<commit_message>
minor edits to 6_linear_regression ppt
</commit_message>
<xml_diff>
--- a/presentations/6_linear_regression/Linear_regression.pptx
+++ b/presentations/6_linear_regression/Linear_regression.pptx
@@ -236,7 +236,7 @@
           <a:p>
             <a:fld id="{2793983C-EFA1-41D2-8DCF-4CEF34100D6A}" type="datetimeFigureOut">
               <a:rPr lang="en-US" smtClean="0"/>
-              <a:t>2/12/2016</a:t>
+              <a:t>2/26/2016</a:t>
             </a:fld>
             <a:endParaRPr lang="en-US"/>
           </a:p>
@@ -2885,7 +2885,7 @@
           <a:p>
             <a:fld id="{97CFF939-70E9-4E47-9899-4E3DA2789027}" type="datetimeFigureOut">
               <a:rPr lang="en-US" smtClean="0"/>
-              <a:t>2/12/2016</a:t>
+              <a:t>2/26/2016</a:t>
             </a:fld>
             <a:endParaRPr lang="en-US"/>
           </a:p>
@@ -3077,7 +3077,7 @@
           <a:p>
             <a:fld id="{97CFF939-70E9-4E47-9899-4E3DA2789027}" type="datetimeFigureOut">
               <a:rPr lang="en-US" smtClean="0"/>
-              <a:t>2/12/2016</a:t>
+              <a:t>2/26/2016</a:t>
             </a:fld>
             <a:endParaRPr lang="en-US"/>
           </a:p>
@@ -3257,7 +3257,7 @@
           <a:p>
             <a:fld id="{97CFF939-70E9-4E47-9899-4E3DA2789027}" type="datetimeFigureOut">
               <a:rPr lang="en-US" smtClean="0"/>
-              <a:t>2/12/2016</a:t>
+              <a:t>2/26/2016</a:t>
             </a:fld>
             <a:endParaRPr lang="en-US"/>
           </a:p>
@@ -3427,7 +3427,7 @@
           <a:p>
             <a:fld id="{97CFF939-70E9-4E47-9899-4E3DA2789027}" type="datetimeFigureOut">
               <a:rPr lang="en-US" smtClean="0"/>
-              <a:t>2/12/2016</a:t>
+              <a:t>2/26/2016</a:t>
             </a:fld>
             <a:endParaRPr lang="en-US"/>
           </a:p>
@@ -3681,7 +3681,7 @@
           <a:p>
             <a:fld id="{97CFF939-70E9-4E47-9899-4E3DA2789027}" type="datetimeFigureOut">
               <a:rPr lang="en-US" smtClean="0"/>
-              <a:t>2/12/2016</a:t>
+              <a:t>2/26/2016</a:t>
             </a:fld>
             <a:endParaRPr lang="en-US"/>
           </a:p>
@@ -4007,7 +4007,7 @@
           <a:p>
             <a:fld id="{97CFF939-70E9-4E47-9899-4E3DA2789027}" type="datetimeFigureOut">
               <a:rPr lang="en-US" smtClean="0"/>
-              <a:t>2/12/2016</a:t>
+              <a:t>2/26/2016</a:t>
             </a:fld>
             <a:endParaRPr lang="en-US"/>
           </a:p>
@@ -4427,7 +4427,7 @@
           <a:p>
             <a:fld id="{97CFF939-70E9-4E47-9899-4E3DA2789027}" type="datetimeFigureOut">
               <a:rPr lang="en-US" smtClean="0"/>
-              <a:t>2/12/2016</a:t>
+              <a:t>2/26/2016</a:t>
             </a:fld>
             <a:endParaRPr lang="en-US"/>
           </a:p>
@@ -4545,7 +4545,7 @@
           <a:p>
             <a:fld id="{97CFF939-70E9-4E47-9899-4E3DA2789027}" type="datetimeFigureOut">
               <a:rPr lang="en-US" smtClean="0"/>
-              <a:t>2/12/2016</a:t>
+              <a:t>2/26/2016</a:t>
             </a:fld>
             <a:endParaRPr lang="en-US"/>
           </a:p>
@@ -4640,7 +4640,7 @@
           <a:p>
             <a:fld id="{97CFF939-70E9-4E47-9899-4E3DA2789027}" type="datetimeFigureOut">
               <a:rPr lang="en-US" smtClean="0"/>
-              <a:t>2/12/2016</a:t>
+              <a:t>2/26/2016</a:t>
             </a:fld>
             <a:endParaRPr lang="en-US"/>
           </a:p>
@@ -4927,7 +4927,7 @@
           <a:p>
             <a:fld id="{97CFF939-70E9-4E47-9899-4E3DA2789027}" type="datetimeFigureOut">
               <a:rPr lang="en-US" smtClean="0"/>
-              <a:t>2/12/2016</a:t>
+              <a:t>2/26/2016</a:t>
             </a:fld>
             <a:endParaRPr lang="en-US"/>
           </a:p>
@@ -5249,7 +5249,7 @@
           <a:p>
             <a:fld id="{97CFF939-70E9-4E47-9899-4E3DA2789027}" type="datetimeFigureOut">
               <a:rPr lang="en-US" smtClean="0"/>
-              <a:t>2/12/2016</a:t>
+              <a:t>2/26/2016</a:t>
             </a:fld>
             <a:endParaRPr lang="en-US"/>
           </a:p>
@@ -5503,7 +5503,7 @@
           <a:p>
             <a:fld id="{97CFF939-70E9-4E47-9899-4E3DA2789027}" type="datetimeFigureOut">
               <a:rPr lang="en-US" smtClean="0"/>
-              <a:t>2/12/2016</a:t>
+              <a:t>2/26/2016</a:t>
             </a:fld>
             <a:endParaRPr lang="en-US"/>
           </a:p>
@@ -10889,11 +10889,7 @@
           <a:p>
             <a:r>
               <a:rPr lang="en-US" sz="2200" b="1" dirty="0" smtClean="0"/>
-              <a:t>Weighted </a:t>
-            </a:r>
-            <a:r>
-              <a:rPr lang="en-US" sz="2200" b="1" dirty="0" smtClean="0"/>
-              <a:t>least squares regression </a:t>
+              <a:t>Weighted least squares regression </a:t>
             </a:r>
             <a:r>
               <a:rPr lang="en-US" sz="2000" dirty="0" smtClean="0"/>
@@ -10907,7 +10903,6 @@
               <a:rPr lang="en-US" sz="2000" dirty="0" smtClean="0"/>
               <a:t> assumption is violated in OLS; gives more weight to observations with small error variance. WLS is not recommended unless the variance structure is known. </a:t>
             </a:r>
-            <a:endParaRPr lang="en-US" sz="2000" dirty="0" smtClean="0"/>
           </a:p>
           <a:p>
             <a:r>
@@ -14322,15 +14317,7 @@
             <a:pPr lvl="0"/>
             <a:r>
               <a:rPr lang="en-US" sz="2400" dirty="0" smtClean="0"/>
-              <a:t>Used in soil </a:t>
-            </a:r>
-            <a:r>
-              <a:rPr lang="en-US" sz="2400" dirty="0" smtClean="0"/>
-              <a:t>science </a:t>
-            </a:r>
-            <a:r>
-              <a:rPr lang="en-US" sz="2400" dirty="0" smtClean="0"/>
-              <a:t>since the early 1900s </a:t>
+              <a:t>Used in soil science since the early 1900s </a:t>
             </a:r>
           </a:p>
           <a:p>
@@ -18751,7 +18738,7 @@
         <p:spPr>
           <a:xfrm>
             <a:off x="5870321" y="2413221"/>
-            <a:ext cx="2417650" cy="646331"/>
+            <a:ext cx="1879041" cy="923330"/>
           </a:xfrm>
           <a:prstGeom prst="rect">
             <a:avLst/>
@@ -18776,7 +18763,18 @@
             </a:r>
             <a:r>
               <a:rPr lang="en-US" dirty="0" smtClean="0"/>
-              <a:t>um of squared error</a:t>
+              <a:t>um of </a:t>
+            </a:r>
+            <a:r>
+              <a:rPr lang="en-US" smtClean="0"/>
+              <a:t>squared </a:t>
+            </a:r>
+            <a:endParaRPr lang="en-US" smtClean="0"/>
+          </a:p>
+          <a:p>
+            <a:r>
+              <a:rPr lang="en-US" smtClean="0"/>
+              <a:t>error</a:t>
             </a:r>
             <a:endParaRPr lang="en-US" dirty="0"/>
           </a:p>

</xml_diff>

<commit_message>
adding content to 6_linear_regression ppt
</commit_message>
<xml_diff>
--- a/presentations/6_linear_regression/Linear_regression.pptx
+++ b/presentations/6_linear_regression/Linear_regression.pptx
@@ -5,15 +5,15 @@
     <p:sldMasterId id="2147483684" r:id="rId1"/>
   </p:sldMasterIdLst>
   <p:notesMasterIdLst>
-    <p:notesMasterId r:id="rId31"/>
+    <p:notesMasterId r:id="rId32"/>
   </p:notesMasterIdLst>
   <p:sldIdLst>
     <p:sldId id="256" r:id="rId2"/>
     <p:sldId id="287" r:id="rId3"/>
     <p:sldId id="298" r:id="rId4"/>
-    <p:sldId id="303" r:id="rId5"/>
-    <p:sldId id="323" r:id="rId6"/>
-    <p:sldId id="312" r:id="rId7"/>
+    <p:sldId id="312" r:id="rId5"/>
+    <p:sldId id="303" r:id="rId6"/>
+    <p:sldId id="323" r:id="rId7"/>
     <p:sldId id="300" r:id="rId8"/>
     <p:sldId id="301" r:id="rId9"/>
     <p:sldId id="299" r:id="rId10"/>
@@ -28,15 +28,16 @@
     <p:sldId id="319" r:id="rId19"/>
     <p:sldId id="296" r:id="rId20"/>
     <p:sldId id="297" r:id="rId21"/>
-    <p:sldId id="310" r:id="rId22"/>
-    <p:sldId id="294" r:id="rId23"/>
-    <p:sldId id="306" r:id="rId24"/>
-    <p:sldId id="325" r:id="rId25"/>
-    <p:sldId id="320" r:id="rId26"/>
-    <p:sldId id="308" r:id="rId27"/>
-    <p:sldId id="324" r:id="rId28"/>
-    <p:sldId id="309" r:id="rId29"/>
-    <p:sldId id="311" r:id="rId30"/>
+    <p:sldId id="326" r:id="rId22"/>
+    <p:sldId id="310" r:id="rId23"/>
+    <p:sldId id="294" r:id="rId24"/>
+    <p:sldId id="306" r:id="rId25"/>
+    <p:sldId id="325" r:id="rId26"/>
+    <p:sldId id="320" r:id="rId27"/>
+    <p:sldId id="308" r:id="rId28"/>
+    <p:sldId id="324" r:id="rId29"/>
+    <p:sldId id="309" r:id="rId30"/>
+    <p:sldId id="311" r:id="rId31"/>
   </p:sldIdLst>
   <p:sldSz cx="9144000" cy="6858000" type="screen4x3"/>
   <p:notesSz cx="6858000" cy="9144000"/>
@@ -236,7 +237,7 @@
           <a:p>
             <a:fld id="{2793983C-EFA1-41D2-8DCF-4CEF34100D6A}" type="datetimeFigureOut">
               <a:rPr lang="en-US" smtClean="0"/>
-              <a:t>2/26/2016</a:t>
+              <a:t>2/29/2016</a:t>
             </a:fld>
             <a:endParaRPr lang="en-US"/>
           </a:p>
@@ -956,6 +957,10 @@
               <a:rPr lang="en-US" baseline="0" dirty="0" smtClean="0"/>
               <a:t> it is important to remember that correlation does not imply causation. Always remember to look at the variables you have – do they make sense that they would be good predictors of the response variable? </a:t>
             </a:r>
+            <a:r>
+              <a:rPr lang="en-US" baseline="0" dirty="0" smtClean="0"/>
+              <a:t>Are the model assumptions met?</a:t>
+            </a:r>
             <a:endParaRPr lang="en-US" dirty="0"/>
           </a:p>
         </p:txBody>
@@ -1042,19 +1047,60 @@
           <a:p>
             <a:r>
               <a:rPr lang="en-US" dirty="0" smtClean="0"/>
-              <a:t>Regression</a:t>
+              <a:t>Scull et al., 2005 in The</a:t>
             </a:r>
             <a:r>
               <a:rPr lang="en-US" baseline="0" dirty="0" smtClean="0"/>
-              <a:t> can also be used in geospatial models, such as regression kriging, geographically weighted regression, etc. It is common in the soil science field to </a:t>
+              <a:t> Professional Geographer. This study compared </a:t>
             </a:r>
             <a:r>
               <a:rPr lang="en-US" baseline="0" dirty="0" err="1" smtClean="0"/>
-              <a:t>krige</a:t>
+              <a:t>nonspatial</a:t>
             </a:r>
             <a:r>
               <a:rPr lang="en-US" baseline="0" dirty="0" smtClean="0"/>
-              <a:t> the residuals of a model such as OLS and add them to the OLS model to better capture spatial variability in the model. </a:t>
+              <a:t> statistical models with geospatial statistical models to predict A horizon gravel and surface fragments for a portion of the Pinto Basin in Joshua Tree National Park, CA. They concluded that MLR performed the best with a m</a:t>
+            </a:r>
+            <a:r>
+              <a:rPr lang="en-US" dirty="0" smtClean="0"/>
+              <a:t>ean jackknife RMSE of </a:t>
+            </a:r>
+            <a:r>
+              <a:rPr lang="en-US" baseline="0" dirty="0" smtClean="0"/>
+              <a:t>12.7% for A horizon gravel and 20.7% for rock fragments. </a:t>
+            </a:r>
+            <a:r>
+              <a:rPr lang="en-US" b="1" baseline="0" dirty="0" smtClean="0"/>
+              <a:t>Looking at the fitted vs actual values, what do you notice about their MLR model?</a:t>
+            </a:r>
+          </a:p>
+          <a:p>
+            <a:endParaRPr lang="en-US" baseline="0" dirty="0" smtClean="0"/>
+          </a:p>
+          <a:p>
+            <a:r>
+              <a:rPr lang="en-US" baseline="0" dirty="0" smtClean="0"/>
+              <a:t>-PCA of </a:t>
+            </a:r>
+            <a:r>
+              <a:rPr lang="en-US" baseline="0" dirty="0" err="1" smtClean="0"/>
+              <a:t>landsat</a:t>
+            </a:r>
+            <a:r>
+              <a:rPr lang="en-US" baseline="0" dirty="0" smtClean="0"/>
+              <a:t> was used in MLR models</a:t>
+            </a:r>
+          </a:p>
+          <a:p>
+            <a:r>
+              <a:rPr lang="en-US" baseline="0" dirty="0" smtClean="0"/>
+              <a:t>“the high standard deviations for the regression tree and geostatistical models show that they are more sensitive to outliers and data anomalies than other methods”</a:t>
+            </a:r>
+          </a:p>
+          <a:p>
+            <a:r>
+              <a:rPr lang="en-US" baseline="0" dirty="0" smtClean="0"/>
+              <a:t>“the discontinuous data pattern.” </a:t>
             </a:r>
             <a:endParaRPr lang="en-US" dirty="0"/>
           </a:p>
@@ -1077,7 +1123,7 @@
           <a:p>
             <a:fld id="{CC5A1FCD-79C7-4337-B79E-A51417706FB1}" type="slidenum">
               <a:rPr lang="en-US" smtClean="0"/>
-              <a:t>24</a:t>
+              <a:t>21</a:t>
             </a:fld>
             <a:endParaRPr lang="en-US"/>
           </a:p>
@@ -1086,7 +1132,7 @@
     </p:spTree>
     <p:extLst>
       <p:ext uri="{BB962C8B-B14F-4D97-AF65-F5344CB8AC3E}">
-        <p14:creationId xmlns:p14="http://schemas.microsoft.com/office/powerpoint/2010/main" val="1152817016"/>
+        <p14:creationId xmlns:p14="http://schemas.microsoft.com/office/powerpoint/2010/main" val="1991638967"/>
       </p:ext>
     </p:extLst>
   </p:cSld>
@@ -1140,6 +1186,22 @@
           <a:bodyPr/>
           <a:lstStyle/>
           <a:p>
+            <a:r>
+              <a:rPr lang="en-US" dirty="0" smtClean="0"/>
+              <a:t>Regression</a:t>
+            </a:r>
+            <a:r>
+              <a:rPr lang="en-US" baseline="0" dirty="0" smtClean="0"/>
+              <a:t> can also be used in geospatial models, such as regression kriging, geographically weighted regression, etc. It is common in the soil science field to </a:t>
+            </a:r>
+            <a:r>
+              <a:rPr lang="en-US" baseline="0" dirty="0" err="1" smtClean="0"/>
+              <a:t>krige</a:t>
+            </a:r>
+            <a:r>
+              <a:rPr lang="en-US" baseline="0" dirty="0" smtClean="0"/>
+              <a:t> the residuals of a model such as OLS and add them to the OLS model to better capture spatial variability in the model. </a:t>
+            </a:r>
             <a:endParaRPr lang="en-US" dirty="0"/>
           </a:p>
         </p:txBody>
@@ -1170,7 +1232,7 @@
     </p:spTree>
     <p:extLst>
       <p:ext uri="{BB962C8B-B14F-4D97-AF65-F5344CB8AC3E}">
-        <p14:creationId xmlns:p14="http://schemas.microsoft.com/office/powerpoint/2010/main" val="2613395863"/>
+        <p14:creationId xmlns:p14="http://schemas.microsoft.com/office/powerpoint/2010/main" val="1152817016"/>
       </p:ext>
     </p:extLst>
   </p:cSld>
@@ -1224,70 +1286,7 @@
           <a:bodyPr/>
           <a:lstStyle/>
           <a:p>
-            <a:pPr marL="0" marR="0" indent="0" algn="l" defTabSz="914400" rtl="0" eaLnBrk="1" fontAlgn="auto" latinLnBrk="0" hangingPunct="1">
-              <a:lnSpc>
-                <a:spcPct val="100000"/>
-              </a:lnSpc>
-              <a:spcBef>
-                <a:spcPts val="0"/>
-              </a:spcBef>
-              <a:spcAft>
-                <a:spcPts val="0"/>
-              </a:spcAft>
-              <a:buClrTx/>
-              <a:buSzTx/>
-              <a:buFontTx/>
-              <a:buNone/>
-              <a:tabLst/>
-              <a:defRPr/>
-            </a:pPr>
-            <a:r>
-              <a:rPr lang="en-US" altLang="en-US" b="0" dirty="0" smtClean="0"/>
-              <a:t>The Sum of Squares Regression (SSR) is the sum of the squared differences between the prediction for each observation and the population mean. (explained</a:t>
-            </a:r>
-            <a:r>
-              <a:rPr lang="en-US" altLang="en-US" b="0" baseline="0" dirty="0" smtClean="0"/>
-              <a:t> variation)</a:t>
-            </a:r>
-            <a:endParaRPr lang="en-US" altLang="en-US" b="0" dirty="0" smtClean="0"/>
-          </a:p>
-          <a:p>
-            <a:endParaRPr lang="en-US" b="0" dirty="0" smtClean="0"/>
-          </a:p>
-          <a:p>
-            <a:pPr eaLnBrk="1" hangingPunct="1">
-              <a:spcBef>
-                <a:spcPct val="50000"/>
-              </a:spcBef>
-            </a:pPr>
-            <a:r>
-              <a:rPr lang="en-US" altLang="en-US" b="0" dirty="0" smtClean="0"/>
-              <a:t>A least squares regression selects the line with the lowest total sum of squared prediction errors or SSE</a:t>
-            </a:r>
-            <a:r>
-              <a:rPr lang="en-US" altLang="en-US" b="0" baseline="0" dirty="0" smtClean="0"/>
-              <a:t> (unexplained variation)</a:t>
-            </a:r>
-          </a:p>
-          <a:p>
-            <a:pPr eaLnBrk="1" hangingPunct="1">
-              <a:spcBef>
-                <a:spcPct val="50000"/>
-              </a:spcBef>
-            </a:pPr>
-            <a:endParaRPr lang="en-US" altLang="en-US" b="0" baseline="0" dirty="0" smtClean="0"/>
-          </a:p>
-          <a:p>
-            <a:pPr eaLnBrk="1" hangingPunct="1">
-              <a:spcBef>
-                <a:spcPct val="50000"/>
-              </a:spcBef>
-            </a:pPr>
-            <a:r>
-              <a:rPr lang="en-US" altLang="en-US" b="0" baseline="0" dirty="0" smtClean="0"/>
-              <a:t>SST (total variation in y)</a:t>
-            </a:r>
-            <a:endParaRPr lang="en-US" altLang="en-US" b="0" dirty="0" smtClean="0"/>
+            <a:endParaRPr lang="en-US" dirty="0"/>
           </a:p>
         </p:txBody>
       </p:sp>
@@ -1317,7 +1316,7 @@
     </p:spTree>
     <p:extLst>
       <p:ext uri="{BB962C8B-B14F-4D97-AF65-F5344CB8AC3E}">
-        <p14:creationId xmlns:p14="http://schemas.microsoft.com/office/powerpoint/2010/main" val="975952257"/>
+        <p14:creationId xmlns:p14="http://schemas.microsoft.com/office/powerpoint/2010/main" val="2613395863"/>
       </p:ext>
     </p:extLst>
   </p:cSld>
@@ -1371,7 +1370,70 @@
           <a:bodyPr/>
           <a:lstStyle/>
           <a:p>
-            <a:endParaRPr lang="en-US" b="0" baseline="0" dirty="0" smtClean="0"/>
+            <a:pPr marL="0" marR="0" indent="0" algn="l" defTabSz="914400" rtl="0" eaLnBrk="1" fontAlgn="auto" latinLnBrk="0" hangingPunct="1">
+              <a:lnSpc>
+                <a:spcPct val="100000"/>
+              </a:lnSpc>
+              <a:spcBef>
+                <a:spcPts val="0"/>
+              </a:spcBef>
+              <a:spcAft>
+                <a:spcPts val="0"/>
+              </a:spcAft>
+              <a:buClrTx/>
+              <a:buSzTx/>
+              <a:buFontTx/>
+              <a:buNone/>
+              <a:tabLst/>
+              <a:defRPr/>
+            </a:pPr>
+            <a:r>
+              <a:rPr lang="en-US" altLang="en-US" b="0" dirty="0" smtClean="0"/>
+              <a:t>The Sum of Squares Regression (SSR) is the sum of the squared differences between the prediction for each observation and the population mean. (explained</a:t>
+            </a:r>
+            <a:r>
+              <a:rPr lang="en-US" altLang="en-US" b="0" baseline="0" dirty="0" smtClean="0"/>
+              <a:t> variation)</a:t>
+            </a:r>
+            <a:endParaRPr lang="en-US" altLang="en-US" b="0" dirty="0" smtClean="0"/>
+          </a:p>
+          <a:p>
+            <a:endParaRPr lang="en-US" b="0" dirty="0" smtClean="0"/>
+          </a:p>
+          <a:p>
+            <a:pPr eaLnBrk="1" hangingPunct="1">
+              <a:spcBef>
+                <a:spcPct val="50000"/>
+              </a:spcBef>
+            </a:pPr>
+            <a:r>
+              <a:rPr lang="en-US" altLang="en-US" b="0" dirty="0" smtClean="0"/>
+              <a:t>A least squares regression selects the line with the lowest total sum of squared prediction errors or SSE</a:t>
+            </a:r>
+            <a:r>
+              <a:rPr lang="en-US" altLang="en-US" b="0" baseline="0" dirty="0" smtClean="0"/>
+              <a:t> (unexplained variation)</a:t>
+            </a:r>
+          </a:p>
+          <a:p>
+            <a:pPr eaLnBrk="1" hangingPunct="1">
+              <a:spcBef>
+                <a:spcPct val="50000"/>
+              </a:spcBef>
+            </a:pPr>
+            <a:endParaRPr lang="en-US" altLang="en-US" b="0" baseline="0" dirty="0" smtClean="0"/>
+          </a:p>
+          <a:p>
+            <a:pPr eaLnBrk="1" hangingPunct="1">
+              <a:spcBef>
+                <a:spcPct val="50000"/>
+              </a:spcBef>
+            </a:pPr>
+            <a:r>
+              <a:rPr lang="en-US" altLang="en-US" b="0" baseline="0" dirty="0" smtClean="0"/>
+              <a:t>SST (total variation in y)</a:t>
+            </a:r>
+            <a:endParaRPr lang="en-US" altLang="en-US" b="0" dirty="0" smtClean="0"/>
           </a:p>
         </p:txBody>
       </p:sp>
@@ -1401,7 +1463,7 @@
     </p:spTree>
     <p:extLst>
       <p:ext uri="{BB962C8B-B14F-4D97-AF65-F5344CB8AC3E}">
-        <p14:creationId xmlns:p14="http://schemas.microsoft.com/office/powerpoint/2010/main" val="3405494277"/>
+        <p14:creationId xmlns:p14="http://schemas.microsoft.com/office/powerpoint/2010/main" val="975952257"/>
       </p:ext>
     </p:extLst>
   </p:cSld>
@@ -1477,6 +1539,90 @@
             <a:fld id="{CC5A1FCD-79C7-4337-B79E-A51417706FB1}" type="slidenum">
               <a:rPr lang="en-US" smtClean="0"/>
               <a:t>28</a:t>
+            </a:fld>
+            <a:endParaRPr lang="en-US"/>
+          </a:p>
+        </p:txBody>
+      </p:sp>
+    </p:spTree>
+    <p:extLst>
+      <p:ext uri="{BB962C8B-B14F-4D97-AF65-F5344CB8AC3E}">
+        <p14:creationId xmlns:p14="http://schemas.microsoft.com/office/powerpoint/2010/main" val="3405494277"/>
+      </p:ext>
+    </p:extLst>
+  </p:cSld>
+  <p:clrMapOvr>
+    <a:masterClrMapping/>
+  </p:clrMapOvr>
+</p:notes>
+</file>
+
+<file path=ppt/notesSlides/notesSlide19.xml><?xml version="1.0" encoding="utf-8"?>
+<p:notes xmlns:a="http://schemas.openxmlformats.org/drawingml/2006/main" xmlns:r="http://schemas.openxmlformats.org/officeDocument/2006/relationships" xmlns:p="http://schemas.openxmlformats.org/presentationml/2006/main">
+  <p:cSld>
+    <p:spTree>
+      <p:nvGrpSpPr>
+        <p:cNvPr id="1" name=""/>
+        <p:cNvGrpSpPr/>
+        <p:nvPr/>
+      </p:nvGrpSpPr>
+      <p:grpSpPr>
+        <a:xfrm>
+          <a:off x="0" y="0"/>
+          <a:ext cx="0" cy="0"/>
+          <a:chOff x="0" y="0"/>
+          <a:chExt cx="0" cy="0"/>
+        </a:xfrm>
+      </p:grpSpPr>
+      <p:sp>
+        <p:nvSpPr>
+          <p:cNvPr id="2" name="Slide Image Placeholder 1"/>
+          <p:cNvSpPr>
+            <a:spLocks noGrp="1" noRot="1" noChangeAspect="1"/>
+          </p:cNvSpPr>
+          <p:nvPr>
+            <p:ph type="sldImg"/>
+          </p:nvPr>
+        </p:nvSpPr>
+        <p:spPr/>
+      </p:sp>
+      <p:sp>
+        <p:nvSpPr>
+          <p:cNvPr id="3" name="Notes Placeholder 2"/>
+          <p:cNvSpPr>
+            <a:spLocks noGrp="1"/>
+          </p:cNvSpPr>
+          <p:nvPr>
+            <p:ph type="body" idx="1"/>
+          </p:nvPr>
+        </p:nvSpPr>
+        <p:spPr/>
+        <p:txBody>
+          <a:bodyPr/>
+          <a:lstStyle/>
+          <a:p>
+            <a:endParaRPr lang="en-US" b="0" baseline="0" dirty="0" smtClean="0"/>
+          </a:p>
+        </p:txBody>
+      </p:sp>
+      <p:sp>
+        <p:nvSpPr>
+          <p:cNvPr id="4" name="Slide Number Placeholder 3"/>
+          <p:cNvSpPr>
+            <a:spLocks noGrp="1"/>
+          </p:cNvSpPr>
+          <p:nvPr>
+            <p:ph type="sldNum" sz="quarter" idx="10"/>
+          </p:nvPr>
+        </p:nvSpPr>
+        <p:spPr/>
+        <p:txBody>
+          <a:bodyPr/>
+          <a:lstStyle/>
+          <a:p>
+            <a:fld id="{CC5A1FCD-79C7-4337-B79E-A51417706FB1}" type="slidenum">
+              <a:rPr lang="en-US" smtClean="0"/>
+              <a:t>29</a:t>
             </a:fld>
             <a:endParaRPr lang="en-US"/>
           </a:p>
@@ -1540,13 +1686,43 @@
           <a:lstStyle/>
           <a:p>
             <a:r>
-              <a:rPr lang="en-US" dirty="0" smtClean="0"/>
-              <a:t>Line</a:t>
-            </a:r>
-            <a:r>
-              <a:rPr lang="en-US" baseline="0" dirty="0" smtClean="0"/>
-              <a:t> of best fit = mean of y given x</a:t>
-            </a:r>
+              <a:rPr lang="en-US" sz="1200" b="1" kern="1200" dirty="0" smtClean="0">
+                <a:solidFill>
+                  <a:schemeClr val="tx1"/>
+                </a:solidFill>
+                <a:effectLst/>
+                <a:latin typeface="+mn-lt"/>
+                <a:ea typeface="+mn-ea"/>
+                <a:cs typeface="+mn-cs"/>
+              </a:rPr>
+              <a:t>Can anyone provide an</a:t>
+            </a:r>
+            <a:r>
+              <a:rPr lang="en-US" sz="1200" b="1" kern="1200" baseline="0" dirty="0" smtClean="0">
+                <a:solidFill>
+                  <a:schemeClr val="tx1"/>
+                </a:solidFill>
+                <a:effectLst/>
+                <a:latin typeface="+mn-lt"/>
+                <a:ea typeface="+mn-ea"/>
+                <a:cs typeface="+mn-cs"/>
+              </a:rPr>
+              <a:t> </a:t>
+            </a:r>
+            <a:r>
+              <a:rPr lang="en-US" sz="1200" b="1" kern="1200" dirty="0" smtClean="0">
+                <a:solidFill>
+                  <a:schemeClr val="tx1"/>
+                </a:solidFill>
+                <a:effectLst/>
+                <a:latin typeface="+mn-lt"/>
+                <a:ea typeface="+mn-ea"/>
+                <a:cs typeface="+mn-cs"/>
+              </a:rPr>
+              <a:t>example of how regression has been used in the natural resources field?</a:t>
+            </a:r>
+          </a:p>
+          <a:p>
             <a:endParaRPr lang="en-US" dirty="0"/>
           </a:p>
         </p:txBody>
@@ -1570,14 +1746,14 @@
               <a:rPr lang="en-US" smtClean="0"/>
               <a:t>4</a:t>
             </a:fld>
-            <a:endParaRPr lang="en-US"/>
+            <a:endParaRPr lang="en-US" dirty="0"/>
           </a:p>
         </p:txBody>
       </p:sp>
     </p:spTree>
     <p:extLst>
       <p:ext uri="{BB962C8B-B14F-4D97-AF65-F5344CB8AC3E}">
-        <p14:creationId xmlns:p14="http://schemas.microsoft.com/office/powerpoint/2010/main" val="4287444118"/>
+        <p14:creationId xmlns:p14="http://schemas.microsoft.com/office/powerpoint/2010/main" val="787909582"/>
       </p:ext>
     </p:extLst>
   </p:cSld>
@@ -1632,26 +1808,14 @@
           <a:lstStyle/>
           <a:p>
             <a:r>
-              <a:rPr lang="en-US" sz="1200" kern="1200" dirty="0" smtClean="0">
-                <a:solidFill>
-                  <a:schemeClr val="tx1"/>
-                </a:solidFill>
-                <a:effectLst/>
-                <a:latin typeface="+mn-lt"/>
-                <a:ea typeface="+mn-ea"/>
-                <a:cs typeface="+mn-cs"/>
-              </a:rPr>
-              <a:t>OLS produces a line that minimizes the sum of the squared vertical distances from the line to the observed data points.</a:t>
-            </a:r>
-            <a:endParaRPr lang="en-US" sz="1200" kern="1200" dirty="0">
-              <a:solidFill>
-                <a:schemeClr val="tx1"/>
-              </a:solidFill>
-              <a:effectLst/>
-              <a:latin typeface="+mn-lt"/>
-              <a:ea typeface="+mn-ea"/>
-              <a:cs typeface="+mn-cs"/>
-            </a:endParaRPr>
+              <a:rPr lang="en-US" dirty="0" smtClean="0"/>
+              <a:t>Line</a:t>
+            </a:r>
+            <a:r>
+              <a:rPr lang="en-US" baseline="0" dirty="0" smtClean="0"/>
+              <a:t> of best fit = mean of y given x</a:t>
+            </a:r>
+            <a:endParaRPr lang="en-US" dirty="0"/>
           </a:p>
         </p:txBody>
       </p:sp>
@@ -1674,14 +1838,14 @@
               <a:rPr lang="en-US" smtClean="0"/>
               <a:t>5</a:t>
             </a:fld>
-            <a:endParaRPr lang="en-US" dirty="0"/>
+            <a:endParaRPr lang="en-US"/>
           </a:p>
         </p:txBody>
       </p:sp>
     </p:spTree>
     <p:extLst>
       <p:ext uri="{BB962C8B-B14F-4D97-AF65-F5344CB8AC3E}">
-        <p14:creationId xmlns:p14="http://schemas.microsoft.com/office/powerpoint/2010/main" val="2411597923"/>
+        <p14:creationId xmlns:p14="http://schemas.microsoft.com/office/powerpoint/2010/main" val="4287444118"/>
       </p:ext>
     </p:extLst>
   </p:cSld>
@@ -1736,7 +1900,7 @@
           <a:lstStyle/>
           <a:p>
             <a:r>
-              <a:rPr lang="en-US" sz="1200" b="1" kern="1200" dirty="0" smtClean="0">
+              <a:rPr lang="en-US" sz="1200" kern="1200" dirty="0" smtClean="0">
                 <a:solidFill>
                   <a:schemeClr val="tx1"/>
                 </a:solidFill>
@@ -1745,35 +1909,17 @@
                 <a:ea typeface="+mn-ea"/>
                 <a:cs typeface="+mn-cs"/>
               </a:rPr>
-              <a:t>Can anyone provide an</a:t>
-            </a:r>
-            <a:r>
-              <a:rPr lang="en-US" sz="1200" b="1" kern="1200" baseline="0" dirty="0" smtClean="0">
-                <a:solidFill>
-                  <a:schemeClr val="tx1"/>
-                </a:solidFill>
-                <a:effectLst/>
-                <a:latin typeface="+mn-lt"/>
-                <a:ea typeface="+mn-ea"/>
-                <a:cs typeface="+mn-cs"/>
-              </a:rPr>
-              <a:t> </a:t>
-            </a:r>
-            <a:r>
-              <a:rPr lang="en-US" sz="1200" b="1" kern="1200" dirty="0" smtClean="0">
-                <a:solidFill>
-                  <a:schemeClr val="tx1"/>
-                </a:solidFill>
-                <a:effectLst/>
-                <a:latin typeface="+mn-lt"/>
-                <a:ea typeface="+mn-ea"/>
-                <a:cs typeface="+mn-cs"/>
-              </a:rPr>
-              <a:t>example of how regression has been used in the natural resources field?</a:t>
-            </a:r>
-          </a:p>
-          <a:p>
-            <a:endParaRPr lang="en-US" dirty="0"/>
+              <a:t>OLS produces a line that minimizes the sum of the squared vertical distances from the line to the observed data points.</a:t>
+            </a:r>
+            <a:endParaRPr lang="en-US" sz="1200" kern="1200" dirty="0">
+              <a:solidFill>
+                <a:schemeClr val="tx1"/>
+              </a:solidFill>
+              <a:effectLst/>
+              <a:latin typeface="+mn-lt"/>
+              <a:ea typeface="+mn-ea"/>
+              <a:cs typeface="+mn-cs"/>
+            </a:endParaRPr>
           </a:p>
         </p:txBody>
       </p:sp>
@@ -1803,7 +1949,7 @@
     </p:spTree>
     <p:extLst>
       <p:ext uri="{BB962C8B-B14F-4D97-AF65-F5344CB8AC3E}">
-        <p14:creationId xmlns:p14="http://schemas.microsoft.com/office/powerpoint/2010/main" val="787909582"/>
+        <p14:creationId xmlns:p14="http://schemas.microsoft.com/office/powerpoint/2010/main" val="2411597923"/>
       </p:ext>
     </p:extLst>
   </p:cSld>
@@ -2885,7 +3031,7 @@
           <a:p>
             <a:fld id="{97CFF939-70E9-4E47-9899-4E3DA2789027}" type="datetimeFigureOut">
               <a:rPr lang="en-US" smtClean="0"/>
-              <a:t>2/26/2016</a:t>
+              <a:t>2/29/2016</a:t>
             </a:fld>
             <a:endParaRPr lang="en-US"/>
           </a:p>
@@ -3077,7 +3223,7 @@
           <a:p>
             <a:fld id="{97CFF939-70E9-4E47-9899-4E3DA2789027}" type="datetimeFigureOut">
               <a:rPr lang="en-US" smtClean="0"/>
-              <a:t>2/26/2016</a:t>
+              <a:t>2/29/2016</a:t>
             </a:fld>
             <a:endParaRPr lang="en-US"/>
           </a:p>
@@ -3257,7 +3403,7 @@
           <a:p>
             <a:fld id="{97CFF939-70E9-4E47-9899-4E3DA2789027}" type="datetimeFigureOut">
               <a:rPr lang="en-US" smtClean="0"/>
-              <a:t>2/26/2016</a:t>
+              <a:t>2/29/2016</a:t>
             </a:fld>
             <a:endParaRPr lang="en-US"/>
           </a:p>
@@ -3427,7 +3573,7 @@
           <a:p>
             <a:fld id="{97CFF939-70E9-4E47-9899-4E3DA2789027}" type="datetimeFigureOut">
               <a:rPr lang="en-US" smtClean="0"/>
-              <a:t>2/26/2016</a:t>
+              <a:t>2/29/2016</a:t>
             </a:fld>
             <a:endParaRPr lang="en-US"/>
           </a:p>
@@ -3681,7 +3827,7 @@
           <a:p>
             <a:fld id="{97CFF939-70E9-4E47-9899-4E3DA2789027}" type="datetimeFigureOut">
               <a:rPr lang="en-US" smtClean="0"/>
-              <a:t>2/26/2016</a:t>
+              <a:t>2/29/2016</a:t>
             </a:fld>
             <a:endParaRPr lang="en-US"/>
           </a:p>
@@ -4007,7 +4153,7 @@
           <a:p>
             <a:fld id="{97CFF939-70E9-4E47-9899-4E3DA2789027}" type="datetimeFigureOut">
               <a:rPr lang="en-US" smtClean="0"/>
-              <a:t>2/26/2016</a:t>
+              <a:t>2/29/2016</a:t>
             </a:fld>
             <a:endParaRPr lang="en-US"/>
           </a:p>
@@ -4427,7 +4573,7 @@
           <a:p>
             <a:fld id="{97CFF939-70E9-4E47-9899-4E3DA2789027}" type="datetimeFigureOut">
               <a:rPr lang="en-US" smtClean="0"/>
-              <a:t>2/26/2016</a:t>
+              <a:t>2/29/2016</a:t>
             </a:fld>
             <a:endParaRPr lang="en-US"/>
           </a:p>
@@ -4545,7 +4691,7 @@
           <a:p>
             <a:fld id="{97CFF939-70E9-4E47-9899-4E3DA2789027}" type="datetimeFigureOut">
               <a:rPr lang="en-US" smtClean="0"/>
-              <a:t>2/26/2016</a:t>
+              <a:t>2/29/2016</a:t>
             </a:fld>
             <a:endParaRPr lang="en-US"/>
           </a:p>
@@ -4640,7 +4786,7 @@
           <a:p>
             <a:fld id="{97CFF939-70E9-4E47-9899-4E3DA2789027}" type="datetimeFigureOut">
               <a:rPr lang="en-US" smtClean="0"/>
-              <a:t>2/26/2016</a:t>
+              <a:t>2/29/2016</a:t>
             </a:fld>
             <a:endParaRPr lang="en-US"/>
           </a:p>
@@ -4927,7 +5073,7 @@
           <a:p>
             <a:fld id="{97CFF939-70E9-4E47-9899-4E3DA2789027}" type="datetimeFigureOut">
               <a:rPr lang="en-US" smtClean="0"/>
-              <a:t>2/26/2016</a:t>
+              <a:t>2/29/2016</a:t>
             </a:fld>
             <a:endParaRPr lang="en-US"/>
           </a:p>
@@ -5249,7 +5395,7 @@
           <a:p>
             <a:fld id="{97CFF939-70E9-4E47-9899-4E3DA2789027}" type="datetimeFigureOut">
               <a:rPr lang="en-US" smtClean="0"/>
-              <a:t>2/26/2016</a:t>
+              <a:t>2/29/2016</a:t>
             </a:fld>
             <a:endParaRPr lang="en-US"/>
           </a:p>
@@ -5503,7 +5649,7 @@
           <a:p>
             <a:fld id="{97CFF939-70E9-4E47-9899-4E3DA2789027}" type="datetimeFigureOut">
               <a:rPr lang="en-US" smtClean="0"/>
-              <a:t>2/26/2016</a:t>
+              <a:t>2/29/2016</a:t>
             </a:fld>
             <a:endParaRPr lang="en-US"/>
           </a:p>
@@ -9365,17 +9511,31 @@
         </p:nvSpPr>
         <p:spPr/>
         <p:txBody>
-          <a:bodyPr/>
+          <a:bodyPr>
+            <a:normAutofit/>
+          </a:bodyPr>
           <a:lstStyle/>
           <a:p>
             <a:pPr marL="0" indent="0">
               <a:buNone/>
             </a:pPr>
             <a:r>
-              <a:rPr lang="en-US" dirty="0" smtClean="0"/>
-              <a:t>****INSERT LINK TO LINEAR REGRESSION .RMD FILE****</a:t>
-            </a:r>
-            <a:endParaRPr lang="en-US" dirty="0"/>
+              <a:rPr lang="en-US" sz="2400" dirty="0">
+                <a:hlinkClick r:id="rId2"/>
+              </a:rPr>
+              <a:t>https://</a:t>
+            </a:r>
+            <a:r>
+              <a:rPr lang="en-US" sz="2400" dirty="0" smtClean="0">
+                <a:hlinkClick r:id="rId2"/>
+              </a:rPr>
+              <a:t>github.com/ncss-tech/stats_for_soil_survey/tree/master/chapters/6_linear_models</a:t>
+            </a:r>
+            <a:r>
+              <a:rPr lang="en-US" sz="2400" dirty="0" smtClean="0"/>
+              <a:t> </a:t>
+            </a:r>
+            <a:endParaRPr lang="en-US" sz="2400" dirty="0"/>
           </a:p>
         </p:txBody>
       </p:sp>
@@ -9637,6 +9797,137 @@
 </file>
 
 <file path=ppt/slides/slide21.xml><?xml version="1.0" encoding="utf-8"?>
+<p:sld xmlns:a="http://schemas.openxmlformats.org/drawingml/2006/main" xmlns:r="http://schemas.openxmlformats.org/officeDocument/2006/relationships" xmlns:p="http://schemas.openxmlformats.org/presentationml/2006/main">
+  <p:cSld>
+    <p:spTree>
+      <p:nvGrpSpPr>
+        <p:cNvPr id="1" name=""/>
+        <p:cNvGrpSpPr/>
+        <p:nvPr/>
+      </p:nvGrpSpPr>
+      <p:grpSpPr>
+        <a:xfrm>
+          <a:off x="0" y="0"/>
+          <a:ext cx="0" cy="0"/>
+          <a:chOff x="0" y="0"/>
+          <a:chExt cx="0" cy="0"/>
+        </a:xfrm>
+      </p:grpSpPr>
+      <p:sp>
+        <p:nvSpPr>
+          <p:cNvPr id="2" name="Title 1"/>
+          <p:cNvSpPr>
+            <a:spLocks noGrp="1"/>
+          </p:cNvSpPr>
+          <p:nvPr>
+            <p:ph type="title"/>
+          </p:nvPr>
+        </p:nvSpPr>
+        <p:spPr/>
+        <p:txBody>
+          <a:bodyPr/>
+          <a:lstStyle/>
+          <a:p>
+            <a:endParaRPr lang="en-US"/>
+          </a:p>
+        </p:txBody>
+      </p:sp>
+      <p:sp>
+        <p:nvSpPr>
+          <p:cNvPr id="5" name="Content Placeholder 4"/>
+          <p:cNvSpPr>
+            <a:spLocks noGrp="1"/>
+          </p:cNvSpPr>
+          <p:nvPr>
+            <p:ph idx="1"/>
+          </p:nvPr>
+        </p:nvSpPr>
+        <p:spPr/>
+        <p:txBody>
+          <a:bodyPr/>
+          <a:lstStyle/>
+          <a:p>
+            <a:endParaRPr lang="en-US"/>
+          </a:p>
+        </p:txBody>
+      </p:sp>
+      <p:pic>
+        <p:nvPicPr>
+          <p:cNvPr id="7" name="Picture 6"/>
+          <p:cNvPicPr>
+            <a:picLocks noChangeAspect="1"/>
+          </p:cNvPicPr>
+          <p:nvPr/>
+        </p:nvPicPr>
+        <p:blipFill>
+          <a:blip r:embed="rId3">
+            <a:grayscl/>
+          </a:blip>
+          <a:stretch>
+            <a:fillRect/>
+          </a:stretch>
+        </p:blipFill>
+        <p:spPr>
+          <a:xfrm>
+            <a:off x="1525711" y="365760"/>
+            <a:ext cx="5287906" cy="6246910"/>
+          </a:xfrm>
+          <a:prstGeom prst="rect">
+            <a:avLst/>
+          </a:prstGeom>
+        </p:spPr>
+      </p:pic>
+      <p:sp>
+        <p:nvSpPr>
+          <p:cNvPr id="8" name="TextBox 7"/>
+          <p:cNvSpPr txBox="1"/>
+          <p:nvPr/>
+        </p:nvSpPr>
+        <p:spPr>
+          <a:xfrm>
+            <a:off x="0" y="6590677"/>
+            <a:ext cx="1164101" cy="246221"/>
+          </a:xfrm>
+          <a:prstGeom prst="rect">
+            <a:avLst/>
+          </a:prstGeom>
+          <a:noFill/>
+        </p:spPr>
+        <p:txBody>
+          <a:bodyPr wrap="none" rtlCol="0">
+            <a:spAutoFit/>
+          </a:bodyPr>
+          <a:lstStyle/>
+          <a:p>
+            <a:r>
+              <a:rPr lang="en-US" sz="1000" dirty="0" smtClean="0"/>
+              <a:t>Scull et al., 2005</a:t>
+            </a:r>
+            <a:endParaRPr lang="en-US" sz="1000" dirty="0"/>
+          </a:p>
+        </p:txBody>
+      </p:sp>
+    </p:spTree>
+    <p:extLst>
+      <p:ext uri="{BB962C8B-B14F-4D97-AF65-F5344CB8AC3E}">
+        <p14:creationId xmlns:p14="http://schemas.microsoft.com/office/powerpoint/2010/main" val="2184580214"/>
+      </p:ext>
+    </p:extLst>
+  </p:cSld>
+  <p:clrMapOvr>
+    <a:masterClrMapping/>
+  </p:clrMapOvr>
+  <p:timing>
+    <p:tnLst>
+      <p:par>
+        <p:cTn id="1" dur="indefinite" restart="never" nodeType="tmRoot"/>
+      </p:par>
+    </p:tnLst>
+  </p:timing>
+</p:sld>
+</file>
+
+<file path=ppt/slides/slide22.xml><?xml version="1.0" encoding="utf-8"?>
 <p:sld xmlns:a="http://schemas.openxmlformats.org/drawingml/2006/main" xmlns:r="http://schemas.openxmlformats.org/officeDocument/2006/relationships" xmlns:p="http://schemas.openxmlformats.org/presentationml/2006/main">
   <p:cSld>
     <p:spTree>
@@ -9884,7 +10175,7 @@
 </p:sld>
 </file>
 
-<file path=ppt/slides/slide22.xml><?xml version="1.0" encoding="utf-8"?>
+<file path=ppt/slides/slide23.xml><?xml version="1.0" encoding="utf-8"?>
 <p:sld xmlns:a="http://schemas.openxmlformats.org/drawingml/2006/main" xmlns:r="http://schemas.openxmlformats.org/officeDocument/2006/relationships" xmlns:p="http://schemas.openxmlformats.org/presentationml/2006/main">
   <p:cSld>
     <p:spTree>
@@ -10331,7 +10622,7 @@
 </p:sld>
 </file>
 
-<file path=ppt/slides/slide23.xml><?xml version="1.0" encoding="utf-8"?>
+<file path=ppt/slides/slide24.xml><?xml version="1.0" encoding="utf-8"?>
 <p:sld xmlns:a="http://schemas.openxmlformats.org/drawingml/2006/main" xmlns:r="http://schemas.openxmlformats.org/officeDocument/2006/relationships" xmlns:p="http://schemas.openxmlformats.org/presentationml/2006/main">
   <p:cSld>
     <p:spTree>
@@ -10783,7 +11074,7 @@
 </p:sld>
 </file>
 
-<file path=ppt/slides/slide24.xml><?xml version="1.0" encoding="utf-8"?>
+<file path=ppt/slides/slide25.xml><?xml version="1.0" encoding="utf-8"?>
 <p:sld xmlns:a="http://schemas.openxmlformats.org/drawingml/2006/main" xmlns:r="http://schemas.openxmlformats.org/officeDocument/2006/relationships" xmlns:p="http://schemas.openxmlformats.org/presentationml/2006/main">
   <p:cSld>
     <p:spTree>
@@ -10951,7 +11242,7 @@
 </p:sld>
 </file>
 
-<file path=ppt/slides/slide25.xml><?xml version="1.0" encoding="utf-8"?>
+<file path=ppt/slides/slide26.xml><?xml version="1.0" encoding="utf-8"?>
 <p:sld xmlns:a="http://schemas.openxmlformats.org/drawingml/2006/main" xmlns:r="http://schemas.openxmlformats.org/officeDocument/2006/relationships" xmlns:p="http://schemas.openxmlformats.org/presentationml/2006/main">
   <p:cSld>
     <p:spTree>
@@ -12272,7 +12563,7 @@
 </p:sld>
 </file>
 
-<file path=ppt/slides/slide26.xml><?xml version="1.0" encoding="utf-8"?>
+<file path=ppt/slides/slide27.xml><?xml version="1.0" encoding="utf-8"?>
 <p:sld xmlns:a="http://schemas.openxmlformats.org/drawingml/2006/main" xmlns:r="http://schemas.openxmlformats.org/officeDocument/2006/relationships" xmlns:p="http://schemas.openxmlformats.org/presentationml/2006/main">
   <p:cSld>
     <p:spTree>
@@ -12894,7 +13185,7 @@
 </p:sld>
 </file>
 
-<file path=ppt/slides/slide27.xml><?xml version="1.0" encoding="utf-8"?>
+<file path=ppt/slides/slide28.xml><?xml version="1.0" encoding="utf-8"?>
 <p:sld xmlns:a="http://schemas.openxmlformats.org/drawingml/2006/main" xmlns:r="http://schemas.openxmlformats.org/officeDocument/2006/relationships" xmlns:p="http://schemas.openxmlformats.org/presentationml/2006/main">
   <p:cSld>
     <p:spTree>
@@ -13790,7 +14081,7 @@
 </p:sld>
 </file>
 
-<file path=ppt/slides/slide28.xml><?xml version="1.0" encoding="utf-8"?>
+<file path=ppt/slides/slide29.xml><?xml version="1.0" encoding="utf-8"?>
 <p:sld xmlns:a="http://schemas.openxmlformats.org/drawingml/2006/main" xmlns:r="http://schemas.openxmlformats.org/officeDocument/2006/relationships" xmlns:p="http://schemas.openxmlformats.org/presentationml/2006/main">
   <p:cSld>
     <p:spTree>
@@ -13952,266 +14243,6 @@
     <p:extLst>
       <p:ext uri="{BB962C8B-B14F-4D97-AF65-F5344CB8AC3E}">
         <p14:creationId xmlns:p14="http://schemas.microsoft.com/office/powerpoint/2010/main" val="3036598996"/>
-      </p:ext>
-    </p:extLst>
-  </p:cSld>
-  <p:clrMapOvr>
-    <a:masterClrMapping/>
-  </p:clrMapOvr>
-  <p:timing>
-    <p:tnLst>
-      <p:par>
-        <p:cTn id="1" dur="indefinite" restart="never" nodeType="tmRoot"/>
-      </p:par>
-    </p:tnLst>
-  </p:timing>
-</p:sld>
-</file>
-
-<file path=ppt/slides/slide29.xml><?xml version="1.0" encoding="utf-8"?>
-<p:sld xmlns:a="http://schemas.openxmlformats.org/drawingml/2006/main" xmlns:r="http://schemas.openxmlformats.org/officeDocument/2006/relationships" xmlns:p="http://schemas.openxmlformats.org/presentationml/2006/main">
-  <p:cSld>
-    <p:spTree>
-      <p:nvGrpSpPr>
-        <p:cNvPr id="1" name=""/>
-        <p:cNvGrpSpPr/>
-        <p:nvPr/>
-      </p:nvGrpSpPr>
-      <p:grpSpPr>
-        <a:xfrm>
-          <a:off x="0" y="0"/>
-          <a:ext cx="0" cy="0"/>
-          <a:chOff x="0" y="0"/>
-          <a:chExt cx="0" cy="0"/>
-        </a:xfrm>
-      </p:grpSpPr>
-      <p:sp>
-        <p:nvSpPr>
-          <p:cNvPr id="2" name="Title 1"/>
-          <p:cNvSpPr>
-            <a:spLocks noGrp="1"/>
-          </p:cNvSpPr>
-          <p:nvPr>
-            <p:ph type="title"/>
-          </p:nvPr>
-        </p:nvSpPr>
-        <p:spPr/>
-        <p:txBody>
-          <a:bodyPr/>
-          <a:lstStyle/>
-          <a:p>
-            <a:r>
-              <a:rPr lang="en-US" smtClean="0"/>
-              <a:t>References</a:t>
-            </a:r>
-            <a:endParaRPr lang="en-US" dirty="0"/>
-          </a:p>
-        </p:txBody>
-      </p:sp>
-      <p:sp>
-        <p:nvSpPr>
-          <p:cNvPr id="3" name="Content Placeholder 2"/>
-          <p:cNvSpPr>
-            <a:spLocks noGrp="1"/>
-          </p:cNvSpPr>
-          <p:nvPr>
-            <p:ph idx="1"/>
-          </p:nvPr>
-        </p:nvSpPr>
-        <p:spPr>
-          <a:xfrm>
-            <a:off x="946404" y="1828801"/>
-            <a:ext cx="6446520" cy="4495799"/>
-          </a:xfrm>
-        </p:spPr>
-        <p:txBody>
-          <a:bodyPr>
-            <a:normAutofit lnSpcReduction="10000"/>
-          </a:bodyPr>
-          <a:lstStyle/>
-          <a:p>
-            <a:pPr marL="0" indent="0">
-              <a:buNone/>
-            </a:pPr>
-            <a:r>
-              <a:rPr lang="en-US" sz="1500" dirty="0" smtClean="0"/>
-              <a:t>Bishop, T.F.A, A.B. </a:t>
-            </a:r>
-            <a:r>
-              <a:rPr lang="en-US" sz="1500" dirty="0" err="1" smtClean="0"/>
-              <a:t>McBratney</a:t>
-            </a:r>
-            <a:r>
-              <a:rPr lang="en-US" sz="1500" dirty="0" smtClean="0"/>
-              <a:t>. 2001. A comparison of prediction methods for the creation of field-extent soil property maps. </a:t>
-            </a:r>
-            <a:r>
-              <a:rPr lang="en-US" sz="1500" dirty="0" err="1" smtClean="0"/>
-              <a:t>Geoderma</a:t>
-            </a:r>
-            <a:r>
-              <a:rPr lang="en-US" sz="1500" dirty="0" smtClean="0"/>
-              <a:t>. 103: 1-2, 149-160.</a:t>
-            </a:r>
-          </a:p>
-          <a:p>
-            <a:pPr marL="0" indent="0">
-              <a:buNone/>
-            </a:pPr>
-            <a:r>
-              <a:rPr lang="en-US" altLang="en-US" sz="1500" dirty="0"/>
-              <a:t>Faraway, J. J. 2002. Practical regression and </a:t>
-            </a:r>
-            <a:r>
-              <a:rPr lang="en-US" altLang="en-US" sz="1500" dirty="0" err="1"/>
-              <a:t>anova</a:t>
-            </a:r>
-            <a:r>
-              <a:rPr lang="en-US" altLang="en-US" sz="1500" dirty="0"/>
-              <a:t> using R. </a:t>
-            </a:r>
-            <a:r>
-              <a:rPr lang="en-US" altLang="en-US" sz="1500" dirty="0" smtClean="0"/>
-              <a:t> &lt;https</a:t>
-            </a:r>
-            <a:r>
-              <a:rPr lang="en-US" altLang="en-US" sz="1500" dirty="0"/>
-              <a:t>://cran.r-project.org/doc/contrib/Faraway-PRA.pdf</a:t>
-            </a:r>
-            <a:r>
-              <a:rPr lang="en-US" altLang="en-US" sz="1500" dirty="0" smtClean="0"/>
-              <a:t>&gt;.</a:t>
-            </a:r>
-          </a:p>
-          <a:p>
-            <a:pPr marL="0" indent="0">
-              <a:buNone/>
-            </a:pPr>
-            <a:r>
-              <a:rPr lang="en-US" altLang="en-US" sz="1500" dirty="0" smtClean="0"/>
-              <a:t>Holland, S. 2011. Data analysis in geosciences</a:t>
-            </a:r>
-            <a:r>
-              <a:rPr lang="en-US" altLang="en-US" sz="1500" dirty="0"/>
-              <a:t>. </a:t>
-            </a:r>
-            <a:r>
-              <a:rPr lang="en-US" altLang="en-US" sz="1500" dirty="0" smtClean="0"/>
-              <a:t> &lt;http</a:t>
-            </a:r>
-            <a:r>
-              <a:rPr lang="en-US" altLang="en-US" sz="1500" dirty="0"/>
-              <a:t>://</a:t>
-            </a:r>
-            <a:r>
-              <a:rPr lang="en-US" altLang="en-US" sz="1500" dirty="0" smtClean="0"/>
-              <a:t>strata.uga.edu/6370/rtips/regressionPlots.html&gt;</a:t>
-            </a:r>
-            <a:endParaRPr lang="en-US" altLang="en-US" sz="1500" dirty="0"/>
-          </a:p>
-          <a:p>
-            <a:pPr marL="0" indent="0">
-              <a:buNone/>
-            </a:pPr>
-            <a:r>
-              <a:rPr lang="en-US" sz="1500" dirty="0" smtClean="0"/>
-              <a:t>Seybold, C.A., P.R. </a:t>
-            </a:r>
-            <a:r>
-              <a:rPr lang="en-US" sz="1500" dirty="0" err="1" smtClean="0"/>
-              <a:t>Finnell</a:t>
-            </a:r>
-            <a:r>
-              <a:rPr lang="en-US" sz="1500" dirty="0" smtClean="0"/>
-              <a:t>, M.A. </a:t>
-            </a:r>
-            <a:r>
-              <a:rPr lang="en-US" sz="1500" dirty="0" err="1" smtClean="0"/>
-              <a:t>Elrashidi</a:t>
-            </a:r>
-            <a:r>
-              <a:rPr lang="en-US" sz="1500" dirty="0" smtClean="0"/>
-              <a:t>. 2009. Estimating total acidity from soil properties using linear models. Soil Science. 174:2, 88-93.</a:t>
-            </a:r>
-            <a:r>
-              <a:rPr lang="en-US" sz="1500" dirty="0"/>
-              <a:t> </a:t>
-            </a:r>
-            <a:endParaRPr lang="en-US" sz="1500" dirty="0" smtClean="0"/>
-          </a:p>
-          <a:p>
-            <a:pPr marL="0" indent="0">
-              <a:buNone/>
-            </a:pPr>
-            <a:r>
-              <a:rPr lang="en-US" sz="1500" dirty="0" smtClean="0"/>
-              <a:t>Whittingham, M.J., P.A. Stephens, R.B. Bradbury, and R.P. </a:t>
-            </a:r>
-            <a:r>
-              <a:rPr lang="en-US" sz="1500" dirty="0" err="1" smtClean="0"/>
-              <a:t>Freckleton</a:t>
-            </a:r>
-            <a:r>
-              <a:rPr lang="en-US" sz="1500" dirty="0" smtClean="0"/>
-              <a:t>. 2006. Why do we still use stepwise modelling in ecology and behavior? Journal of Animal Ecology. 75: 1182-1189.</a:t>
-            </a:r>
-          </a:p>
-          <a:p>
-            <a:pPr marL="0" indent="0">
-              <a:buNone/>
-            </a:pPr>
-            <a:r>
-              <a:rPr lang="en-US" sz="1500" dirty="0" smtClean="0"/>
-              <a:t>Wills</a:t>
-            </a:r>
-            <a:r>
-              <a:rPr lang="en-US" sz="1500" dirty="0"/>
-              <a:t>, S., C. Seybold, J. </a:t>
-            </a:r>
-            <a:r>
-              <a:rPr lang="en-US" sz="1500" dirty="0" err="1"/>
-              <a:t>Chiaretti</a:t>
-            </a:r>
-            <a:r>
-              <a:rPr lang="en-US" sz="1500" dirty="0"/>
-              <a:t>, C. </a:t>
-            </a:r>
-            <a:r>
-              <a:rPr lang="en-US" sz="1500" dirty="0" err="1"/>
-              <a:t>Sequeira</a:t>
-            </a:r>
-            <a:r>
-              <a:rPr lang="en-US" sz="1500" dirty="0"/>
-              <a:t>, and L. West. 2013. Quantifying tacit knowledge about soil SOC stocks using soil taxa and official soil series descriptions. Soil Science Society of America Journal. </a:t>
-            </a:r>
-            <a:r>
-              <a:rPr lang="en-US" sz="1500" dirty="0" smtClean="0"/>
-              <a:t>77: </a:t>
-            </a:r>
-            <a:r>
-              <a:rPr lang="en-US" sz="1500" dirty="0"/>
-              <a:t>1711-1723</a:t>
-            </a:r>
-            <a:r>
-              <a:rPr lang="en-US" sz="1500" dirty="0" smtClean="0"/>
-              <a:t>.</a:t>
-            </a:r>
-          </a:p>
-          <a:p>
-            <a:pPr marL="0" indent="0">
-              <a:buNone/>
-            </a:pPr>
-            <a:endParaRPr lang="en-US" sz="1900" dirty="0" smtClean="0"/>
-          </a:p>
-          <a:p>
-            <a:endParaRPr lang="en-US" dirty="0"/>
-          </a:p>
-        </p:txBody>
-      </p:sp>
-    </p:spTree>
-    <p:extLst>
-      <p:ext uri="{BB962C8B-B14F-4D97-AF65-F5344CB8AC3E}">
-        <p14:creationId xmlns:p14="http://schemas.microsoft.com/office/powerpoint/2010/main" val="3086065701"/>
       </p:ext>
     </p:extLst>
   </p:cSld>
@@ -15510,7 +15541,715 @@
 </p:sld>
 </file>
 
+<file path=ppt/slides/slide30.xml><?xml version="1.0" encoding="utf-8"?>
+<p:sld xmlns:a="http://schemas.openxmlformats.org/drawingml/2006/main" xmlns:r="http://schemas.openxmlformats.org/officeDocument/2006/relationships" xmlns:p="http://schemas.openxmlformats.org/presentationml/2006/main">
+  <p:cSld>
+    <p:spTree>
+      <p:nvGrpSpPr>
+        <p:cNvPr id="1" name=""/>
+        <p:cNvGrpSpPr/>
+        <p:nvPr/>
+      </p:nvGrpSpPr>
+      <p:grpSpPr>
+        <a:xfrm>
+          <a:off x="0" y="0"/>
+          <a:ext cx="0" cy="0"/>
+          <a:chOff x="0" y="0"/>
+          <a:chExt cx="0" cy="0"/>
+        </a:xfrm>
+      </p:grpSpPr>
+      <p:sp>
+        <p:nvSpPr>
+          <p:cNvPr id="2" name="Title 1"/>
+          <p:cNvSpPr>
+            <a:spLocks noGrp="1"/>
+          </p:cNvSpPr>
+          <p:nvPr>
+            <p:ph type="title"/>
+          </p:nvPr>
+        </p:nvSpPr>
+        <p:spPr/>
+        <p:txBody>
+          <a:bodyPr/>
+          <a:lstStyle/>
+          <a:p>
+            <a:r>
+              <a:rPr lang="en-US" smtClean="0"/>
+              <a:t>References</a:t>
+            </a:r>
+            <a:endParaRPr lang="en-US" dirty="0"/>
+          </a:p>
+        </p:txBody>
+      </p:sp>
+      <p:sp>
+        <p:nvSpPr>
+          <p:cNvPr id="3" name="Content Placeholder 2"/>
+          <p:cNvSpPr>
+            <a:spLocks noGrp="1"/>
+          </p:cNvSpPr>
+          <p:nvPr>
+            <p:ph idx="1"/>
+          </p:nvPr>
+        </p:nvSpPr>
+        <p:spPr>
+          <a:xfrm>
+            <a:off x="946404" y="1828801"/>
+            <a:ext cx="6446520" cy="4495799"/>
+          </a:xfrm>
+        </p:spPr>
+        <p:txBody>
+          <a:bodyPr>
+            <a:normAutofit lnSpcReduction="10000"/>
+          </a:bodyPr>
+          <a:lstStyle/>
+          <a:p>
+            <a:pPr marL="0" indent="0">
+              <a:buNone/>
+            </a:pPr>
+            <a:r>
+              <a:rPr lang="en-US" sz="1500" dirty="0" smtClean="0"/>
+              <a:t>Bishop, T.F.A, A.B. </a:t>
+            </a:r>
+            <a:r>
+              <a:rPr lang="en-US" sz="1500" dirty="0" err="1" smtClean="0"/>
+              <a:t>McBratney</a:t>
+            </a:r>
+            <a:r>
+              <a:rPr lang="en-US" sz="1500" dirty="0" smtClean="0"/>
+              <a:t>. 2001. A comparison of prediction methods for the creation of field-extent soil property maps. </a:t>
+            </a:r>
+            <a:r>
+              <a:rPr lang="en-US" sz="1500" dirty="0" err="1" smtClean="0"/>
+              <a:t>Geoderma</a:t>
+            </a:r>
+            <a:r>
+              <a:rPr lang="en-US" sz="1500" dirty="0" smtClean="0"/>
+              <a:t>. 103: 1-2, 149-160.</a:t>
+            </a:r>
+          </a:p>
+          <a:p>
+            <a:pPr marL="0" indent="0">
+              <a:buNone/>
+            </a:pPr>
+            <a:r>
+              <a:rPr lang="en-US" altLang="en-US" sz="1500" dirty="0"/>
+              <a:t>Faraway, J. J. 2002. Practical regression and </a:t>
+            </a:r>
+            <a:r>
+              <a:rPr lang="en-US" altLang="en-US" sz="1500" dirty="0" err="1"/>
+              <a:t>anova</a:t>
+            </a:r>
+            <a:r>
+              <a:rPr lang="en-US" altLang="en-US" sz="1500" dirty="0"/>
+              <a:t> using R. </a:t>
+            </a:r>
+            <a:r>
+              <a:rPr lang="en-US" altLang="en-US" sz="1500" dirty="0" smtClean="0"/>
+              <a:t> &lt;https</a:t>
+            </a:r>
+            <a:r>
+              <a:rPr lang="en-US" altLang="en-US" sz="1500" dirty="0"/>
+              <a:t>://cran.r-project.org/doc/contrib/Faraway-PRA.pdf</a:t>
+            </a:r>
+            <a:r>
+              <a:rPr lang="en-US" altLang="en-US" sz="1500" dirty="0" smtClean="0"/>
+              <a:t>&gt;.</a:t>
+            </a:r>
+          </a:p>
+          <a:p>
+            <a:pPr marL="0" indent="0">
+              <a:buNone/>
+            </a:pPr>
+            <a:r>
+              <a:rPr lang="en-US" altLang="en-US" sz="1500" dirty="0" smtClean="0"/>
+              <a:t>Holland, S. 2011. Data analysis in geosciences</a:t>
+            </a:r>
+            <a:r>
+              <a:rPr lang="en-US" altLang="en-US" sz="1500" dirty="0"/>
+              <a:t>. </a:t>
+            </a:r>
+            <a:r>
+              <a:rPr lang="en-US" altLang="en-US" sz="1500" dirty="0" smtClean="0"/>
+              <a:t> &lt;http</a:t>
+            </a:r>
+            <a:r>
+              <a:rPr lang="en-US" altLang="en-US" sz="1500" dirty="0"/>
+              <a:t>://</a:t>
+            </a:r>
+            <a:r>
+              <a:rPr lang="en-US" altLang="en-US" sz="1500" dirty="0" smtClean="0"/>
+              <a:t>strata.uga.edu/6370/rtips/regressionPlots.html&gt;</a:t>
+            </a:r>
+            <a:endParaRPr lang="en-US" altLang="en-US" sz="1500" dirty="0"/>
+          </a:p>
+          <a:p>
+            <a:pPr marL="0" indent="0">
+              <a:buNone/>
+            </a:pPr>
+            <a:r>
+              <a:rPr lang="en-US" sz="1500" dirty="0" smtClean="0"/>
+              <a:t>Seybold, C.A., P.R. </a:t>
+            </a:r>
+            <a:r>
+              <a:rPr lang="en-US" sz="1500" dirty="0" err="1" smtClean="0"/>
+              <a:t>Finnell</a:t>
+            </a:r>
+            <a:r>
+              <a:rPr lang="en-US" sz="1500" dirty="0" smtClean="0"/>
+              <a:t>, M.A. </a:t>
+            </a:r>
+            <a:r>
+              <a:rPr lang="en-US" sz="1500" dirty="0" err="1" smtClean="0"/>
+              <a:t>Elrashidi</a:t>
+            </a:r>
+            <a:r>
+              <a:rPr lang="en-US" sz="1500" dirty="0" smtClean="0"/>
+              <a:t>. 2009. Estimating total acidity from soil properties using linear models. Soil Science. 174:2, 88-93.</a:t>
+            </a:r>
+            <a:r>
+              <a:rPr lang="en-US" sz="1500" dirty="0"/>
+              <a:t> </a:t>
+            </a:r>
+            <a:endParaRPr lang="en-US" sz="1500" dirty="0" smtClean="0"/>
+          </a:p>
+          <a:p>
+            <a:pPr marL="0" indent="0">
+              <a:buNone/>
+            </a:pPr>
+            <a:r>
+              <a:rPr lang="en-US" sz="1500" dirty="0" smtClean="0"/>
+              <a:t>Whittingham, M.J., P.A. Stephens, R.B. Bradbury, and R.P. </a:t>
+            </a:r>
+            <a:r>
+              <a:rPr lang="en-US" sz="1500" dirty="0" err="1" smtClean="0"/>
+              <a:t>Freckleton</a:t>
+            </a:r>
+            <a:r>
+              <a:rPr lang="en-US" sz="1500" dirty="0" smtClean="0"/>
+              <a:t>. 2006. Why do we still use stepwise modelling in ecology and behavior? Journal of Animal Ecology. 75: 1182-1189.</a:t>
+            </a:r>
+          </a:p>
+          <a:p>
+            <a:pPr marL="0" indent="0">
+              <a:buNone/>
+            </a:pPr>
+            <a:r>
+              <a:rPr lang="en-US" sz="1500" dirty="0" smtClean="0"/>
+              <a:t>Wills</a:t>
+            </a:r>
+            <a:r>
+              <a:rPr lang="en-US" sz="1500" dirty="0"/>
+              <a:t>, S., C. Seybold, J. </a:t>
+            </a:r>
+            <a:r>
+              <a:rPr lang="en-US" sz="1500" dirty="0" err="1"/>
+              <a:t>Chiaretti</a:t>
+            </a:r>
+            <a:r>
+              <a:rPr lang="en-US" sz="1500" dirty="0"/>
+              <a:t>, C. </a:t>
+            </a:r>
+            <a:r>
+              <a:rPr lang="en-US" sz="1500" dirty="0" err="1"/>
+              <a:t>Sequeira</a:t>
+            </a:r>
+            <a:r>
+              <a:rPr lang="en-US" sz="1500" dirty="0"/>
+              <a:t>, and L. West. 2013. Quantifying tacit knowledge about soil SOC stocks using soil taxa and official soil series descriptions. Soil Science Society of America Journal. </a:t>
+            </a:r>
+            <a:r>
+              <a:rPr lang="en-US" sz="1500" dirty="0" smtClean="0"/>
+              <a:t>77: </a:t>
+            </a:r>
+            <a:r>
+              <a:rPr lang="en-US" sz="1500" dirty="0"/>
+              <a:t>1711-1723</a:t>
+            </a:r>
+            <a:r>
+              <a:rPr lang="en-US" sz="1500" dirty="0" smtClean="0"/>
+              <a:t>.</a:t>
+            </a:r>
+          </a:p>
+          <a:p>
+            <a:pPr marL="0" indent="0">
+              <a:buNone/>
+            </a:pPr>
+            <a:endParaRPr lang="en-US" sz="1900" dirty="0" smtClean="0"/>
+          </a:p>
+          <a:p>
+            <a:endParaRPr lang="en-US" dirty="0"/>
+          </a:p>
+        </p:txBody>
+      </p:sp>
+    </p:spTree>
+    <p:extLst>
+      <p:ext uri="{BB962C8B-B14F-4D97-AF65-F5344CB8AC3E}">
+        <p14:creationId xmlns:p14="http://schemas.microsoft.com/office/powerpoint/2010/main" val="3086065701"/>
+      </p:ext>
+    </p:extLst>
+  </p:cSld>
+  <p:clrMapOvr>
+    <a:masterClrMapping/>
+  </p:clrMapOvr>
+  <p:timing>
+    <p:tnLst>
+      <p:par>
+        <p:cTn id="1" dur="indefinite" restart="never" nodeType="tmRoot"/>
+      </p:par>
+    </p:tnLst>
+  </p:timing>
+</p:sld>
+</file>
+
 <file path=ppt/slides/slide4.xml><?xml version="1.0" encoding="utf-8"?>
+<p:sld xmlns:a="http://schemas.openxmlformats.org/drawingml/2006/main" xmlns:r="http://schemas.openxmlformats.org/officeDocument/2006/relationships" xmlns:p="http://schemas.openxmlformats.org/presentationml/2006/main">
+  <p:cSld>
+    <p:spTree>
+      <p:nvGrpSpPr>
+        <p:cNvPr id="1" name=""/>
+        <p:cNvGrpSpPr/>
+        <p:nvPr/>
+      </p:nvGrpSpPr>
+      <p:grpSpPr>
+        <a:xfrm>
+          <a:off x="0" y="0"/>
+          <a:ext cx="0" cy="0"/>
+          <a:chOff x="0" y="0"/>
+          <a:chExt cx="0" cy="0"/>
+        </a:xfrm>
+      </p:grpSpPr>
+      <p:sp>
+        <p:nvSpPr>
+          <p:cNvPr id="2" name="Title 1"/>
+          <p:cNvSpPr>
+            <a:spLocks noGrp="1"/>
+          </p:cNvSpPr>
+          <p:nvPr>
+            <p:ph type="title"/>
+          </p:nvPr>
+        </p:nvSpPr>
+        <p:spPr/>
+        <p:txBody>
+          <a:bodyPr/>
+          <a:lstStyle/>
+          <a:p>
+            <a:r>
+              <a:rPr lang="en-US" dirty="0" smtClean="0"/>
+              <a:t>Simple vs. Multiple Linear Regression</a:t>
+            </a:r>
+            <a:endParaRPr lang="en-US" dirty="0"/>
+          </a:p>
+        </p:txBody>
+      </p:sp>
+      <p:sp>
+        <p:nvSpPr>
+          <p:cNvPr id="3" name="Content Placeholder 2"/>
+          <p:cNvSpPr>
+            <a:spLocks noGrp="1"/>
+          </p:cNvSpPr>
+          <p:nvPr>
+            <p:ph idx="1"/>
+          </p:nvPr>
+        </p:nvSpPr>
+        <p:spPr/>
+        <p:txBody>
+          <a:bodyPr>
+            <a:normAutofit/>
+          </a:bodyPr>
+          <a:lstStyle/>
+          <a:p>
+            <a:pPr marL="182563" lvl="1" indent="-182563"/>
+            <a:r>
+              <a:rPr lang="en-US" sz="2400" dirty="0" smtClean="0"/>
+              <a:t>Simple linear regression (SLR): </a:t>
+            </a:r>
+          </a:p>
+          <a:p>
+            <a:pPr marL="274320" lvl="2" indent="0">
+              <a:spcAft>
+                <a:spcPts val="2400"/>
+              </a:spcAft>
+              <a:buNone/>
+            </a:pPr>
+            <a:r>
+              <a:rPr lang="en-US" sz="2200" dirty="0" smtClean="0"/>
+              <a:t>Y is predicted from </a:t>
+            </a:r>
+            <a:r>
+              <a:rPr lang="en-US" sz="2200" b="1" u="sng" dirty="0" smtClean="0"/>
+              <a:t>one</a:t>
+            </a:r>
+            <a:r>
+              <a:rPr lang="en-US" sz="2200" dirty="0" smtClean="0"/>
+              <a:t> independent variable (X).</a:t>
+            </a:r>
+          </a:p>
+          <a:p>
+            <a:pPr marL="182563" lvl="1" indent="-182563"/>
+            <a:r>
+              <a:rPr lang="en-US" sz="2400" dirty="0" smtClean="0"/>
+              <a:t>Multiple linear regression (MLR): </a:t>
+            </a:r>
+          </a:p>
+          <a:p>
+            <a:pPr marL="274320" lvl="2" indent="0">
+              <a:buNone/>
+            </a:pPr>
+            <a:r>
+              <a:rPr lang="en-US" sz="2200" dirty="0" smtClean="0"/>
+              <a:t>Y is </a:t>
+            </a:r>
+            <a:r>
+              <a:rPr lang="en-US" sz="2200" dirty="0"/>
+              <a:t>predicted from </a:t>
+            </a:r>
+            <a:r>
+              <a:rPr lang="en-US" sz="2200" b="1" u="sng" dirty="0" smtClean="0"/>
+              <a:t>two or more </a:t>
+            </a:r>
+            <a:r>
+              <a:rPr lang="en-US" sz="2200" dirty="0" smtClean="0"/>
+              <a:t>independent variables (X</a:t>
+            </a:r>
+            <a:r>
+              <a:rPr lang="en-US" sz="2200" baseline="-25000" dirty="0" smtClean="0"/>
+              <a:t>1</a:t>
+            </a:r>
+            <a:r>
+              <a:rPr lang="en-US" sz="2200" dirty="0" smtClean="0"/>
+              <a:t>, X</a:t>
+            </a:r>
+            <a:r>
+              <a:rPr lang="en-US" sz="2200" baseline="-25000" dirty="0" smtClean="0"/>
+              <a:t>2</a:t>
+            </a:r>
+            <a:r>
+              <a:rPr lang="en-US" sz="2200" dirty="0" smtClean="0"/>
+              <a:t>, </a:t>
+            </a:r>
+            <a:r>
+              <a:rPr lang="en-US" sz="2200" dirty="0" err="1" smtClean="0"/>
+              <a:t>X</a:t>
+            </a:r>
+            <a:r>
+              <a:rPr lang="en-US" sz="2200" baseline="-25000" dirty="0" err="1" smtClean="0"/>
+              <a:t>k</a:t>
+            </a:r>
+            <a:r>
+              <a:rPr lang="en-US" sz="2200" dirty="0" smtClean="0"/>
+              <a:t>). </a:t>
+            </a:r>
+          </a:p>
+          <a:p>
+            <a:pPr marL="182563" lvl="1" indent="-182563"/>
+            <a:endParaRPr lang="en-US" sz="2200" dirty="0" smtClean="0"/>
+          </a:p>
+          <a:p>
+            <a:pPr marL="182563" lvl="1" indent="-182563"/>
+            <a:endParaRPr lang="en-US" sz="2000" dirty="0"/>
+          </a:p>
+          <a:p>
+            <a:pPr marL="274320" lvl="1" indent="0">
+              <a:buNone/>
+            </a:pPr>
+            <a:endParaRPr lang="en-US" dirty="0" smtClean="0"/>
+          </a:p>
+          <a:p>
+            <a:pPr marL="274320" lvl="1" indent="0">
+              <a:buNone/>
+            </a:pPr>
+            <a:endParaRPr lang="en-US" dirty="0" smtClean="0"/>
+          </a:p>
+        </p:txBody>
+      </p:sp>
+    </p:spTree>
+    <p:extLst>
+      <p:ext uri="{BB962C8B-B14F-4D97-AF65-F5344CB8AC3E}">
+        <p14:creationId xmlns:p14="http://schemas.microsoft.com/office/powerpoint/2010/main" val="3032909276"/>
+      </p:ext>
+    </p:extLst>
+  </p:cSld>
+  <p:clrMapOvr>
+    <a:masterClrMapping/>
+  </p:clrMapOvr>
+  <p:timing>
+    <p:tnLst>
+      <p:par>
+        <p:cTn id="1" dur="indefinite" restart="never" nodeType="tmRoot">
+          <p:childTnLst>
+            <p:seq concurrent="1" nextAc="seek">
+              <p:cTn id="2" dur="indefinite" nodeType="mainSeq">
+                <p:childTnLst>
+                  <p:par>
+                    <p:cTn id="3" fill="hold">
+                      <p:stCondLst>
+                        <p:cond delay="indefinite"/>
+                      </p:stCondLst>
+                      <p:childTnLst>
+                        <p:par>
+                          <p:cTn id="4" fill="hold">
+                            <p:stCondLst>
+                              <p:cond delay="0"/>
+                            </p:stCondLst>
+                            <p:childTnLst>
+                              <p:par>
+                                <p:cTn id="5" presetID="10" presetClass="entr" presetSubtype="0" fill="hold" nodeType="clickEffect">
+                                  <p:stCondLst>
+                                    <p:cond delay="0"/>
+                                  </p:stCondLst>
+                                  <p:childTnLst>
+                                    <p:set>
+                                      <p:cBhvr>
+                                        <p:cTn id="6" dur="1" fill="hold">
+                                          <p:stCondLst>
+                                            <p:cond delay="0"/>
+                                          </p:stCondLst>
+                                        </p:cTn>
+                                        <p:tgtEl>
+                                          <p:spTgt spid="3">
+                                            <p:txEl>
+                                              <p:pRg st="0" end="0"/>
+                                            </p:txEl>
+                                          </p:spTgt>
+                                        </p:tgtEl>
+                                        <p:attrNameLst>
+                                          <p:attrName>style.visibility</p:attrName>
+                                        </p:attrNameLst>
+                                      </p:cBhvr>
+                                      <p:to>
+                                        <p:strVal val="visible"/>
+                                      </p:to>
+                                    </p:set>
+                                    <p:animEffect transition="in" filter="fade">
+                                      <p:cBhvr>
+                                        <p:cTn id="7" dur="500"/>
+                                        <p:tgtEl>
+                                          <p:spTgt spid="3">
+                                            <p:txEl>
+                                              <p:pRg st="0" end="0"/>
+                                            </p:txEl>
+                                          </p:spTgt>
+                                        </p:tgtEl>
+                                      </p:cBhvr>
+                                    </p:animEffect>
+                                  </p:childTnLst>
+                                </p:cTn>
+                              </p:par>
+                            </p:childTnLst>
+                          </p:cTn>
+                        </p:par>
+                      </p:childTnLst>
+                    </p:cTn>
+                  </p:par>
+                  <p:par>
+                    <p:cTn id="8" fill="hold">
+                      <p:stCondLst>
+                        <p:cond delay="indefinite"/>
+                      </p:stCondLst>
+                      <p:childTnLst>
+                        <p:par>
+                          <p:cTn id="9" fill="hold">
+                            <p:stCondLst>
+                              <p:cond delay="0"/>
+                            </p:stCondLst>
+                            <p:childTnLst>
+                              <p:par>
+                                <p:cTn id="10" presetID="10" presetClass="entr" presetSubtype="0" fill="hold" nodeType="clickEffect">
+                                  <p:stCondLst>
+                                    <p:cond delay="0"/>
+                                  </p:stCondLst>
+                                  <p:childTnLst>
+                                    <p:set>
+                                      <p:cBhvr>
+                                        <p:cTn id="11" dur="1" fill="hold">
+                                          <p:stCondLst>
+                                            <p:cond delay="0"/>
+                                          </p:stCondLst>
+                                        </p:cTn>
+                                        <p:tgtEl>
+                                          <p:spTgt spid="3">
+                                            <p:txEl>
+                                              <p:pRg st="1" end="1"/>
+                                            </p:txEl>
+                                          </p:spTgt>
+                                        </p:tgtEl>
+                                        <p:attrNameLst>
+                                          <p:attrName>style.visibility</p:attrName>
+                                        </p:attrNameLst>
+                                      </p:cBhvr>
+                                      <p:to>
+                                        <p:strVal val="visible"/>
+                                      </p:to>
+                                    </p:set>
+                                    <p:animEffect transition="in" filter="fade">
+                                      <p:cBhvr>
+                                        <p:cTn id="12" dur="500"/>
+                                        <p:tgtEl>
+                                          <p:spTgt spid="3">
+                                            <p:txEl>
+                                              <p:pRg st="1" end="1"/>
+                                            </p:txEl>
+                                          </p:spTgt>
+                                        </p:tgtEl>
+                                      </p:cBhvr>
+                                    </p:animEffect>
+                                  </p:childTnLst>
+                                </p:cTn>
+                              </p:par>
+                            </p:childTnLst>
+                          </p:cTn>
+                        </p:par>
+                      </p:childTnLst>
+                    </p:cTn>
+                  </p:par>
+                  <p:par>
+                    <p:cTn id="13" fill="hold">
+                      <p:stCondLst>
+                        <p:cond delay="indefinite"/>
+                      </p:stCondLst>
+                      <p:childTnLst>
+                        <p:par>
+                          <p:cTn id="14" fill="hold">
+                            <p:stCondLst>
+                              <p:cond delay="0"/>
+                            </p:stCondLst>
+                            <p:childTnLst>
+                              <p:par>
+                                <p:cTn id="15" presetID="10" presetClass="entr" presetSubtype="0" fill="hold" nodeType="clickEffect">
+                                  <p:stCondLst>
+                                    <p:cond delay="0"/>
+                                  </p:stCondLst>
+                                  <p:childTnLst>
+                                    <p:set>
+                                      <p:cBhvr>
+                                        <p:cTn id="16" dur="1" fill="hold">
+                                          <p:stCondLst>
+                                            <p:cond delay="0"/>
+                                          </p:stCondLst>
+                                        </p:cTn>
+                                        <p:tgtEl>
+                                          <p:spTgt spid="3">
+                                            <p:txEl>
+                                              <p:pRg st="2" end="2"/>
+                                            </p:txEl>
+                                          </p:spTgt>
+                                        </p:tgtEl>
+                                        <p:attrNameLst>
+                                          <p:attrName>style.visibility</p:attrName>
+                                        </p:attrNameLst>
+                                      </p:cBhvr>
+                                      <p:to>
+                                        <p:strVal val="visible"/>
+                                      </p:to>
+                                    </p:set>
+                                    <p:animEffect transition="in" filter="fade">
+                                      <p:cBhvr>
+                                        <p:cTn id="17" dur="500"/>
+                                        <p:tgtEl>
+                                          <p:spTgt spid="3">
+                                            <p:txEl>
+                                              <p:pRg st="2" end="2"/>
+                                            </p:txEl>
+                                          </p:spTgt>
+                                        </p:tgtEl>
+                                      </p:cBhvr>
+                                    </p:animEffect>
+                                  </p:childTnLst>
+                                </p:cTn>
+                              </p:par>
+                            </p:childTnLst>
+                          </p:cTn>
+                        </p:par>
+                      </p:childTnLst>
+                    </p:cTn>
+                  </p:par>
+                  <p:par>
+                    <p:cTn id="18" fill="hold">
+                      <p:stCondLst>
+                        <p:cond delay="indefinite"/>
+                      </p:stCondLst>
+                      <p:childTnLst>
+                        <p:par>
+                          <p:cTn id="19" fill="hold">
+                            <p:stCondLst>
+                              <p:cond delay="0"/>
+                            </p:stCondLst>
+                            <p:childTnLst>
+                              <p:par>
+                                <p:cTn id="20" presetID="10" presetClass="entr" presetSubtype="0" fill="hold" nodeType="clickEffect">
+                                  <p:stCondLst>
+                                    <p:cond delay="0"/>
+                                  </p:stCondLst>
+                                  <p:childTnLst>
+                                    <p:set>
+                                      <p:cBhvr>
+                                        <p:cTn id="21" dur="1" fill="hold">
+                                          <p:stCondLst>
+                                            <p:cond delay="0"/>
+                                          </p:stCondLst>
+                                        </p:cTn>
+                                        <p:tgtEl>
+                                          <p:spTgt spid="3">
+                                            <p:txEl>
+                                              <p:pRg st="3" end="3"/>
+                                            </p:txEl>
+                                          </p:spTgt>
+                                        </p:tgtEl>
+                                        <p:attrNameLst>
+                                          <p:attrName>style.visibility</p:attrName>
+                                        </p:attrNameLst>
+                                      </p:cBhvr>
+                                      <p:to>
+                                        <p:strVal val="visible"/>
+                                      </p:to>
+                                    </p:set>
+                                    <p:animEffect transition="in" filter="fade">
+                                      <p:cBhvr>
+                                        <p:cTn id="22" dur="500"/>
+                                        <p:tgtEl>
+                                          <p:spTgt spid="3">
+                                            <p:txEl>
+                                              <p:pRg st="3" end="3"/>
+                                            </p:txEl>
+                                          </p:spTgt>
+                                        </p:tgtEl>
+                                      </p:cBhvr>
+                                    </p:animEffect>
+                                  </p:childTnLst>
+                                </p:cTn>
+                              </p:par>
+                            </p:childTnLst>
+                          </p:cTn>
+                        </p:par>
+                      </p:childTnLst>
+                    </p:cTn>
+                  </p:par>
+                </p:childTnLst>
+              </p:cTn>
+              <p:prevCondLst>
+                <p:cond evt="onPrev" delay="0">
+                  <p:tgtEl>
+                    <p:sldTgt/>
+                  </p:tgtEl>
+                </p:cond>
+              </p:prevCondLst>
+              <p:nextCondLst>
+                <p:cond evt="onNext" delay="0">
+                  <p:tgtEl>
+                    <p:sldTgt/>
+                  </p:tgtEl>
+                </p:cond>
+              </p:nextCondLst>
+            </p:seq>
+          </p:childTnLst>
+        </p:cTn>
+      </p:par>
+    </p:tnLst>
+  </p:timing>
+</p:sld>
+</file>
+
+<file path=ppt/slides/slide5.xml><?xml version="1.0" encoding="utf-8"?>
 <p:sld xmlns:a="http://schemas.openxmlformats.org/drawingml/2006/main" xmlns:r="http://schemas.openxmlformats.org/officeDocument/2006/relationships" xmlns:p="http://schemas.openxmlformats.org/presentationml/2006/main">
   <p:cSld>
     <p:spTree>
@@ -17618,7 +18357,7 @@
 </p:sld>
 </file>
 
-<file path=ppt/slides/slide5.xml><?xml version="1.0" encoding="utf-8"?>
+<file path=ppt/slides/slide6.xml><?xml version="1.0" encoding="utf-8"?>
 <p:sld xmlns:a="http://schemas.openxmlformats.org/drawingml/2006/main" xmlns:r="http://schemas.openxmlformats.org/officeDocument/2006/relationships" xmlns:p="http://schemas.openxmlformats.org/presentationml/2006/main">
   <p:cSld>
     <p:spTree>
@@ -18769,7 +19508,6 @@
               <a:rPr lang="en-US" smtClean="0"/>
               <a:t>squared </a:t>
             </a:r>
-            <a:endParaRPr lang="en-US" smtClean="0"/>
           </a:p>
           <a:p>
             <a:r>
@@ -19163,454 +19901,6 @@
       <p:bldP spid="47" grpId="0" animBg="1"/>
       <p:bldP spid="48" grpId="0" animBg="1"/>
     </p:bldLst>
-  </p:timing>
-</p:sld>
-</file>
-
-<file path=ppt/slides/slide6.xml><?xml version="1.0" encoding="utf-8"?>
-<p:sld xmlns:a="http://schemas.openxmlformats.org/drawingml/2006/main" xmlns:r="http://schemas.openxmlformats.org/officeDocument/2006/relationships" xmlns:p="http://schemas.openxmlformats.org/presentationml/2006/main">
-  <p:cSld>
-    <p:spTree>
-      <p:nvGrpSpPr>
-        <p:cNvPr id="1" name=""/>
-        <p:cNvGrpSpPr/>
-        <p:nvPr/>
-      </p:nvGrpSpPr>
-      <p:grpSpPr>
-        <a:xfrm>
-          <a:off x="0" y="0"/>
-          <a:ext cx="0" cy="0"/>
-          <a:chOff x="0" y="0"/>
-          <a:chExt cx="0" cy="0"/>
-        </a:xfrm>
-      </p:grpSpPr>
-      <p:sp>
-        <p:nvSpPr>
-          <p:cNvPr id="2" name="Title 1"/>
-          <p:cNvSpPr>
-            <a:spLocks noGrp="1"/>
-          </p:cNvSpPr>
-          <p:nvPr>
-            <p:ph type="title"/>
-          </p:nvPr>
-        </p:nvSpPr>
-        <p:spPr/>
-        <p:txBody>
-          <a:bodyPr/>
-          <a:lstStyle/>
-          <a:p>
-            <a:r>
-              <a:rPr lang="en-US" dirty="0" smtClean="0"/>
-              <a:t>Simple vs. Multiple Linear Regression</a:t>
-            </a:r>
-            <a:endParaRPr lang="en-US" dirty="0"/>
-          </a:p>
-        </p:txBody>
-      </p:sp>
-      <p:sp>
-        <p:nvSpPr>
-          <p:cNvPr id="3" name="Content Placeholder 2"/>
-          <p:cNvSpPr>
-            <a:spLocks noGrp="1"/>
-          </p:cNvSpPr>
-          <p:nvPr>
-            <p:ph idx="1"/>
-          </p:nvPr>
-        </p:nvSpPr>
-        <p:spPr/>
-        <p:txBody>
-          <a:bodyPr>
-            <a:normAutofit/>
-          </a:bodyPr>
-          <a:lstStyle/>
-          <a:p>
-            <a:pPr marL="182563" lvl="1" indent="-182563"/>
-            <a:r>
-              <a:rPr lang="en-US" sz="2400" dirty="0" smtClean="0"/>
-              <a:t>Simple linear regression (SLR): </a:t>
-            </a:r>
-          </a:p>
-          <a:p>
-            <a:pPr marL="274320" lvl="2" indent="0">
-              <a:spcAft>
-                <a:spcPts val="2400"/>
-              </a:spcAft>
-              <a:buNone/>
-            </a:pPr>
-            <a:r>
-              <a:rPr lang="en-US" sz="2200" dirty="0" smtClean="0"/>
-              <a:t>Y is predicted from </a:t>
-            </a:r>
-            <a:r>
-              <a:rPr lang="en-US" sz="2200" b="1" u="sng" dirty="0" smtClean="0"/>
-              <a:t>one</a:t>
-            </a:r>
-            <a:r>
-              <a:rPr lang="en-US" sz="2200" dirty="0" smtClean="0"/>
-              <a:t> independent variable (X).</a:t>
-            </a:r>
-          </a:p>
-          <a:p>
-            <a:pPr marL="182563" lvl="1" indent="-182563"/>
-            <a:r>
-              <a:rPr lang="en-US" sz="2400" dirty="0" smtClean="0"/>
-              <a:t>Multiple linear regression (MLR): </a:t>
-            </a:r>
-          </a:p>
-          <a:p>
-            <a:pPr marL="274320" lvl="2" indent="0">
-              <a:buNone/>
-            </a:pPr>
-            <a:r>
-              <a:rPr lang="en-US" sz="2200" dirty="0" smtClean="0"/>
-              <a:t>Y is </a:t>
-            </a:r>
-            <a:r>
-              <a:rPr lang="en-US" sz="2200" dirty="0"/>
-              <a:t>predicted from </a:t>
-            </a:r>
-            <a:r>
-              <a:rPr lang="en-US" sz="2200" b="1" u="sng" dirty="0" smtClean="0"/>
-              <a:t>two or more </a:t>
-            </a:r>
-            <a:r>
-              <a:rPr lang="en-US" sz="2200" dirty="0" smtClean="0"/>
-              <a:t>independent variables (X</a:t>
-            </a:r>
-            <a:r>
-              <a:rPr lang="en-US" sz="2200" baseline="-25000" dirty="0" smtClean="0"/>
-              <a:t>1</a:t>
-            </a:r>
-            <a:r>
-              <a:rPr lang="en-US" sz="2200" dirty="0" smtClean="0"/>
-              <a:t>, X</a:t>
-            </a:r>
-            <a:r>
-              <a:rPr lang="en-US" sz="2200" baseline="-25000" dirty="0" smtClean="0"/>
-              <a:t>2</a:t>
-            </a:r>
-            <a:r>
-              <a:rPr lang="en-US" sz="2200" dirty="0" smtClean="0"/>
-              <a:t>, </a:t>
-            </a:r>
-            <a:r>
-              <a:rPr lang="en-US" sz="2200" dirty="0" err="1" smtClean="0"/>
-              <a:t>X</a:t>
-            </a:r>
-            <a:r>
-              <a:rPr lang="en-US" sz="2200" baseline="-25000" dirty="0" err="1" smtClean="0"/>
-              <a:t>k</a:t>
-            </a:r>
-            <a:r>
-              <a:rPr lang="en-US" sz="2200" dirty="0" smtClean="0"/>
-              <a:t>). </a:t>
-            </a:r>
-          </a:p>
-          <a:p>
-            <a:pPr marL="182563" lvl="1" indent="-182563"/>
-            <a:endParaRPr lang="en-US" sz="2200" dirty="0" smtClean="0"/>
-          </a:p>
-          <a:p>
-            <a:pPr marL="182563" lvl="1" indent="-182563"/>
-            <a:endParaRPr lang="en-US" sz="2000" dirty="0"/>
-          </a:p>
-          <a:p>
-            <a:pPr marL="274320" lvl="1" indent="0">
-              <a:buNone/>
-            </a:pPr>
-            <a:endParaRPr lang="en-US" dirty="0" smtClean="0"/>
-          </a:p>
-          <a:p>
-            <a:pPr marL="274320" lvl="1" indent="0">
-              <a:buNone/>
-            </a:pPr>
-            <a:endParaRPr lang="en-US" dirty="0" smtClean="0"/>
-          </a:p>
-        </p:txBody>
-      </p:sp>
-    </p:spTree>
-    <p:extLst>
-      <p:ext uri="{BB962C8B-B14F-4D97-AF65-F5344CB8AC3E}">
-        <p14:creationId xmlns:p14="http://schemas.microsoft.com/office/powerpoint/2010/main" val="3032909276"/>
-      </p:ext>
-    </p:extLst>
-  </p:cSld>
-  <p:clrMapOvr>
-    <a:masterClrMapping/>
-  </p:clrMapOvr>
-  <p:timing>
-    <p:tnLst>
-      <p:par>
-        <p:cTn id="1" dur="indefinite" restart="never" nodeType="tmRoot">
-          <p:childTnLst>
-            <p:seq concurrent="1" nextAc="seek">
-              <p:cTn id="2" dur="indefinite" nodeType="mainSeq">
-                <p:childTnLst>
-                  <p:par>
-                    <p:cTn id="3" fill="hold">
-                      <p:stCondLst>
-                        <p:cond delay="indefinite"/>
-                      </p:stCondLst>
-                      <p:childTnLst>
-                        <p:par>
-                          <p:cTn id="4" fill="hold">
-                            <p:stCondLst>
-                              <p:cond delay="0"/>
-                            </p:stCondLst>
-                            <p:childTnLst>
-                              <p:par>
-                                <p:cTn id="5" presetID="10" presetClass="entr" presetSubtype="0" fill="hold" nodeType="clickEffect">
-                                  <p:stCondLst>
-                                    <p:cond delay="0"/>
-                                  </p:stCondLst>
-                                  <p:childTnLst>
-                                    <p:set>
-                                      <p:cBhvr>
-                                        <p:cTn id="6" dur="1" fill="hold">
-                                          <p:stCondLst>
-                                            <p:cond delay="0"/>
-                                          </p:stCondLst>
-                                        </p:cTn>
-                                        <p:tgtEl>
-                                          <p:spTgt spid="3">
-                                            <p:txEl>
-                                              <p:pRg st="0" end="0"/>
-                                            </p:txEl>
-                                          </p:spTgt>
-                                        </p:tgtEl>
-                                        <p:attrNameLst>
-                                          <p:attrName>style.visibility</p:attrName>
-                                        </p:attrNameLst>
-                                      </p:cBhvr>
-                                      <p:to>
-                                        <p:strVal val="visible"/>
-                                      </p:to>
-                                    </p:set>
-                                    <p:animEffect transition="in" filter="fade">
-                                      <p:cBhvr>
-                                        <p:cTn id="7" dur="500"/>
-                                        <p:tgtEl>
-                                          <p:spTgt spid="3">
-                                            <p:txEl>
-                                              <p:pRg st="0" end="0"/>
-                                            </p:txEl>
-                                          </p:spTgt>
-                                        </p:tgtEl>
-                                      </p:cBhvr>
-                                    </p:animEffect>
-                                  </p:childTnLst>
-                                </p:cTn>
-                              </p:par>
-                            </p:childTnLst>
-                          </p:cTn>
-                        </p:par>
-                      </p:childTnLst>
-                    </p:cTn>
-                  </p:par>
-                  <p:par>
-                    <p:cTn id="8" fill="hold">
-                      <p:stCondLst>
-                        <p:cond delay="indefinite"/>
-                      </p:stCondLst>
-                      <p:childTnLst>
-                        <p:par>
-                          <p:cTn id="9" fill="hold">
-                            <p:stCondLst>
-                              <p:cond delay="0"/>
-                            </p:stCondLst>
-                            <p:childTnLst>
-                              <p:par>
-                                <p:cTn id="10" presetID="10" presetClass="entr" presetSubtype="0" fill="hold" nodeType="clickEffect">
-                                  <p:stCondLst>
-                                    <p:cond delay="0"/>
-                                  </p:stCondLst>
-                                  <p:childTnLst>
-                                    <p:set>
-                                      <p:cBhvr>
-                                        <p:cTn id="11" dur="1" fill="hold">
-                                          <p:stCondLst>
-                                            <p:cond delay="0"/>
-                                          </p:stCondLst>
-                                        </p:cTn>
-                                        <p:tgtEl>
-                                          <p:spTgt spid="3">
-                                            <p:txEl>
-                                              <p:pRg st="1" end="1"/>
-                                            </p:txEl>
-                                          </p:spTgt>
-                                        </p:tgtEl>
-                                        <p:attrNameLst>
-                                          <p:attrName>style.visibility</p:attrName>
-                                        </p:attrNameLst>
-                                      </p:cBhvr>
-                                      <p:to>
-                                        <p:strVal val="visible"/>
-                                      </p:to>
-                                    </p:set>
-                                    <p:animEffect transition="in" filter="fade">
-                                      <p:cBhvr>
-                                        <p:cTn id="12" dur="500"/>
-                                        <p:tgtEl>
-                                          <p:spTgt spid="3">
-                                            <p:txEl>
-                                              <p:pRg st="1" end="1"/>
-                                            </p:txEl>
-                                          </p:spTgt>
-                                        </p:tgtEl>
-                                      </p:cBhvr>
-                                    </p:animEffect>
-                                  </p:childTnLst>
-                                </p:cTn>
-                              </p:par>
-                            </p:childTnLst>
-                          </p:cTn>
-                        </p:par>
-                      </p:childTnLst>
-                    </p:cTn>
-                  </p:par>
-                  <p:par>
-                    <p:cTn id="13" fill="hold">
-                      <p:stCondLst>
-                        <p:cond delay="indefinite"/>
-                      </p:stCondLst>
-                      <p:childTnLst>
-                        <p:par>
-                          <p:cTn id="14" fill="hold">
-                            <p:stCondLst>
-                              <p:cond delay="0"/>
-                            </p:stCondLst>
-                            <p:childTnLst>
-                              <p:par>
-                                <p:cTn id="15" presetID="10" presetClass="entr" presetSubtype="0" fill="hold" nodeType="clickEffect">
-                                  <p:stCondLst>
-                                    <p:cond delay="0"/>
-                                  </p:stCondLst>
-                                  <p:childTnLst>
-                                    <p:set>
-                                      <p:cBhvr>
-                                        <p:cTn id="16" dur="1" fill="hold">
-                                          <p:stCondLst>
-                                            <p:cond delay="0"/>
-                                          </p:stCondLst>
-                                        </p:cTn>
-                                        <p:tgtEl>
-                                          <p:spTgt spid="3">
-                                            <p:txEl>
-                                              <p:pRg st="2" end="2"/>
-                                            </p:txEl>
-                                          </p:spTgt>
-                                        </p:tgtEl>
-                                        <p:attrNameLst>
-                                          <p:attrName>style.visibility</p:attrName>
-                                        </p:attrNameLst>
-                                      </p:cBhvr>
-                                      <p:to>
-                                        <p:strVal val="visible"/>
-                                      </p:to>
-                                    </p:set>
-                                    <p:animEffect transition="in" filter="fade">
-                                      <p:cBhvr>
-                                        <p:cTn id="17" dur="500"/>
-                                        <p:tgtEl>
-                                          <p:spTgt spid="3">
-                                            <p:txEl>
-                                              <p:pRg st="2" end="2"/>
-                                            </p:txEl>
-                                          </p:spTgt>
-                                        </p:tgtEl>
-                                      </p:cBhvr>
-                                    </p:animEffect>
-                                  </p:childTnLst>
-                                </p:cTn>
-                              </p:par>
-                            </p:childTnLst>
-                          </p:cTn>
-                        </p:par>
-                      </p:childTnLst>
-                    </p:cTn>
-                  </p:par>
-                  <p:par>
-                    <p:cTn id="18" fill="hold">
-                      <p:stCondLst>
-                        <p:cond delay="indefinite"/>
-                      </p:stCondLst>
-                      <p:childTnLst>
-                        <p:par>
-                          <p:cTn id="19" fill="hold">
-                            <p:stCondLst>
-                              <p:cond delay="0"/>
-                            </p:stCondLst>
-                            <p:childTnLst>
-                              <p:par>
-                                <p:cTn id="20" presetID="10" presetClass="entr" presetSubtype="0" fill="hold" nodeType="clickEffect">
-                                  <p:stCondLst>
-                                    <p:cond delay="0"/>
-                                  </p:stCondLst>
-                                  <p:childTnLst>
-                                    <p:set>
-                                      <p:cBhvr>
-                                        <p:cTn id="21" dur="1" fill="hold">
-                                          <p:stCondLst>
-                                            <p:cond delay="0"/>
-                                          </p:stCondLst>
-                                        </p:cTn>
-                                        <p:tgtEl>
-                                          <p:spTgt spid="3">
-                                            <p:txEl>
-                                              <p:pRg st="3" end="3"/>
-                                            </p:txEl>
-                                          </p:spTgt>
-                                        </p:tgtEl>
-                                        <p:attrNameLst>
-                                          <p:attrName>style.visibility</p:attrName>
-                                        </p:attrNameLst>
-                                      </p:cBhvr>
-                                      <p:to>
-                                        <p:strVal val="visible"/>
-                                      </p:to>
-                                    </p:set>
-                                    <p:animEffect transition="in" filter="fade">
-                                      <p:cBhvr>
-                                        <p:cTn id="22" dur="500"/>
-                                        <p:tgtEl>
-                                          <p:spTgt spid="3">
-                                            <p:txEl>
-                                              <p:pRg st="3" end="3"/>
-                                            </p:txEl>
-                                          </p:spTgt>
-                                        </p:tgtEl>
-                                      </p:cBhvr>
-                                    </p:animEffect>
-                                  </p:childTnLst>
-                                </p:cTn>
-                              </p:par>
-                            </p:childTnLst>
-                          </p:cTn>
-                        </p:par>
-                      </p:childTnLst>
-                    </p:cTn>
-                  </p:par>
-                </p:childTnLst>
-              </p:cTn>
-              <p:prevCondLst>
-                <p:cond evt="onPrev" delay="0">
-                  <p:tgtEl>
-                    <p:sldTgt/>
-                  </p:tgtEl>
-                </p:cond>
-              </p:prevCondLst>
-              <p:nextCondLst>
-                <p:cond evt="onNext" delay="0">
-                  <p:tgtEl>
-                    <p:sldTgt/>
-                  </p:tgtEl>
-                </p:cond>
-              </p:nextCondLst>
-            </p:seq>
-          </p:childTnLst>
-        </p:cTn>
-      </p:par>
-    </p:tnLst>
   </p:timing>
 </p:sld>
 </file>

</xml_diff>

<commit_message>
minor edits to ppt for 6_linear_regression
</commit_message>
<xml_diff>
--- a/presentations/6_linear_regression/Linear_regression.pptx
+++ b/presentations/6_linear_regression/Linear_regression.pptx
@@ -237,7 +237,7 @@
           <a:p>
             <a:fld id="{2793983C-EFA1-41D2-8DCF-4CEF34100D6A}" type="datetimeFigureOut">
               <a:rPr lang="en-US" smtClean="0"/>
-              <a:t>2/29/2016</a:t>
+              <a:t>3/2/2016</a:t>
             </a:fld>
             <a:endParaRPr lang="en-US"/>
           </a:p>
@@ -955,11 +955,7 @@
             </a:r>
             <a:r>
               <a:rPr lang="en-US" baseline="0" dirty="0" smtClean="0"/>
-              <a:t> it is important to remember that correlation does not imply causation. Always remember to look at the variables you have – do they make sense that they would be good predictors of the response variable? </a:t>
-            </a:r>
-            <a:r>
-              <a:rPr lang="en-US" baseline="0" dirty="0" smtClean="0"/>
-              <a:t>Are the model assumptions met?</a:t>
+              <a:t> it is important to remember that correlation does not imply causation. Always remember to look at the variables you have – do they make sense that they would be good predictors of the response variable? Are the model assumptions met?</a:t>
             </a:r>
             <a:endParaRPr lang="en-US" dirty="0"/>
           </a:p>
@@ -3031,7 +3027,7 @@
           <a:p>
             <a:fld id="{97CFF939-70E9-4E47-9899-4E3DA2789027}" type="datetimeFigureOut">
               <a:rPr lang="en-US" smtClean="0"/>
-              <a:t>2/29/2016</a:t>
+              <a:t>3/2/2016</a:t>
             </a:fld>
             <a:endParaRPr lang="en-US"/>
           </a:p>
@@ -3223,7 +3219,7 @@
           <a:p>
             <a:fld id="{97CFF939-70E9-4E47-9899-4E3DA2789027}" type="datetimeFigureOut">
               <a:rPr lang="en-US" smtClean="0"/>
-              <a:t>2/29/2016</a:t>
+              <a:t>3/2/2016</a:t>
             </a:fld>
             <a:endParaRPr lang="en-US"/>
           </a:p>
@@ -3403,7 +3399,7 @@
           <a:p>
             <a:fld id="{97CFF939-70E9-4E47-9899-4E3DA2789027}" type="datetimeFigureOut">
               <a:rPr lang="en-US" smtClean="0"/>
-              <a:t>2/29/2016</a:t>
+              <a:t>3/2/2016</a:t>
             </a:fld>
             <a:endParaRPr lang="en-US"/>
           </a:p>
@@ -3573,7 +3569,7 @@
           <a:p>
             <a:fld id="{97CFF939-70E9-4E47-9899-4E3DA2789027}" type="datetimeFigureOut">
               <a:rPr lang="en-US" smtClean="0"/>
-              <a:t>2/29/2016</a:t>
+              <a:t>3/2/2016</a:t>
             </a:fld>
             <a:endParaRPr lang="en-US"/>
           </a:p>
@@ -3827,7 +3823,7 @@
           <a:p>
             <a:fld id="{97CFF939-70E9-4E47-9899-4E3DA2789027}" type="datetimeFigureOut">
               <a:rPr lang="en-US" smtClean="0"/>
-              <a:t>2/29/2016</a:t>
+              <a:t>3/2/2016</a:t>
             </a:fld>
             <a:endParaRPr lang="en-US"/>
           </a:p>
@@ -4153,7 +4149,7 @@
           <a:p>
             <a:fld id="{97CFF939-70E9-4E47-9899-4E3DA2789027}" type="datetimeFigureOut">
               <a:rPr lang="en-US" smtClean="0"/>
-              <a:t>2/29/2016</a:t>
+              <a:t>3/2/2016</a:t>
             </a:fld>
             <a:endParaRPr lang="en-US"/>
           </a:p>
@@ -4573,7 +4569,7 @@
           <a:p>
             <a:fld id="{97CFF939-70E9-4E47-9899-4E3DA2789027}" type="datetimeFigureOut">
               <a:rPr lang="en-US" smtClean="0"/>
-              <a:t>2/29/2016</a:t>
+              <a:t>3/2/2016</a:t>
             </a:fld>
             <a:endParaRPr lang="en-US"/>
           </a:p>
@@ -4691,7 +4687,7 @@
           <a:p>
             <a:fld id="{97CFF939-70E9-4E47-9899-4E3DA2789027}" type="datetimeFigureOut">
               <a:rPr lang="en-US" smtClean="0"/>
-              <a:t>2/29/2016</a:t>
+              <a:t>3/2/2016</a:t>
             </a:fld>
             <a:endParaRPr lang="en-US"/>
           </a:p>
@@ -4786,7 +4782,7 @@
           <a:p>
             <a:fld id="{97CFF939-70E9-4E47-9899-4E3DA2789027}" type="datetimeFigureOut">
               <a:rPr lang="en-US" smtClean="0"/>
-              <a:t>2/29/2016</a:t>
+              <a:t>3/2/2016</a:t>
             </a:fld>
             <a:endParaRPr lang="en-US"/>
           </a:p>
@@ -5073,7 +5069,7 @@
           <a:p>
             <a:fld id="{97CFF939-70E9-4E47-9899-4E3DA2789027}" type="datetimeFigureOut">
               <a:rPr lang="en-US" smtClean="0"/>
-              <a:t>2/29/2016</a:t>
+              <a:t>3/2/2016</a:t>
             </a:fld>
             <a:endParaRPr lang="en-US"/>
           </a:p>
@@ -5395,7 +5391,7 @@
           <a:p>
             <a:fld id="{97CFF939-70E9-4E47-9899-4E3DA2789027}" type="datetimeFigureOut">
               <a:rPr lang="en-US" smtClean="0"/>
-              <a:t>2/29/2016</a:t>
+              <a:t>3/2/2016</a:t>
             </a:fld>
             <a:endParaRPr lang="en-US"/>
           </a:p>
@@ -5649,7 +5645,7 @@
           <a:p>
             <a:fld id="{97CFF939-70E9-4E47-9899-4E3DA2789027}" type="datetimeFigureOut">
               <a:rPr lang="en-US" smtClean="0"/>
-              <a:t>2/29/2016</a:t>
+              <a:t>3/2/2016</a:t>
             </a:fld>
             <a:endParaRPr lang="en-US"/>
           </a:p>
@@ -20912,128 +20908,6 @@
           </a:p>
         </p:txBody>
       </p:sp>
-      <p:pic>
-        <p:nvPicPr>
-          <p:cNvPr id="4" name="Picture 3"/>
-          <p:cNvPicPr>
-            <a:picLocks noChangeAspect="1"/>
-          </p:cNvPicPr>
-          <p:nvPr/>
-        </p:nvPicPr>
-        <p:blipFill rotWithShape="1">
-          <a:blip r:embed="rId2"/>
-          <a:srcRect r="50056"/>
-          <a:stretch/>
-        </p:blipFill>
-        <p:spPr>
-          <a:xfrm>
-            <a:off x="381001" y="1828801"/>
-            <a:ext cx="3962400" cy="2590800"/>
-          </a:xfrm>
-          <a:prstGeom prst="rect">
-            <a:avLst/>
-          </a:prstGeom>
-        </p:spPr>
-      </p:pic>
-      <p:pic>
-        <p:nvPicPr>
-          <p:cNvPr id="8" name="Picture 7"/>
-          <p:cNvPicPr>
-            <a:picLocks noChangeAspect="1"/>
-          </p:cNvPicPr>
-          <p:nvPr/>
-        </p:nvPicPr>
-        <p:blipFill rotWithShape="1">
-          <a:blip r:embed="rId2"/>
-          <a:srcRect l="49546"/>
-          <a:stretch/>
-        </p:blipFill>
-        <p:spPr>
-          <a:xfrm>
-            <a:off x="4342229" y="1828801"/>
-            <a:ext cx="4002829" cy="2590800"/>
-          </a:xfrm>
-          <a:prstGeom prst="rect">
-            <a:avLst/>
-          </a:prstGeom>
-        </p:spPr>
-      </p:pic>
-      <p:sp>
-        <p:nvSpPr>
-          <p:cNvPr id="10" name="TextBox 9"/>
-          <p:cNvSpPr txBox="1"/>
-          <p:nvPr/>
-        </p:nvSpPr>
-        <p:spPr>
-          <a:xfrm>
-            <a:off x="4724400" y="2429129"/>
-            <a:ext cx="731290" cy="369332"/>
-          </a:xfrm>
-          <a:prstGeom prst="rect">
-            <a:avLst/>
-          </a:prstGeom>
-          <a:noFill/>
-        </p:spPr>
-        <p:txBody>
-          <a:bodyPr wrap="none" rtlCol="0">
-            <a:spAutoFit/>
-          </a:bodyPr>
-          <a:lstStyle/>
-          <a:p>
-            <a:r>
-              <a:rPr lang="en-US" b="1" dirty="0" smtClean="0">
-                <a:solidFill>
-                  <a:srgbClr val="FF0000"/>
-                </a:solidFill>
-              </a:rPr>
-              <a:t>BAD</a:t>
-            </a:r>
-            <a:endParaRPr lang="en-US" b="1" dirty="0">
-              <a:solidFill>
-                <a:srgbClr val="FF0000"/>
-              </a:solidFill>
-            </a:endParaRPr>
-          </a:p>
-        </p:txBody>
-      </p:sp>
-      <p:sp>
-        <p:nvSpPr>
-          <p:cNvPr id="7" name="TextBox 6"/>
-          <p:cNvSpPr txBox="1"/>
-          <p:nvPr/>
-        </p:nvSpPr>
-        <p:spPr>
-          <a:xfrm>
-            <a:off x="762000" y="2429129"/>
-            <a:ext cx="954107" cy="369332"/>
-          </a:xfrm>
-          <a:prstGeom prst="rect">
-            <a:avLst/>
-          </a:prstGeom>
-          <a:noFill/>
-        </p:spPr>
-        <p:txBody>
-          <a:bodyPr wrap="none" rtlCol="0">
-            <a:spAutoFit/>
-          </a:bodyPr>
-          <a:lstStyle/>
-          <a:p>
-            <a:r>
-              <a:rPr lang="en-US" b="1" dirty="0" smtClean="0">
-                <a:solidFill>
-                  <a:srgbClr val="00B050"/>
-                </a:solidFill>
-              </a:rPr>
-              <a:t>GOOD</a:t>
-            </a:r>
-            <a:endParaRPr lang="en-US" b="1" dirty="0">
-              <a:solidFill>
-                <a:srgbClr val="00B050"/>
-              </a:solidFill>
-            </a:endParaRPr>
-          </a:p>
-        </p:txBody>
-      </p:sp>
     </p:spTree>
     <p:extLst>
       <p:ext uri="{BB962C8B-B14F-4D97-AF65-F5344CB8AC3E}">
@@ -21296,182 +21170,6 @@
                       </p:childTnLst>
                     </p:cTn>
                   </p:par>
-                  <p:par>
-                    <p:cTn id="23" fill="hold">
-                      <p:stCondLst>
-                        <p:cond delay="indefinite"/>
-                      </p:stCondLst>
-                      <p:childTnLst>
-                        <p:par>
-                          <p:cTn id="24" fill="hold">
-                            <p:stCondLst>
-                              <p:cond delay="0"/>
-                            </p:stCondLst>
-                            <p:childTnLst>
-                              <p:par>
-                                <p:cTn id="25" presetID="10" presetClass="entr" presetSubtype="0" fill="hold" nodeType="clickEffect">
-                                  <p:stCondLst>
-                                    <p:cond delay="0"/>
-                                  </p:stCondLst>
-                                  <p:childTnLst>
-                                    <p:set>
-                                      <p:cBhvr>
-                                        <p:cTn id="26" dur="1" fill="hold">
-                                          <p:stCondLst>
-                                            <p:cond delay="0"/>
-                                          </p:stCondLst>
-                                        </p:cTn>
-                                        <p:tgtEl>
-                                          <p:spTgt spid="4"/>
-                                        </p:tgtEl>
-                                        <p:attrNameLst>
-                                          <p:attrName>style.visibility</p:attrName>
-                                        </p:attrNameLst>
-                                      </p:cBhvr>
-                                      <p:to>
-                                        <p:strVal val="visible"/>
-                                      </p:to>
-                                    </p:set>
-                                    <p:animEffect transition="in" filter="fade">
-                                      <p:cBhvr>
-                                        <p:cTn id="27" dur="500"/>
-                                        <p:tgtEl>
-                                          <p:spTgt spid="4"/>
-                                        </p:tgtEl>
-                                      </p:cBhvr>
-                                    </p:animEffect>
-                                  </p:childTnLst>
-                                </p:cTn>
-                              </p:par>
-                              <p:par>
-                                <p:cTn id="28" presetID="10" presetClass="entr" presetSubtype="0" fill="hold" grpId="0" nodeType="withEffect">
-                                  <p:stCondLst>
-                                    <p:cond delay="0"/>
-                                  </p:stCondLst>
-                                  <p:childTnLst>
-                                    <p:set>
-                                      <p:cBhvr>
-                                        <p:cTn id="29" dur="1" fill="hold">
-                                          <p:stCondLst>
-                                            <p:cond delay="0"/>
-                                          </p:stCondLst>
-                                        </p:cTn>
-                                        <p:tgtEl>
-                                          <p:spTgt spid="7"/>
-                                        </p:tgtEl>
-                                        <p:attrNameLst>
-                                          <p:attrName>style.visibility</p:attrName>
-                                        </p:attrNameLst>
-                                      </p:cBhvr>
-                                      <p:to>
-                                        <p:strVal val="visible"/>
-                                      </p:to>
-                                    </p:set>
-                                    <p:animEffect transition="in" filter="fade">
-                                      <p:cBhvr>
-                                        <p:cTn id="30" dur="500"/>
-                                        <p:tgtEl>
-                                          <p:spTgt spid="7"/>
-                                        </p:tgtEl>
-                                      </p:cBhvr>
-                                    </p:animEffect>
-                                  </p:childTnLst>
-                                </p:cTn>
-                              </p:par>
-                            </p:childTnLst>
-                          </p:cTn>
-                        </p:par>
-                      </p:childTnLst>
-                    </p:cTn>
-                  </p:par>
-                  <p:par>
-                    <p:cTn id="31" fill="hold">
-                      <p:stCondLst>
-                        <p:cond delay="indefinite"/>
-                      </p:stCondLst>
-                      <p:childTnLst>
-                        <p:par>
-                          <p:cTn id="32" fill="hold">
-                            <p:stCondLst>
-                              <p:cond delay="0"/>
-                            </p:stCondLst>
-                            <p:childTnLst>
-                              <p:par>
-                                <p:cTn id="33" presetID="14" presetClass="entr" presetSubtype="10" fill="hold" nodeType="clickEffect">
-                                  <p:stCondLst>
-                                    <p:cond delay="0"/>
-                                  </p:stCondLst>
-                                  <p:childTnLst>
-                                    <p:set>
-                                      <p:cBhvr>
-                                        <p:cTn id="34" dur="1" fill="hold">
-                                          <p:stCondLst>
-                                            <p:cond delay="0"/>
-                                          </p:stCondLst>
-                                        </p:cTn>
-                                        <p:tgtEl>
-                                          <p:spTgt spid="8"/>
-                                        </p:tgtEl>
-                                        <p:attrNameLst>
-                                          <p:attrName>style.visibility</p:attrName>
-                                        </p:attrNameLst>
-                                      </p:cBhvr>
-                                      <p:to>
-                                        <p:strVal val="visible"/>
-                                      </p:to>
-                                    </p:set>
-                                    <p:animEffect transition="in" filter="randombar(horizontal)">
-                                      <p:cBhvr>
-                                        <p:cTn id="35" dur="1000"/>
-                                        <p:tgtEl>
-                                          <p:spTgt spid="8"/>
-                                        </p:tgtEl>
-                                      </p:cBhvr>
-                                    </p:animEffect>
-                                  </p:childTnLst>
-                                </p:cTn>
-                              </p:par>
-                              <p:par>
-                                <p:cTn id="36" presetID="10" presetClass="entr" presetSubtype="0" fill="hold" grpId="0" nodeType="withEffect">
-                                  <p:stCondLst>
-                                    <p:cond delay="0"/>
-                                  </p:stCondLst>
-                                  <p:childTnLst>
-                                    <p:set>
-                                      <p:cBhvr>
-                                        <p:cTn id="37" dur="1" fill="hold">
-                                          <p:stCondLst>
-                                            <p:cond delay="0"/>
-                                          </p:stCondLst>
-                                        </p:cTn>
-                                        <p:tgtEl>
-                                          <p:spTgt spid="10"/>
-                                        </p:tgtEl>
-                                        <p:attrNameLst>
-                                          <p:attrName>style.visibility</p:attrName>
-                                        </p:attrNameLst>
-                                      </p:cBhvr>
-                                      <p:to>
-                                        <p:strVal val="visible"/>
-                                      </p:to>
-                                    </p:set>
-                                    <p:animEffect transition="in" filter="fade">
-                                      <p:cBhvr>
-                                        <p:cTn id="38" dur="500"/>
-                                        <p:tgtEl>
-                                          <p:spTgt spid="10"/>
-                                        </p:tgtEl>
-                                      </p:cBhvr>
-                                    </p:animEffect>
-                                  </p:childTnLst>
-                                </p:cTn>
-                              </p:par>
-                            </p:childTnLst>
-                          </p:cTn>
-                        </p:par>
-                      </p:childTnLst>
-                    </p:cTn>
-                  </p:par>
                 </p:childTnLst>
               </p:cTn>
               <p:prevCondLst>
@@ -21493,10 +21191,6 @@
         </p:cTn>
       </p:par>
     </p:tnLst>
-    <p:bldLst>
-      <p:bldP spid="10" grpId="0"/>
-      <p:bldP spid="7" grpId="0"/>
-    </p:bldLst>
   </p:timing>
 </p:sld>
 </file>

</xml_diff>

<commit_message>
adding slides to 6_linear_regression ppt
</commit_message>
<xml_diff>
--- a/presentations/6_linear_regression/Linear_regression.pptx
+++ b/presentations/6_linear_regression/Linear_regression.pptx
@@ -5,7 +5,7 @@
     <p:sldMasterId id="2147483684" r:id="rId1"/>
   </p:sldMasterIdLst>
   <p:notesMasterIdLst>
-    <p:notesMasterId r:id="rId29"/>
+    <p:notesMasterId r:id="rId31"/>
   </p:notesMasterIdLst>
   <p:sldIdLst>
     <p:sldId id="256" r:id="rId2"/>
@@ -17,24 +17,26 @@
     <p:sldId id="301" r:id="rId8"/>
     <p:sldId id="299" r:id="rId9"/>
     <p:sldId id="302" r:id="rId10"/>
-    <p:sldId id="304" r:id="rId11"/>
-    <p:sldId id="315" r:id="rId12"/>
-    <p:sldId id="316" r:id="rId13"/>
-    <p:sldId id="317" r:id="rId14"/>
-    <p:sldId id="318" r:id="rId15"/>
-    <p:sldId id="319" r:id="rId16"/>
-    <p:sldId id="296" r:id="rId17"/>
-    <p:sldId id="297" r:id="rId18"/>
-    <p:sldId id="326" r:id="rId19"/>
-    <p:sldId id="310" r:id="rId20"/>
-    <p:sldId id="294" r:id="rId21"/>
-    <p:sldId id="306" r:id="rId22"/>
-    <p:sldId id="325" r:id="rId23"/>
-    <p:sldId id="320" r:id="rId24"/>
-    <p:sldId id="308" r:id="rId25"/>
-    <p:sldId id="324" r:id="rId26"/>
-    <p:sldId id="309" r:id="rId27"/>
-    <p:sldId id="311" r:id="rId28"/>
+    <p:sldId id="328" r:id="rId11"/>
+    <p:sldId id="330" r:id="rId12"/>
+    <p:sldId id="304" r:id="rId13"/>
+    <p:sldId id="315" r:id="rId14"/>
+    <p:sldId id="316" r:id="rId15"/>
+    <p:sldId id="317" r:id="rId16"/>
+    <p:sldId id="318" r:id="rId17"/>
+    <p:sldId id="319" r:id="rId18"/>
+    <p:sldId id="296" r:id="rId19"/>
+    <p:sldId id="297" r:id="rId20"/>
+    <p:sldId id="326" r:id="rId21"/>
+    <p:sldId id="310" r:id="rId22"/>
+    <p:sldId id="294" r:id="rId23"/>
+    <p:sldId id="306" r:id="rId24"/>
+    <p:sldId id="325" r:id="rId25"/>
+    <p:sldId id="320" r:id="rId26"/>
+    <p:sldId id="308" r:id="rId27"/>
+    <p:sldId id="324" r:id="rId28"/>
+    <p:sldId id="309" r:id="rId29"/>
+    <p:sldId id="311" r:id="rId30"/>
   </p:sldIdLst>
   <p:sldSz cx="9144000" cy="6858000" type="screen4x3"/>
   <p:notesSz cx="6858000" cy="9144000"/>
@@ -234,7 +236,7 @@
           <a:p>
             <a:fld id="{2793983C-EFA1-41D2-8DCF-4CEF34100D6A}" type="datetimeFigureOut">
               <a:rPr lang="en-US" smtClean="0"/>
-              <a:t>3/3/2016</a:t>
+              <a:t>3/4/2016</a:t>
             </a:fld>
             <a:endParaRPr lang="en-US"/>
           </a:p>
@@ -674,7 +676,7 @@
           <a:p>
             <a:fld id="{CC5A1FCD-79C7-4337-B79E-A51417706FB1}" type="slidenum">
               <a:rPr lang="en-US" smtClean="0"/>
-              <a:t>12</a:t>
+              <a:t>14</a:t>
             </a:fld>
             <a:endParaRPr lang="en-US"/>
           </a:p>
@@ -794,7 +796,7 @@
           <a:p>
             <a:fld id="{CC5A1FCD-79C7-4337-B79E-A51417706FB1}" type="slidenum">
               <a:rPr lang="en-US" smtClean="0"/>
-              <a:t>13</a:t>
+              <a:t>15</a:t>
             </a:fld>
             <a:endParaRPr lang="en-US"/>
           </a:p>
@@ -890,7 +892,7 @@
           <a:p>
             <a:fld id="{CC5A1FCD-79C7-4337-B79E-A51417706FB1}" type="slidenum">
               <a:rPr lang="en-US" smtClean="0"/>
-              <a:t>14</a:t>
+              <a:t>16</a:t>
             </a:fld>
             <a:endParaRPr lang="en-US"/>
           </a:p>
@@ -990,7 +992,7 @@
           <a:p>
             <a:fld id="{CC5A1FCD-79C7-4337-B79E-A51417706FB1}" type="slidenum">
               <a:rPr lang="en-US" smtClean="0"/>
-              <a:t>15</a:t>
+              <a:t>17</a:t>
             </a:fld>
             <a:endParaRPr lang="en-US"/>
           </a:p>
@@ -1082,7 +1084,7 @@
           <a:p>
             <a:fld id="{CC5A1FCD-79C7-4337-B79E-A51417706FB1}" type="slidenum">
               <a:rPr lang="en-US" smtClean="0"/>
-              <a:t>17</a:t>
+              <a:t>19</a:t>
             </a:fld>
             <a:endParaRPr lang="en-US"/>
           </a:p>
@@ -1223,7 +1225,7 @@
           <a:p>
             <a:fld id="{CC5A1FCD-79C7-4337-B79E-A51417706FB1}" type="slidenum">
               <a:rPr lang="en-US" smtClean="0"/>
-              <a:t>18</a:t>
+              <a:t>20</a:t>
             </a:fld>
             <a:endParaRPr lang="en-US"/>
           </a:p>
@@ -1323,7 +1325,7 @@
           <a:p>
             <a:fld id="{CC5A1FCD-79C7-4337-B79E-A51417706FB1}" type="slidenum">
               <a:rPr lang="en-US" smtClean="0"/>
-              <a:t>22</a:t>
+              <a:t>24</a:t>
             </a:fld>
             <a:endParaRPr lang="en-US"/>
           </a:p>
@@ -1407,7 +1409,7 @@
           <a:p>
             <a:fld id="{CC5A1FCD-79C7-4337-B79E-A51417706FB1}" type="slidenum">
               <a:rPr lang="en-US" smtClean="0"/>
-              <a:t>23</a:t>
+              <a:t>25</a:t>
             </a:fld>
             <a:endParaRPr lang="en-US"/>
           </a:p>
@@ -1554,7 +1556,7 @@
           <a:p>
             <a:fld id="{CC5A1FCD-79C7-4337-B79E-A51417706FB1}" type="slidenum">
               <a:rPr lang="en-US" smtClean="0"/>
-              <a:t>24</a:t>
+              <a:t>26</a:t>
             </a:fld>
             <a:endParaRPr lang="en-US"/>
           </a:p>
@@ -1638,7 +1640,7 @@
           <a:p>
             <a:fld id="{CC5A1FCD-79C7-4337-B79E-A51417706FB1}" type="slidenum">
               <a:rPr lang="en-US" smtClean="0"/>
-              <a:t>25</a:t>
+              <a:t>27</a:t>
             </a:fld>
             <a:endParaRPr lang="en-US"/>
           </a:p>
@@ -1806,7 +1808,7 @@
           <a:p>
             <a:fld id="{CC5A1FCD-79C7-4337-B79E-A51417706FB1}" type="slidenum">
               <a:rPr lang="en-US" smtClean="0"/>
-              <a:t>26</a:t>
+              <a:t>28</a:t>
             </a:fld>
             <a:endParaRPr lang="en-US"/>
           </a:p>
@@ -2901,7 +2903,7 @@
           <a:p>
             <a:fld id="{CC5A1FCD-79C7-4337-B79E-A51417706FB1}" type="slidenum">
               <a:rPr lang="en-US" smtClean="0"/>
-              <a:t>10</a:t>
+              <a:t>12</a:t>
             </a:fld>
             <a:endParaRPr lang="en-US"/>
           </a:p>
@@ -3127,7 +3129,7 @@
           <a:p>
             <a:fld id="{97CFF939-70E9-4E47-9899-4E3DA2789027}" type="datetimeFigureOut">
               <a:rPr lang="en-US" smtClean="0"/>
-              <a:t>3/3/2016</a:t>
+              <a:t>3/4/2016</a:t>
             </a:fld>
             <a:endParaRPr lang="en-US"/>
           </a:p>
@@ -3319,7 +3321,7 @@
           <a:p>
             <a:fld id="{97CFF939-70E9-4E47-9899-4E3DA2789027}" type="datetimeFigureOut">
               <a:rPr lang="en-US" smtClean="0"/>
-              <a:t>3/3/2016</a:t>
+              <a:t>3/4/2016</a:t>
             </a:fld>
             <a:endParaRPr lang="en-US"/>
           </a:p>
@@ -3499,7 +3501,7 @@
           <a:p>
             <a:fld id="{97CFF939-70E9-4E47-9899-4E3DA2789027}" type="datetimeFigureOut">
               <a:rPr lang="en-US" smtClean="0"/>
-              <a:t>3/3/2016</a:t>
+              <a:t>3/4/2016</a:t>
             </a:fld>
             <a:endParaRPr lang="en-US"/>
           </a:p>
@@ -3669,7 +3671,7 @@
           <a:p>
             <a:fld id="{97CFF939-70E9-4E47-9899-4E3DA2789027}" type="datetimeFigureOut">
               <a:rPr lang="en-US" smtClean="0"/>
-              <a:t>3/3/2016</a:t>
+              <a:t>3/4/2016</a:t>
             </a:fld>
             <a:endParaRPr lang="en-US"/>
           </a:p>
@@ -3923,7 +3925,7 @@
           <a:p>
             <a:fld id="{97CFF939-70E9-4E47-9899-4E3DA2789027}" type="datetimeFigureOut">
               <a:rPr lang="en-US" smtClean="0"/>
-              <a:t>3/3/2016</a:t>
+              <a:t>3/4/2016</a:t>
             </a:fld>
             <a:endParaRPr lang="en-US"/>
           </a:p>
@@ -4249,7 +4251,7 @@
           <a:p>
             <a:fld id="{97CFF939-70E9-4E47-9899-4E3DA2789027}" type="datetimeFigureOut">
               <a:rPr lang="en-US" smtClean="0"/>
-              <a:t>3/3/2016</a:t>
+              <a:t>3/4/2016</a:t>
             </a:fld>
             <a:endParaRPr lang="en-US"/>
           </a:p>
@@ -4669,7 +4671,7 @@
           <a:p>
             <a:fld id="{97CFF939-70E9-4E47-9899-4E3DA2789027}" type="datetimeFigureOut">
               <a:rPr lang="en-US" smtClean="0"/>
-              <a:t>3/3/2016</a:t>
+              <a:t>3/4/2016</a:t>
             </a:fld>
             <a:endParaRPr lang="en-US"/>
           </a:p>
@@ -4787,7 +4789,7 @@
           <a:p>
             <a:fld id="{97CFF939-70E9-4E47-9899-4E3DA2789027}" type="datetimeFigureOut">
               <a:rPr lang="en-US" smtClean="0"/>
-              <a:t>3/3/2016</a:t>
+              <a:t>3/4/2016</a:t>
             </a:fld>
             <a:endParaRPr lang="en-US"/>
           </a:p>
@@ -4882,7 +4884,7 @@
           <a:p>
             <a:fld id="{97CFF939-70E9-4E47-9899-4E3DA2789027}" type="datetimeFigureOut">
               <a:rPr lang="en-US" smtClean="0"/>
-              <a:t>3/3/2016</a:t>
+              <a:t>3/4/2016</a:t>
             </a:fld>
             <a:endParaRPr lang="en-US"/>
           </a:p>
@@ -5169,7 +5171,7 @@
           <a:p>
             <a:fld id="{97CFF939-70E9-4E47-9899-4E3DA2789027}" type="datetimeFigureOut">
               <a:rPr lang="en-US" smtClean="0"/>
-              <a:t>3/3/2016</a:t>
+              <a:t>3/4/2016</a:t>
             </a:fld>
             <a:endParaRPr lang="en-US"/>
           </a:p>
@@ -5491,7 +5493,7 @@
           <a:p>
             <a:fld id="{97CFF939-70E9-4E47-9899-4E3DA2789027}" type="datetimeFigureOut">
               <a:rPr lang="en-US" smtClean="0"/>
-              <a:t>3/3/2016</a:t>
+              <a:t>3/4/2016</a:t>
             </a:fld>
             <a:endParaRPr lang="en-US"/>
           </a:p>
@@ -5745,7 +5747,7 @@
           <a:p>
             <a:fld id="{97CFF939-70E9-4E47-9899-4E3DA2789027}" type="datetimeFigureOut">
               <a:rPr lang="en-US" smtClean="0"/>
-              <a:t>3/3/2016</a:t>
+              <a:t>3/4/2016</a:t>
             </a:fld>
             <a:endParaRPr lang="en-US"/>
           </a:p>
@@ -6335,6 +6337,2158 @@
           <a:chExt cx="0" cy="0"/>
         </a:xfrm>
       </p:grpSpPr>
+      <p:sp>
+        <p:nvSpPr>
+          <p:cNvPr id="4" name="Title 3"/>
+          <p:cNvSpPr>
+            <a:spLocks noGrp="1"/>
+          </p:cNvSpPr>
+          <p:nvPr>
+            <p:ph type="title"/>
+          </p:nvPr>
+        </p:nvSpPr>
+        <p:spPr>
+          <a:xfrm>
+            <a:off x="946404" y="-304800"/>
+            <a:ext cx="7269480" cy="1325562"/>
+          </a:xfrm>
+        </p:spPr>
+        <p:txBody>
+          <a:bodyPr/>
+          <a:lstStyle/>
+          <a:p>
+            <a:r>
+              <a:rPr lang="en-US" dirty="0" err="1" smtClean="0"/>
+              <a:t>Heteroscedasticity</a:t>
+            </a:r>
+            <a:endParaRPr lang="en-US" dirty="0"/>
+          </a:p>
+        </p:txBody>
+      </p:sp>
+      <p:grpSp>
+        <p:nvGrpSpPr>
+          <p:cNvPr id="29" name="Group 28"/>
+          <p:cNvGrpSpPr>
+            <a:grpSpLocks noChangeAspect="1"/>
+          </p:cNvGrpSpPr>
+          <p:nvPr/>
+        </p:nvGrpSpPr>
+        <p:grpSpPr>
+          <a:xfrm>
+            <a:off x="457873" y="1020124"/>
+            <a:ext cx="3352127" cy="2725426"/>
+            <a:chOff x="55236" y="451181"/>
+            <a:chExt cx="4285014" cy="3483904"/>
+          </a:xfrm>
+        </p:grpSpPr>
+        <p:sp>
+          <p:nvSpPr>
+            <p:cNvPr id="18" name="Rectangle 17"/>
+            <p:cNvSpPr/>
+            <p:nvPr/>
+          </p:nvSpPr>
+          <p:spPr>
+            <a:xfrm>
+              <a:off x="499770" y="957262"/>
+              <a:ext cx="3840480" cy="2471738"/>
+            </a:xfrm>
+            <a:prstGeom prst="rect">
+              <a:avLst/>
+            </a:prstGeom>
+            <a:solidFill>
+              <a:schemeClr val="tx1"/>
+            </a:solidFill>
+            <a:ln w="19050">
+              <a:solidFill>
+                <a:schemeClr val="bg1"/>
+              </a:solidFill>
+            </a:ln>
+          </p:spPr>
+          <p:style>
+            <a:lnRef idx="2">
+              <a:schemeClr val="accent1">
+                <a:shade val="50000"/>
+              </a:schemeClr>
+            </a:lnRef>
+            <a:fillRef idx="1">
+              <a:schemeClr val="accent1"/>
+            </a:fillRef>
+            <a:effectRef idx="0">
+              <a:schemeClr val="accent1"/>
+            </a:effectRef>
+            <a:fontRef idx="minor">
+              <a:schemeClr val="lt1"/>
+            </a:fontRef>
+          </p:style>
+          <p:txBody>
+            <a:bodyPr rtlCol="0" anchor="ctr"/>
+            <a:lstStyle/>
+            <a:p>
+              <a:pPr algn="ctr"/>
+              <a:endParaRPr lang="en-US"/>
+            </a:p>
+          </p:txBody>
+        </p:sp>
+        <p:cxnSp>
+          <p:nvCxnSpPr>
+            <p:cNvPr id="19" name="Straight Connector 18"/>
+            <p:cNvCxnSpPr>
+              <a:stCxn id="18" idx="1"/>
+              <a:endCxn id="18" idx="3"/>
+            </p:cNvCxnSpPr>
+            <p:nvPr/>
+          </p:nvCxnSpPr>
+          <p:spPr>
+            <a:xfrm>
+              <a:off x="499770" y="2193131"/>
+              <a:ext cx="3840480" cy="0"/>
+            </a:xfrm>
+            <a:prstGeom prst="line">
+              <a:avLst/>
+            </a:prstGeom>
+            <a:ln w="19050">
+              <a:solidFill>
+                <a:schemeClr val="bg1"/>
+              </a:solidFill>
+            </a:ln>
+          </p:spPr>
+          <p:style>
+            <a:lnRef idx="1">
+              <a:schemeClr val="accent1"/>
+            </a:lnRef>
+            <a:fillRef idx="0">
+              <a:schemeClr val="accent1"/>
+            </a:fillRef>
+            <a:effectRef idx="0">
+              <a:schemeClr val="accent1"/>
+            </a:effectRef>
+            <a:fontRef idx="minor">
+              <a:schemeClr val="tx1"/>
+            </a:fontRef>
+          </p:style>
+        </p:cxnSp>
+        <p:sp>
+          <p:nvSpPr>
+            <p:cNvPr id="20" name="TextBox 19"/>
+            <p:cNvSpPr txBox="1"/>
+            <p:nvPr/>
+          </p:nvSpPr>
+          <p:spPr>
+            <a:xfrm>
+              <a:off x="1695157" y="3424518"/>
+              <a:ext cx="1776991" cy="472116"/>
+            </a:xfrm>
+            <a:prstGeom prst="rect">
+              <a:avLst/>
+            </a:prstGeom>
+            <a:noFill/>
+          </p:spPr>
+          <p:txBody>
+            <a:bodyPr wrap="none" rtlCol="0">
+              <a:spAutoFit/>
+            </a:bodyPr>
+            <a:lstStyle/>
+            <a:p>
+              <a:r>
+                <a:rPr lang="en-US" dirty="0" smtClean="0"/>
+                <a:t>Predicted y</a:t>
+              </a:r>
+              <a:endParaRPr lang="en-US" dirty="0"/>
+            </a:p>
+          </p:txBody>
+        </p:sp>
+        <p:sp>
+          <p:nvSpPr>
+            <p:cNvPr id="21" name="TextBox 20"/>
+            <p:cNvSpPr txBox="1"/>
+            <p:nvPr/>
+          </p:nvSpPr>
+          <p:spPr>
+            <a:xfrm rot="16200000">
+              <a:off x="-1450658" y="1957075"/>
+              <a:ext cx="3483904" cy="472116"/>
+            </a:xfrm>
+            <a:prstGeom prst="rect">
+              <a:avLst/>
+            </a:prstGeom>
+            <a:noFill/>
+          </p:spPr>
+          <p:txBody>
+            <a:bodyPr wrap="none" rtlCol="0">
+              <a:spAutoFit/>
+            </a:bodyPr>
+            <a:lstStyle/>
+            <a:p>
+              <a:pPr algn="ctr"/>
+              <a:r>
+                <a:rPr lang="en-US" dirty="0" smtClean="0"/>
+                <a:t>Standardized Residuals</a:t>
+              </a:r>
+              <a:endParaRPr lang="en-US" dirty="0"/>
+            </a:p>
+          </p:txBody>
+        </p:sp>
+        <p:sp>
+          <p:nvSpPr>
+            <p:cNvPr id="22" name="Rectangle 21"/>
+            <p:cNvSpPr/>
+            <p:nvPr/>
+          </p:nvSpPr>
+          <p:spPr>
+            <a:xfrm>
+              <a:off x="609600" y="1612105"/>
+              <a:ext cx="3657600" cy="1143000"/>
+            </a:xfrm>
+            <a:prstGeom prst="rect">
+              <a:avLst/>
+            </a:prstGeom>
+            <a:solidFill>
+              <a:schemeClr val="accent1">
+                <a:alpha val="50000"/>
+              </a:schemeClr>
+            </a:solidFill>
+            <a:ln>
+              <a:noFill/>
+            </a:ln>
+          </p:spPr>
+          <p:style>
+            <a:lnRef idx="2">
+              <a:schemeClr val="accent1">
+                <a:shade val="50000"/>
+              </a:schemeClr>
+            </a:lnRef>
+            <a:fillRef idx="1">
+              <a:schemeClr val="accent1"/>
+            </a:fillRef>
+            <a:effectRef idx="0">
+              <a:schemeClr val="accent1"/>
+            </a:effectRef>
+            <a:fontRef idx="minor">
+              <a:schemeClr val="lt1"/>
+            </a:fontRef>
+          </p:style>
+          <p:txBody>
+            <a:bodyPr rtlCol="0" anchor="ctr"/>
+            <a:lstStyle/>
+            <a:p>
+              <a:pPr algn="ctr"/>
+              <a:endParaRPr lang="en-US"/>
+            </a:p>
+          </p:txBody>
+        </p:sp>
+      </p:grpSp>
+      <p:grpSp>
+        <p:nvGrpSpPr>
+          <p:cNvPr id="23" name="Group 22"/>
+          <p:cNvGrpSpPr>
+            <a:grpSpLocks noChangeAspect="1"/>
+          </p:cNvGrpSpPr>
+          <p:nvPr/>
+        </p:nvGrpSpPr>
+        <p:grpSpPr>
+          <a:xfrm>
+            <a:off x="457873" y="3782726"/>
+            <a:ext cx="3352127" cy="2725426"/>
+            <a:chOff x="36479" y="3411076"/>
+            <a:chExt cx="4285014" cy="3483904"/>
+          </a:xfrm>
+        </p:grpSpPr>
+        <p:sp>
+          <p:nvSpPr>
+            <p:cNvPr id="7" name="Rectangle 6"/>
+            <p:cNvSpPr/>
+            <p:nvPr/>
+          </p:nvSpPr>
+          <p:spPr>
+            <a:xfrm>
+              <a:off x="481013" y="3917157"/>
+              <a:ext cx="3840480" cy="2471738"/>
+            </a:xfrm>
+            <a:prstGeom prst="rect">
+              <a:avLst/>
+            </a:prstGeom>
+            <a:solidFill>
+              <a:schemeClr val="tx1"/>
+            </a:solidFill>
+            <a:ln w="19050">
+              <a:solidFill>
+                <a:schemeClr val="bg1"/>
+              </a:solidFill>
+            </a:ln>
+          </p:spPr>
+          <p:style>
+            <a:lnRef idx="2">
+              <a:schemeClr val="accent1">
+                <a:shade val="50000"/>
+              </a:schemeClr>
+            </a:lnRef>
+            <a:fillRef idx="1">
+              <a:schemeClr val="accent1"/>
+            </a:fillRef>
+            <a:effectRef idx="0">
+              <a:schemeClr val="accent1"/>
+            </a:effectRef>
+            <a:fontRef idx="minor">
+              <a:schemeClr val="lt1"/>
+            </a:fontRef>
+          </p:style>
+          <p:txBody>
+            <a:bodyPr rtlCol="0" anchor="ctr"/>
+            <a:lstStyle/>
+            <a:p>
+              <a:pPr algn="ctr"/>
+              <a:endParaRPr lang="en-US"/>
+            </a:p>
+          </p:txBody>
+        </p:sp>
+        <p:cxnSp>
+          <p:nvCxnSpPr>
+            <p:cNvPr id="9" name="Straight Connector 8"/>
+            <p:cNvCxnSpPr>
+              <a:stCxn id="7" idx="1"/>
+              <a:endCxn id="7" idx="3"/>
+            </p:cNvCxnSpPr>
+            <p:nvPr/>
+          </p:nvCxnSpPr>
+          <p:spPr>
+            <a:xfrm>
+              <a:off x="481013" y="5153026"/>
+              <a:ext cx="3840480" cy="0"/>
+            </a:xfrm>
+            <a:prstGeom prst="line">
+              <a:avLst/>
+            </a:prstGeom>
+            <a:ln w="19050">
+              <a:solidFill>
+                <a:schemeClr val="bg1"/>
+              </a:solidFill>
+            </a:ln>
+          </p:spPr>
+          <p:style>
+            <a:lnRef idx="1">
+              <a:schemeClr val="accent1"/>
+            </a:lnRef>
+            <a:fillRef idx="0">
+              <a:schemeClr val="accent1"/>
+            </a:fillRef>
+            <a:effectRef idx="0">
+              <a:schemeClr val="accent1"/>
+            </a:effectRef>
+            <a:fontRef idx="minor">
+              <a:schemeClr val="tx1"/>
+            </a:fontRef>
+          </p:style>
+        </p:cxnSp>
+        <p:sp>
+          <p:nvSpPr>
+            <p:cNvPr id="10" name="TextBox 9"/>
+            <p:cNvSpPr txBox="1"/>
+            <p:nvPr/>
+          </p:nvSpPr>
+          <p:spPr>
+            <a:xfrm>
+              <a:off x="1676400" y="6384413"/>
+              <a:ext cx="1776991" cy="472116"/>
+            </a:xfrm>
+            <a:prstGeom prst="rect">
+              <a:avLst/>
+            </a:prstGeom>
+            <a:noFill/>
+          </p:spPr>
+          <p:txBody>
+            <a:bodyPr wrap="none" rtlCol="0">
+              <a:spAutoFit/>
+            </a:bodyPr>
+            <a:lstStyle/>
+            <a:p>
+              <a:r>
+                <a:rPr lang="en-US" dirty="0" smtClean="0"/>
+                <a:t>Predicted y</a:t>
+              </a:r>
+              <a:endParaRPr lang="en-US" dirty="0"/>
+            </a:p>
+          </p:txBody>
+        </p:sp>
+        <p:sp>
+          <p:nvSpPr>
+            <p:cNvPr id="14" name="TextBox 13"/>
+            <p:cNvSpPr txBox="1"/>
+            <p:nvPr/>
+          </p:nvSpPr>
+          <p:spPr>
+            <a:xfrm rot="16200000">
+              <a:off x="-1469415" y="4916970"/>
+              <a:ext cx="3483904" cy="472116"/>
+            </a:xfrm>
+            <a:prstGeom prst="rect">
+              <a:avLst/>
+            </a:prstGeom>
+            <a:noFill/>
+          </p:spPr>
+          <p:txBody>
+            <a:bodyPr wrap="none" rtlCol="0">
+              <a:spAutoFit/>
+            </a:bodyPr>
+            <a:lstStyle/>
+            <a:p>
+              <a:pPr algn="ctr"/>
+              <a:r>
+                <a:rPr lang="en-US" dirty="0" smtClean="0"/>
+                <a:t>Standardized Residuals</a:t>
+              </a:r>
+              <a:endParaRPr lang="en-US" dirty="0"/>
+            </a:p>
+          </p:txBody>
+        </p:sp>
+        <p:sp>
+          <p:nvSpPr>
+            <p:cNvPr id="12" name="Trapezoid 11"/>
+            <p:cNvSpPr/>
+            <p:nvPr/>
+          </p:nvSpPr>
+          <p:spPr>
+            <a:xfrm rot="16200000">
+              <a:off x="1624014" y="3337560"/>
+              <a:ext cx="1554480" cy="3657600"/>
+            </a:xfrm>
+            <a:prstGeom prst="trapezoid">
+              <a:avLst>
+                <a:gd name="adj" fmla="val 30769"/>
+              </a:avLst>
+            </a:prstGeom>
+            <a:solidFill>
+              <a:schemeClr val="accent1">
+                <a:alpha val="50000"/>
+              </a:schemeClr>
+            </a:solidFill>
+            <a:ln>
+              <a:noFill/>
+            </a:ln>
+          </p:spPr>
+          <p:style>
+            <a:lnRef idx="2">
+              <a:schemeClr val="accent1">
+                <a:shade val="50000"/>
+              </a:schemeClr>
+            </a:lnRef>
+            <a:fillRef idx="1">
+              <a:schemeClr val="accent1"/>
+            </a:fillRef>
+            <a:effectRef idx="0">
+              <a:schemeClr val="accent1"/>
+            </a:effectRef>
+            <a:fontRef idx="minor">
+              <a:schemeClr val="lt1"/>
+            </a:fontRef>
+          </p:style>
+          <p:txBody>
+            <a:bodyPr rtlCol="0" anchor="ctr"/>
+            <a:lstStyle/>
+            <a:p>
+              <a:pPr algn="ctr"/>
+              <a:endParaRPr lang="en-US"/>
+            </a:p>
+          </p:txBody>
+        </p:sp>
+      </p:grpSp>
+      <p:grpSp>
+        <p:nvGrpSpPr>
+          <p:cNvPr id="30" name="Group 29"/>
+          <p:cNvGrpSpPr>
+            <a:grpSpLocks noChangeAspect="1"/>
+          </p:cNvGrpSpPr>
+          <p:nvPr/>
+        </p:nvGrpSpPr>
+        <p:grpSpPr>
+          <a:xfrm>
+            <a:off x="4779637" y="1020122"/>
+            <a:ext cx="3352127" cy="2725426"/>
+            <a:chOff x="4548744" y="451181"/>
+            <a:chExt cx="4285014" cy="3483905"/>
+          </a:xfrm>
+        </p:grpSpPr>
+        <p:sp>
+          <p:nvSpPr>
+            <p:cNvPr id="24" name="Rectangle 23"/>
+            <p:cNvSpPr/>
+            <p:nvPr/>
+          </p:nvSpPr>
+          <p:spPr>
+            <a:xfrm>
+              <a:off x="4993278" y="957263"/>
+              <a:ext cx="3840480" cy="2471739"/>
+            </a:xfrm>
+            <a:prstGeom prst="rect">
+              <a:avLst/>
+            </a:prstGeom>
+            <a:solidFill>
+              <a:schemeClr val="tx1"/>
+            </a:solidFill>
+            <a:ln w="19050">
+              <a:solidFill>
+                <a:schemeClr val="bg1"/>
+              </a:solidFill>
+            </a:ln>
+          </p:spPr>
+          <p:style>
+            <a:lnRef idx="2">
+              <a:schemeClr val="accent1">
+                <a:shade val="50000"/>
+              </a:schemeClr>
+            </a:lnRef>
+            <a:fillRef idx="1">
+              <a:schemeClr val="accent1"/>
+            </a:fillRef>
+            <a:effectRef idx="0">
+              <a:schemeClr val="accent1"/>
+            </a:effectRef>
+            <a:fontRef idx="minor">
+              <a:schemeClr val="lt1"/>
+            </a:fontRef>
+          </p:style>
+          <p:txBody>
+            <a:bodyPr rtlCol="0" anchor="ctr"/>
+            <a:lstStyle/>
+            <a:p>
+              <a:pPr algn="ctr"/>
+              <a:endParaRPr lang="en-US"/>
+            </a:p>
+          </p:txBody>
+        </p:sp>
+        <p:cxnSp>
+          <p:nvCxnSpPr>
+            <p:cNvPr id="25" name="Straight Connector 24"/>
+            <p:cNvCxnSpPr>
+              <a:stCxn id="24" idx="1"/>
+              <a:endCxn id="24" idx="3"/>
+            </p:cNvCxnSpPr>
+            <p:nvPr/>
+          </p:nvCxnSpPr>
+          <p:spPr>
+            <a:xfrm>
+              <a:off x="4993278" y="2193131"/>
+              <a:ext cx="3840480" cy="0"/>
+            </a:xfrm>
+            <a:prstGeom prst="line">
+              <a:avLst/>
+            </a:prstGeom>
+            <a:ln w="19050">
+              <a:solidFill>
+                <a:schemeClr val="bg1"/>
+              </a:solidFill>
+            </a:ln>
+          </p:spPr>
+          <p:style>
+            <a:lnRef idx="1">
+              <a:schemeClr val="accent1"/>
+            </a:lnRef>
+            <a:fillRef idx="0">
+              <a:schemeClr val="accent1"/>
+            </a:fillRef>
+            <a:effectRef idx="0">
+              <a:schemeClr val="accent1"/>
+            </a:effectRef>
+            <a:fontRef idx="minor">
+              <a:schemeClr val="tx1"/>
+            </a:fontRef>
+          </p:style>
+        </p:cxnSp>
+        <p:sp>
+          <p:nvSpPr>
+            <p:cNvPr id="26" name="TextBox 25"/>
+            <p:cNvSpPr txBox="1"/>
+            <p:nvPr/>
+          </p:nvSpPr>
+          <p:spPr>
+            <a:xfrm>
+              <a:off x="6188665" y="3424518"/>
+              <a:ext cx="1776992" cy="472116"/>
+            </a:xfrm>
+            <a:prstGeom prst="rect">
+              <a:avLst/>
+            </a:prstGeom>
+            <a:noFill/>
+          </p:spPr>
+          <p:txBody>
+            <a:bodyPr wrap="none" rtlCol="0">
+              <a:spAutoFit/>
+            </a:bodyPr>
+            <a:lstStyle/>
+            <a:p>
+              <a:r>
+                <a:rPr lang="en-US" dirty="0" smtClean="0"/>
+                <a:t>Predicted y</a:t>
+              </a:r>
+              <a:endParaRPr lang="en-US" dirty="0"/>
+            </a:p>
+          </p:txBody>
+        </p:sp>
+        <p:sp>
+          <p:nvSpPr>
+            <p:cNvPr id="27" name="TextBox 26"/>
+            <p:cNvSpPr txBox="1"/>
+            <p:nvPr/>
+          </p:nvSpPr>
+          <p:spPr>
+            <a:xfrm rot="16200000">
+              <a:off x="3042849" y="1957076"/>
+              <a:ext cx="3483905" cy="472116"/>
+            </a:xfrm>
+            <a:prstGeom prst="rect">
+              <a:avLst/>
+            </a:prstGeom>
+            <a:noFill/>
+          </p:spPr>
+          <p:txBody>
+            <a:bodyPr wrap="none" rtlCol="0">
+              <a:spAutoFit/>
+            </a:bodyPr>
+            <a:lstStyle/>
+            <a:p>
+              <a:pPr algn="ctr"/>
+              <a:r>
+                <a:rPr lang="en-US" dirty="0" smtClean="0"/>
+                <a:t>Standardized Residuals</a:t>
+              </a:r>
+              <a:endParaRPr lang="en-US" dirty="0"/>
+            </a:p>
+          </p:txBody>
+        </p:sp>
+        <p:sp>
+          <p:nvSpPr>
+            <p:cNvPr id="15" name="Freeform 14"/>
+            <p:cNvSpPr/>
+            <p:nvPr/>
+          </p:nvSpPr>
+          <p:spPr>
+            <a:xfrm>
+              <a:off x="5083245" y="1371599"/>
+              <a:ext cx="3660545" cy="1706707"/>
+            </a:xfrm>
+            <a:custGeom>
+              <a:avLst/>
+              <a:gdLst>
+                <a:gd name="connsiteX0" fmla="*/ 0 w 3010487"/>
+                <a:gd name="connsiteY0" fmla="*/ 0 h 1603717"/>
+                <a:gd name="connsiteX1" fmla="*/ 14068 w 3010487"/>
+                <a:gd name="connsiteY1" fmla="*/ 1266092 h 1603717"/>
+                <a:gd name="connsiteX2" fmla="*/ 1491176 w 3010487"/>
+                <a:gd name="connsiteY2" fmla="*/ 1603717 h 1603717"/>
+                <a:gd name="connsiteX3" fmla="*/ 3010487 w 3010487"/>
+                <a:gd name="connsiteY3" fmla="*/ 1280160 h 1603717"/>
+                <a:gd name="connsiteX4" fmla="*/ 3010487 w 3010487"/>
+                <a:gd name="connsiteY4" fmla="*/ 0 h 1603717"/>
+                <a:gd name="connsiteX5" fmla="*/ 1491176 w 3010487"/>
+                <a:gd name="connsiteY5" fmla="*/ 478301 h 1603717"/>
+                <a:gd name="connsiteX6" fmla="*/ 0 w 3010487"/>
+                <a:gd name="connsiteY6" fmla="*/ 0 h 1603717"/>
+                <a:gd name="connsiteX0" fmla="*/ 0 w 3010487"/>
+                <a:gd name="connsiteY0" fmla="*/ 0 h 1603717"/>
+                <a:gd name="connsiteX1" fmla="*/ 0 w 3010487"/>
+                <a:gd name="connsiteY1" fmla="*/ 1308295 h 1603717"/>
+                <a:gd name="connsiteX2" fmla="*/ 1491176 w 3010487"/>
+                <a:gd name="connsiteY2" fmla="*/ 1603717 h 1603717"/>
+                <a:gd name="connsiteX3" fmla="*/ 3010487 w 3010487"/>
+                <a:gd name="connsiteY3" fmla="*/ 1280160 h 1603717"/>
+                <a:gd name="connsiteX4" fmla="*/ 3010487 w 3010487"/>
+                <a:gd name="connsiteY4" fmla="*/ 0 h 1603717"/>
+                <a:gd name="connsiteX5" fmla="*/ 1491176 w 3010487"/>
+                <a:gd name="connsiteY5" fmla="*/ 478301 h 1603717"/>
+                <a:gd name="connsiteX6" fmla="*/ 0 w 3010487"/>
+                <a:gd name="connsiteY6" fmla="*/ 0 h 1603717"/>
+                <a:gd name="connsiteX0" fmla="*/ 0 w 3010487"/>
+                <a:gd name="connsiteY0" fmla="*/ 0 h 1603717"/>
+                <a:gd name="connsiteX1" fmla="*/ 0 w 3010487"/>
+                <a:gd name="connsiteY1" fmla="*/ 1308295 h 1603717"/>
+                <a:gd name="connsiteX2" fmla="*/ 1491176 w 3010487"/>
+                <a:gd name="connsiteY2" fmla="*/ 1603717 h 1603717"/>
+                <a:gd name="connsiteX3" fmla="*/ 3010487 w 3010487"/>
+                <a:gd name="connsiteY3" fmla="*/ 1280160 h 1603717"/>
+                <a:gd name="connsiteX4" fmla="*/ 3010487 w 3010487"/>
+                <a:gd name="connsiteY4" fmla="*/ 0 h 1603717"/>
+                <a:gd name="connsiteX5" fmla="*/ 1533380 w 3010487"/>
+                <a:gd name="connsiteY5" fmla="*/ 407963 h 1603717"/>
+                <a:gd name="connsiteX6" fmla="*/ 0 w 3010487"/>
+                <a:gd name="connsiteY6" fmla="*/ 0 h 1603717"/>
+                <a:gd name="connsiteX0" fmla="*/ 0 w 3010487"/>
+                <a:gd name="connsiteY0" fmla="*/ 0 h 1603717"/>
+                <a:gd name="connsiteX1" fmla="*/ 0 w 3010487"/>
+                <a:gd name="connsiteY1" fmla="*/ 1308295 h 1603717"/>
+                <a:gd name="connsiteX2" fmla="*/ 1491176 w 3010487"/>
+                <a:gd name="connsiteY2" fmla="*/ 1603717 h 1603717"/>
+                <a:gd name="connsiteX3" fmla="*/ 3010487 w 3010487"/>
+                <a:gd name="connsiteY3" fmla="*/ 1280160 h 1603717"/>
+                <a:gd name="connsiteX4" fmla="*/ 3010487 w 3010487"/>
+                <a:gd name="connsiteY4" fmla="*/ 0 h 1603717"/>
+                <a:gd name="connsiteX5" fmla="*/ 1533380 w 3010487"/>
+                <a:gd name="connsiteY5" fmla="*/ 407963 h 1603717"/>
+                <a:gd name="connsiteX6" fmla="*/ 0 w 3010487"/>
+                <a:gd name="connsiteY6" fmla="*/ 0 h 1603717"/>
+                <a:gd name="connsiteX0" fmla="*/ 0 w 3010487"/>
+                <a:gd name="connsiteY0" fmla="*/ 0 h 1603717"/>
+                <a:gd name="connsiteX1" fmla="*/ 0 w 3010487"/>
+                <a:gd name="connsiteY1" fmla="*/ 1308295 h 1603717"/>
+                <a:gd name="connsiteX2" fmla="*/ 1491176 w 3010487"/>
+                <a:gd name="connsiteY2" fmla="*/ 1603717 h 1603717"/>
+                <a:gd name="connsiteX3" fmla="*/ 3010487 w 3010487"/>
+                <a:gd name="connsiteY3" fmla="*/ 1280160 h 1603717"/>
+                <a:gd name="connsiteX4" fmla="*/ 3010487 w 3010487"/>
+                <a:gd name="connsiteY4" fmla="*/ 0 h 1603717"/>
+                <a:gd name="connsiteX5" fmla="*/ 1533380 w 3010487"/>
+                <a:gd name="connsiteY5" fmla="*/ 407963 h 1603717"/>
+                <a:gd name="connsiteX6" fmla="*/ 0 w 3010487"/>
+                <a:gd name="connsiteY6" fmla="*/ 0 h 1603717"/>
+                <a:gd name="connsiteX0" fmla="*/ 0 w 3010487"/>
+                <a:gd name="connsiteY0" fmla="*/ 0 h 1603717"/>
+                <a:gd name="connsiteX1" fmla="*/ 0 w 3010487"/>
+                <a:gd name="connsiteY1" fmla="*/ 1308295 h 1603717"/>
+                <a:gd name="connsiteX2" fmla="*/ 1491176 w 3010487"/>
+                <a:gd name="connsiteY2" fmla="*/ 1603717 h 1603717"/>
+                <a:gd name="connsiteX3" fmla="*/ 3010487 w 3010487"/>
+                <a:gd name="connsiteY3" fmla="*/ 1280160 h 1603717"/>
+                <a:gd name="connsiteX4" fmla="*/ 3010487 w 3010487"/>
+                <a:gd name="connsiteY4" fmla="*/ 0 h 1603717"/>
+                <a:gd name="connsiteX5" fmla="*/ 1533380 w 3010487"/>
+                <a:gd name="connsiteY5" fmla="*/ 407963 h 1603717"/>
+                <a:gd name="connsiteX6" fmla="*/ 0 w 3010487"/>
+                <a:gd name="connsiteY6" fmla="*/ 0 h 1603717"/>
+                <a:gd name="connsiteX0" fmla="*/ 0 w 3010487"/>
+                <a:gd name="connsiteY0" fmla="*/ 0 h 1603717"/>
+                <a:gd name="connsiteX1" fmla="*/ 0 w 3010487"/>
+                <a:gd name="connsiteY1" fmla="*/ 1308295 h 1603717"/>
+                <a:gd name="connsiteX2" fmla="*/ 1491176 w 3010487"/>
+                <a:gd name="connsiteY2" fmla="*/ 1603717 h 1603717"/>
+                <a:gd name="connsiteX3" fmla="*/ 3010487 w 3010487"/>
+                <a:gd name="connsiteY3" fmla="*/ 1280160 h 1603717"/>
+                <a:gd name="connsiteX4" fmla="*/ 3010487 w 3010487"/>
+                <a:gd name="connsiteY4" fmla="*/ 0 h 1603717"/>
+                <a:gd name="connsiteX5" fmla="*/ 1533380 w 3010487"/>
+                <a:gd name="connsiteY5" fmla="*/ 407963 h 1603717"/>
+                <a:gd name="connsiteX6" fmla="*/ 0 w 3010487"/>
+                <a:gd name="connsiteY6" fmla="*/ 0 h 1603717"/>
+                <a:gd name="connsiteX0" fmla="*/ 0 w 3010487"/>
+                <a:gd name="connsiteY0" fmla="*/ 0 h 1603717"/>
+                <a:gd name="connsiteX1" fmla="*/ 0 w 3010487"/>
+                <a:gd name="connsiteY1" fmla="*/ 1308295 h 1603717"/>
+                <a:gd name="connsiteX2" fmla="*/ 1491176 w 3010487"/>
+                <a:gd name="connsiteY2" fmla="*/ 1603717 h 1603717"/>
+                <a:gd name="connsiteX3" fmla="*/ 3010487 w 3010487"/>
+                <a:gd name="connsiteY3" fmla="*/ 1280160 h 1603717"/>
+                <a:gd name="connsiteX4" fmla="*/ 3010487 w 3010487"/>
+                <a:gd name="connsiteY4" fmla="*/ 0 h 1603717"/>
+                <a:gd name="connsiteX5" fmla="*/ 1547447 w 3010487"/>
+                <a:gd name="connsiteY5" fmla="*/ 618978 h 1603717"/>
+                <a:gd name="connsiteX6" fmla="*/ 0 w 3010487"/>
+                <a:gd name="connsiteY6" fmla="*/ 0 h 1603717"/>
+                <a:gd name="connsiteX0" fmla="*/ 56271 w 3010487"/>
+                <a:gd name="connsiteY0" fmla="*/ 253218 h 1603717"/>
+                <a:gd name="connsiteX1" fmla="*/ 0 w 3010487"/>
+                <a:gd name="connsiteY1" fmla="*/ 1308295 h 1603717"/>
+                <a:gd name="connsiteX2" fmla="*/ 1491176 w 3010487"/>
+                <a:gd name="connsiteY2" fmla="*/ 1603717 h 1603717"/>
+                <a:gd name="connsiteX3" fmla="*/ 3010487 w 3010487"/>
+                <a:gd name="connsiteY3" fmla="*/ 1280160 h 1603717"/>
+                <a:gd name="connsiteX4" fmla="*/ 3010487 w 3010487"/>
+                <a:gd name="connsiteY4" fmla="*/ 0 h 1603717"/>
+                <a:gd name="connsiteX5" fmla="*/ 1547447 w 3010487"/>
+                <a:gd name="connsiteY5" fmla="*/ 618978 h 1603717"/>
+                <a:gd name="connsiteX6" fmla="*/ 56271 w 3010487"/>
+                <a:gd name="connsiteY6" fmla="*/ 253218 h 1603717"/>
+                <a:gd name="connsiteX0" fmla="*/ 56271 w 3024555"/>
+                <a:gd name="connsiteY0" fmla="*/ 0 h 1350499"/>
+                <a:gd name="connsiteX1" fmla="*/ 0 w 3024555"/>
+                <a:gd name="connsiteY1" fmla="*/ 1055077 h 1350499"/>
+                <a:gd name="connsiteX2" fmla="*/ 1491176 w 3024555"/>
+                <a:gd name="connsiteY2" fmla="*/ 1350499 h 1350499"/>
+                <a:gd name="connsiteX3" fmla="*/ 3010487 w 3024555"/>
+                <a:gd name="connsiteY3" fmla="*/ 1026942 h 1350499"/>
+                <a:gd name="connsiteX4" fmla="*/ 3024555 w 3024555"/>
+                <a:gd name="connsiteY4" fmla="*/ 56272 h 1350499"/>
+                <a:gd name="connsiteX5" fmla="*/ 1547447 w 3024555"/>
+                <a:gd name="connsiteY5" fmla="*/ 365760 h 1350499"/>
+                <a:gd name="connsiteX6" fmla="*/ 56271 w 3024555"/>
+                <a:gd name="connsiteY6" fmla="*/ 0 h 1350499"/>
+                <a:gd name="connsiteX0" fmla="*/ 56271 w 3010487"/>
+                <a:gd name="connsiteY0" fmla="*/ 0 h 1350499"/>
+                <a:gd name="connsiteX1" fmla="*/ 0 w 3010487"/>
+                <a:gd name="connsiteY1" fmla="*/ 1055077 h 1350499"/>
+                <a:gd name="connsiteX2" fmla="*/ 1491176 w 3010487"/>
+                <a:gd name="connsiteY2" fmla="*/ 1350499 h 1350499"/>
+                <a:gd name="connsiteX3" fmla="*/ 3010487 w 3010487"/>
+                <a:gd name="connsiteY3" fmla="*/ 1026942 h 1350499"/>
+                <a:gd name="connsiteX4" fmla="*/ 2996419 w 3010487"/>
+                <a:gd name="connsiteY4" fmla="*/ 1 h 1350499"/>
+                <a:gd name="connsiteX5" fmla="*/ 1547447 w 3010487"/>
+                <a:gd name="connsiteY5" fmla="*/ 365760 h 1350499"/>
+                <a:gd name="connsiteX6" fmla="*/ 56271 w 3010487"/>
+                <a:gd name="connsiteY6" fmla="*/ 0 h 1350499"/>
+                <a:gd name="connsiteX0" fmla="*/ 56271 w 3024555"/>
+                <a:gd name="connsiteY0" fmla="*/ 0 h 1350499"/>
+                <a:gd name="connsiteX1" fmla="*/ 0 w 3024555"/>
+                <a:gd name="connsiteY1" fmla="*/ 1055077 h 1350499"/>
+                <a:gd name="connsiteX2" fmla="*/ 1491176 w 3024555"/>
+                <a:gd name="connsiteY2" fmla="*/ 1350499 h 1350499"/>
+                <a:gd name="connsiteX3" fmla="*/ 3010487 w 3024555"/>
+                <a:gd name="connsiteY3" fmla="*/ 1026942 h 1350499"/>
+                <a:gd name="connsiteX4" fmla="*/ 3024555 w 3024555"/>
+                <a:gd name="connsiteY4" fmla="*/ 1 h 1350499"/>
+                <a:gd name="connsiteX5" fmla="*/ 1547447 w 3024555"/>
+                <a:gd name="connsiteY5" fmla="*/ 365760 h 1350499"/>
+                <a:gd name="connsiteX6" fmla="*/ 56271 w 3024555"/>
+                <a:gd name="connsiteY6" fmla="*/ 0 h 1350499"/>
+                <a:gd name="connsiteX0" fmla="*/ 56271 w 3010488"/>
+                <a:gd name="connsiteY0" fmla="*/ 56270 h 1406769"/>
+                <a:gd name="connsiteX1" fmla="*/ 0 w 3010488"/>
+                <a:gd name="connsiteY1" fmla="*/ 1111347 h 1406769"/>
+                <a:gd name="connsiteX2" fmla="*/ 1491176 w 3010488"/>
+                <a:gd name="connsiteY2" fmla="*/ 1406769 h 1406769"/>
+                <a:gd name="connsiteX3" fmla="*/ 3010487 w 3010488"/>
+                <a:gd name="connsiteY3" fmla="*/ 1083212 h 1406769"/>
+                <a:gd name="connsiteX4" fmla="*/ 3010488 w 3010488"/>
+                <a:gd name="connsiteY4" fmla="*/ 0 h 1406769"/>
+                <a:gd name="connsiteX5" fmla="*/ 1547447 w 3010488"/>
+                <a:gd name="connsiteY5" fmla="*/ 422030 h 1406769"/>
+                <a:gd name="connsiteX6" fmla="*/ 56271 w 3010488"/>
+                <a:gd name="connsiteY6" fmla="*/ 56270 h 1406769"/>
+                <a:gd name="connsiteX0" fmla="*/ 9956 w 3010488"/>
+                <a:gd name="connsiteY0" fmla="*/ 79460 h 1406769"/>
+                <a:gd name="connsiteX1" fmla="*/ 0 w 3010488"/>
+                <a:gd name="connsiteY1" fmla="*/ 1111347 h 1406769"/>
+                <a:gd name="connsiteX2" fmla="*/ 1491176 w 3010488"/>
+                <a:gd name="connsiteY2" fmla="*/ 1406769 h 1406769"/>
+                <a:gd name="connsiteX3" fmla="*/ 3010487 w 3010488"/>
+                <a:gd name="connsiteY3" fmla="*/ 1083212 h 1406769"/>
+                <a:gd name="connsiteX4" fmla="*/ 3010488 w 3010488"/>
+                <a:gd name="connsiteY4" fmla="*/ 0 h 1406769"/>
+                <a:gd name="connsiteX5" fmla="*/ 1547447 w 3010488"/>
+                <a:gd name="connsiteY5" fmla="*/ 422030 h 1406769"/>
+                <a:gd name="connsiteX6" fmla="*/ 9956 w 3010488"/>
+                <a:gd name="connsiteY6" fmla="*/ 79460 h 1406769"/>
+                <a:gd name="connsiteX0" fmla="*/ 802 w 3012912"/>
+                <a:gd name="connsiteY0" fmla="*/ 102651 h 1406769"/>
+                <a:gd name="connsiteX1" fmla="*/ 2424 w 3012912"/>
+                <a:gd name="connsiteY1" fmla="*/ 1111347 h 1406769"/>
+                <a:gd name="connsiteX2" fmla="*/ 1493600 w 3012912"/>
+                <a:gd name="connsiteY2" fmla="*/ 1406769 h 1406769"/>
+                <a:gd name="connsiteX3" fmla="*/ 3012911 w 3012912"/>
+                <a:gd name="connsiteY3" fmla="*/ 1083212 h 1406769"/>
+                <a:gd name="connsiteX4" fmla="*/ 3012912 w 3012912"/>
+                <a:gd name="connsiteY4" fmla="*/ 0 h 1406769"/>
+                <a:gd name="connsiteX5" fmla="*/ 1549871 w 3012912"/>
+                <a:gd name="connsiteY5" fmla="*/ 422030 h 1406769"/>
+                <a:gd name="connsiteX6" fmla="*/ 802 w 3012912"/>
+                <a:gd name="connsiteY6" fmla="*/ 102651 h 1406769"/>
+                <a:gd name="connsiteX0" fmla="*/ 802 w 3012912"/>
+                <a:gd name="connsiteY0" fmla="*/ 102651 h 1406769"/>
+                <a:gd name="connsiteX1" fmla="*/ 2424 w 3012912"/>
+                <a:gd name="connsiteY1" fmla="*/ 1111347 h 1406769"/>
+                <a:gd name="connsiteX2" fmla="*/ 1493600 w 3012912"/>
+                <a:gd name="connsiteY2" fmla="*/ 1406769 h 1406769"/>
+                <a:gd name="connsiteX3" fmla="*/ 3012911 w 3012912"/>
+                <a:gd name="connsiteY3" fmla="*/ 1083212 h 1406769"/>
+                <a:gd name="connsiteX4" fmla="*/ 3012912 w 3012912"/>
+                <a:gd name="connsiteY4" fmla="*/ 0 h 1406769"/>
+                <a:gd name="connsiteX5" fmla="*/ 1549871 w 3012912"/>
+                <a:gd name="connsiteY5" fmla="*/ 422030 h 1406769"/>
+                <a:gd name="connsiteX6" fmla="*/ 802 w 3012912"/>
+                <a:gd name="connsiteY6" fmla="*/ 102651 h 1406769"/>
+                <a:gd name="connsiteX0" fmla="*/ 802 w 3012912"/>
+                <a:gd name="connsiteY0" fmla="*/ 102651 h 1406769"/>
+                <a:gd name="connsiteX1" fmla="*/ 2424 w 3012912"/>
+                <a:gd name="connsiteY1" fmla="*/ 1111347 h 1406769"/>
+                <a:gd name="connsiteX2" fmla="*/ 1493600 w 3012912"/>
+                <a:gd name="connsiteY2" fmla="*/ 1406769 h 1406769"/>
+                <a:gd name="connsiteX3" fmla="*/ 3012911 w 3012912"/>
+                <a:gd name="connsiteY3" fmla="*/ 1083212 h 1406769"/>
+                <a:gd name="connsiteX4" fmla="*/ 3012912 w 3012912"/>
+                <a:gd name="connsiteY4" fmla="*/ 0 h 1406769"/>
+                <a:gd name="connsiteX5" fmla="*/ 1549871 w 3012912"/>
+                <a:gd name="connsiteY5" fmla="*/ 422030 h 1406769"/>
+                <a:gd name="connsiteX6" fmla="*/ 802 w 3012912"/>
+                <a:gd name="connsiteY6" fmla="*/ 102651 h 1406769"/>
+                <a:gd name="connsiteX0" fmla="*/ 802 w 3024490"/>
+                <a:gd name="connsiteY0" fmla="*/ 102651 h 1406769"/>
+                <a:gd name="connsiteX1" fmla="*/ 2424 w 3024490"/>
+                <a:gd name="connsiteY1" fmla="*/ 1111347 h 1406769"/>
+                <a:gd name="connsiteX2" fmla="*/ 1493600 w 3024490"/>
+                <a:gd name="connsiteY2" fmla="*/ 1406769 h 1406769"/>
+                <a:gd name="connsiteX3" fmla="*/ 3024490 w 3024490"/>
+                <a:gd name="connsiteY3" fmla="*/ 944067 h 1406769"/>
+                <a:gd name="connsiteX4" fmla="*/ 3012912 w 3024490"/>
+                <a:gd name="connsiteY4" fmla="*/ 0 h 1406769"/>
+                <a:gd name="connsiteX5" fmla="*/ 1549871 w 3024490"/>
+                <a:gd name="connsiteY5" fmla="*/ 422030 h 1406769"/>
+                <a:gd name="connsiteX6" fmla="*/ 802 w 3024490"/>
+                <a:gd name="connsiteY6" fmla="*/ 102651 h 1406769"/>
+                <a:gd name="connsiteX0" fmla="*/ 802 w 3024490"/>
+                <a:gd name="connsiteY0" fmla="*/ 102651 h 1406769"/>
+                <a:gd name="connsiteX1" fmla="*/ 2424 w 3024490"/>
+                <a:gd name="connsiteY1" fmla="*/ 1111347 h 1406769"/>
+                <a:gd name="connsiteX2" fmla="*/ 1493600 w 3024490"/>
+                <a:gd name="connsiteY2" fmla="*/ 1406769 h 1406769"/>
+                <a:gd name="connsiteX3" fmla="*/ 3024490 w 3024490"/>
+                <a:gd name="connsiteY3" fmla="*/ 944067 h 1406769"/>
+                <a:gd name="connsiteX4" fmla="*/ 3012912 w 3024490"/>
+                <a:gd name="connsiteY4" fmla="*/ 0 h 1406769"/>
+                <a:gd name="connsiteX5" fmla="*/ 1549871 w 3024490"/>
+                <a:gd name="connsiteY5" fmla="*/ 422030 h 1406769"/>
+                <a:gd name="connsiteX6" fmla="*/ 802 w 3024490"/>
+                <a:gd name="connsiteY6" fmla="*/ 102651 h 1406769"/>
+                <a:gd name="connsiteX0" fmla="*/ 802 w 3024490"/>
+                <a:gd name="connsiteY0" fmla="*/ 102651 h 1406769"/>
+                <a:gd name="connsiteX1" fmla="*/ 2424 w 3024490"/>
+                <a:gd name="connsiteY1" fmla="*/ 995393 h 1406769"/>
+                <a:gd name="connsiteX2" fmla="*/ 1493600 w 3024490"/>
+                <a:gd name="connsiteY2" fmla="*/ 1406769 h 1406769"/>
+                <a:gd name="connsiteX3" fmla="*/ 3024490 w 3024490"/>
+                <a:gd name="connsiteY3" fmla="*/ 944067 h 1406769"/>
+                <a:gd name="connsiteX4" fmla="*/ 3012912 w 3024490"/>
+                <a:gd name="connsiteY4" fmla="*/ 0 h 1406769"/>
+                <a:gd name="connsiteX5" fmla="*/ 1549871 w 3024490"/>
+                <a:gd name="connsiteY5" fmla="*/ 422030 h 1406769"/>
+                <a:gd name="connsiteX6" fmla="*/ 802 w 3024490"/>
+                <a:gd name="connsiteY6" fmla="*/ 102651 h 1406769"/>
+                <a:gd name="connsiteX0" fmla="*/ 802 w 3024490"/>
+                <a:gd name="connsiteY0" fmla="*/ 102651 h 1406769"/>
+                <a:gd name="connsiteX1" fmla="*/ 2424 w 3024490"/>
+                <a:gd name="connsiteY1" fmla="*/ 995393 h 1406769"/>
+                <a:gd name="connsiteX2" fmla="*/ 1493600 w 3024490"/>
+                <a:gd name="connsiteY2" fmla="*/ 1406769 h 1406769"/>
+                <a:gd name="connsiteX3" fmla="*/ 3024490 w 3024490"/>
+                <a:gd name="connsiteY3" fmla="*/ 944067 h 1406769"/>
+                <a:gd name="connsiteX4" fmla="*/ 3012912 w 3024490"/>
+                <a:gd name="connsiteY4" fmla="*/ 0 h 1406769"/>
+                <a:gd name="connsiteX5" fmla="*/ 1549871 w 3024490"/>
+                <a:gd name="connsiteY5" fmla="*/ 422030 h 1406769"/>
+                <a:gd name="connsiteX6" fmla="*/ 802 w 3024490"/>
+                <a:gd name="connsiteY6" fmla="*/ 102651 h 1406769"/>
+                <a:gd name="connsiteX0" fmla="*/ 802 w 3024490"/>
+                <a:gd name="connsiteY0" fmla="*/ 102651 h 1406769"/>
+                <a:gd name="connsiteX1" fmla="*/ 2424 w 3024490"/>
+                <a:gd name="connsiteY1" fmla="*/ 995393 h 1406769"/>
+                <a:gd name="connsiteX2" fmla="*/ 1493600 w 3024490"/>
+                <a:gd name="connsiteY2" fmla="*/ 1406769 h 1406769"/>
+                <a:gd name="connsiteX3" fmla="*/ 3024490 w 3024490"/>
+                <a:gd name="connsiteY3" fmla="*/ 944067 h 1406769"/>
+                <a:gd name="connsiteX4" fmla="*/ 3012912 w 3024490"/>
+                <a:gd name="connsiteY4" fmla="*/ 0 h 1406769"/>
+                <a:gd name="connsiteX5" fmla="*/ 1526714 w 3024490"/>
+                <a:gd name="connsiteY5" fmla="*/ 526389 h 1406769"/>
+                <a:gd name="connsiteX6" fmla="*/ 802 w 3024490"/>
+                <a:gd name="connsiteY6" fmla="*/ 102651 h 1406769"/>
+                <a:gd name="connsiteX0" fmla="*/ 802 w 3024490"/>
+                <a:gd name="connsiteY0" fmla="*/ 102651 h 1406769"/>
+                <a:gd name="connsiteX1" fmla="*/ 2424 w 3024490"/>
+                <a:gd name="connsiteY1" fmla="*/ 995393 h 1406769"/>
+                <a:gd name="connsiteX2" fmla="*/ 1493600 w 3024490"/>
+                <a:gd name="connsiteY2" fmla="*/ 1406769 h 1406769"/>
+                <a:gd name="connsiteX3" fmla="*/ 3024490 w 3024490"/>
+                <a:gd name="connsiteY3" fmla="*/ 944067 h 1406769"/>
+                <a:gd name="connsiteX4" fmla="*/ 3012912 w 3024490"/>
+                <a:gd name="connsiteY4" fmla="*/ 0 h 1406769"/>
+                <a:gd name="connsiteX5" fmla="*/ 1526714 w 3024490"/>
+                <a:gd name="connsiteY5" fmla="*/ 526389 h 1406769"/>
+                <a:gd name="connsiteX6" fmla="*/ 802 w 3024490"/>
+                <a:gd name="connsiteY6" fmla="*/ 102651 h 1406769"/>
+                <a:gd name="connsiteX0" fmla="*/ 802 w 3024490"/>
+                <a:gd name="connsiteY0" fmla="*/ 102651 h 1406769"/>
+                <a:gd name="connsiteX1" fmla="*/ 2424 w 3024490"/>
+                <a:gd name="connsiteY1" fmla="*/ 995393 h 1406769"/>
+                <a:gd name="connsiteX2" fmla="*/ 1493600 w 3024490"/>
+                <a:gd name="connsiteY2" fmla="*/ 1406769 h 1406769"/>
+                <a:gd name="connsiteX3" fmla="*/ 3024490 w 3024490"/>
+                <a:gd name="connsiteY3" fmla="*/ 944067 h 1406769"/>
+                <a:gd name="connsiteX4" fmla="*/ 3012912 w 3024490"/>
+                <a:gd name="connsiteY4" fmla="*/ 0 h 1406769"/>
+                <a:gd name="connsiteX5" fmla="*/ 1526714 w 3024490"/>
+                <a:gd name="connsiteY5" fmla="*/ 526389 h 1406769"/>
+                <a:gd name="connsiteX6" fmla="*/ 802 w 3024490"/>
+                <a:gd name="connsiteY6" fmla="*/ 102651 h 1406769"/>
+                <a:gd name="connsiteX0" fmla="*/ 802 w 3024490"/>
+                <a:gd name="connsiteY0" fmla="*/ 102651 h 1406769"/>
+                <a:gd name="connsiteX1" fmla="*/ 2424 w 3024490"/>
+                <a:gd name="connsiteY1" fmla="*/ 995393 h 1406769"/>
+                <a:gd name="connsiteX2" fmla="*/ 1493600 w 3024490"/>
+                <a:gd name="connsiteY2" fmla="*/ 1406769 h 1406769"/>
+                <a:gd name="connsiteX3" fmla="*/ 3024490 w 3024490"/>
+                <a:gd name="connsiteY3" fmla="*/ 944067 h 1406769"/>
+                <a:gd name="connsiteX4" fmla="*/ 3012912 w 3024490"/>
+                <a:gd name="connsiteY4" fmla="*/ 0 h 1406769"/>
+                <a:gd name="connsiteX5" fmla="*/ 1526714 w 3024490"/>
+                <a:gd name="connsiteY5" fmla="*/ 526389 h 1406769"/>
+                <a:gd name="connsiteX6" fmla="*/ 802 w 3024490"/>
+                <a:gd name="connsiteY6" fmla="*/ 102651 h 1406769"/>
+                <a:gd name="connsiteX0" fmla="*/ 802 w 3024490"/>
+                <a:gd name="connsiteY0" fmla="*/ 102651 h 1406769"/>
+                <a:gd name="connsiteX1" fmla="*/ 2424 w 3024490"/>
+                <a:gd name="connsiteY1" fmla="*/ 1018584 h 1406769"/>
+                <a:gd name="connsiteX2" fmla="*/ 1493600 w 3024490"/>
+                <a:gd name="connsiteY2" fmla="*/ 1406769 h 1406769"/>
+                <a:gd name="connsiteX3" fmla="*/ 3024490 w 3024490"/>
+                <a:gd name="connsiteY3" fmla="*/ 944067 h 1406769"/>
+                <a:gd name="connsiteX4" fmla="*/ 3012912 w 3024490"/>
+                <a:gd name="connsiteY4" fmla="*/ 0 h 1406769"/>
+                <a:gd name="connsiteX5" fmla="*/ 1526714 w 3024490"/>
+                <a:gd name="connsiteY5" fmla="*/ 526389 h 1406769"/>
+                <a:gd name="connsiteX6" fmla="*/ 802 w 3024490"/>
+                <a:gd name="connsiteY6" fmla="*/ 102651 h 1406769"/>
+                <a:gd name="connsiteX0" fmla="*/ 802 w 3012912"/>
+                <a:gd name="connsiteY0" fmla="*/ 102651 h 1406769"/>
+                <a:gd name="connsiteX1" fmla="*/ 2424 w 3012912"/>
+                <a:gd name="connsiteY1" fmla="*/ 1018584 h 1406769"/>
+                <a:gd name="connsiteX2" fmla="*/ 1493600 w 3012912"/>
+                <a:gd name="connsiteY2" fmla="*/ 1406769 h 1406769"/>
+                <a:gd name="connsiteX3" fmla="*/ 3001333 w 3012912"/>
+                <a:gd name="connsiteY3" fmla="*/ 955662 h 1406769"/>
+                <a:gd name="connsiteX4" fmla="*/ 3012912 w 3012912"/>
+                <a:gd name="connsiteY4" fmla="*/ 0 h 1406769"/>
+                <a:gd name="connsiteX5" fmla="*/ 1526714 w 3012912"/>
+                <a:gd name="connsiteY5" fmla="*/ 526389 h 1406769"/>
+                <a:gd name="connsiteX6" fmla="*/ 802 w 3012912"/>
+                <a:gd name="connsiteY6" fmla="*/ 102651 h 1406769"/>
+                <a:gd name="connsiteX0" fmla="*/ 802 w 3012912"/>
+                <a:gd name="connsiteY0" fmla="*/ 102651 h 1406769"/>
+                <a:gd name="connsiteX1" fmla="*/ 2424 w 3012912"/>
+                <a:gd name="connsiteY1" fmla="*/ 1018584 h 1406769"/>
+                <a:gd name="connsiteX2" fmla="*/ 1493600 w 3012912"/>
+                <a:gd name="connsiteY2" fmla="*/ 1406769 h 1406769"/>
+                <a:gd name="connsiteX3" fmla="*/ 3012912 w 3012912"/>
+                <a:gd name="connsiteY3" fmla="*/ 955662 h 1406769"/>
+                <a:gd name="connsiteX4" fmla="*/ 3012912 w 3012912"/>
+                <a:gd name="connsiteY4" fmla="*/ 0 h 1406769"/>
+                <a:gd name="connsiteX5" fmla="*/ 1526714 w 3012912"/>
+                <a:gd name="connsiteY5" fmla="*/ 526389 h 1406769"/>
+                <a:gd name="connsiteX6" fmla="*/ 802 w 3012912"/>
+                <a:gd name="connsiteY6" fmla="*/ 102651 h 1406769"/>
+              </a:gdLst>
+              <a:ahLst/>
+              <a:cxnLst>
+                <a:cxn ang="0">
+                  <a:pos x="connsiteX0" y="connsiteY0"/>
+                </a:cxn>
+                <a:cxn ang="0">
+                  <a:pos x="connsiteX1" y="connsiteY1"/>
+                </a:cxn>
+                <a:cxn ang="0">
+                  <a:pos x="connsiteX2" y="connsiteY2"/>
+                </a:cxn>
+                <a:cxn ang="0">
+                  <a:pos x="connsiteX3" y="connsiteY3"/>
+                </a:cxn>
+                <a:cxn ang="0">
+                  <a:pos x="connsiteX4" y="connsiteY4"/>
+                </a:cxn>
+                <a:cxn ang="0">
+                  <a:pos x="connsiteX5" y="connsiteY5"/>
+                </a:cxn>
+                <a:cxn ang="0">
+                  <a:pos x="connsiteX6" y="connsiteY6"/>
+                </a:cxn>
+              </a:cxnLst>
+              <a:rect l="l" t="t" r="r" b="b"/>
+              <a:pathLst>
+                <a:path w="3012912" h="1406769">
+                  <a:moveTo>
+                    <a:pt x="802" y="102651"/>
+                  </a:moveTo>
+                  <a:cubicBezTo>
+                    <a:pt x="-2517" y="446613"/>
+                    <a:pt x="5743" y="674622"/>
+                    <a:pt x="2424" y="1018584"/>
+                  </a:cubicBezTo>
+                  <a:cubicBezTo>
+                    <a:pt x="487905" y="1209822"/>
+                    <a:pt x="729254" y="1392701"/>
+                    <a:pt x="1493600" y="1406769"/>
+                  </a:cubicBezTo>
+                  <a:cubicBezTo>
+                    <a:pt x="2239187" y="1383323"/>
+                    <a:pt x="2518053" y="1191064"/>
+                    <a:pt x="3012912" y="955662"/>
+                  </a:cubicBezTo>
+                  <a:lnTo>
+                    <a:pt x="3012912" y="0"/>
+                  </a:lnTo>
+                  <a:cubicBezTo>
+                    <a:pt x="2439492" y="286728"/>
+                    <a:pt x="2145692" y="509593"/>
+                    <a:pt x="1526714" y="526389"/>
+                  </a:cubicBezTo>
+                  <a:cubicBezTo>
+                    <a:pt x="874910" y="517010"/>
+                    <a:pt x="511929" y="308211"/>
+                    <a:pt x="802" y="102651"/>
+                  </a:cubicBezTo>
+                  <a:close/>
+                </a:path>
+              </a:pathLst>
+            </a:custGeom>
+            <a:solidFill>
+              <a:schemeClr val="accent1">
+                <a:alpha val="50000"/>
+              </a:schemeClr>
+            </a:solidFill>
+            <a:ln>
+              <a:noFill/>
+            </a:ln>
+          </p:spPr>
+          <p:style>
+            <a:lnRef idx="2">
+              <a:schemeClr val="accent1">
+                <a:shade val="50000"/>
+              </a:schemeClr>
+            </a:lnRef>
+            <a:fillRef idx="1">
+              <a:schemeClr val="accent1"/>
+            </a:fillRef>
+            <a:effectRef idx="0">
+              <a:schemeClr val="accent1"/>
+            </a:effectRef>
+            <a:fontRef idx="minor">
+              <a:schemeClr val="lt1"/>
+            </a:fontRef>
+          </p:style>
+          <p:txBody>
+            <a:bodyPr rtlCol="0" anchor="ctr"/>
+            <a:lstStyle/>
+            <a:p>
+              <a:pPr algn="ctr"/>
+              <a:endParaRPr lang="en-US" dirty="0"/>
+            </a:p>
+          </p:txBody>
+        </p:sp>
+      </p:grpSp>
+      <p:grpSp>
+        <p:nvGrpSpPr>
+          <p:cNvPr id="30721" name="Group 30720"/>
+          <p:cNvGrpSpPr/>
+          <p:nvPr/>
+        </p:nvGrpSpPr>
+        <p:grpSpPr>
+          <a:xfrm>
+            <a:off x="4779637" y="4061994"/>
+            <a:ext cx="3352126" cy="2725426"/>
+            <a:chOff x="4775852" y="3378787"/>
+            <a:chExt cx="3867676" cy="3957953"/>
+          </a:xfrm>
+        </p:grpSpPr>
+        <p:sp>
+          <p:nvSpPr>
+            <p:cNvPr id="31" name="Rectangle 30"/>
+            <p:cNvSpPr/>
+            <p:nvPr/>
+          </p:nvSpPr>
+          <p:spPr>
+            <a:xfrm>
+              <a:off x="5177090" y="4210402"/>
+              <a:ext cx="3466438" cy="2231004"/>
+            </a:xfrm>
+            <a:prstGeom prst="rect">
+              <a:avLst/>
+            </a:prstGeom>
+            <a:solidFill>
+              <a:schemeClr val="tx1"/>
+            </a:solidFill>
+            <a:ln w="19050">
+              <a:solidFill>
+                <a:schemeClr val="bg1"/>
+              </a:solidFill>
+            </a:ln>
+          </p:spPr>
+          <p:style>
+            <a:lnRef idx="2">
+              <a:schemeClr val="accent1">
+                <a:shade val="50000"/>
+              </a:schemeClr>
+            </a:lnRef>
+            <a:fillRef idx="1">
+              <a:schemeClr val="accent1"/>
+            </a:fillRef>
+            <a:effectRef idx="0">
+              <a:schemeClr val="accent1"/>
+            </a:effectRef>
+            <a:fontRef idx="minor">
+              <a:schemeClr val="lt1"/>
+            </a:fontRef>
+          </p:style>
+          <p:txBody>
+            <a:bodyPr rtlCol="0" anchor="ctr"/>
+            <a:lstStyle/>
+            <a:p>
+              <a:pPr algn="ctr"/>
+              <a:endParaRPr lang="en-US"/>
+            </a:p>
+          </p:txBody>
+        </p:sp>
+        <p:cxnSp>
+          <p:nvCxnSpPr>
+            <p:cNvPr id="32" name="Straight Connector 31"/>
+            <p:cNvCxnSpPr>
+              <a:stCxn id="31" idx="1"/>
+              <a:endCxn id="31" idx="3"/>
+            </p:cNvCxnSpPr>
+            <p:nvPr/>
+          </p:nvCxnSpPr>
+          <p:spPr>
+            <a:xfrm>
+              <a:off x="5177090" y="5325904"/>
+              <a:ext cx="3466438" cy="0"/>
+            </a:xfrm>
+            <a:prstGeom prst="line">
+              <a:avLst/>
+            </a:prstGeom>
+            <a:ln w="19050">
+              <a:solidFill>
+                <a:schemeClr val="bg1"/>
+              </a:solidFill>
+            </a:ln>
+          </p:spPr>
+          <p:style>
+            <a:lnRef idx="1">
+              <a:schemeClr val="accent1"/>
+            </a:lnRef>
+            <a:fillRef idx="0">
+              <a:schemeClr val="accent1"/>
+            </a:fillRef>
+            <a:effectRef idx="0">
+              <a:schemeClr val="accent1"/>
+            </a:effectRef>
+            <a:fontRef idx="minor">
+              <a:schemeClr val="tx1"/>
+            </a:fontRef>
+          </p:style>
+        </p:cxnSp>
+        <p:sp>
+          <p:nvSpPr>
+            <p:cNvPr id="33" name="TextBox 32"/>
+            <p:cNvSpPr txBox="1"/>
+            <p:nvPr/>
+          </p:nvSpPr>
+          <p:spPr>
+            <a:xfrm>
+              <a:off x="6256053" y="6437361"/>
+              <a:ext cx="1603922" cy="536356"/>
+            </a:xfrm>
+            <a:prstGeom prst="rect">
+              <a:avLst/>
+            </a:prstGeom>
+            <a:noFill/>
+          </p:spPr>
+          <p:txBody>
+            <a:bodyPr wrap="none" rtlCol="0">
+              <a:spAutoFit/>
+            </a:bodyPr>
+            <a:lstStyle/>
+            <a:p>
+              <a:r>
+                <a:rPr lang="en-US" dirty="0" smtClean="0"/>
+                <a:t>Predicted y</a:t>
+              </a:r>
+              <a:endParaRPr lang="en-US" dirty="0"/>
+            </a:p>
+          </p:txBody>
+        </p:sp>
+        <p:sp>
+          <p:nvSpPr>
+            <p:cNvPr id="34" name="TextBox 33"/>
+            <p:cNvSpPr txBox="1"/>
+            <p:nvPr/>
+          </p:nvSpPr>
+          <p:spPr>
+            <a:xfrm rot="16200000">
+              <a:off x="3009942" y="5144697"/>
+              <a:ext cx="3957953" cy="426134"/>
+            </a:xfrm>
+            <a:prstGeom prst="rect">
+              <a:avLst/>
+            </a:prstGeom>
+            <a:noFill/>
+          </p:spPr>
+          <p:txBody>
+            <a:bodyPr wrap="none" rtlCol="0">
+              <a:spAutoFit/>
+            </a:bodyPr>
+            <a:lstStyle/>
+            <a:p>
+              <a:pPr algn="ctr"/>
+              <a:r>
+                <a:rPr lang="en-US" dirty="0" smtClean="0"/>
+                <a:t>Standardized Residuals</a:t>
+              </a:r>
+              <a:endParaRPr lang="en-US" dirty="0"/>
+            </a:p>
+          </p:txBody>
+        </p:sp>
+        <p:sp>
+          <p:nvSpPr>
+            <p:cNvPr id="35" name="Freeform 34"/>
+            <p:cNvSpPr/>
+            <p:nvPr/>
+          </p:nvSpPr>
+          <p:spPr>
+            <a:xfrm>
+              <a:off x="5248256" y="4476032"/>
+              <a:ext cx="3301370" cy="1661395"/>
+            </a:xfrm>
+            <a:custGeom>
+              <a:avLst/>
+              <a:gdLst>
+                <a:gd name="connsiteX0" fmla="*/ 0 w 3010487"/>
+                <a:gd name="connsiteY0" fmla="*/ 0 h 1603717"/>
+                <a:gd name="connsiteX1" fmla="*/ 14068 w 3010487"/>
+                <a:gd name="connsiteY1" fmla="*/ 1266092 h 1603717"/>
+                <a:gd name="connsiteX2" fmla="*/ 1491176 w 3010487"/>
+                <a:gd name="connsiteY2" fmla="*/ 1603717 h 1603717"/>
+                <a:gd name="connsiteX3" fmla="*/ 3010487 w 3010487"/>
+                <a:gd name="connsiteY3" fmla="*/ 1280160 h 1603717"/>
+                <a:gd name="connsiteX4" fmla="*/ 3010487 w 3010487"/>
+                <a:gd name="connsiteY4" fmla="*/ 0 h 1603717"/>
+                <a:gd name="connsiteX5" fmla="*/ 1491176 w 3010487"/>
+                <a:gd name="connsiteY5" fmla="*/ 478301 h 1603717"/>
+                <a:gd name="connsiteX6" fmla="*/ 0 w 3010487"/>
+                <a:gd name="connsiteY6" fmla="*/ 0 h 1603717"/>
+                <a:gd name="connsiteX0" fmla="*/ 0 w 3010487"/>
+                <a:gd name="connsiteY0" fmla="*/ 0 h 1603717"/>
+                <a:gd name="connsiteX1" fmla="*/ 0 w 3010487"/>
+                <a:gd name="connsiteY1" fmla="*/ 1308295 h 1603717"/>
+                <a:gd name="connsiteX2" fmla="*/ 1491176 w 3010487"/>
+                <a:gd name="connsiteY2" fmla="*/ 1603717 h 1603717"/>
+                <a:gd name="connsiteX3" fmla="*/ 3010487 w 3010487"/>
+                <a:gd name="connsiteY3" fmla="*/ 1280160 h 1603717"/>
+                <a:gd name="connsiteX4" fmla="*/ 3010487 w 3010487"/>
+                <a:gd name="connsiteY4" fmla="*/ 0 h 1603717"/>
+                <a:gd name="connsiteX5" fmla="*/ 1491176 w 3010487"/>
+                <a:gd name="connsiteY5" fmla="*/ 478301 h 1603717"/>
+                <a:gd name="connsiteX6" fmla="*/ 0 w 3010487"/>
+                <a:gd name="connsiteY6" fmla="*/ 0 h 1603717"/>
+                <a:gd name="connsiteX0" fmla="*/ 0 w 3010487"/>
+                <a:gd name="connsiteY0" fmla="*/ 0 h 1603717"/>
+                <a:gd name="connsiteX1" fmla="*/ 0 w 3010487"/>
+                <a:gd name="connsiteY1" fmla="*/ 1308295 h 1603717"/>
+                <a:gd name="connsiteX2" fmla="*/ 1491176 w 3010487"/>
+                <a:gd name="connsiteY2" fmla="*/ 1603717 h 1603717"/>
+                <a:gd name="connsiteX3" fmla="*/ 3010487 w 3010487"/>
+                <a:gd name="connsiteY3" fmla="*/ 1280160 h 1603717"/>
+                <a:gd name="connsiteX4" fmla="*/ 3010487 w 3010487"/>
+                <a:gd name="connsiteY4" fmla="*/ 0 h 1603717"/>
+                <a:gd name="connsiteX5" fmla="*/ 1533380 w 3010487"/>
+                <a:gd name="connsiteY5" fmla="*/ 407963 h 1603717"/>
+                <a:gd name="connsiteX6" fmla="*/ 0 w 3010487"/>
+                <a:gd name="connsiteY6" fmla="*/ 0 h 1603717"/>
+                <a:gd name="connsiteX0" fmla="*/ 0 w 3010487"/>
+                <a:gd name="connsiteY0" fmla="*/ 0 h 1603717"/>
+                <a:gd name="connsiteX1" fmla="*/ 0 w 3010487"/>
+                <a:gd name="connsiteY1" fmla="*/ 1308295 h 1603717"/>
+                <a:gd name="connsiteX2" fmla="*/ 1491176 w 3010487"/>
+                <a:gd name="connsiteY2" fmla="*/ 1603717 h 1603717"/>
+                <a:gd name="connsiteX3" fmla="*/ 3010487 w 3010487"/>
+                <a:gd name="connsiteY3" fmla="*/ 1280160 h 1603717"/>
+                <a:gd name="connsiteX4" fmla="*/ 3010487 w 3010487"/>
+                <a:gd name="connsiteY4" fmla="*/ 0 h 1603717"/>
+                <a:gd name="connsiteX5" fmla="*/ 1533380 w 3010487"/>
+                <a:gd name="connsiteY5" fmla="*/ 407963 h 1603717"/>
+                <a:gd name="connsiteX6" fmla="*/ 0 w 3010487"/>
+                <a:gd name="connsiteY6" fmla="*/ 0 h 1603717"/>
+                <a:gd name="connsiteX0" fmla="*/ 0 w 3010487"/>
+                <a:gd name="connsiteY0" fmla="*/ 0 h 1603717"/>
+                <a:gd name="connsiteX1" fmla="*/ 0 w 3010487"/>
+                <a:gd name="connsiteY1" fmla="*/ 1308295 h 1603717"/>
+                <a:gd name="connsiteX2" fmla="*/ 1491176 w 3010487"/>
+                <a:gd name="connsiteY2" fmla="*/ 1603717 h 1603717"/>
+                <a:gd name="connsiteX3" fmla="*/ 3010487 w 3010487"/>
+                <a:gd name="connsiteY3" fmla="*/ 1280160 h 1603717"/>
+                <a:gd name="connsiteX4" fmla="*/ 3010487 w 3010487"/>
+                <a:gd name="connsiteY4" fmla="*/ 0 h 1603717"/>
+                <a:gd name="connsiteX5" fmla="*/ 1533380 w 3010487"/>
+                <a:gd name="connsiteY5" fmla="*/ 407963 h 1603717"/>
+                <a:gd name="connsiteX6" fmla="*/ 0 w 3010487"/>
+                <a:gd name="connsiteY6" fmla="*/ 0 h 1603717"/>
+                <a:gd name="connsiteX0" fmla="*/ 0 w 3010487"/>
+                <a:gd name="connsiteY0" fmla="*/ 0 h 1603717"/>
+                <a:gd name="connsiteX1" fmla="*/ 0 w 3010487"/>
+                <a:gd name="connsiteY1" fmla="*/ 1308295 h 1603717"/>
+                <a:gd name="connsiteX2" fmla="*/ 1491176 w 3010487"/>
+                <a:gd name="connsiteY2" fmla="*/ 1603717 h 1603717"/>
+                <a:gd name="connsiteX3" fmla="*/ 3010487 w 3010487"/>
+                <a:gd name="connsiteY3" fmla="*/ 1280160 h 1603717"/>
+                <a:gd name="connsiteX4" fmla="*/ 3010487 w 3010487"/>
+                <a:gd name="connsiteY4" fmla="*/ 0 h 1603717"/>
+                <a:gd name="connsiteX5" fmla="*/ 1533380 w 3010487"/>
+                <a:gd name="connsiteY5" fmla="*/ 407963 h 1603717"/>
+                <a:gd name="connsiteX6" fmla="*/ 0 w 3010487"/>
+                <a:gd name="connsiteY6" fmla="*/ 0 h 1603717"/>
+                <a:gd name="connsiteX0" fmla="*/ 0 w 3010487"/>
+                <a:gd name="connsiteY0" fmla="*/ 0 h 1603717"/>
+                <a:gd name="connsiteX1" fmla="*/ 0 w 3010487"/>
+                <a:gd name="connsiteY1" fmla="*/ 1308295 h 1603717"/>
+                <a:gd name="connsiteX2" fmla="*/ 1491176 w 3010487"/>
+                <a:gd name="connsiteY2" fmla="*/ 1603717 h 1603717"/>
+                <a:gd name="connsiteX3" fmla="*/ 3010487 w 3010487"/>
+                <a:gd name="connsiteY3" fmla="*/ 1280160 h 1603717"/>
+                <a:gd name="connsiteX4" fmla="*/ 3010487 w 3010487"/>
+                <a:gd name="connsiteY4" fmla="*/ 0 h 1603717"/>
+                <a:gd name="connsiteX5" fmla="*/ 1533380 w 3010487"/>
+                <a:gd name="connsiteY5" fmla="*/ 407963 h 1603717"/>
+                <a:gd name="connsiteX6" fmla="*/ 0 w 3010487"/>
+                <a:gd name="connsiteY6" fmla="*/ 0 h 1603717"/>
+                <a:gd name="connsiteX0" fmla="*/ 0 w 3010487"/>
+                <a:gd name="connsiteY0" fmla="*/ 0 h 1603717"/>
+                <a:gd name="connsiteX1" fmla="*/ 0 w 3010487"/>
+                <a:gd name="connsiteY1" fmla="*/ 1308295 h 1603717"/>
+                <a:gd name="connsiteX2" fmla="*/ 1491176 w 3010487"/>
+                <a:gd name="connsiteY2" fmla="*/ 1603717 h 1603717"/>
+                <a:gd name="connsiteX3" fmla="*/ 3010487 w 3010487"/>
+                <a:gd name="connsiteY3" fmla="*/ 1280160 h 1603717"/>
+                <a:gd name="connsiteX4" fmla="*/ 3010487 w 3010487"/>
+                <a:gd name="connsiteY4" fmla="*/ 0 h 1603717"/>
+                <a:gd name="connsiteX5" fmla="*/ 1547447 w 3010487"/>
+                <a:gd name="connsiteY5" fmla="*/ 618978 h 1603717"/>
+                <a:gd name="connsiteX6" fmla="*/ 0 w 3010487"/>
+                <a:gd name="connsiteY6" fmla="*/ 0 h 1603717"/>
+                <a:gd name="connsiteX0" fmla="*/ 56271 w 3010487"/>
+                <a:gd name="connsiteY0" fmla="*/ 253218 h 1603717"/>
+                <a:gd name="connsiteX1" fmla="*/ 0 w 3010487"/>
+                <a:gd name="connsiteY1" fmla="*/ 1308295 h 1603717"/>
+                <a:gd name="connsiteX2" fmla="*/ 1491176 w 3010487"/>
+                <a:gd name="connsiteY2" fmla="*/ 1603717 h 1603717"/>
+                <a:gd name="connsiteX3" fmla="*/ 3010487 w 3010487"/>
+                <a:gd name="connsiteY3" fmla="*/ 1280160 h 1603717"/>
+                <a:gd name="connsiteX4" fmla="*/ 3010487 w 3010487"/>
+                <a:gd name="connsiteY4" fmla="*/ 0 h 1603717"/>
+                <a:gd name="connsiteX5" fmla="*/ 1547447 w 3010487"/>
+                <a:gd name="connsiteY5" fmla="*/ 618978 h 1603717"/>
+                <a:gd name="connsiteX6" fmla="*/ 56271 w 3010487"/>
+                <a:gd name="connsiteY6" fmla="*/ 253218 h 1603717"/>
+                <a:gd name="connsiteX0" fmla="*/ 56271 w 3024555"/>
+                <a:gd name="connsiteY0" fmla="*/ 0 h 1350499"/>
+                <a:gd name="connsiteX1" fmla="*/ 0 w 3024555"/>
+                <a:gd name="connsiteY1" fmla="*/ 1055077 h 1350499"/>
+                <a:gd name="connsiteX2" fmla="*/ 1491176 w 3024555"/>
+                <a:gd name="connsiteY2" fmla="*/ 1350499 h 1350499"/>
+                <a:gd name="connsiteX3" fmla="*/ 3010487 w 3024555"/>
+                <a:gd name="connsiteY3" fmla="*/ 1026942 h 1350499"/>
+                <a:gd name="connsiteX4" fmla="*/ 3024555 w 3024555"/>
+                <a:gd name="connsiteY4" fmla="*/ 56272 h 1350499"/>
+                <a:gd name="connsiteX5" fmla="*/ 1547447 w 3024555"/>
+                <a:gd name="connsiteY5" fmla="*/ 365760 h 1350499"/>
+                <a:gd name="connsiteX6" fmla="*/ 56271 w 3024555"/>
+                <a:gd name="connsiteY6" fmla="*/ 0 h 1350499"/>
+                <a:gd name="connsiteX0" fmla="*/ 56271 w 3010487"/>
+                <a:gd name="connsiteY0" fmla="*/ 0 h 1350499"/>
+                <a:gd name="connsiteX1" fmla="*/ 0 w 3010487"/>
+                <a:gd name="connsiteY1" fmla="*/ 1055077 h 1350499"/>
+                <a:gd name="connsiteX2" fmla="*/ 1491176 w 3010487"/>
+                <a:gd name="connsiteY2" fmla="*/ 1350499 h 1350499"/>
+                <a:gd name="connsiteX3" fmla="*/ 3010487 w 3010487"/>
+                <a:gd name="connsiteY3" fmla="*/ 1026942 h 1350499"/>
+                <a:gd name="connsiteX4" fmla="*/ 2996419 w 3010487"/>
+                <a:gd name="connsiteY4" fmla="*/ 1 h 1350499"/>
+                <a:gd name="connsiteX5" fmla="*/ 1547447 w 3010487"/>
+                <a:gd name="connsiteY5" fmla="*/ 365760 h 1350499"/>
+                <a:gd name="connsiteX6" fmla="*/ 56271 w 3010487"/>
+                <a:gd name="connsiteY6" fmla="*/ 0 h 1350499"/>
+                <a:gd name="connsiteX0" fmla="*/ 56271 w 3024555"/>
+                <a:gd name="connsiteY0" fmla="*/ 0 h 1350499"/>
+                <a:gd name="connsiteX1" fmla="*/ 0 w 3024555"/>
+                <a:gd name="connsiteY1" fmla="*/ 1055077 h 1350499"/>
+                <a:gd name="connsiteX2" fmla="*/ 1491176 w 3024555"/>
+                <a:gd name="connsiteY2" fmla="*/ 1350499 h 1350499"/>
+                <a:gd name="connsiteX3" fmla="*/ 3010487 w 3024555"/>
+                <a:gd name="connsiteY3" fmla="*/ 1026942 h 1350499"/>
+                <a:gd name="connsiteX4" fmla="*/ 3024555 w 3024555"/>
+                <a:gd name="connsiteY4" fmla="*/ 1 h 1350499"/>
+                <a:gd name="connsiteX5" fmla="*/ 1547447 w 3024555"/>
+                <a:gd name="connsiteY5" fmla="*/ 365760 h 1350499"/>
+                <a:gd name="connsiteX6" fmla="*/ 56271 w 3024555"/>
+                <a:gd name="connsiteY6" fmla="*/ 0 h 1350499"/>
+                <a:gd name="connsiteX0" fmla="*/ 56271 w 3010488"/>
+                <a:gd name="connsiteY0" fmla="*/ 56270 h 1406769"/>
+                <a:gd name="connsiteX1" fmla="*/ 0 w 3010488"/>
+                <a:gd name="connsiteY1" fmla="*/ 1111347 h 1406769"/>
+                <a:gd name="connsiteX2" fmla="*/ 1491176 w 3010488"/>
+                <a:gd name="connsiteY2" fmla="*/ 1406769 h 1406769"/>
+                <a:gd name="connsiteX3" fmla="*/ 3010487 w 3010488"/>
+                <a:gd name="connsiteY3" fmla="*/ 1083212 h 1406769"/>
+                <a:gd name="connsiteX4" fmla="*/ 3010488 w 3010488"/>
+                <a:gd name="connsiteY4" fmla="*/ 0 h 1406769"/>
+                <a:gd name="connsiteX5" fmla="*/ 1547447 w 3010488"/>
+                <a:gd name="connsiteY5" fmla="*/ 422030 h 1406769"/>
+                <a:gd name="connsiteX6" fmla="*/ 56271 w 3010488"/>
+                <a:gd name="connsiteY6" fmla="*/ 56270 h 1406769"/>
+                <a:gd name="connsiteX0" fmla="*/ 9956 w 3010488"/>
+                <a:gd name="connsiteY0" fmla="*/ 79460 h 1406769"/>
+                <a:gd name="connsiteX1" fmla="*/ 0 w 3010488"/>
+                <a:gd name="connsiteY1" fmla="*/ 1111347 h 1406769"/>
+                <a:gd name="connsiteX2" fmla="*/ 1491176 w 3010488"/>
+                <a:gd name="connsiteY2" fmla="*/ 1406769 h 1406769"/>
+                <a:gd name="connsiteX3" fmla="*/ 3010487 w 3010488"/>
+                <a:gd name="connsiteY3" fmla="*/ 1083212 h 1406769"/>
+                <a:gd name="connsiteX4" fmla="*/ 3010488 w 3010488"/>
+                <a:gd name="connsiteY4" fmla="*/ 0 h 1406769"/>
+                <a:gd name="connsiteX5" fmla="*/ 1547447 w 3010488"/>
+                <a:gd name="connsiteY5" fmla="*/ 422030 h 1406769"/>
+                <a:gd name="connsiteX6" fmla="*/ 9956 w 3010488"/>
+                <a:gd name="connsiteY6" fmla="*/ 79460 h 1406769"/>
+                <a:gd name="connsiteX0" fmla="*/ 802 w 3012912"/>
+                <a:gd name="connsiteY0" fmla="*/ 102651 h 1406769"/>
+                <a:gd name="connsiteX1" fmla="*/ 2424 w 3012912"/>
+                <a:gd name="connsiteY1" fmla="*/ 1111347 h 1406769"/>
+                <a:gd name="connsiteX2" fmla="*/ 1493600 w 3012912"/>
+                <a:gd name="connsiteY2" fmla="*/ 1406769 h 1406769"/>
+                <a:gd name="connsiteX3" fmla="*/ 3012911 w 3012912"/>
+                <a:gd name="connsiteY3" fmla="*/ 1083212 h 1406769"/>
+                <a:gd name="connsiteX4" fmla="*/ 3012912 w 3012912"/>
+                <a:gd name="connsiteY4" fmla="*/ 0 h 1406769"/>
+                <a:gd name="connsiteX5" fmla="*/ 1549871 w 3012912"/>
+                <a:gd name="connsiteY5" fmla="*/ 422030 h 1406769"/>
+                <a:gd name="connsiteX6" fmla="*/ 802 w 3012912"/>
+                <a:gd name="connsiteY6" fmla="*/ 102651 h 1406769"/>
+                <a:gd name="connsiteX0" fmla="*/ 802 w 3012912"/>
+                <a:gd name="connsiteY0" fmla="*/ 102651 h 1406769"/>
+                <a:gd name="connsiteX1" fmla="*/ 2424 w 3012912"/>
+                <a:gd name="connsiteY1" fmla="*/ 1111347 h 1406769"/>
+                <a:gd name="connsiteX2" fmla="*/ 1493600 w 3012912"/>
+                <a:gd name="connsiteY2" fmla="*/ 1406769 h 1406769"/>
+                <a:gd name="connsiteX3" fmla="*/ 3012911 w 3012912"/>
+                <a:gd name="connsiteY3" fmla="*/ 1083212 h 1406769"/>
+                <a:gd name="connsiteX4" fmla="*/ 3012912 w 3012912"/>
+                <a:gd name="connsiteY4" fmla="*/ 0 h 1406769"/>
+                <a:gd name="connsiteX5" fmla="*/ 1549871 w 3012912"/>
+                <a:gd name="connsiteY5" fmla="*/ 422030 h 1406769"/>
+                <a:gd name="connsiteX6" fmla="*/ 802 w 3012912"/>
+                <a:gd name="connsiteY6" fmla="*/ 102651 h 1406769"/>
+                <a:gd name="connsiteX0" fmla="*/ 802 w 3012912"/>
+                <a:gd name="connsiteY0" fmla="*/ 102651 h 1406769"/>
+                <a:gd name="connsiteX1" fmla="*/ 2424 w 3012912"/>
+                <a:gd name="connsiteY1" fmla="*/ 1111347 h 1406769"/>
+                <a:gd name="connsiteX2" fmla="*/ 1493600 w 3012912"/>
+                <a:gd name="connsiteY2" fmla="*/ 1406769 h 1406769"/>
+                <a:gd name="connsiteX3" fmla="*/ 3012911 w 3012912"/>
+                <a:gd name="connsiteY3" fmla="*/ 1083212 h 1406769"/>
+                <a:gd name="connsiteX4" fmla="*/ 3012912 w 3012912"/>
+                <a:gd name="connsiteY4" fmla="*/ 0 h 1406769"/>
+                <a:gd name="connsiteX5" fmla="*/ 1549871 w 3012912"/>
+                <a:gd name="connsiteY5" fmla="*/ 422030 h 1406769"/>
+                <a:gd name="connsiteX6" fmla="*/ 802 w 3012912"/>
+                <a:gd name="connsiteY6" fmla="*/ 102651 h 1406769"/>
+                <a:gd name="connsiteX0" fmla="*/ 802 w 3024490"/>
+                <a:gd name="connsiteY0" fmla="*/ 102651 h 1406769"/>
+                <a:gd name="connsiteX1" fmla="*/ 2424 w 3024490"/>
+                <a:gd name="connsiteY1" fmla="*/ 1111347 h 1406769"/>
+                <a:gd name="connsiteX2" fmla="*/ 1493600 w 3024490"/>
+                <a:gd name="connsiteY2" fmla="*/ 1406769 h 1406769"/>
+                <a:gd name="connsiteX3" fmla="*/ 3024490 w 3024490"/>
+                <a:gd name="connsiteY3" fmla="*/ 944067 h 1406769"/>
+                <a:gd name="connsiteX4" fmla="*/ 3012912 w 3024490"/>
+                <a:gd name="connsiteY4" fmla="*/ 0 h 1406769"/>
+                <a:gd name="connsiteX5" fmla="*/ 1549871 w 3024490"/>
+                <a:gd name="connsiteY5" fmla="*/ 422030 h 1406769"/>
+                <a:gd name="connsiteX6" fmla="*/ 802 w 3024490"/>
+                <a:gd name="connsiteY6" fmla="*/ 102651 h 1406769"/>
+                <a:gd name="connsiteX0" fmla="*/ 802 w 3024490"/>
+                <a:gd name="connsiteY0" fmla="*/ 102651 h 1406769"/>
+                <a:gd name="connsiteX1" fmla="*/ 2424 w 3024490"/>
+                <a:gd name="connsiteY1" fmla="*/ 1111347 h 1406769"/>
+                <a:gd name="connsiteX2" fmla="*/ 1493600 w 3024490"/>
+                <a:gd name="connsiteY2" fmla="*/ 1406769 h 1406769"/>
+                <a:gd name="connsiteX3" fmla="*/ 3024490 w 3024490"/>
+                <a:gd name="connsiteY3" fmla="*/ 944067 h 1406769"/>
+                <a:gd name="connsiteX4" fmla="*/ 3012912 w 3024490"/>
+                <a:gd name="connsiteY4" fmla="*/ 0 h 1406769"/>
+                <a:gd name="connsiteX5" fmla="*/ 1549871 w 3024490"/>
+                <a:gd name="connsiteY5" fmla="*/ 422030 h 1406769"/>
+                <a:gd name="connsiteX6" fmla="*/ 802 w 3024490"/>
+                <a:gd name="connsiteY6" fmla="*/ 102651 h 1406769"/>
+                <a:gd name="connsiteX0" fmla="*/ 802 w 3024490"/>
+                <a:gd name="connsiteY0" fmla="*/ 102651 h 1406769"/>
+                <a:gd name="connsiteX1" fmla="*/ 2424 w 3024490"/>
+                <a:gd name="connsiteY1" fmla="*/ 995393 h 1406769"/>
+                <a:gd name="connsiteX2" fmla="*/ 1493600 w 3024490"/>
+                <a:gd name="connsiteY2" fmla="*/ 1406769 h 1406769"/>
+                <a:gd name="connsiteX3" fmla="*/ 3024490 w 3024490"/>
+                <a:gd name="connsiteY3" fmla="*/ 944067 h 1406769"/>
+                <a:gd name="connsiteX4" fmla="*/ 3012912 w 3024490"/>
+                <a:gd name="connsiteY4" fmla="*/ 0 h 1406769"/>
+                <a:gd name="connsiteX5" fmla="*/ 1549871 w 3024490"/>
+                <a:gd name="connsiteY5" fmla="*/ 422030 h 1406769"/>
+                <a:gd name="connsiteX6" fmla="*/ 802 w 3024490"/>
+                <a:gd name="connsiteY6" fmla="*/ 102651 h 1406769"/>
+                <a:gd name="connsiteX0" fmla="*/ 802 w 3024490"/>
+                <a:gd name="connsiteY0" fmla="*/ 102651 h 1406769"/>
+                <a:gd name="connsiteX1" fmla="*/ 2424 w 3024490"/>
+                <a:gd name="connsiteY1" fmla="*/ 995393 h 1406769"/>
+                <a:gd name="connsiteX2" fmla="*/ 1493600 w 3024490"/>
+                <a:gd name="connsiteY2" fmla="*/ 1406769 h 1406769"/>
+                <a:gd name="connsiteX3" fmla="*/ 3024490 w 3024490"/>
+                <a:gd name="connsiteY3" fmla="*/ 944067 h 1406769"/>
+                <a:gd name="connsiteX4" fmla="*/ 3012912 w 3024490"/>
+                <a:gd name="connsiteY4" fmla="*/ 0 h 1406769"/>
+                <a:gd name="connsiteX5" fmla="*/ 1549871 w 3024490"/>
+                <a:gd name="connsiteY5" fmla="*/ 422030 h 1406769"/>
+                <a:gd name="connsiteX6" fmla="*/ 802 w 3024490"/>
+                <a:gd name="connsiteY6" fmla="*/ 102651 h 1406769"/>
+                <a:gd name="connsiteX0" fmla="*/ 802 w 3024490"/>
+                <a:gd name="connsiteY0" fmla="*/ 102651 h 1406769"/>
+                <a:gd name="connsiteX1" fmla="*/ 2424 w 3024490"/>
+                <a:gd name="connsiteY1" fmla="*/ 995393 h 1406769"/>
+                <a:gd name="connsiteX2" fmla="*/ 1493600 w 3024490"/>
+                <a:gd name="connsiteY2" fmla="*/ 1406769 h 1406769"/>
+                <a:gd name="connsiteX3" fmla="*/ 3024490 w 3024490"/>
+                <a:gd name="connsiteY3" fmla="*/ 944067 h 1406769"/>
+                <a:gd name="connsiteX4" fmla="*/ 3012912 w 3024490"/>
+                <a:gd name="connsiteY4" fmla="*/ 0 h 1406769"/>
+                <a:gd name="connsiteX5" fmla="*/ 1526714 w 3024490"/>
+                <a:gd name="connsiteY5" fmla="*/ 526389 h 1406769"/>
+                <a:gd name="connsiteX6" fmla="*/ 802 w 3024490"/>
+                <a:gd name="connsiteY6" fmla="*/ 102651 h 1406769"/>
+                <a:gd name="connsiteX0" fmla="*/ 802 w 3024490"/>
+                <a:gd name="connsiteY0" fmla="*/ 102651 h 1406769"/>
+                <a:gd name="connsiteX1" fmla="*/ 2424 w 3024490"/>
+                <a:gd name="connsiteY1" fmla="*/ 995393 h 1406769"/>
+                <a:gd name="connsiteX2" fmla="*/ 1493600 w 3024490"/>
+                <a:gd name="connsiteY2" fmla="*/ 1406769 h 1406769"/>
+                <a:gd name="connsiteX3" fmla="*/ 3024490 w 3024490"/>
+                <a:gd name="connsiteY3" fmla="*/ 944067 h 1406769"/>
+                <a:gd name="connsiteX4" fmla="*/ 3012912 w 3024490"/>
+                <a:gd name="connsiteY4" fmla="*/ 0 h 1406769"/>
+                <a:gd name="connsiteX5" fmla="*/ 1526714 w 3024490"/>
+                <a:gd name="connsiteY5" fmla="*/ 526389 h 1406769"/>
+                <a:gd name="connsiteX6" fmla="*/ 802 w 3024490"/>
+                <a:gd name="connsiteY6" fmla="*/ 102651 h 1406769"/>
+                <a:gd name="connsiteX0" fmla="*/ 802 w 3024490"/>
+                <a:gd name="connsiteY0" fmla="*/ 102651 h 1406769"/>
+                <a:gd name="connsiteX1" fmla="*/ 2424 w 3024490"/>
+                <a:gd name="connsiteY1" fmla="*/ 995393 h 1406769"/>
+                <a:gd name="connsiteX2" fmla="*/ 1493600 w 3024490"/>
+                <a:gd name="connsiteY2" fmla="*/ 1406769 h 1406769"/>
+                <a:gd name="connsiteX3" fmla="*/ 3024490 w 3024490"/>
+                <a:gd name="connsiteY3" fmla="*/ 944067 h 1406769"/>
+                <a:gd name="connsiteX4" fmla="*/ 3012912 w 3024490"/>
+                <a:gd name="connsiteY4" fmla="*/ 0 h 1406769"/>
+                <a:gd name="connsiteX5" fmla="*/ 1526714 w 3024490"/>
+                <a:gd name="connsiteY5" fmla="*/ 526389 h 1406769"/>
+                <a:gd name="connsiteX6" fmla="*/ 802 w 3024490"/>
+                <a:gd name="connsiteY6" fmla="*/ 102651 h 1406769"/>
+                <a:gd name="connsiteX0" fmla="*/ 802 w 3024490"/>
+                <a:gd name="connsiteY0" fmla="*/ 102651 h 1406769"/>
+                <a:gd name="connsiteX1" fmla="*/ 2424 w 3024490"/>
+                <a:gd name="connsiteY1" fmla="*/ 995393 h 1406769"/>
+                <a:gd name="connsiteX2" fmla="*/ 1493600 w 3024490"/>
+                <a:gd name="connsiteY2" fmla="*/ 1406769 h 1406769"/>
+                <a:gd name="connsiteX3" fmla="*/ 3024490 w 3024490"/>
+                <a:gd name="connsiteY3" fmla="*/ 944067 h 1406769"/>
+                <a:gd name="connsiteX4" fmla="*/ 3012912 w 3024490"/>
+                <a:gd name="connsiteY4" fmla="*/ 0 h 1406769"/>
+                <a:gd name="connsiteX5" fmla="*/ 1526714 w 3024490"/>
+                <a:gd name="connsiteY5" fmla="*/ 526389 h 1406769"/>
+                <a:gd name="connsiteX6" fmla="*/ 802 w 3024490"/>
+                <a:gd name="connsiteY6" fmla="*/ 102651 h 1406769"/>
+                <a:gd name="connsiteX0" fmla="*/ 802 w 3024490"/>
+                <a:gd name="connsiteY0" fmla="*/ 102651 h 1406769"/>
+                <a:gd name="connsiteX1" fmla="*/ 2424 w 3024490"/>
+                <a:gd name="connsiteY1" fmla="*/ 1018584 h 1406769"/>
+                <a:gd name="connsiteX2" fmla="*/ 1493600 w 3024490"/>
+                <a:gd name="connsiteY2" fmla="*/ 1406769 h 1406769"/>
+                <a:gd name="connsiteX3" fmla="*/ 3024490 w 3024490"/>
+                <a:gd name="connsiteY3" fmla="*/ 944067 h 1406769"/>
+                <a:gd name="connsiteX4" fmla="*/ 3012912 w 3024490"/>
+                <a:gd name="connsiteY4" fmla="*/ 0 h 1406769"/>
+                <a:gd name="connsiteX5" fmla="*/ 1526714 w 3024490"/>
+                <a:gd name="connsiteY5" fmla="*/ 526389 h 1406769"/>
+                <a:gd name="connsiteX6" fmla="*/ 802 w 3024490"/>
+                <a:gd name="connsiteY6" fmla="*/ 102651 h 1406769"/>
+                <a:gd name="connsiteX0" fmla="*/ 802 w 3012912"/>
+                <a:gd name="connsiteY0" fmla="*/ 102651 h 1406769"/>
+                <a:gd name="connsiteX1" fmla="*/ 2424 w 3012912"/>
+                <a:gd name="connsiteY1" fmla="*/ 1018584 h 1406769"/>
+                <a:gd name="connsiteX2" fmla="*/ 1493600 w 3012912"/>
+                <a:gd name="connsiteY2" fmla="*/ 1406769 h 1406769"/>
+                <a:gd name="connsiteX3" fmla="*/ 3001333 w 3012912"/>
+                <a:gd name="connsiteY3" fmla="*/ 955662 h 1406769"/>
+                <a:gd name="connsiteX4" fmla="*/ 3012912 w 3012912"/>
+                <a:gd name="connsiteY4" fmla="*/ 0 h 1406769"/>
+                <a:gd name="connsiteX5" fmla="*/ 1526714 w 3012912"/>
+                <a:gd name="connsiteY5" fmla="*/ 526389 h 1406769"/>
+                <a:gd name="connsiteX6" fmla="*/ 802 w 3012912"/>
+                <a:gd name="connsiteY6" fmla="*/ 102651 h 1406769"/>
+                <a:gd name="connsiteX0" fmla="*/ 802 w 3012912"/>
+                <a:gd name="connsiteY0" fmla="*/ 102651 h 1406769"/>
+                <a:gd name="connsiteX1" fmla="*/ 2424 w 3012912"/>
+                <a:gd name="connsiteY1" fmla="*/ 1018584 h 1406769"/>
+                <a:gd name="connsiteX2" fmla="*/ 1493600 w 3012912"/>
+                <a:gd name="connsiteY2" fmla="*/ 1406769 h 1406769"/>
+                <a:gd name="connsiteX3" fmla="*/ 3012912 w 3012912"/>
+                <a:gd name="connsiteY3" fmla="*/ 955662 h 1406769"/>
+                <a:gd name="connsiteX4" fmla="*/ 3012912 w 3012912"/>
+                <a:gd name="connsiteY4" fmla="*/ 0 h 1406769"/>
+                <a:gd name="connsiteX5" fmla="*/ 1526714 w 3012912"/>
+                <a:gd name="connsiteY5" fmla="*/ 526389 h 1406769"/>
+                <a:gd name="connsiteX6" fmla="*/ 802 w 3012912"/>
+                <a:gd name="connsiteY6" fmla="*/ 102651 h 1406769"/>
+                <a:gd name="connsiteX0" fmla="*/ 9957 w 3022067"/>
+                <a:gd name="connsiteY0" fmla="*/ 102651 h 1539653"/>
+                <a:gd name="connsiteX1" fmla="*/ 0 w 3022067"/>
+                <a:gd name="connsiteY1" fmla="*/ 1470806 h 1539653"/>
+                <a:gd name="connsiteX2" fmla="*/ 1502755 w 3022067"/>
+                <a:gd name="connsiteY2" fmla="*/ 1406769 h 1539653"/>
+                <a:gd name="connsiteX3" fmla="*/ 3022067 w 3022067"/>
+                <a:gd name="connsiteY3" fmla="*/ 955662 h 1539653"/>
+                <a:gd name="connsiteX4" fmla="*/ 3022067 w 3022067"/>
+                <a:gd name="connsiteY4" fmla="*/ 0 h 1539653"/>
+                <a:gd name="connsiteX5" fmla="*/ 1535869 w 3022067"/>
+                <a:gd name="connsiteY5" fmla="*/ 526389 h 1539653"/>
+                <a:gd name="connsiteX6" fmla="*/ 9957 w 3022067"/>
+                <a:gd name="connsiteY6" fmla="*/ 102651 h 1539653"/>
+                <a:gd name="connsiteX0" fmla="*/ 9957 w 3022067"/>
+                <a:gd name="connsiteY0" fmla="*/ 102651 h 1505445"/>
+                <a:gd name="connsiteX1" fmla="*/ 0 w 3022067"/>
+                <a:gd name="connsiteY1" fmla="*/ 1470806 h 1505445"/>
+                <a:gd name="connsiteX2" fmla="*/ 1572228 w 3022067"/>
+                <a:gd name="connsiteY2" fmla="*/ 1012525 h 1505445"/>
+                <a:gd name="connsiteX3" fmla="*/ 3022067 w 3022067"/>
+                <a:gd name="connsiteY3" fmla="*/ 955662 h 1505445"/>
+                <a:gd name="connsiteX4" fmla="*/ 3022067 w 3022067"/>
+                <a:gd name="connsiteY4" fmla="*/ 0 h 1505445"/>
+                <a:gd name="connsiteX5" fmla="*/ 1535869 w 3022067"/>
+                <a:gd name="connsiteY5" fmla="*/ 526389 h 1505445"/>
+                <a:gd name="connsiteX6" fmla="*/ 9957 w 3022067"/>
+                <a:gd name="connsiteY6" fmla="*/ 102651 h 1505445"/>
+                <a:gd name="connsiteX0" fmla="*/ 9957 w 3033646"/>
+                <a:gd name="connsiteY0" fmla="*/ 102651 h 1513641"/>
+                <a:gd name="connsiteX1" fmla="*/ 0 w 3033646"/>
+                <a:gd name="connsiteY1" fmla="*/ 1470806 h 1513641"/>
+                <a:gd name="connsiteX2" fmla="*/ 1572228 w 3033646"/>
+                <a:gd name="connsiteY2" fmla="*/ 1012525 h 1513641"/>
+                <a:gd name="connsiteX3" fmla="*/ 3033646 w 3033646"/>
+                <a:gd name="connsiteY3" fmla="*/ 1465862 h 1513641"/>
+                <a:gd name="connsiteX4" fmla="*/ 3022067 w 3033646"/>
+                <a:gd name="connsiteY4" fmla="*/ 0 h 1513641"/>
+                <a:gd name="connsiteX5" fmla="*/ 1535869 w 3033646"/>
+                <a:gd name="connsiteY5" fmla="*/ 526389 h 1513641"/>
+                <a:gd name="connsiteX6" fmla="*/ 9957 w 3033646"/>
+                <a:gd name="connsiteY6" fmla="*/ 102651 h 1513641"/>
+                <a:gd name="connsiteX0" fmla="*/ 9957 w 3033646"/>
+                <a:gd name="connsiteY0" fmla="*/ 102651 h 1568634"/>
+                <a:gd name="connsiteX1" fmla="*/ 0 w 3033646"/>
+                <a:gd name="connsiteY1" fmla="*/ 1470806 h 1568634"/>
+                <a:gd name="connsiteX2" fmla="*/ 1572228 w 3033646"/>
+                <a:gd name="connsiteY2" fmla="*/ 1012525 h 1568634"/>
+                <a:gd name="connsiteX3" fmla="*/ 3033646 w 3033646"/>
+                <a:gd name="connsiteY3" fmla="*/ 1523839 h 1568634"/>
+                <a:gd name="connsiteX4" fmla="*/ 3022067 w 3033646"/>
+                <a:gd name="connsiteY4" fmla="*/ 0 h 1568634"/>
+                <a:gd name="connsiteX5" fmla="*/ 1535869 w 3033646"/>
+                <a:gd name="connsiteY5" fmla="*/ 526389 h 1568634"/>
+                <a:gd name="connsiteX6" fmla="*/ 9957 w 3033646"/>
+                <a:gd name="connsiteY6" fmla="*/ 102651 h 1568634"/>
+                <a:gd name="connsiteX0" fmla="*/ 9957 w 3033646"/>
+                <a:gd name="connsiteY0" fmla="*/ 102651 h 1567543"/>
+                <a:gd name="connsiteX1" fmla="*/ 0 w 3033646"/>
+                <a:gd name="connsiteY1" fmla="*/ 1470806 h 1567543"/>
+                <a:gd name="connsiteX2" fmla="*/ 1502756 w 3033646"/>
+                <a:gd name="connsiteY2" fmla="*/ 989333 h 1567543"/>
+                <a:gd name="connsiteX3" fmla="*/ 3033646 w 3033646"/>
+                <a:gd name="connsiteY3" fmla="*/ 1523839 h 1567543"/>
+                <a:gd name="connsiteX4" fmla="*/ 3022067 w 3033646"/>
+                <a:gd name="connsiteY4" fmla="*/ 0 h 1567543"/>
+                <a:gd name="connsiteX5" fmla="*/ 1535869 w 3033646"/>
+                <a:gd name="connsiteY5" fmla="*/ 526389 h 1567543"/>
+                <a:gd name="connsiteX6" fmla="*/ 9957 w 3033646"/>
+                <a:gd name="connsiteY6" fmla="*/ 102651 h 1567543"/>
+                <a:gd name="connsiteX0" fmla="*/ 9957 w 3033646"/>
+                <a:gd name="connsiteY0" fmla="*/ 102651 h 1567543"/>
+                <a:gd name="connsiteX1" fmla="*/ 0 w 3033646"/>
+                <a:gd name="connsiteY1" fmla="*/ 1528783 h 1567543"/>
+                <a:gd name="connsiteX2" fmla="*/ 1502756 w 3033646"/>
+                <a:gd name="connsiteY2" fmla="*/ 989333 h 1567543"/>
+                <a:gd name="connsiteX3" fmla="*/ 3033646 w 3033646"/>
+                <a:gd name="connsiteY3" fmla="*/ 1523839 h 1567543"/>
+                <a:gd name="connsiteX4" fmla="*/ 3022067 w 3033646"/>
+                <a:gd name="connsiteY4" fmla="*/ 0 h 1567543"/>
+                <a:gd name="connsiteX5" fmla="*/ 1535869 w 3033646"/>
+                <a:gd name="connsiteY5" fmla="*/ 526389 h 1567543"/>
+                <a:gd name="connsiteX6" fmla="*/ 9957 w 3033646"/>
+                <a:gd name="connsiteY6" fmla="*/ 102651 h 1567543"/>
+                <a:gd name="connsiteX0" fmla="*/ 9957 w 3033646"/>
+                <a:gd name="connsiteY0" fmla="*/ 102651 h 1567543"/>
+                <a:gd name="connsiteX1" fmla="*/ 0 w 3033646"/>
+                <a:gd name="connsiteY1" fmla="*/ 1528783 h 1567543"/>
+                <a:gd name="connsiteX2" fmla="*/ 1502756 w 3033646"/>
+                <a:gd name="connsiteY2" fmla="*/ 989333 h 1567543"/>
+                <a:gd name="connsiteX3" fmla="*/ 3033646 w 3033646"/>
+                <a:gd name="connsiteY3" fmla="*/ 1523839 h 1567543"/>
+                <a:gd name="connsiteX4" fmla="*/ 3022067 w 3033646"/>
+                <a:gd name="connsiteY4" fmla="*/ 0 h 1567543"/>
+                <a:gd name="connsiteX5" fmla="*/ 1535869 w 3033646"/>
+                <a:gd name="connsiteY5" fmla="*/ 526389 h 1567543"/>
+                <a:gd name="connsiteX6" fmla="*/ 9957 w 3033646"/>
+                <a:gd name="connsiteY6" fmla="*/ 102651 h 1567543"/>
+                <a:gd name="connsiteX0" fmla="*/ 9957 w 3033646"/>
+                <a:gd name="connsiteY0" fmla="*/ 102651 h 1567543"/>
+                <a:gd name="connsiteX1" fmla="*/ 0 w 3033646"/>
+                <a:gd name="connsiteY1" fmla="*/ 1528783 h 1567543"/>
+                <a:gd name="connsiteX2" fmla="*/ 1502756 w 3033646"/>
+                <a:gd name="connsiteY2" fmla="*/ 989333 h 1567543"/>
+                <a:gd name="connsiteX3" fmla="*/ 3033646 w 3033646"/>
+                <a:gd name="connsiteY3" fmla="*/ 1523839 h 1567543"/>
+                <a:gd name="connsiteX4" fmla="*/ 3022067 w 3033646"/>
+                <a:gd name="connsiteY4" fmla="*/ 0 h 1567543"/>
+                <a:gd name="connsiteX5" fmla="*/ 1535869 w 3033646"/>
+                <a:gd name="connsiteY5" fmla="*/ 526389 h 1567543"/>
+                <a:gd name="connsiteX6" fmla="*/ 9957 w 3033646"/>
+                <a:gd name="connsiteY6" fmla="*/ 102651 h 1567543"/>
+                <a:gd name="connsiteX0" fmla="*/ 9957 w 3033646"/>
+                <a:gd name="connsiteY0" fmla="*/ 102651 h 1528783"/>
+                <a:gd name="connsiteX1" fmla="*/ 0 w 3033646"/>
+                <a:gd name="connsiteY1" fmla="*/ 1528783 h 1528783"/>
+                <a:gd name="connsiteX2" fmla="*/ 1502756 w 3033646"/>
+                <a:gd name="connsiteY2" fmla="*/ 989333 h 1528783"/>
+                <a:gd name="connsiteX3" fmla="*/ 3033646 w 3033646"/>
+                <a:gd name="connsiteY3" fmla="*/ 1523839 h 1528783"/>
+                <a:gd name="connsiteX4" fmla="*/ 3022067 w 3033646"/>
+                <a:gd name="connsiteY4" fmla="*/ 0 h 1528783"/>
+                <a:gd name="connsiteX5" fmla="*/ 1535869 w 3033646"/>
+                <a:gd name="connsiteY5" fmla="*/ 526389 h 1528783"/>
+                <a:gd name="connsiteX6" fmla="*/ 9957 w 3033646"/>
+                <a:gd name="connsiteY6" fmla="*/ 102651 h 1528783"/>
+                <a:gd name="connsiteX0" fmla="*/ 9957 w 3033646"/>
+                <a:gd name="connsiteY0" fmla="*/ 102651 h 1528783"/>
+                <a:gd name="connsiteX1" fmla="*/ 0 w 3033646"/>
+                <a:gd name="connsiteY1" fmla="*/ 1528783 h 1528783"/>
+                <a:gd name="connsiteX2" fmla="*/ 1537492 w 3033646"/>
+                <a:gd name="connsiteY2" fmla="*/ 1024119 h 1528783"/>
+                <a:gd name="connsiteX3" fmla="*/ 3033646 w 3033646"/>
+                <a:gd name="connsiteY3" fmla="*/ 1523839 h 1528783"/>
+                <a:gd name="connsiteX4" fmla="*/ 3022067 w 3033646"/>
+                <a:gd name="connsiteY4" fmla="*/ 0 h 1528783"/>
+                <a:gd name="connsiteX5" fmla="*/ 1535869 w 3033646"/>
+                <a:gd name="connsiteY5" fmla="*/ 526389 h 1528783"/>
+                <a:gd name="connsiteX6" fmla="*/ 9957 w 3033646"/>
+                <a:gd name="connsiteY6" fmla="*/ 102651 h 1528783"/>
+                <a:gd name="connsiteX0" fmla="*/ 9957 w 3033646"/>
+                <a:gd name="connsiteY0" fmla="*/ 102651 h 1528783"/>
+                <a:gd name="connsiteX1" fmla="*/ 0 w 3033646"/>
+                <a:gd name="connsiteY1" fmla="*/ 1528783 h 1528783"/>
+                <a:gd name="connsiteX2" fmla="*/ 1537492 w 3033646"/>
+                <a:gd name="connsiteY2" fmla="*/ 1024119 h 1528783"/>
+                <a:gd name="connsiteX3" fmla="*/ 3033646 w 3033646"/>
+                <a:gd name="connsiteY3" fmla="*/ 1523839 h 1528783"/>
+                <a:gd name="connsiteX4" fmla="*/ 3022067 w 3033646"/>
+                <a:gd name="connsiteY4" fmla="*/ 0 h 1528783"/>
+                <a:gd name="connsiteX5" fmla="*/ 1535869 w 3033646"/>
+                <a:gd name="connsiteY5" fmla="*/ 526389 h 1528783"/>
+                <a:gd name="connsiteX6" fmla="*/ 9957 w 3033646"/>
+                <a:gd name="connsiteY6" fmla="*/ 102651 h 1528783"/>
+                <a:gd name="connsiteX0" fmla="*/ 9957 w 3033646"/>
+                <a:gd name="connsiteY0" fmla="*/ 102651 h 1528783"/>
+                <a:gd name="connsiteX1" fmla="*/ 0 w 3033646"/>
+                <a:gd name="connsiteY1" fmla="*/ 1528783 h 1528783"/>
+                <a:gd name="connsiteX2" fmla="*/ 1537492 w 3033646"/>
+                <a:gd name="connsiteY2" fmla="*/ 1024119 h 1528783"/>
+                <a:gd name="connsiteX3" fmla="*/ 3033646 w 3033646"/>
+                <a:gd name="connsiteY3" fmla="*/ 1523839 h 1528783"/>
+                <a:gd name="connsiteX4" fmla="*/ 3022067 w 3033646"/>
+                <a:gd name="connsiteY4" fmla="*/ 0 h 1528783"/>
+                <a:gd name="connsiteX5" fmla="*/ 1535869 w 3033646"/>
+                <a:gd name="connsiteY5" fmla="*/ 526389 h 1528783"/>
+                <a:gd name="connsiteX6" fmla="*/ 9957 w 3033646"/>
+                <a:gd name="connsiteY6" fmla="*/ 102651 h 1528783"/>
+                <a:gd name="connsiteX0" fmla="*/ 9957 w 3033646"/>
+                <a:gd name="connsiteY0" fmla="*/ 102651 h 1528783"/>
+                <a:gd name="connsiteX1" fmla="*/ 0 w 3033646"/>
+                <a:gd name="connsiteY1" fmla="*/ 1528783 h 1528783"/>
+                <a:gd name="connsiteX2" fmla="*/ 1537492 w 3033646"/>
+                <a:gd name="connsiteY2" fmla="*/ 1024119 h 1528783"/>
+                <a:gd name="connsiteX3" fmla="*/ 3033646 w 3033646"/>
+                <a:gd name="connsiteY3" fmla="*/ 1523839 h 1528783"/>
+                <a:gd name="connsiteX4" fmla="*/ 3022067 w 3033646"/>
+                <a:gd name="connsiteY4" fmla="*/ 0 h 1528783"/>
+                <a:gd name="connsiteX5" fmla="*/ 1535869 w 3033646"/>
+                <a:gd name="connsiteY5" fmla="*/ 526389 h 1528783"/>
+                <a:gd name="connsiteX6" fmla="*/ 9957 w 3033646"/>
+                <a:gd name="connsiteY6" fmla="*/ 102651 h 1528783"/>
+                <a:gd name="connsiteX0" fmla="*/ 9957 w 3045737"/>
+                <a:gd name="connsiteY0" fmla="*/ 91055 h 1517187"/>
+                <a:gd name="connsiteX1" fmla="*/ 0 w 3045737"/>
+                <a:gd name="connsiteY1" fmla="*/ 1517187 h 1517187"/>
+                <a:gd name="connsiteX2" fmla="*/ 1537492 w 3045737"/>
+                <a:gd name="connsiteY2" fmla="*/ 1012523 h 1517187"/>
+                <a:gd name="connsiteX3" fmla="*/ 3033646 w 3045737"/>
+                <a:gd name="connsiteY3" fmla="*/ 1512243 h 1517187"/>
+                <a:gd name="connsiteX4" fmla="*/ 3045224 w 3045737"/>
+                <a:gd name="connsiteY4" fmla="*/ 0 h 1517187"/>
+                <a:gd name="connsiteX5" fmla="*/ 1535869 w 3045737"/>
+                <a:gd name="connsiteY5" fmla="*/ 514793 h 1517187"/>
+                <a:gd name="connsiteX6" fmla="*/ 9957 w 3045737"/>
+                <a:gd name="connsiteY6" fmla="*/ 91055 h 1517187"/>
+                <a:gd name="connsiteX0" fmla="*/ 9957 w 3045737"/>
+                <a:gd name="connsiteY0" fmla="*/ 91055 h 1517187"/>
+                <a:gd name="connsiteX1" fmla="*/ 0 w 3045737"/>
+                <a:gd name="connsiteY1" fmla="*/ 1517187 h 1517187"/>
+                <a:gd name="connsiteX2" fmla="*/ 1537492 w 3045737"/>
+                <a:gd name="connsiteY2" fmla="*/ 1012523 h 1517187"/>
+                <a:gd name="connsiteX3" fmla="*/ 3033646 w 3045737"/>
+                <a:gd name="connsiteY3" fmla="*/ 1512243 h 1517187"/>
+                <a:gd name="connsiteX4" fmla="*/ 3045224 w 3045737"/>
+                <a:gd name="connsiteY4" fmla="*/ 0 h 1517187"/>
+                <a:gd name="connsiteX5" fmla="*/ 1535869 w 3045737"/>
+                <a:gd name="connsiteY5" fmla="*/ 514793 h 1517187"/>
+                <a:gd name="connsiteX6" fmla="*/ 9957 w 3045737"/>
+                <a:gd name="connsiteY6" fmla="*/ 91055 h 1517187"/>
+                <a:gd name="connsiteX0" fmla="*/ 9957 w 3034759"/>
+                <a:gd name="connsiteY0" fmla="*/ 91055 h 1517187"/>
+                <a:gd name="connsiteX1" fmla="*/ 0 w 3034759"/>
+                <a:gd name="connsiteY1" fmla="*/ 1517187 h 1517187"/>
+                <a:gd name="connsiteX2" fmla="*/ 1537492 w 3034759"/>
+                <a:gd name="connsiteY2" fmla="*/ 1012523 h 1517187"/>
+                <a:gd name="connsiteX3" fmla="*/ 3033646 w 3034759"/>
+                <a:gd name="connsiteY3" fmla="*/ 1512243 h 1517187"/>
+                <a:gd name="connsiteX4" fmla="*/ 3033645 w 3034759"/>
+                <a:gd name="connsiteY4" fmla="*/ 0 h 1517187"/>
+                <a:gd name="connsiteX5" fmla="*/ 1535869 w 3034759"/>
+                <a:gd name="connsiteY5" fmla="*/ 514793 h 1517187"/>
+                <a:gd name="connsiteX6" fmla="*/ 9957 w 3034759"/>
+                <a:gd name="connsiteY6" fmla="*/ 91055 h 1517187"/>
+              </a:gdLst>
+              <a:ahLst/>
+              <a:cxnLst>
+                <a:cxn ang="0">
+                  <a:pos x="connsiteX0" y="connsiteY0"/>
+                </a:cxn>
+                <a:cxn ang="0">
+                  <a:pos x="connsiteX1" y="connsiteY1"/>
+                </a:cxn>
+                <a:cxn ang="0">
+                  <a:pos x="connsiteX2" y="connsiteY2"/>
+                </a:cxn>
+                <a:cxn ang="0">
+                  <a:pos x="connsiteX3" y="connsiteY3"/>
+                </a:cxn>
+                <a:cxn ang="0">
+                  <a:pos x="connsiteX4" y="connsiteY4"/>
+                </a:cxn>
+                <a:cxn ang="0">
+                  <a:pos x="connsiteX5" y="connsiteY5"/>
+                </a:cxn>
+                <a:cxn ang="0">
+                  <a:pos x="connsiteX6" y="connsiteY6"/>
+                </a:cxn>
+              </a:cxnLst>
+              <a:rect l="l" t="t" r="r" b="b"/>
+              <a:pathLst>
+                <a:path w="3034759" h="1517187">
+                  <a:moveTo>
+                    <a:pt x="9957" y="91055"/>
+                  </a:moveTo>
+                  <a:cubicBezTo>
+                    <a:pt x="6638" y="435017"/>
+                    <a:pt x="3319" y="1173225"/>
+                    <a:pt x="0" y="1517187"/>
+                  </a:cubicBezTo>
+                  <a:cubicBezTo>
+                    <a:pt x="624427" y="1175035"/>
+                    <a:pt x="1004722" y="1010050"/>
+                    <a:pt x="1537492" y="1012523"/>
+                  </a:cubicBezTo>
+                  <a:cubicBezTo>
+                    <a:pt x="1958873" y="1000673"/>
+                    <a:pt x="2434578" y="1191064"/>
+                    <a:pt x="3033646" y="1512243"/>
+                  </a:cubicBezTo>
+                  <a:cubicBezTo>
+                    <a:pt x="3029786" y="1023622"/>
+                    <a:pt x="3037505" y="488621"/>
+                    <a:pt x="3033645" y="0"/>
+                  </a:cubicBezTo>
+                  <a:cubicBezTo>
+                    <a:pt x="2460225" y="286728"/>
+                    <a:pt x="2154847" y="497997"/>
+                    <a:pt x="1535869" y="514793"/>
+                  </a:cubicBezTo>
+                  <a:cubicBezTo>
+                    <a:pt x="884065" y="505414"/>
+                    <a:pt x="521084" y="296615"/>
+                    <a:pt x="9957" y="91055"/>
+                  </a:cubicBezTo>
+                  <a:close/>
+                </a:path>
+              </a:pathLst>
+            </a:custGeom>
+            <a:solidFill>
+              <a:schemeClr val="accent1">
+                <a:alpha val="50000"/>
+              </a:schemeClr>
+            </a:solidFill>
+            <a:ln>
+              <a:noFill/>
+            </a:ln>
+          </p:spPr>
+          <p:style>
+            <a:lnRef idx="2">
+              <a:schemeClr val="accent1">
+                <a:shade val="50000"/>
+              </a:schemeClr>
+            </a:lnRef>
+            <a:fillRef idx="1">
+              <a:schemeClr val="accent1"/>
+            </a:fillRef>
+            <a:effectRef idx="0">
+              <a:schemeClr val="accent1"/>
+            </a:effectRef>
+            <a:fontRef idx="minor">
+              <a:schemeClr val="lt1"/>
+            </a:fontRef>
+          </p:style>
+          <p:txBody>
+            <a:bodyPr rtlCol="0" anchor="ctr"/>
+            <a:lstStyle/>
+            <a:p>
+              <a:pPr algn="ctr"/>
+              <a:endParaRPr lang="en-US" dirty="0"/>
+            </a:p>
+          </p:txBody>
+        </p:sp>
+      </p:grpSp>
+    </p:spTree>
+    <p:extLst>
+      <p:ext uri="{BB962C8B-B14F-4D97-AF65-F5344CB8AC3E}">
+        <p14:creationId xmlns:p14="http://schemas.microsoft.com/office/powerpoint/2010/main" val="1986669040"/>
+      </p:ext>
+    </p:extLst>
+  </p:cSld>
+  <p:clrMapOvr>
+    <a:masterClrMapping/>
+  </p:clrMapOvr>
+  <p:timing>
+    <p:tnLst>
+      <p:par>
+        <p:cTn id="1" dur="indefinite" restart="never" nodeType="tmRoot"/>
+      </p:par>
+    </p:tnLst>
+  </p:timing>
+</p:sld>
+</file>
+
+<file path=ppt/slides/slide11.xml><?xml version="1.0" encoding="utf-8"?>
+<p:sld xmlns:a="http://schemas.openxmlformats.org/drawingml/2006/main" xmlns:r="http://schemas.openxmlformats.org/officeDocument/2006/relationships" xmlns:p="http://schemas.openxmlformats.org/presentationml/2006/main">
+  <p:cSld>
+    <p:spTree>
+      <p:nvGrpSpPr>
+        <p:cNvPr id="1" name=""/>
+        <p:cNvGrpSpPr/>
+        <p:nvPr/>
+      </p:nvGrpSpPr>
+      <p:grpSpPr>
+        <a:xfrm>
+          <a:off x="0" y="0"/>
+          <a:ext cx="0" cy="0"/>
+          <a:chOff x="0" y="0"/>
+          <a:chExt cx="0" cy="0"/>
+        </a:xfrm>
+      </p:grpSpPr>
+      <p:sp>
+        <p:nvSpPr>
+          <p:cNvPr id="2" name="Title 1"/>
+          <p:cNvSpPr>
+            <a:spLocks noGrp="1"/>
+          </p:cNvSpPr>
+          <p:nvPr>
+            <p:ph type="title"/>
+          </p:nvPr>
+        </p:nvSpPr>
+        <p:spPr/>
+        <p:txBody>
+          <a:bodyPr/>
+          <a:lstStyle/>
+          <a:p>
+            <a:r>
+              <a:rPr lang="en-US" dirty="0" smtClean="0"/>
+              <a:t>Analysis of Residuals</a:t>
+            </a:r>
+            <a:endParaRPr lang="en-US" dirty="0"/>
+          </a:p>
+        </p:txBody>
+      </p:sp>
+      <p:sp>
+        <p:nvSpPr>
+          <p:cNvPr id="3" name="Content Placeholder 2"/>
+          <p:cNvSpPr>
+            <a:spLocks noGrp="1"/>
+          </p:cNvSpPr>
+          <p:nvPr>
+            <p:ph idx="1"/>
+          </p:nvPr>
+        </p:nvSpPr>
+        <p:spPr/>
+        <p:txBody>
+          <a:bodyPr>
+            <a:normAutofit/>
+          </a:bodyPr>
+          <a:lstStyle/>
+          <a:p>
+            <a:pPr marL="0" indent="0">
+              <a:buNone/>
+            </a:pPr>
+            <a:r>
+              <a:rPr lang="en-US" sz="2600" dirty="0" smtClean="0"/>
+              <a:t>Heteroscedasticity and non-normality in the residuals indicates:</a:t>
+            </a:r>
+            <a:endParaRPr lang="en-US" sz="2600" dirty="0"/>
+          </a:p>
+          <a:p>
+            <a:pPr lvl="1"/>
+            <a:r>
+              <a:rPr lang="en-US" sz="2400" dirty="0" smtClean="0"/>
+              <a:t>One or more important variables were omitted from the model</a:t>
+            </a:r>
+          </a:p>
+          <a:p>
+            <a:pPr lvl="1"/>
+            <a:r>
+              <a:rPr lang="en-US" sz="2400" dirty="0" smtClean="0"/>
+              <a:t>Incorrect functional form used for the model (e.g., linear when the function is actually nonlinear)</a:t>
+            </a:r>
+            <a:endParaRPr lang="en-US" sz="2400" dirty="0"/>
+          </a:p>
+        </p:txBody>
+      </p:sp>
+    </p:spTree>
+    <p:extLst>
+      <p:ext uri="{BB962C8B-B14F-4D97-AF65-F5344CB8AC3E}">
+        <p14:creationId xmlns:p14="http://schemas.microsoft.com/office/powerpoint/2010/main" val="933020272"/>
+      </p:ext>
+    </p:extLst>
+  </p:cSld>
+  <p:clrMapOvr>
+    <a:masterClrMapping/>
+  </p:clrMapOvr>
+  <p:timing>
+    <p:tnLst>
+      <p:par>
+        <p:cTn id="1" dur="indefinite" restart="never" nodeType="tmRoot"/>
+      </p:par>
+    </p:tnLst>
+  </p:timing>
+</p:sld>
+</file>
+
+<file path=ppt/slides/slide12.xml><?xml version="1.0" encoding="utf-8"?>
+<p:sld xmlns:a="http://schemas.openxmlformats.org/drawingml/2006/main" xmlns:r="http://schemas.openxmlformats.org/officeDocument/2006/relationships" xmlns:p="http://schemas.openxmlformats.org/presentationml/2006/main">
+  <p:cSld>
+    <p:spTree>
+      <p:nvGrpSpPr>
+        <p:cNvPr id="1" name=""/>
+        <p:cNvGrpSpPr/>
+        <p:nvPr/>
+      </p:nvGrpSpPr>
+      <p:grpSpPr>
+        <a:xfrm>
+          <a:off x="0" y="0"/>
+          <a:ext cx="0" cy="0"/>
+          <a:chOff x="0" y="0"/>
+          <a:chExt cx="0" cy="0"/>
+        </a:xfrm>
+      </p:grpSpPr>
       <p:pic>
         <p:nvPicPr>
           <p:cNvPr id="9" name="Picture 8"/>
@@ -6615,7 +8769,7 @@
 </p:sld>
 </file>
 
-<file path=ppt/slides/slide11.xml><?xml version="1.0" encoding="utf-8"?>
+<file path=ppt/slides/slide13.xml><?xml version="1.0" encoding="utf-8"?>
 <p:sld xmlns:a="http://schemas.openxmlformats.org/drawingml/2006/main" xmlns:r="http://schemas.openxmlformats.org/officeDocument/2006/relationships" xmlns:p="http://schemas.openxmlformats.org/presentationml/2006/main">
   <p:cSld>
     <p:spTree>
@@ -6703,7 +8857,7 @@
 </p:sld>
 </file>
 
-<file path=ppt/slides/slide12.xml><?xml version="1.0" encoding="utf-8"?>
+<file path=ppt/slides/slide14.xml><?xml version="1.0" encoding="utf-8"?>
 <p:sld xmlns:a="http://schemas.openxmlformats.org/drawingml/2006/main" xmlns:r="http://schemas.openxmlformats.org/officeDocument/2006/relationships" xmlns:p="http://schemas.openxmlformats.org/presentationml/2006/main">
   <p:cSld>
     <p:spTree>
@@ -6942,7 +9096,7 @@
 </p:sld>
 </file>
 
-<file path=ppt/slides/slide13.xml><?xml version="1.0" encoding="utf-8"?>
+<file path=ppt/slides/slide15.xml><?xml version="1.0" encoding="utf-8"?>
 <p:sld xmlns:a="http://schemas.openxmlformats.org/drawingml/2006/main" xmlns:r="http://schemas.openxmlformats.org/officeDocument/2006/relationships" xmlns:p="http://schemas.openxmlformats.org/presentationml/2006/main">
   <p:cSld>
     <p:spTree>
@@ -7031,7 +9185,7 @@
 </p:sld>
 </file>
 
-<file path=ppt/slides/slide14.xml><?xml version="1.0" encoding="utf-8"?>
+<file path=ppt/slides/slide16.xml><?xml version="1.0" encoding="utf-8"?>
 <p:sld xmlns:a="http://schemas.openxmlformats.org/drawingml/2006/main" xmlns:r="http://schemas.openxmlformats.org/officeDocument/2006/relationships" xmlns:p="http://schemas.openxmlformats.org/presentationml/2006/main">
   <p:cSld>
     <p:spTree>
@@ -7120,7 +9274,7 @@
 </p:sld>
 </file>
 
-<file path=ppt/slides/slide15.xml><?xml version="1.0" encoding="utf-8"?>
+<file path=ppt/slides/slide17.xml><?xml version="1.0" encoding="utf-8"?>
 <p:sld xmlns:a="http://schemas.openxmlformats.org/drawingml/2006/main" xmlns:r="http://schemas.openxmlformats.org/officeDocument/2006/relationships" xmlns:p="http://schemas.openxmlformats.org/presentationml/2006/main">
   <p:cSld>
     <p:spTree>
@@ -7209,252 +9363,6 @@
 </p:sld>
 </file>
 
-<file path=ppt/slides/slide16.xml><?xml version="1.0" encoding="utf-8"?>
-<p:sld xmlns:a="http://schemas.openxmlformats.org/drawingml/2006/main" xmlns:r="http://schemas.openxmlformats.org/officeDocument/2006/relationships" xmlns:p="http://schemas.openxmlformats.org/presentationml/2006/main">
-  <p:cSld>
-    <p:spTree>
-      <p:nvGrpSpPr>
-        <p:cNvPr id="1" name=""/>
-        <p:cNvGrpSpPr/>
-        <p:nvPr/>
-      </p:nvGrpSpPr>
-      <p:grpSpPr>
-        <a:xfrm>
-          <a:off x="0" y="0"/>
-          <a:ext cx="0" cy="0"/>
-          <a:chOff x="0" y="0"/>
-          <a:chExt cx="0" cy="0"/>
-        </a:xfrm>
-      </p:grpSpPr>
-      <p:sp>
-        <p:nvSpPr>
-          <p:cNvPr id="2" name="Title 1"/>
-          <p:cNvSpPr>
-            <a:spLocks noGrp="1"/>
-          </p:cNvSpPr>
-          <p:nvPr>
-            <p:ph type="title"/>
-          </p:nvPr>
-        </p:nvSpPr>
-        <p:spPr/>
-        <p:txBody>
-          <a:bodyPr/>
-          <a:lstStyle/>
-          <a:p>
-            <a:r>
-              <a:rPr lang="en-US" dirty="0" smtClean="0"/>
-              <a:t>EXERCISE: Linear Regression</a:t>
-            </a:r>
-            <a:endParaRPr lang="en-US" dirty="0"/>
-          </a:p>
-        </p:txBody>
-      </p:sp>
-      <p:sp>
-        <p:nvSpPr>
-          <p:cNvPr id="3" name="Content Placeholder 2"/>
-          <p:cNvSpPr>
-            <a:spLocks noGrp="1"/>
-          </p:cNvSpPr>
-          <p:nvPr>
-            <p:ph idx="1"/>
-          </p:nvPr>
-        </p:nvSpPr>
-        <p:spPr/>
-        <p:txBody>
-          <a:bodyPr>
-            <a:normAutofit/>
-          </a:bodyPr>
-          <a:lstStyle/>
-          <a:p>
-            <a:pPr marL="0" indent="0">
-              <a:buNone/>
-            </a:pPr>
-            <a:r>
-              <a:rPr lang="en-US" sz="2400" dirty="0">
-                <a:hlinkClick r:id="rId2"/>
-              </a:rPr>
-              <a:t>https://</a:t>
-            </a:r>
-            <a:r>
-              <a:rPr lang="en-US" sz="2400" dirty="0" smtClean="0">
-                <a:hlinkClick r:id="rId2"/>
-              </a:rPr>
-              <a:t>github.com/ncss-tech/stats_for_soil_survey/tree/master/chapters/6_linear_models</a:t>
-            </a:r>
-            <a:r>
-              <a:rPr lang="en-US" sz="2400" dirty="0" smtClean="0"/>
-              <a:t> </a:t>
-            </a:r>
-            <a:endParaRPr lang="en-US" sz="2400" dirty="0"/>
-          </a:p>
-        </p:txBody>
-      </p:sp>
-    </p:spTree>
-    <p:extLst>
-      <p:ext uri="{BB962C8B-B14F-4D97-AF65-F5344CB8AC3E}">
-        <p14:creationId xmlns:p14="http://schemas.microsoft.com/office/powerpoint/2010/main" val="3530076183"/>
-      </p:ext>
-    </p:extLst>
-  </p:cSld>
-  <p:clrMapOvr>
-    <a:masterClrMapping/>
-  </p:clrMapOvr>
-  <p:timing>
-    <p:tnLst>
-      <p:par>
-        <p:cTn id="1" dur="indefinite" restart="never" nodeType="tmRoot"/>
-      </p:par>
-    </p:tnLst>
-  </p:timing>
-</p:sld>
-</file>
-
-<file path=ppt/slides/slide17.xml><?xml version="1.0" encoding="utf-8"?>
-<p:sld xmlns:a="http://schemas.openxmlformats.org/drawingml/2006/main" xmlns:r="http://schemas.openxmlformats.org/officeDocument/2006/relationships" xmlns:p="http://schemas.openxmlformats.org/presentationml/2006/main">
-  <p:cSld>
-    <p:spTree>
-      <p:nvGrpSpPr>
-        <p:cNvPr id="1" name=""/>
-        <p:cNvGrpSpPr/>
-        <p:nvPr/>
-      </p:nvGrpSpPr>
-      <p:grpSpPr>
-        <a:xfrm>
-          <a:off x="0" y="0"/>
-          <a:ext cx="0" cy="0"/>
-          <a:chOff x="0" y="0"/>
-          <a:chExt cx="0" cy="0"/>
-        </a:xfrm>
-      </p:grpSpPr>
-      <p:sp>
-        <p:nvSpPr>
-          <p:cNvPr id="2" name="Title 1"/>
-          <p:cNvSpPr>
-            <a:spLocks noGrp="1"/>
-          </p:cNvSpPr>
-          <p:nvPr>
-            <p:ph type="title"/>
-          </p:nvPr>
-        </p:nvSpPr>
-        <p:spPr/>
-        <p:txBody>
-          <a:bodyPr/>
-          <a:lstStyle/>
-          <a:p>
-            <a:r>
-              <a:rPr lang="en-US" dirty="0" smtClean="0"/>
-              <a:t>Summary</a:t>
-            </a:r>
-            <a:endParaRPr lang="en-US" dirty="0"/>
-          </a:p>
-        </p:txBody>
-      </p:sp>
-      <p:pic>
-        <p:nvPicPr>
-          <p:cNvPr id="4" name="Content Placeholder 3"/>
-          <p:cNvPicPr>
-            <a:picLocks noChangeAspect="1"/>
-          </p:cNvPicPr>
-          <p:nvPr/>
-        </p:nvPicPr>
-        <p:blipFill>
-          <a:blip r:embed="rId3">
-            <a:extLst>
-              <a:ext uri="{28A0092B-C50C-407E-A947-70E740481C1C}">
-                <a14:useLocalDpi xmlns:a14="http://schemas.microsoft.com/office/drawing/2010/main" val="0"/>
-              </a:ext>
-            </a:extLst>
-          </a:blip>
-          <a:stretch>
-            <a:fillRect/>
-          </a:stretch>
-        </p:blipFill>
-        <p:spPr>
-          <a:xfrm>
-            <a:off x="786765" y="1777032"/>
-            <a:ext cx="6765798" cy="4329524"/>
-          </a:xfrm>
-          <a:prstGeom prst="rect">
-            <a:avLst/>
-          </a:prstGeom>
-        </p:spPr>
-      </p:pic>
-      <p:sp>
-        <p:nvSpPr>
-          <p:cNvPr id="5" name="Rectangle 4"/>
-          <p:cNvSpPr/>
-          <p:nvPr/>
-        </p:nvSpPr>
-        <p:spPr>
-          <a:xfrm>
-            <a:off x="0" y="6642556"/>
-            <a:ext cx="1140056" cy="215444"/>
-          </a:xfrm>
-          <a:prstGeom prst="rect">
-            <a:avLst/>
-          </a:prstGeom>
-        </p:spPr>
-        <p:txBody>
-          <a:bodyPr wrap="none">
-            <a:spAutoFit/>
-          </a:bodyPr>
-          <a:lstStyle/>
-          <a:p>
-            <a:r>
-              <a:rPr lang="en-US" sz="800" dirty="0"/>
-              <a:t>http://xkcd.com/833/</a:t>
-            </a:r>
-          </a:p>
-        </p:txBody>
-      </p:sp>
-      <p:sp>
-        <p:nvSpPr>
-          <p:cNvPr id="6" name="Rectangle 5"/>
-          <p:cNvSpPr/>
-          <p:nvPr/>
-        </p:nvSpPr>
-        <p:spPr>
-          <a:xfrm>
-            <a:off x="1959764" y="6106556"/>
-            <a:ext cx="4419800" cy="369332"/>
-          </a:xfrm>
-          <a:prstGeom prst="rect">
-            <a:avLst/>
-          </a:prstGeom>
-        </p:spPr>
-        <p:txBody>
-          <a:bodyPr wrap="none">
-            <a:spAutoFit/>
-          </a:bodyPr>
-          <a:lstStyle/>
-          <a:p>
-            <a:r>
-              <a:rPr lang="en-US" dirty="0"/>
-              <a:t>Correlation does NOT imply Causation!</a:t>
-            </a:r>
-          </a:p>
-        </p:txBody>
-      </p:sp>
-    </p:spTree>
-    <p:extLst>
-      <p:ext uri="{BB962C8B-B14F-4D97-AF65-F5344CB8AC3E}">
-        <p14:creationId xmlns:p14="http://schemas.microsoft.com/office/powerpoint/2010/main" val="2719573860"/>
-      </p:ext>
-    </p:extLst>
-  </p:cSld>
-  <p:clrMapOvr>
-    <a:masterClrMapping/>
-  </p:clrMapOvr>
-  <p:timing>
-    <p:tnLst>
-      <p:par>
-        <p:cTn id="1" dur="indefinite" restart="never" nodeType="tmRoot"/>
-      </p:par>
-    </p:tnLst>
-  </p:timing>
-</p:sld>
-</file>
-
 <file path=ppt/slides/slide18.xml><?xml version="1.0" encoding="utf-8"?>
 <p:sld xmlns:a="http://schemas.openxmlformats.org/drawingml/2006/main" xmlns:r="http://schemas.openxmlformats.org/officeDocument/2006/relationships" xmlns:p="http://schemas.openxmlformats.org/presentationml/2006/main">
   <p:cSld>
@@ -7487,13 +9395,17 @@
           <a:bodyPr/>
           <a:lstStyle/>
           <a:p>
-            <a:endParaRPr lang="en-US"/>
+            <a:r>
+              <a:rPr lang="en-US" dirty="0" smtClean="0"/>
+              <a:t>EXERCISE: Linear Regression</a:t>
+            </a:r>
+            <a:endParaRPr lang="en-US" dirty="0"/>
           </a:p>
         </p:txBody>
       </p:sp>
       <p:sp>
         <p:nvSpPr>
-          <p:cNvPr id="5" name="Content Placeholder 4"/>
+          <p:cNvPr id="3" name="Content Placeholder 2"/>
           <p:cNvSpPr>
             <a:spLocks noGrp="1"/>
           </p:cNvSpPr>
@@ -7503,73 +9415,38 @@
         </p:nvSpPr>
         <p:spPr/>
         <p:txBody>
-          <a:bodyPr/>
-          <a:lstStyle/>
-          <a:p>
-            <a:endParaRPr lang="en-US"/>
-          </a:p>
-        </p:txBody>
-      </p:sp>
-      <p:pic>
-        <p:nvPicPr>
-          <p:cNvPr id="7" name="Picture 6"/>
-          <p:cNvPicPr>
-            <a:picLocks noChangeAspect="1"/>
-          </p:cNvPicPr>
-          <p:nvPr/>
-        </p:nvPicPr>
-        <p:blipFill rotWithShape="1">
-          <a:blip r:embed="rId3">
-            <a:grayscl/>
-            <a:lum contrast="20000"/>
-          </a:blip>
-          <a:srcRect l="6562" r="9979" b="68041"/>
-          <a:stretch/>
-        </p:blipFill>
-        <p:spPr>
-          <a:xfrm>
-            <a:off x="379716" y="1905000"/>
-            <a:ext cx="7579895" cy="3429000"/>
-          </a:xfrm>
-          <a:prstGeom prst="rect">
-            <a:avLst/>
-          </a:prstGeom>
-        </p:spPr>
-      </p:pic>
-      <p:sp>
-        <p:nvSpPr>
-          <p:cNvPr id="8" name="TextBox 7"/>
-          <p:cNvSpPr txBox="1"/>
-          <p:nvPr/>
-        </p:nvSpPr>
-        <p:spPr>
-          <a:xfrm>
-            <a:off x="0" y="6590677"/>
-            <a:ext cx="1164101" cy="246221"/>
-          </a:xfrm>
-          <a:prstGeom prst="rect">
-            <a:avLst/>
-          </a:prstGeom>
-          <a:noFill/>
-        </p:spPr>
-        <p:txBody>
-          <a:bodyPr wrap="none" rtlCol="0">
-            <a:spAutoFit/>
+          <a:bodyPr>
+            <a:normAutofit/>
           </a:bodyPr>
           <a:lstStyle/>
           <a:p>
-            <a:r>
-              <a:rPr lang="en-US" sz="1000" dirty="0" smtClean="0"/>
-              <a:t>Scull et al., 2005</a:t>
-            </a:r>
-            <a:endParaRPr lang="en-US" sz="1000" dirty="0"/>
+            <a:pPr marL="0" indent="0">
+              <a:buNone/>
+            </a:pPr>
+            <a:r>
+              <a:rPr lang="en-US" sz="2400" dirty="0">
+                <a:hlinkClick r:id="rId2"/>
+              </a:rPr>
+              <a:t>https://</a:t>
+            </a:r>
+            <a:r>
+              <a:rPr lang="en-US" sz="2400" dirty="0" smtClean="0">
+                <a:hlinkClick r:id="rId2"/>
+              </a:rPr>
+              <a:t>github.com/ncss-tech/stats_for_soil_survey/tree/master/chapters/6_linear_models</a:t>
+            </a:r>
+            <a:r>
+              <a:rPr lang="en-US" sz="2400" dirty="0" smtClean="0"/>
+              <a:t> </a:t>
+            </a:r>
+            <a:endParaRPr lang="en-US" sz="2400" dirty="0"/>
           </a:p>
         </p:txBody>
       </p:sp>
     </p:spTree>
     <p:extLst>
       <p:ext uri="{BB962C8B-B14F-4D97-AF65-F5344CB8AC3E}">
-        <p14:creationId xmlns:p14="http://schemas.microsoft.com/office/powerpoint/2010/main" val="2184580214"/>
+        <p14:creationId xmlns:p14="http://schemas.microsoft.com/office/powerpoint/2010/main" val="3530076183"/>
       </p:ext>
     </p:extLst>
   </p:cSld>
@@ -7626,53 +9503,96 @@
           </a:p>
         </p:txBody>
       </p:sp>
-      <p:sp>
-        <p:nvSpPr>
-          <p:cNvPr id="3" name="Content Placeholder 2"/>
-          <p:cNvSpPr>
-            <a:spLocks noGrp="1"/>
-          </p:cNvSpPr>
-          <p:nvPr>
-            <p:ph idx="1"/>
-          </p:nvPr>
-        </p:nvSpPr>
-        <p:spPr/>
+      <p:pic>
+        <p:nvPicPr>
+          <p:cNvPr id="4" name="Content Placeholder 3"/>
+          <p:cNvPicPr>
+            <a:picLocks noChangeAspect="1"/>
+          </p:cNvPicPr>
+          <p:nvPr/>
+        </p:nvPicPr>
+        <p:blipFill>
+          <a:blip r:embed="rId3">
+            <a:extLst>
+              <a:ext uri="{28A0092B-C50C-407E-A947-70E740481C1C}">
+                <a14:useLocalDpi xmlns:a14="http://schemas.microsoft.com/office/drawing/2010/main" val="0"/>
+              </a:ext>
+            </a:extLst>
+          </a:blip>
+          <a:stretch>
+            <a:fillRect/>
+          </a:stretch>
+        </p:blipFill>
+        <p:spPr>
+          <a:xfrm>
+            <a:off x="786765" y="1777032"/>
+            <a:ext cx="6765798" cy="4329524"/>
+          </a:xfrm>
+          <a:prstGeom prst="rect">
+            <a:avLst/>
+          </a:prstGeom>
+        </p:spPr>
+      </p:pic>
+      <p:sp>
+        <p:nvSpPr>
+          <p:cNvPr id="5" name="Rectangle 4"/>
+          <p:cNvSpPr/>
+          <p:nvPr/>
+        </p:nvSpPr>
+        <p:spPr>
+          <a:xfrm>
+            <a:off x="0" y="6642556"/>
+            <a:ext cx="1140056" cy="215444"/>
+          </a:xfrm>
+          <a:prstGeom prst="rect">
+            <a:avLst/>
+          </a:prstGeom>
+        </p:spPr>
         <p:txBody>
-          <a:bodyPr/>
+          <a:bodyPr wrap="none">
+            <a:spAutoFit/>
+          </a:bodyPr>
           <a:lstStyle/>
           <a:p>
             <a:r>
-              <a:rPr lang="en-US" sz="2000" dirty="0" smtClean="0"/>
-              <a:t>Linear regression models are intuitive, quick to execute, and easy to interpret, making them useful for NASIS calculations and </a:t>
-            </a:r>
-            <a:r>
-              <a:rPr lang="en-US" sz="2000" dirty="0" err="1" smtClean="0"/>
-              <a:t>pedotransfer</a:t>
-            </a:r>
-            <a:r>
-              <a:rPr lang="en-US" sz="2000" dirty="0" smtClean="0"/>
-              <a:t> functions. </a:t>
-            </a:r>
-          </a:p>
-          <a:p>
-            <a:r>
-              <a:rPr lang="en-US" sz="2000" dirty="0" smtClean="0"/>
-              <a:t>Due to the non-linear nature of environmental data, data transformations or deletions are often needed to meet model assumptions. </a:t>
-            </a:r>
-          </a:p>
-          <a:p>
-            <a:r>
-              <a:rPr lang="en-US" sz="2000" dirty="0" smtClean="0"/>
-              <a:t>Tacit knowledge is needed throughout model development. </a:t>
-            </a:r>
-            <a:endParaRPr lang="en-US" sz="2000" dirty="0"/>
+              <a:rPr lang="en-US" sz="800" dirty="0"/>
+              <a:t>http://xkcd.com/833/</a:t>
+            </a:r>
+          </a:p>
+        </p:txBody>
+      </p:sp>
+      <p:sp>
+        <p:nvSpPr>
+          <p:cNvPr id="6" name="Rectangle 5"/>
+          <p:cNvSpPr/>
+          <p:nvPr/>
+        </p:nvSpPr>
+        <p:spPr>
+          <a:xfrm>
+            <a:off x="1959764" y="6106556"/>
+            <a:ext cx="4419800" cy="369332"/>
+          </a:xfrm>
+          <a:prstGeom prst="rect">
+            <a:avLst/>
+          </a:prstGeom>
+        </p:spPr>
+        <p:txBody>
+          <a:bodyPr wrap="none">
+            <a:spAutoFit/>
+          </a:bodyPr>
+          <a:lstStyle/>
+          <a:p>
+            <a:r>
+              <a:rPr lang="en-US" dirty="0"/>
+              <a:t>Correlation does NOT imply Causation!</a:t>
+            </a:r>
           </a:p>
         </p:txBody>
       </p:sp>
     </p:spTree>
     <p:extLst>
       <p:ext uri="{BB962C8B-B14F-4D97-AF65-F5344CB8AC3E}">
-        <p14:creationId xmlns:p14="http://schemas.microsoft.com/office/powerpoint/2010/main" val="3709144762"/>
+        <p14:creationId xmlns:p14="http://schemas.microsoft.com/office/powerpoint/2010/main" val="2719573860"/>
       </p:ext>
     </p:extLst>
   </p:cSld>
@@ -7682,152 +9602,7 @@
   <p:timing>
     <p:tnLst>
       <p:par>
-        <p:cTn id="1" dur="indefinite" restart="never" nodeType="tmRoot">
-          <p:childTnLst>
-            <p:seq concurrent="1" nextAc="seek">
-              <p:cTn id="2" dur="indefinite" nodeType="mainSeq">
-                <p:childTnLst>
-                  <p:par>
-                    <p:cTn id="3" fill="hold">
-                      <p:stCondLst>
-                        <p:cond delay="indefinite"/>
-                      </p:stCondLst>
-                      <p:childTnLst>
-                        <p:par>
-                          <p:cTn id="4" fill="hold">
-                            <p:stCondLst>
-                              <p:cond delay="0"/>
-                            </p:stCondLst>
-                            <p:childTnLst>
-                              <p:par>
-                                <p:cTn id="5" presetID="10" presetClass="entr" presetSubtype="0" fill="hold" nodeType="clickEffect">
-                                  <p:stCondLst>
-                                    <p:cond delay="0"/>
-                                  </p:stCondLst>
-                                  <p:childTnLst>
-                                    <p:set>
-                                      <p:cBhvr>
-                                        <p:cTn id="6" dur="1" fill="hold">
-                                          <p:stCondLst>
-                                            <p:cond delay="0"/>
-                                          </p:stCondLst>
-                                        </p:cTn>
-                                        <p:tgtEl>
-                                          <p:spTgt spid="3">
-                                            <p:txEl>
-                                              <p:pRg st="1" end="1"/>
-                                            </p:txEl>
-                                          </p:spTgt>
-                                        </p:tgtEl>
-                                        <p:attrNameLst>
-                                          <p:attrName>style.visibility</p:attrName>
-                                        </p:attrNameLst>
-                                      </p:cBhvr>
-                                      <p:to>
-                                        <p:strVal val="visible"/>
-                                      </p:to>
-                                    </p:set>
-                                    <p:animEffect transition="in" filter="fade">
-                                      <p:cBhvr>
-                                        <p:cTn id="7" dur="500"/>
-                                        <p:tgtEl>
-                                          <p:spTgt spid="3">
-                                            <p:txEl>
-                                              <p:pRg st="1" end="1"/>
-                                            </p:txEl>
-                                          </p:spTgt>
-                                        </p:tgtEl>
-                                      </p:cBhvr>
-                                    </p:animEffect>
-                                  </p:childTnLst>
-                                </p:cTn>
-                              </p:par>
-                            </p:childTnLst>
-                          </p:cTn>
-                        </p:par>
-                      </p:childTnLst>
-                    </p:cTn>
-                  </p:par>
-                  <p:par>
-                    <p:cTn id="8" fill="hold">
-                      <p:stCondLst>
-                        <p:cond delay="indefinite"/>
-                      </p:stCondLst>
-                      <p:childTnLst>
-                        <p:par>
-                          <p:cTn id="9" fill="hold">
-                            <p:stCondLst>
-                              <p:cond delay="0"/>
-                            </p:stCondLst>
-                            <p:childTnLst>
-                              <p:par>
-                                <p:cTn id="10" presetID="10" presetClass="entr" presetSubtype="0" fill="hold" nodeType="clickEffect">
-                                  <p:stCondLst>
-                                    <p:cond delay="0"/>
-                                  </p:stCondLst>
-                                  <p:childTnLst>
-                                    <p:set>
-                                      <p:cBhvr>
-                                        <p:cTn id="11" dur="1" fill="hold">
-                                          <p:stCondLst>
-                                            <p:cond delay="0"/>
-                                          </p:stCondLst>
-                                        </p:cTn>
-                                        <p:tgtEl>
-                                          <p:spTgt spid="3">
-                                            <p:txEl>
-                                              <p:pRg st="2" end="2"/>
-                                            </p:txEl>
-                                          </p:spTgt>
-                                        </p:tgtEl>
-                                        <p:attrNameLst>
-                                          <p:attrName>style.visibility</p:attrName>
-                                        </p:attrNameLst>
-                                      </p:cBhvr>
-                                      <p:to>
-                                        <p:strVal val="visible"/>
-                                      </p:to>
-                                    </p:set>
-                                    <p:animEffect transition="in" filter="fade">
-                                      <p:cBhvr>
-                                        <p:cTn id="12" dur="500"/>
-                                        <p:tgtEl>
-                                          <p:spTgt spid="3">
-                                            <p:txEl>
-                                              <p:pRg st="2" end="2"/>
-                                            </p:txEl>
-                                          </p:spTgt>
-                                        </p:tgtEl>
-                                      </p:cBhvr>
-                                    </p:animEffect>
-                                  </p:childTnLst>
-                                </p:cTn>
-                              </p:par>
-                            </p:childTnLst>
-                          </p:cTn>
-                        </p:par>
-                      </p:childTnLst>
-                    </p:cTn>
-                  </p:par>
-                </p:childTnLst>
-              </p:cTn>
-              <p:prevCondLst>
-                <p:cond evt="onPrev" delay="0">
-                  <p:tgtEl>
-                    <p:sldTgt/>
-                  </p:tgtEl>
-                </p:cond>
-              </p:prevCondLst>
-              <p:nextCondLst>
-                <p:cond evt="onNext" delay="0">
-                  <p:tgtEl>
-                    <p:sldTgt/>
-                  </p:tgtEl>
-                </p:cond>
-              </p:nextCondLst>
-            </p:seq>
-          </p:childTnLst>
-        </p:cTn>
+        <p:cTn id="1" dur="indefinite" restart="never" nodeType="tmRoot"/>
       </p:par>
     </p:tnLst>
   </p:timing>
@@ -9080,6 +10855,385 @@
           <a:bodyPr/>
           <a:lstStyle/>
           <a:p>
+            <a:endParaRPr lang="en-US"/>
+          </a:p>
+        </p:txBody>
+      </p:sp>
+      <p:sp>
+        <p:nvSpPr>
+          <p:cNvPr id="5" name="Content Placeholder 4"/>
+          <p:cNvSpPr>
+            <a:spLocks noGrp="1"/>
+          </p:cNvSpPr>
+          <p:nvPr>
+            <p:ph idx="1"/>
+          </p:nvPr>
+        </p:nvSpPr>
+        <p:spPr/>
+        <p:txBody>
+          <a:bodyPr/>
+          <a:lstStyle/>
+          <a:p>
+            <a:endParaRPr lang="en-US"/>
+          </a:p>
+        </p:txBody>
+      </p:sp>
+      <p:pic>
+        <p:nvPicPr>
+          <p:cNvPr id="7" name="Picture 6"/>
+          <p:cNvPicPr>
+            <a:picLocks noChangeAspect="1"/>
+          </p:cNvPicPr>
+          <p:nvPr/>
+        </p:nvPicPr>
+        <p:blipFill rotWithShape="1">
+          <a:blip r:embed="rId3">
+            <a:grayscl/>
+            <a:lum contrast="20000"/>
+          </a:blip>
+          <a:srcRect l="6562" r="9979" b="68041"/>
+          <a:stretch/>
+        </p:blipFill>
+        <p:spPr>
+          <a:xfrm>
+            <a:off x="379716" y="1905000"/>
+            <a:ext cx="7579895" cy="3429000"/>
+          </a:xfrm>
+          <a:prstGeom prst="rect">
+            <a:avLst/>
+          </a:prstGeom>
+        </p:spPr>
+      </p:pic>
+      <p:sp>
+        <p:nvSpPr>
+          <p:cNvPr id="8" name="TextBox 7"/>
+          <p:cNvSpPr txBox="1"/>
+          <p:nvPr/>
+        </p:nvSpPr>
+        <p:spPr>
+          <a:xfrm>
+            <a:off x="0" y="6590677"/>
+            <a:ext cx="1164101" cy="246221"/>
+          </a:xfrm>
+          <a:prstGeom prst="rect">
+            <a:avLst/>
+          </a:prstGeom>
+          <a:noFill/>
+        </p:spPr>
+        <p:txBody>
+          <a:bodyPr wrap="none" rtlCol="0">
+            <a:spAutoFit/>
+          </a:bodyPr>
+          <a:lstStyle/>
+          <a:p>
+            <a:r>
+              <a:rPr lang="en-US" sz="1000" dirty="0" smtClean="0"/>
+              <a:t>Scull et al., 2005</a:t>
+            </a:r>
+            <a:endParaRPr lang="en-US" sz="1000" dirty="0"/>
+          </a:p>
+        </p:txBody>
+      </p:sp>
+    </p:spTree>
+    <p:extLst>
+      <p:ext uri="{BB962C8B-B14F-4D97-AF65-F5344CB8AC3E}">
+        <p14:creationId xmlns:p14="http://schemas.microsoft.com/office/powerpoint/2010/main" val="2184580214"/>
+      </p:ext>
+    </p:extLst>
+  </p:cSld>
+  <p:clrMapOvr>
+    <a:masterClrMapping/>
+  </p:clrMapOvr>
+  <p:timing>
+    <p:tnLst>
+      <p:par>
+        <p:cTn id="1" dur="indefinite" restart="never" nodeType="tmRoot"/>
+      </p:par>
+    </p:tnLst>
+  </p:timing>
+</p:sld>
+</file>
+
+<file path=ppt/slides/slide21.xml><?xml version="1.0" encoding="utf-8"?>
+<p:sld xmlns:a="http://schemas.openxmlformats.org/drawingml/2006/main" xmlns:r="http://schemas.openxmlformats.org/officeDocument/2006/relationships" xmlns:p="http://schemas.openxmlformats.org/presentationml/2006/main">
+  <p:cSld>
+    <p:spTree>
+      <p:nvGrpSpPr>
+        <p:cNvPr id="1" name=""/>
+        <p:cNvGrpSpPr/>
+        <p:nvPr/>
+      </p:nvGrpSpPr>
+      <p:grpSpPr>
+        <a:xfrm>
+          <a:off x="0" y="0"/>
+          <a:ext cx="0" cy="0"/>
+          <a:chOff x="0" y="0"/>
+          <a:chExt cx="0" cy="0"/>
+        </a:xfrm>
+      </p:grpSpPr>
+      <p:sp>
+        <p:nvSpPr>
+          <p:cNvPr id="2" name="Title 1"/>
+          <p:cNvSpPr>
+            <a:spLocks noGrp="1"/>
+          </p:cNvSpPr>
+          <p:nvPr>
+            <p:ph type="title"/>
+          </p:nvPr>
+        </p:nvSpPr>
+        <p:spPr/>
+        <p:txBody>
+          <a:bodyPr/>
+          <a:lstStyle/>
+          <a:p>
+            <a:r>
+              <a:rPr lang="en-US" dirty="0" smtClean="0"/>
+              <a:t>Summary</a:t>
+            </a:r>
+            <a:endParaRPr lang="en-US" dirty="0"/>
+          </a:p>
+        </p:txBody>
+      </p:sp>
+      <p:sp>
+        <p:nvSpPr>
+          <p:cNvPr id="3" name="Content Placeholder 2"/>
+          <p:cNvSpPr>
+            <a:spLocks noGrp="1"/>
+          </p:cNvSpPr>
+          <p:nvPr>
+            <p:ph idx="1"/>
+          </p:nvPr>
+        </p:nvSpPr>
+        <p:spPr/>
+        <p:txBody>
+          <a:bodyPr/>
+          <a:lstStyle/>
+          <a:p>
+            <a:r>
+              <a:rPr lang="en-US" sz="2000" dirty="0" smtClean="0"/>
+              <a:t>Linear regression models are intuitive, quick to execute, and easy to interpret, making them useful for NASIS calculations and </a:t>
+            </a:r>
+            <a:r>
+              <a:rPr lang="en-US" sz="2000" dirty="0" err="1" smtClean="0"/>
+              <a:t>pedotransfer</a:t>
+            </a:r>
+            <a:r>
+              <a:rPr lang="en-US" sz="2000" dirty="0" smtClean="0"/>
+              <a:t> functions. </a:t>
+            </a:r>
+          </a:p>
+          <a:p>
+            <a:r>
+              <a:rPr lang="en-US" sz="2000" dirty="0" smtClean="0"/>
+              <a:t>Due to the non-linear nature of environmental data, data transformations or deletions are often needed to meet model assumptions. </a:t>
+            </a:r>
+          </a:p>
+          <a:p>
+            <a:r>
+              <a:rPr lang="en-US" sz="2000" dirty="0" smtClean="0"/>
+              <a:t>Tacit knowledge is needed throughout model development. </a:t>
+            </a:r>
+            <a:endParaRPr lang="en-US" sz="2000" dirty="0"/>
+          </a:p>
+        </p:txBody>
+      </p:sp>
+    </p:spTree>
+    <p:extLst>
+      <p:ext uri="{BB962C8B-B14F-4D97-AF65-F5344CB8AC3E}">
+        <p14:creationId xmlns:p14="http://schemas.microsoft.com/office/powerpoint/2010/main" val="3709144762"/>
+      </p:ext>
+    </p:extLst>
+  </p:cSld>
+  <p:clrMapOvr>
+    <a:masterClrMapping/>
+  </p:clrMapOvr>
+  <p:timing>
+    <p:tnLst>
+      <p:par>
+        <p:cTn id="1" dur="indefinite" restart="never" nodeType="tmRoot">
+          <p:childTnLst>
+            <p:seq concurrent="1" nextAc="seek">
+              <p:cTn id="2" dur="indefinite" nodeType="mainSeq">
+                <p:childTnLst>
+                  <p:par>
+                    <p:cTn id="3" fill="hold">
+                      <p:stCondLst>
+                        <p:cond delay="indefinite"/>
+                      </p:stCondLst>
+                      <p:childTnLst>
+                        <p:par>
+                          <p:cTn id="4" fill="hold">
+                            <p:stCondLst>
+                              <p:cond delay="0"/>
+                            </p:stCondLst>
+                            <p:childTnLst>
+                              <p:par>
+                                <p:cTn id="5" presetID="10" presetClass="entr" presetSubtype="0" fill="hold" nodeType="clickEffect">
+                                  <p:stCondLst>
+                                    <p:cond delay="0"/>
+                                  </p:stCondLst>
+                                  <p:childTnLst>
+                                    <p:set>
+                                      <p:cBhvr>
+                                        <p:cTn id="6" dur="1" fill="hold">
+                                          <p:stCondLst>
+                                            <p:cond delay="0"/>
+                                          </p:stCondLst>
+                                        </p:cTn>
+                                        <p:tgtEl>
+                                          <p:spTgt spid="3">
+                                            <p:txEl>
+                                              <p:pRg st="1" end="1"/>
+                                            </p:txEl>
+                                          </p:spTgt>
+                                        </p:tgtEl>
+                                        <p:attrNameLst>
+                                          <p:attrName>style.visibility</p:attrName>
+                                        </p:attrNameLst>
+                                      </p:cBhvr>
+                                      <p:to>
+                                        <p:strVal val="visible"/>
+                                      </p:to>
+                                    </p:set>
+                                    <p:animEffect transition="in" filter="fade">
+                                      <p:cBhvr>
+                                        <p:cTn id="7" dur="500"/>
+                                        <p:tgtEl>
+                                          <p:spTgt spid="3">
+                                            <p:txEl>
+                                              <p:pRg st="1" end="1"/>
+                                            </p:txEl>
+                                          </p:spTgt>
+                                        </p:tgtEl>
+                                      </p:cBhvr>
+                                    </p:animEffect>
+                                  </p:childTnLst>
+                                </p:cTn>
+                              </p:par>
+                            </p:childTnLst>
+                          </p:cTn>
+                        </p:par>
+                      </p:childTnLst>
+                    </p:cTn>
+                  </p:par>
+                  <p:par>
+                    <p:cTn id="8" fill="hold">
+                      <p:stCondLst>
+                        <p:cond delay="indefinite"/>
+                      </p:stCondLst>
+                      <p:childTnLst>
+                        <p:par>
+                          <p:cTn id="9" fill="hold">
+                            <p:stCondLst>
+                              <p:cond delay="0"/>
+                            </p:stCondLst>
+                            <p:childTnLst>
+                              <p:par>
+                                <p:cTn id="10" presetID="10" presetClass="entr" presetSubtype="0" fill="hold" nodeType="clickEffect">
+                                  <p:stCondLst>
+                                    <p:cond delay="0"/>
+                                  </p:stCondLst>
+                                  <p:childTnLst>
+                                    <p:set>
+                                      <p:cBhvr>
+                                        <p:cTn id="11" dur="1" fill="hold">
+                                          <p:stCondLst>
+                                            <p:cond delay="0"/>
+                                          </p:stCondLst>
+                                        </p:cTn>
+                                        <p:tgtEl>
+                                          <p:spTgt spid="3">
+                                            <p:txEl>
+                                              <p:pRg st="2" end="2"/>
+                                            </p:txEl>
+                                          </p:spTgt>
+                                        </p:tgtEl>
+                                        <p:attrNameLst>
+                                          <p:attrName>style.visibility</p:attrName>
+                                        </p:attrNameLst>
+                                      </p:cBhvr>
+                                      <p:to>
+                                        <p:strVal val="visible"/>
+                                      </p:to>
+                                    </p:set>
+                                    <p:animEffect transition="in" filter="fade">
+                                      <p:cBhvr>
+                                        <p:cTn id="12" dur="500"/>
+                                        <p:tgtEl>
+                                          <p:spTgt spid="3">
+                                            <p:txEl>
+                                              <p:pRg st="2" end="2"/>
+                                            </p:txEl>
+                                          </p:spTgt>
+                                        </p:tgtEl>
+                                      </p:cBhvr>
+                                    </p:animEffect>
+                                  </p:childTnLst>
+                                </p:cTn>
+                              </p:par>
+                            </p:childTnLst>
+                          </p:cTn>
+                        </p:par>
+                      </p:childTnLst>
+                    </p:cTn>
+                  </p:par>
+                </p:childTnLst>
+              </p:cTn>
+              <p:prevCondLst>
+                <p:cond evt="onPrev" delay="0">
+                  <p:tgtEl>
+                    <p:sldTgt/>
+                  </p:tgtEl>
+                </p:cond>
+              </p:prevCondLst>
+              <p:nextCondLst>
+                <p:cond evt="onNext" delay="0">
+                  <p:tgtEl>
+                    <p:sldTgt/>
+                  </p:tgtEl>
+                </p:cond>
+              </p:nextCondLst>
+            </p:seq>
+          </p:childTnLst>
+        </p:cTn>
+      </p:par>
+    </p:tnLst>
+  </p:timing>
+</p:sld>
+</file>
+
+<file path=ppt/slides/slide22.xml><?xml version="1.0" encoding="utf-8"?>
+<p:sld xmlns:a="http://schemas.openxmlformats.org/drawingml/2006/main" xmlns:r="http://schemas.openxmlformats.org/officeDocument/2006/relationships" xmlns:p="http://schemas.openxmlformats.org/presentationml/2006/main">
+  <p:cSld>
+    <p:spTree>
+      <p:nvGrpSpPr>
+        <p:cNvPr id="1" name=""/>
+        <p:cNvGrpSpPr/>
+        <p:nvPr/>
+      </p:nvGrpSpPr>
+      <p:grpSpPr>
+        <a:xfrm>
+          <a:off x="0" y="0"/>
+          <a:ext cx="0" cy="0"/>
+          <a:chOff x="0" y="0"/>
+          <a:chExt cx="0" cy="0"/>
+        </a:xfrm>
+      </p:grpSpPr>
+      <p:sp>
+        <p:nvSpPr>
+          <p:cNvPr id="2" name="Title 1"/>
+          <p:cNvSpPr>
+            <a:spLocks noGrp="1"/>
+          </p:cNvSpPr>
+          <p:nvPr>
+            <p:ph type="title"/>
+          </p:nvPr>
+        </p:nvSpPr>
+        <p:spPr/>
+        <p:txBody>
+          <a:bodyPr/>
+          <a:lstStyle/>
+          <a:p>
             <a:r>
               <a:rPr lang="en-US" dirty="0" smtClean="0"/>
               <a:t>Linear Regression in R</a:t>
@@ -9495,7 +11649,7 @@
 </p:sld>
 </file>
 
-<file path=ppt/slides/slide21.xml><?xml version="1.0" encoding="utf-8"?>
+<file path=ppt/slides/slide23.xml><?xml version="1.0" encoding="utf-8"?>
 <p:sld xmlns:a="http://schemas.openxmlformats.org/drawingml/2006/main" xmlns:r="http://schemas.openxmlformats.org/officeDocument/2006/relationships" xmlns:p="http://schemas.openxmlformats.org/presentationml/2006/main">
   <p:cSld>
     <p:spTree>
@@ -9947,7 +12101,7 @@
 </p:sld>
 </file>
 
-<file path=ppt/slides/slide22.xml><?xml version="1.0" encoding="utf-8"?>
+<file path=ppt/slides/slide24.xml><?xml version="1.0" encoding="utf-8"?>
 <p:sld xmlns:a="http://schemas.openxmlformats.org/drawingml/2006/main" xmlns:r="http://schemas.openxmlformats.org/officeDocument/2006/relationships" xmlns:p="http://schemas.openxmlformats.org/presentationml/2006/main">
   <p:cSld>
     <p:spTree>
@@ -10115,7 +12269,7 @@
 </p:sld>
 </file>
 
-<file path=ppt/slides/slide23.xml><?xml version="1.0" encoding="utf-8"?>
+<file path=ppt/slides/slide25.xml><?xml version="1.0" encoding="utf-8"?>
 <p:sld xmlns:a="http://schemas.openxmlformats.org/drawingml/2006/main" xmlns:r="http://schemas.openxmlformats.org/officeDocument/2006/relationships" xmlns:p="http://schemas.openxmlformats.org/presentationml/2006/main">
   <p:cSld>
     <p:spTree>
@@ -11436,7 +13590,7 @@
 </p:sld>
 </file>
 
-<file path=ppt/slides/slide24.xml><?xml version="1.0" encoding="utf-8"?>
+<file path=ppt/slides/slide26.xml><?xml version="1.0" encoding="utf-8"?>
 <p:sld xmlns:a="http://schemas.openxmlformats.org/drawingml/2006/main" xmlns:r="http://schemas.openxmlformats.org/officeDocument/2006/relationships" xmlns:p="http://schemas.openxmlformats.org/presentationml/2006/main">
   <p:cSld>
     <p:spTree>
@@ -12058,7 +14212,7 @@
 </p:sld>
 </file>
 
-<file path=ppt/slides/slide25.xml><?xml version="1.0" encoding="utf-8"?>
+<file path=ppt/slides/slide27.xml><?xml version="1.0" encoding="utf-8"?>
 <p:sld xmlns:a="http://schemas.openxmlformats.org/drawingml/2006/main" xmlns:r="http://schemas.openxmlformats.org/officeDocument/2006/relationships" xmlns:p="http://schemas.openxmlformats.org/presentationml/2006/main">
   <p:cSld>
     <p:spTree>
@@ -12954,7 +15108,7 @@
 </p:sld>
 </file>
 
-<file path=ppt/slides/slide26.xml><?xml version="1.0" encoding="utf-8"?>
+<file path=ppt/slides/slide28.xml><?xml version="1.0" encoding="utf-8"?>
 <p:sld xmlns:a="http://schemas.openxmlformats.org/drawingml/2006/main" xmlns:r="http://schemas.openxmlformats.org/officeDocument/2006/relationships" xmlns:p="http://schemas.openxmlformats.org/presentationml/2006/main">
   <p:cSld>
     <p:spTree>
@@ -13132,7 +15286,7 @@
 </p:sld>
 </file>
 
-<file path=ppt/slides/slide27.xml><?xml version="1.0" encoding="utf-8"?>
+<file path=ppt/slides/slide29.xml><?xml version="1.0" encoding="utf-8"?>
 <p:sld xmlns:a="http://schemas.openxmlformats.org/drawingml/2006/main" xmlns:r="http://schemas.openxmlformats.org/officeDocument/2006/relationships" xmlns:p="http://schemas.openxmlformats.org/presentationml/2006/main">
   <p:cSld>
     <p:spTree>
@@ -18482,7 +20636,7 @@
         </p:spPr>
         <p:txBody>
           <a:bodyPr>
-            <a:normAutofit lnSpcReduction="10000"/>
+            <a:normAutofit fontScale="92500"/>
           </a:bodyPr>
           <a:lstStyle/>
           <a:p>
@@ -18575,7 +20729,39 @@
                   <a:schemeClr val="tx1"/>
                 </a:solidFill>
               </a:rPr>
-              <a:t>Correlation</a:t>
+              <a:t>Correlation (</a:t>
+            </a:r>
+            <a:r>
+              <a:rPr lang="en-US" sz="2200" u="sng" dirty="0" smtClean="0">
+                <a:solidFill>
+                  <a:schemeClr val="tx1"/>
+                </a:solidFill>
+              </a:rPr>
+              <a:t>&gt;</a:t>
+            </a:r>
+            <a:r>
+              <a:rPr lang="en-US" sz="2200" dirty="0" smtClean="0">
+                <a:solidFill>
+                  <a:schemeClr val="tx1"/>
+                </a:solidFill>
+              </a:rPr>
+              <a:t>0.7 or </a:t>
+            </a:r>
+            <a:r>
+              <a:rPr lang="en-US" sz="2200" u="sng" dirty="0" smtClean="0">
+                <a:solidFill>
+                  <a:schemeClr val="tx1"/>
+                </a:solidFill>
+              </a:rPr>
+              <a:t>&lt;</a:t>
+            </a:r>
+            <a:r>
+              <a:rPr lang="en-US" sz="2200" dirty="0" smtClean="0">
+                <a:solidFill>
+                  <a:schemeClr val="tx1"/>
+                </a:solidFill>
+              </a:rPr>
+              <a:t>-0.7 = highly correlated)</a:t>
             </a:r>
           </a:p>
           <a:p>

</xml_diff>

<commit_message>
updates to 6_linear_regression ppt
</commit_message>
<xml_diff>
--- a/presentations/6_linear_regression/Linear_regression.pptx
+++ b/presentations/6_linear_regression/Linear_regression.pptx
@@ -5,7 +5,7 @@
     <p:sldMasterId id="2147483684" r:id="rId1"/>
   </p:sldMasterIdLst>
   <p:notesMasterIdLst>
-    <p:notesMasterId r:id="rId31"/>
+    <p:notesMasterId r:id="rId29"/>
   </p:notesMasterIdLst>
   <p:sldIdLst>
     <p:sldId id="256" r:id="rId2"/>
@@ -26,17 +26,15 @@
     <p:sldId id="318" r:id="rId17"/>
     <p:sldId id="319" r:id="rId18"/>
     <p:sldId id="296" r:id="rId19"/>
-    <p:sldId id="297" r:id="rId20"/>
-    <p:sldId id="326" r:id="rId21"/>
-    <p:sldId id="310" r:id="rId22"/>
-    <p:sldId id="294" r:id="rId23"/>
-    <p:sldId id="306" r:id="rId24"/>
-    <p:sldId id="325" r:id="rId25"/>
-    <p:sldId id="320" r:id="rId26"/>
-    <p:sldId id="308" r:id="rId27"/>
-    <p:sldId id="324" r:id="rId28"/>
-    <p:sldId id="309" r:id="rId29"/>
-    <p:sldId id="311" r:id="rId30"/>
+    <p:sldId id="326" r:id="rId20"/>
+    <p:sldId id="310" r:id="rId21"/>
+    <p:sldId id="325" r:id="rId22"/>
+    <p:sldId id="320" r:id="rId23"/>
+    <p:sldId id="294" r:id="rId24"/>
+    <p:sldId id="308" r:id="rId25"/>
+    <p:sldId id="324" r:id="rId26"/>
+    <p:sldId id="309" r:id="rId27"/>
+    <p:sldId id="311" r:id="rId28"/>
   </p:sldIdLst>
   <p:sldSz cx="9144000" cy="6858000" type="screen4x3"/>
   <p:notesSz cx="6858000" cy="9144000"/>
@@ -236,7 +234,7 @@
           <a:p>
             <a:fld id="{2793983C-EFA1-41D2-8DCF-4CEF34100D6A}" type="datetimeFigureOut">
               <a:rPr lang="en-US" smtClean="0"/>
-              <a:t>3/4/2016</a:t>
+              <a:t>3/6/2016</a:t>
             </a:fld>
             <a:endParaRPr lang="en-US"/>
           </a:p>
@@ -1057,11 +1055,60 @@
           <a:p>
             <a:r>
               <a:rPr lang="en-US" dirty="0" smtClean="0"/>
-              <a:t>As with all models,</a:t>
+              <a:t>Scull et al., 2005 in The</a:t>
             </a:r>
             <a:r>
               <a:rPr lang="en-US" baseline="0" dirty="0" smtClean="0"/>
-              <a:t> it is important to remember that correlation does not imply causation. Always remember to look at the variables you have – do they make sense that they would be good predictors of the response variable? Are the model assumptions met?</a:t>
+              <a:t> Professional Geographer. This study compared </a:t>
+            </a:r>
+            <a:r>
+              <a:rPr lang="en-US" baseline="0" dirty="0" err="1" smtClean="0"/>
+              <a:t>nonspatial</a:t>
+            </a:r>
+            <a:r>
+              <a:rPr lang="en-US" baseline="0" dirty="0" smtClean="0"/>
+              <a:t> statistical models with geospatial statistical models to predict A horizon gravel and surface fragments for a portion of the Pinto Basin in Joshua Tree National Park, CA. They concluded that MLR performed the best with a m</a:t>
+            </a:r>
+            <a:r>
+              <a:rPr lang="en-US" dirty="0" smtClean="0"/>
+              <a:t>ean jackknife RMSE of </a:t>
+            </a:r>
+            <a:r>
+              <a:rPr lang="en-US" baseline="0" dirty="0" smtClean="0"/>
+              <a:t>12.7% for A horizon gravel and 20.7% for rock fragments. </a:t>
+            </a:r>
+            <a:r>
+              <a:rPr lang="en-US" b="1" baseline="0" dirty="0" smtClean="0"/>
+              <a:t>Looking at the fitted vs actual values, what do you notice about their MLR model?</a:t>
+            </a:r>
+          </a:p>
+          <a:p>
+            <a:endParaRPr lang="en-US" baseline="0" dirty="0" smtClean="0"/>
+          </a:p>
+          <a:p>
+            <a:r>
+              <a:rPr lang="en-US" baseline="0" dirty="0" smtClean="0"/>
+              <a:t>-PCA of </a:t>
+            </a:r>
+            <a:r>
+              <a:rPr lang="en-US" baseline="0" dirty="0" err="1" smtClean="0"/>
+              <a:t>landsat</a:t>
+            </a:r>
+            <a:r>
+              <a:rPr lang="en-US" baseline="0" dirty="0" smtClean="0"/>
+              <a:t> was used in MLR models</a:t>
+            </a:r>
+          </a:p>
+          <a:p>
+            <a:r>
+              <a:rPr lang="en-US" baseline="0" dirty="0" smtClean="0"/>
+              <a:t>“the high standard deviations for the regression tree and geostatistical models show that they are more sensitive to outliers and data anomalies than other methods”</a:t>
+            </a:r>
+          </a:p>
+          <a:p>
+            <a:r>
+              <a:rPr lang="en-US" baseline="0" dirty="0" smtClean="0"/>
+              <a:t>“the discontinuous data pattern.” </a:t>
             </a:r>
             <a:endParaRPr lang="en-US" dirty="0"/>
           </a:p>
@@ -1093,7 +1140,7 @@
     </p:spTree>
     <p:extLst>
       <p:ext uri="{BB962C8B-B14F-4D97-AF65-F5344CB8AC3E}">
-        <p14:creationId xmlns:p14="http://schemas.microsoft.com/office/powerpoint/2010/main" val="2506501427"/>
+        <p14:creationId xmlns:p14="http://schemas.microsoft.com/office/powerpoint/2010/main" val="1991638967"/>
       </p:ext>
     </p:extLst>
   </p:cSld>
@@ -1149,60 +1196,19 @@
           <a:p>
             <a:r>
               <a:rPr lang="en-US" dirty="0" smtClean="0"/>
-              <a:t>Scull et al., 2005 in The</a:t>
+              <a:t>Regression</a:t>
             </a:r>
             <a:r>
               <a:rPr lang="en-US" baseline="0" dirty="0" smtClean="0"/>
-              <a:t> Professional Geographer. This study compared </a:t>
+              <a:t> can also be used in geospatial models, such as regression kriging, geographically weighted regression, etc. It is common in the soil science field to </a:t>
             </a:r>
             <a:r>
               <a:rPr lang="en-US" baseline="0" dirty="0" err="1" smtClean="0"/>
-              <a:t>nonspatial</a:t>
+              <a:t>krige</a:t>
             </a:r>
             <a:r>
               <a:rPr lang="en-US" baseline="0" dirty="0" smtClean="0"/>
-              <a:t> statistical models with geospatial statistical models to predict A horizon gravel and surface fragments for a portion of the Pinto Basin in Joshua Tree National Park, CA. They concluded that MLR performed the best with a m</a:t>
-            </a:r>
-            <a:r>
-              <a:rPr lang="en-US" dirty="0" smtClean="0"/>
-              <a:t>ean jackknife RMSE of </a:t>
-            </a:r>
-            <a:r>
-              <a:rPr lang="en-US" baseline="0" dirty="0" smtClean="0"/>
-              <a:t>12.7% for A horizon gravel and 20.7% for rock fragments. </a:t>
-            </a:r>
-            <a:r>
-              <a:rPr lang="en-US" b="1" baseline="0" dirty="0" smtClean="0"/>
-              <a:t>Looking at the fitted vs actual values, what do you notice about their MLR model?</a:t>
-            </a:r>
-          </a:p>
-          <a:p>
-            <a:endParaRPr lang="en-US" baseline="0" dirty="0" smtClean="0"/>
-          </a:p>
-          <a:p>
-            <a:r>
-              <a:rPr lang="en-US" baseline="0" dirty="0" smtClean="0"/>
-              <a:t>-PCA of </a:t>
-            </a:r>
-            <a:r>
-              <a:rPr lang="en-US" baseline="0" dirty="0" err="1" smtClean="0"/>
-              <a:t>landsat</a:t>
-            </a:r>
-            <a:r>
-              <a:rPr lang="en-US" baseline="0" dirty="0" smtClean="0"/>
-              <a:t> was used in MLR models</a:t>
-            </a:r>
-          </a:p>
-          <a:p>
-            <a:r>
-              <a:rPr lang="en-US" baseline="0" dirty="0" smtClean="0"/>
-              <a:t>“the high standard deviations for the regression tree and geostatistical models show that they are more sensitive to outliers and data anomalies than other methods”</a:t>
-            </a:r>
-          </a:p>
-          <a:p>
-            <a:r>
-              <a:rPr lang="en-US" baseline="0" dirty="0" smtClean="0"/>
-              <a:t>“the discontinuous data pattern.” </a:t>
+              <a:t> the residuals of a model such as OLS and add them to the OLS model to better capture spatial variability in the model. </a:t>
             </a:r>
             <a:endParaRPr lang="en-US" dirty="0"/>
           </a:p>
@@ -1225,7 +1231,7 @@
           <a:p>
             <a:fld id="{CC5A1FCD-79C7-4337-B79E-A51417706FB1}" type="slidenum">
               <a:rPr lang="en-US" smtClean="0"/>
-              <a:t>20</a:t>
+              <a:t>21</a:t>
             </a:fld>
             <a:endParaRPr lang="en-US"/>
           </a:p>
@@ -1234,7 +1240,7 @@
     </p:spTree>
     <p:extLst>
       <p:ext uri="{BB962C8B-B14F-4D97-AF65-F5344CB8AC3E}">
-        <p14:creationId xmlns:p14="http://schemas.microsoft.com/office/powerpoint/2010/main" val="1991638967"/>
+        <p14:creationId xmlns:p14="http://schemas.microsoft.com/office/powerpoint/2010/main" val="1152817016"/>
       </p:ext>
     </p:extLst>
   </p:cSld>
@@ -1288,22 +1294,6 @@
           <a:bodyPr/>
           <a:lstStyle/>
           <a:p>
-            <a:r>
-              <a:rPr lang="en-US" dirty="0" smtClean="0"/>
-              <a:t>Regression</a:t>
-            </a:r>
-            <a:r>
-              <a:rPr lang="en-US" baseline="0" dirty="0" smtClean="0"/>
-              <a:t> can also be used in geospatial models, such as regression kriging, geographically weighted regression, etc. It is common in the soil science field to </a:t>
-            </a:r>
-            <a:r>
-              <a:rPr lang="en-US" baseline="0" dirty="0" err="1" smtClean="0"/>
-              <a:t>krige</a:t>
-            </a:r>
-            <a:r>
-              <a:rPr lang="en-US" baseline="0" dirty="0" smtClean="0"/>
-              <a:t> the residuals of a model such as OLS and add them to the OLS model to better capture spatial variability in the model. </a:t>
-            </a:r>
             <a:endParaRPr lang="en-US" dirty="0"/>
           </a:p>
         </p:txBody>
@@ -1325,7 +1315,7 @@
           <a:p>
             <a:fld id="{CC5A1FCD-79C7-4337-B79E-A51417706FB1}" type="slidenum">
               <a:rPr lang="en-US" smtClean="0"/>
-              <a:t>24</a:t>
+              <a:t>22</a:t>
             </a:fld>
             <a:endParaRPr lang="en-US"/>
           </a:p>
@@ -1334,7 +1324,7 @@
     </p:spTree>
     <p:extLst>
       <p:ext uri="{BB962C8B-B14F-4D97-AF65-F5344CB8AC3E}">
-        <p14:creationId xmlns:p14="http://schemas.microsoft.com/office/powerpoint/2010/main" val="1152817016"/>
+        <p14:creationId xmlns:p14="http://schemas.microsoft.com/office/powerpoint/2010/main" val="2613395863"/>
       </p:ext>
     </p:extLst>
   </p:cSld>
@@ -1388,7 +1378,70 @@
           <a:bodyPr/>
           <a:lstStyle/>
           <a:p>
-            <a:endParaRPr lang="en-US" dirty="0"/>
+            <a:pPr marL="0" marR="0" indent="0" algn="l" defTabSz="914400" rtl="0" eaLnBrk="1" fontAlgn="auto" latinLnBrk="0" hangingPunct="1">
+              <a:lnSpc>
+                <a:spcPct val="100000"/>
+              </a:lnSpc>
+              <a:spcBef>
+                <a:spcPts val="0"/>
+              </a:spcBef>
+              <a:spcAft>
+                <a:spcPts val="0"/>
+              </a:spcAft>
+              <a:buClrTx/>
+              <a:buSzTx/>
+              <a:buFontTx/>
+              <a:buNone/>
+              <a:tabLst/>
+              <a:defRPr/>
+            </a:pPr>
+            <a:r>
+              <a:rPr lang="en-US" altLang="en-US" b="0" dirty="0" smtClean="0"/>
+              <a:t>The Sum of Squares Regression (SSR) is the sum of the squared differences between the prediction for each observation and the population mean. (explained</a:t>
+            </a:r>
+            <a:r>
+              <a:rPr lang="en-US" altLang="en-US" b="0" baseline="0" dirty="0" smtClean="0"/>
+              <a:t> variation)</a:t>
+            </a:r>
+            <a:endParaRPr lang="en-US" altLang="en-US" b="0" dirty="0" smtClean="0"/>
+          </a:p>
+          <a:p>
+            <a:endParaRPr lang="en-US" b="0" dirty="0" smtClean="0"/>
+          </a:p>
+          <a:p>
+            <a:pPr eaLnBrk="1" hangingPunct="1">
+              <a:spcBef>
+                <a:spcPct val="50000"/>
+              </a:spcBef>
+            </a:pPr>
+            <a:r>
+              <a:rPr lang="en-US" altLang="en-US" b="0" dirty="0" smtClean="0"/>
+              <a:t>A least squares regression selects the line with the lowest total sum of squared prediction errors or SSE</a:t>
+            </a:r>
+            <a:r>
+              <a:rPr lang="en-US" altLang="en-US" b="0" baseline="0" dirty="0" smtClean="0"/>
+              <a:t> (unexplained variation)</a:t>
+            </a:r>
+          </a:p>
+          <a:p>
+            <a:pPr eaLnBrk="1" hangingPunct="1">
+              <a:spcBef>
+                <a:spcPct val="50000"/>
+              </a:spcBef>
+            </a:pPr>
+            <a:endParaRPr lang="en-US" altLang="en-US" b="0" baseline="0" dirty="0" smtClean="0"/>
+          </a:p>
+          <a:p>
+            <a:pPr eaLnBrk="1" hangingPunct="1">
+              <a:spcBef>
+                <a:spcPct val="50000"/>
+              </a:spcBef>
+            </a:pPr>
+            <a:r>
+              <a:rPr lang="en-US" altLang="en-US" b="0" baseline="0" dirty="0" smtClean="0"/>
+              <a:t>SST (total variation in y)</a:t>
+            </a:r>
+            <a:endParaRPr lang="en-US" altLang="en-US" b="0" dirty="0" smtClean="0"/>
           </a:p>
         </p:txBody>
       </p:sp>
@@ -1409,7 +1462,7 @@
           <a:p>
             <a:fld id="{CC5A1FCD-79C7-4337-B79E-A51417706FB1}" type="slidenum">
               <a:rPr lang="en-US" smtClean="0"/>
-              <a:t>25</a:t>
+              <a:t>24</a:t>
             </a:fld>
             <a:endParaRPr lang="en-US"/>
           </a:p>
@@ -1418,7 +1471,7 @@
     </p:spTree>
     <p:extLst>
       <p:ext uri="{BB962C8B-B14F-4D97-AF65-F5344CB8AC3E}">
-        <p14:creationId xmlns:p14="http://schemas.microsoft.com/office/powerpoint/2010/main" val="2613395863"/>
+        <p14:creationId xmlns:p14="http://schemas.microsoft.com/office/powerpoint/2010/main" val="975952257"/>
       </p:ext>
     </p:extLst>
   </p:cSld>
@@ -1472,70 +1525,7 @@
           <a:bodyPr/>
           <a:lstStyle/>
           <a:p>
-            <a:pPr marL="0" marR="0" indent="0" algn="l" defTabSz="914400" rtl="0" eaLnBrk="1" fontAlgn="auto" latinLnBrk="0" hangingPunct="1">
-              <a:lnSpc>
-                <a:spcPct val="100000"/>
-              </a:lnSpc>
-              <a:spcBef>
-                <a:spcPts val="0"/>
-              </a:spcBef>
-              <a:spcAft>
-                <a:spcPts val="0"/>
-              </a:spcAft>
-              <a:buClrTx/>
-              <a:buSzTx/>
-              <a:buFontTx/>
-              <a:buNone/>
-              <a:tabLst/>
-              <a:defRPr/>
-            </a:pPr>
-            <a:r>
-              <a:rPr lang="en-US" altLang="en-US" b="0" dirty="0" smtClean="0"/>
-              <a:t>The Sum of Squares Regression (SSR) is the sum of the squared differences between the prediction for each observation and the population mean. (explained</a:t>
-            </a:r>
-            <a:r>
-              <a:rPr lang="en-US" altLang="en-US" b="0" baseline="0" dirty="0" smtClean="0"/>
-              <a:t> variation)</a:t>
-            </a:r>
-            <a:endParaRPr lang="en-US" altLang="en-US" b="0" dirty="0" smtClean="0"/>
-          </a:p>
-          <a:p>
-            <a:endParaRPr lang="en-US" b="0" dirty="0" smtClean="0"/>
-          </a:p>
-          <a:p>
-            <a:pPr eaLnBrk="1" hangingPunct="1">
-              <a:spcBef>
-                <a:spcPct val="50000"/>
-              </a:spcBef>
-            </a:pPr>
-            <a:r>
-              <a:rPr lang="en-US" altLang="en-US" b="0" dirty="0" smtClean="0"/>
-              <a:t>A least squares regression selects the line with the lowest total sum of squared prediction errors or SSE</a:t>
-            </a:r>
-            <a:r>
-              <a:rPr lang="en-US" altLang="en-US" b="0" baseline="0" dirty="0" smtClean="0"/>
-              <a:t> (unexplained variation)</a:t>
-            </a:r>
-          </a:p>
-          <a:p>
-            <a:pPr eaLnBrk="1" hangingPunct="1">
-              <a:spcBef>
-                <a:spcPct val="50000"/>
-              </a:spcBef>
-            </a:pPr>
-            <a:endParaRPr lang="en-US" altLang="en-US" b="0" baseline="0" dirty="0" smtClean="0"/>
-          </a:p>
-          <a:p>
-            <a:pPr eaLnBrk="1" hangingPunct="1">
-              <a:spcBef>
-                <a:spcPct val="50000"/>
-              </a:spcBef>
-            </a:pPr>
-            <a:r>
-              <a:rPr lang="en-US" altLang="en-US" b="0" baseline="0" dirty="0" smtClean="0"/>
-              <a:t>SST (total variation in y)</a:t>
-            </a:r>
-            <a:endParaRPr lang="en-US" altLang="en-US" b="0" dirty="0" smtClean="0"/>
+            <a:endParaRPr lang="en-US" b="0" baseline="0" dirty="0" smtClean="0"/>
           </a:p>
         </p:txBody>
       </p:sp>
@@ -1556,7 +1546,7 @@
           <a:p>
             <a:fld id="{CC5A1FCD-79C7-4337-B79E-A51417706FB1}" type="slidenum">
               <a:rPr lang="en-US" smtClean="0"/>
-              <a:t>26</a:t>
+              <a:t>25</a:t>
             </a:fld>
             <a:endParaRPr lang="en-US"/>
           </a:p>
@@ -1565,7 +1555,7 @@
     </p:spTree>
     <p:extLst>
       <p:ext uri="{BB962C8B-B14F-4D97-AF65-F5344CB8AC3E}">
-        <p14:creationId xmlns:p14="http://schemas.microsoft.com/office/powerpoint/2010/main" val="975952257"/>
+        <p14:creationId xmlns:p14="http://schemas.microsoft.com/office/powerpoint/2010/main" val="3405494277"/>
       </p:ext>
     </p:extLst>
   </p:cSld>
@@ -1640,7 +1630,7 @@
           <a:p>
             <a:fld id="{CC5A1FCD-79C7-4337-B79E-A51417706FB1}" type="slidenum">
               <a:rPr lang="en-US" smtClean="0"/>
-              <a:t>27</a:t>
+              <a:t>26</a:t>
             </a:fld>
             <a:endParaRPr lang="en-US"/>
           </a:p>
@@ -1649,7 +1639,7 @@
     </p:spTree>
     <p:extLst>
       <p:ext uri="{BB962C8B-B14F-4D97-AF65-F5344CB8AC3E}">
-        <p14:creationId xmlns:p14="http://schemas.microsoft.com/office/powerpoint/2010/main" val="3405494277"/>
+        <p14:creationId xmlns:p14="http://schemas.microsoft.com/office/powerpoint/2010/main" val="229642298"/>
       </p:ext>
     </p:extLst>
   </p:cSld>
@@ -1734,90 +1724,6 @@
     <p:extLst>
       <p:ext uri="{BB962C8B-B14F-4D97-AF65-F5344CB8AC3E}">
         <p14:creationId xmlns:p14="http://schemas.microsoft.com/office/powerpoint/2010/main" val="3142198636"/>
-      </p:ext>
-    </p:extLst>
-  </p:cSld>
-  <p:clrMapOvr>
-    <a:masterClrMapping/>
-  </p:clrMapOvr>
-</p:notes>
-</file>
-
-<file path=ppt/notesSlides/notesSlide20.xml><?xml version="1.0" encoding="utf-8"?>
-<p:notes xmlns:a="http://schemas.openxmlformats.org/drawingml/2006/main" xmlns:r="http://schemas.openxmlformats.org/officeDocument/2006/relationships" xmlns:p="http://schemas.openxmlformats.org/presentationml/2006/main">
-  <p:cSld>
-    <p:spTree>
-      <p:nvGrpSpPr>
-        <p:cNvPr id="1" name=""/>
-        <p:cNvGrpSpPr/>
-        <p:nvPr/>
-      </p:nvGrpSpPr>
-      <p:grpSpPr>
-        <a:xfrm>
-          <a:off x="0" y="0"/>
-          <a:ext cx="0" cy="0"/>
-          <a:chOff x="0" y="0"/>
-          <a:chExt cx="0" cy="0"/>
-        </a:xfrm>
-      </p:grpSpPr>
-      <p:sp>
-        <p:nvSpPr>
-          <p:cNvPr id="2" name="Slide Image Placeholder 1"/>
-          <p:cNvSpPr>
-            <a:spLocks noGrp="1" noRot="1" noChangeAspect="1"/>
-          </p:cNvSpPr>
-          <p:nvPr>
-            <p:ph type="sldImg"/>
-          </p:nvPr>
-        </p:nvSpPr>
-        <p:spPr/>
-      </p:sp>
-      <p:sp>
-        <p:nvSpPr>
-          <p:cNvPr id="3" name="Notes Placeholder 2"/>
-          <p:cNvSpPr>
-            <a:spLocks noGrp="1"/>
-          </p:cNvSpPr>
-          <p:nvPr>
-            <p:ph type="body" idx="1"/>
-          </p:nvPr>
-        </p:nvSpPr>
-        <p:spPr/>
-        <p:txBody>
-          <a:bodyPr/>
-          <a:lstStyle/>
-          <a:p>
-            <a:endParaRPr lang="en-US" b="0" baseline="0" dirty="0" smtClean="0"/>
-          </a:p>
-        </p:txBody>
-      </p:sp>
-      <p:sp>
-        <p:nvSpPr>
-          <p:cNvPr id="4" name="Slide Number Placeholder 3"/>
-          <p:cNvSpPr>
-            <a:spLocks noGrp="1"/>
-          </p:cNvSpPr>
-          <p:nvPr>
-            <p:ph type="sldNum" sz="quarter" idx="10"/>
-          </p:nvPr>
-        </p:nvSpPr>
-        <p:spPr/>
-        <p:txBody>
-          <a:bodyPr/>
-          <a:lstStyle/>
-          <a:p>
-            <a:fld id="{CC5A1FCD-79C7-4337-B79E-A51417706FB1}" type="slidenum">
-              <a:rPr lang="en-US" smtClean="0"/>
-              <a:t>28</a:t>
-            </a:fld>
-            <a:endParaRPr lang="en-US"/>
-          </a:p>
-        </p:txBody>
-      </p:sp>
-    </p:spTree>
-    <p:extLst>
-      <p:ext uri="{BB962C8B-B14F-4D97-AF65-F5344CB8AC3E}">
-        <p14:creationId xmlns:p14="http://schemas.microsoft.com/office/powerpoint/2010/main" val="229642298"/>
       </p:ext>
     </p:extLst>
   </p:cSld>
@@ -3129,7 +3035,7 @@
           <a:p>
             <a:fld id="{97CFF939-70E9-4E47-9899-4E3DA2789027}" type="datetimeFigureOut">
               <a:rPr lang="en-US" smtClean="0"/>
-              <a:t>3/4/2016</a:t>
+              <a:t>3/6/2016</a:t>
             </a:fld>
             <a:endParaRPr lang="en-US"/>
           </a:p>
@@ -3321,7 +3227,7 @@
           <a:p>
             <a:fld id="{97CFF939-70E9-4E47-9899-4E3DA2789027}" type="datetimeFigureOut">
               <a:rPr lang="en-US" smtClean="0"/>
-              <a:t>3/4/2016</a:t>
+              <a:t>3/6/2016</a:t>
             </a:fld>
             <a:endParaRPr lang="en-US"/>
           </a:p>
@@ -3501,7 +3407,7 @@
           <a:p>
             <a:fld id="{97CFF939-70E9-4E47-9899-4E3DA2789027}" type="datetimeFigureOut">
               <a:rPr lang="en-US" smtClean="0"/>
-              <a:t>3/4/2016</a:t>
+              <a:t>3/6/2016</a:t>
             </a:fld>
             <a:endParaRPr lang="en-US"/>
           </a:p>
@@ -3671,7 +3577,7 @@
           <a:p>
             <a:fld id="{97CFF939-70E9-4E47-9899-4E3DA2789027}" type="datetimeFigureOut">
               <a:rPr lang="en-US" smtClean="0"/>
-              <a:t>3/4/2016</a:t>
+              <a:t>3/6/2016</a:t>
             </a:fld>
             <a:endParaRPr lang="en-US"/>
           </a:p>
@@ -3925,7 +3831,7 @@
           <a:p>
             <a:fld id="{97CFF939-70E9-4E47-9899-4E3DA2789027}" type="datetimeFigureOut">
               <a:rPr lang="en-US" smtClean="0"/>
-              <a:t>3/4/2016</a:t>
+              <a:t>3/6/2016</a:t>
             </a:fld>
             <a:endParaRPr lang="en-US"/>
           </a:p>
@@ -4251,7 +4157,7 @@
           <a:p>
             <a:fld id="{97CFF939-70E9-4E47-9899-4E3DA2789027}" type="datetimeFigureOut">
               <a:rPr lang="en-US" smtClean="0"/>
-              <a:t>3/4/2016</a:t>
+              <a:t>3/6/2016</a:t>
             </a:fld>
             <a:endParaRPr lang="en-US"/>
           </a:p>
@@ -4671,7 +4577,7 @@
           <a:p>
             <a:fld id="{97CFF939-70E9-4E47-9899-4E3DA2789027}" type="datetimeFigureOut">
               <a:rPr lang="en-US" smtClean="0"/>
-              <a:t>3/4/2016</a:t>
+              <a:t>3/6/2016</a:t>
             </a:fld>
             <a:endParaRPr lang="en-US"/>
           </a:p>
@@ -4789,7 +4695,7 @@
           <a:p>
             <a:fld id="{97CFF939-70E9-4E47-9899-4E3DA2789027}" type="datetimeFigureOut">
               <a:rPr lang="en-US" smtClean="0"/>
-              <a:t>3/4/2016</a:t>
+              <a:t>3/6/2016</a:t>
             </a:fld>
             <a:endParaRPr lang="en-US"/>
           </a:p>
@@ -4884,7 +4790,7 @@
           <a:p>
             <a:fld id="{97CFF939-70E9-4E47-9899-4E3DA2789027}" type="datetimeFigureOut">
               <a:rPr lang="en-US" smtClean="0"/>
-              <a:t>3/4/2016</a:t>
+              <a:t>3/6/2016</a:t>
             </a:fld>
             <a:endParaRPr lang="en-US"/>
           </a:p>
@@ -5171,7 +5077,7 @@
           <a:p>
             <a:fld id="{97CFF939-70E9-4E47-9899-4E3DA2789027}" type="datetimeFigureOut">
               <a:rPr lang="en-US" smtClean="0"/>
-              <a:t>3/4/2016</a:t>
+              <a:t>3/6/2016</a:t>
             </a:fld>
             <a:endParaRPr lang="en-US"/>
           </a:p>
@@ -5493,7 +5399,7 @@
           <a:p>
             <a:fld id="{97CFF939-70E9-4E47-9899-4E3DA2789027}" type="datetimeFigureOut">
               <a:rPr lang="en-US" smtClean="0"/>
-              <a:t>3/4/2016</a:t>
+              <a:t>3/6/2016</a:t>
             </a:fld>
             <a:endParaRPr lang="en-US"/>
           </a:p>
@@ -5747,7 +5653,7 @@
           <a:p>
             <a:fld id="{97CFF939-70E9-4E47-9899-4E3DA2789027}" type="datetimeFigureOut">
               <a:rPr lang="en-US" smtClean="0"/>
-              <a:t>3/4/2016</a:t>
+              <a:t>3/6/2016</a:t>
             </a:fld>
             <a:endParaRPr lang="en-US"/>
           </a:p>
@@ -9495,38 +9401,49 @@
           <a:bodyPr/>
           <a:lstStyle/>
           <a:p>
-            <a:r>
-              <a:rPr lang="en-US" dirty="0" smtClean="0"/>
-              <a:t>Summary</a:t>
-            </a:r>
-            <a:endParaRPr lang="en-US" dirty="0"/>
+            <a:endParaRPr lang="en-US"/>
+          </a:p>
+        </p:txBody>
+      </p:sp>
+      <p:sp>
+        <p:nvSpPr>
+          <p:cNvPr id="5" name="Content Placeholder 4"/>
+          <p:cNvSpPr>
+            <a:spLocks noGrp="1"/>
+          </p:cNvSpPr>
+          <p:nvPr>
+            <p:ph idx="1"/>
+          </p:nvPr>
+        </p:nvSpPr>
+        <p:spPr/>
+        <p:txBody>
+          <a:bodyPr/>
+          <a:lstStyle/>
+          <a:p>
+            <a:endParaRPr lang="en-US"/>
           </a:p>
         </p:txBody>
       </p:sp>
       <p:pic>
         <p:nvPicPr>
-          <p:cNvPr id="4" name="Content Placeholder 3"/>
+          <p:cNvPr id="7" name="Picture 6"/>
           <p:cNvPicPr>
             <a:picLocks noChangeAspect="1"/>
           </p:cNvPicPr>
           <p:nvPr/>
         </p:nvPicPr>
-        <p:blipFill>
+        <p:blipFill rotWithShape="1">
           <a:blip r:embed="rId3">
-            <a:extLst>
-              <a:ext uri="{28A0092B-C50C-407E-A947-70E740481C1C}">
-                <a14:useLocalDpi xmlns:a14="http://schemas.microsoft.com/office/drawing/2010/main" val="0"/>
-              </a:ext>
-            </a:extLst>
+            <a:grayscl/>
+            <a:lum contrast="20000"/>
           </a:blip>
-          <a:stretch>
-            <a:fillRect/>
-          </a:stretch>
+          <a:srcRect l="6562" r="9979" b="68041"/>
+          <a:stretch/>
         </p:blipFill>
         <p:spPr>
           <a:xfrm>
-            <a:off x="786765" y="1777032"/>
-            <a:ext cx="6765798" cy="4329524"/>
+            <a:off x="379716" y="1905000"/>
+            <a:ext cx="7579895" cy="3429000"/>
           </a:xfrm>
           <a:prstGeom prst="rect">
             <a:avLst/>
@@ -9535,64 +9452,38 @@
       </p:pic>
       <p:sp>
         <p:nvSpPr>
-          <p:cNvPr id="5" name="Rectangle 4"/>
-          <p:cNvSpPr/>
+          <p:cNvPr id="8" name="TextBox 7"/>
+          <p:cNvSpPr txBox="1"/>
           <p:nvPr/>
         </p:nvSpPr>
         <p:spPr>
           <a:xfrm>
-            <a:off x="0" y="6642556"/>
-            <a:ext cx="1140056" cy="215444"/>
+            <a:off x="0" y="6590677"/>
+            <a:ext cx="1164101" cy="246221"/>
           </a:xfrm>
           <a:prstGeom prst="rect">
             <a:avLst/>
           </a:prstGeom>
+          <a:noFill/>
         </p:spPr>
         <p:txBody>
-          <a:bodyPr wrap="none">
+          <a:bodyPr wrap="none" rtlCol="0">
             <a:spAutoFit/>
           </a:bodyPr>
           <a:lstStyle/>
           <a:p>
             <a:r>
-              <a:rPr lang="en-US" sz="800" dirty="0"/>
-              <a:t>http://xkcd.com/833/</a:t>
-            </a:r>
-          </a:p>
-        </p:txBody>
-      </p:sp>
-      <p:sp>
-        <p:nvSpPr>
-          <p:cNvPr id="6" name="Rectangle 5"/>
-          <p:cNvSpPr/>
-          <p:nvPr/>
-        </p:nvSpPr>
-        <p:spPr>
-          <a:xfrm>
-            <a:off x="1959764" y="6106556"/>
-            <a:ext cx="4419800" cy="369332"/>
-          </a:xfrm>
-          <a:prstGeom prst="rect">
-            <a:avLst/>
-          </a:prstGeom>
-        </p:spPr>
-        <p:txBody>
-          <a:bodyPr wrap="none">
-            <a:spAutoFit/>
-          </a:bodyPr>
-          <a:lstStyle/>
-          <a:p>
-            <a:r>
-              <a:rPr lang="en-US" dirty="0"/>
-              <a:t>Correlation does NOT imply Causation!</a:t>
-            </a:r>
+              <a:rPr lang="en-US" sz="1000" dirty="0" smtClean="0"/>
+              <a:t>Scull et al., 2005</a:t>
+            </a:r>
+            <a:endParaRPr lang="en-US" sz="1000" dirty="0"/>
           </a:p>
         </p:txBody>
       </p:sp>
     </p:spTree>
     <p:extLst>
       <p:ext uri="{BB962C8B-B14F-4D97-AF65-F5344CB8AC3E}">
-        <p14:creationId xmlns:p14="http://schemas.microsoft.com/office/powerpoint/2010/main" val="2719573860"/>
+        <p14:creationId xmlns:p14="http://schemas.microsoft.com/office/powerpoint/2010/main" val="2184580214"/>
       </p:ext>
     </p:extLst>
   </p:cSld>
@@ -10855,137 +10746,6 @@
           <a:bodyPr/>
           <a:lstStyle/>
           <a:p>
-            <a:endParaRPr lang="en-US"/>
-          </a:p>
-        </p:txBody>
-      </p:sp>
-      <p:sp>
-        <p:nvSpPr>
-          <p:cNvPr id="5" name="Content Placeholder 4"/>
-          <p:cNvSpPr>
-            <a:spLocks noGrp="1"/>
-          </p:cNvSpPr>
-          <p:nvPr>
-            <p:ph idx="1"/>
-          </p:nvPr>
-        </p:nvSpPr>
-        <p:spPr/>
-        <p:txBody>
-          <a:bodyPr/>
-          <a:lstStyle/>
-          <a:p>
-            <a:endParaRPr lang="en-US"/>
-          </a:p>
-        </p:txBody>
-      </p:sp>
-      <p:pic>
-        <p:nvPicPr>
-          <p:cNvPr id="7" name="Picture 6"/>
-          <p:cNvPicPr>
-            <a:picLocks noChangeAspect="1"/>
-          </p:cNvPicPr>
-          <p:nvPr/>
-        </p:nvPicPr>
-        <p:blipFill rotWithShape="1">
-          <a:blip r:embed="rId3">
-            <a:grayscl/>
-            <a:lum contrast="20000"/>
-          </a:blip>
-          <a:srcRect l="6562" r="9979" b="68041"/>
-          <a:stretch/>
-        </p:blipFill>
-        <p:spPr>
-          <a:xfrm>
-            <a:off x="379716" y="1905000"/>
-            <a:ext cx="7579895" cy="3429000"/>
-          </a:xfrm>
-          <a:prstGeom prst="rect">
-            <a:avLst/>
-          </a:prstGeom>
-        </p:spPr>
-      </p:pic>
-      <p:sp>
-        <p:nvSpPr>
-          <p:cNvPr id="8" name="TextBox 7"/>
-          <p:cNvSpPr txBox="1"/>
-          <p:nvPr/>
-        </p:nvSpPr>
-        <p:spPr>
-          <a:xfrm>
-            <a:off x="0" y="6590677"/>
-            <a:ext cx="1164101" cy="246221"/>
-          </a:xfrm>
-          <a:prstGeom prst="rect">
-            <a:avLst/>
-          </a:prstGeom>
-          <a:noFill/>
-        </p:spPr>
-        <p:txBody>
-          <a:bodyPr wrap="none" rtlCol="0">
-            <a:spAutoFit/>
-          </a:bodyPr>
-          <a:lstStyle/>
-          <a:p>
-            <a:r>
-              <a:rPr lang="en-US" sz="1000" dirty="0" smtClean="0"/>
-              <a:t>Scull et al., 2005</a:t>
-            </a:r>
-            <a:endParaRPr lang="en-US" sz="1000" dirty="0"/>
-          </a:p>
-        </p:txBody>
-      </p:sp>
-    </p:spTree>
-    <p:extLst>
-      <p:ext uri="{BB962C8B-B14F-4D97-AF65-F5344CB8AC3E}">
-        <p14:creationId xmlns:p14="http://schemas.microsoft.com/office/powerpoint/2010/main" val="2184580214"/>
-      </p:ext>
-    </p:extLst>
-  </p:cSld>
-  <p:clrMapOvr>
-    <a:masterClrMapping/>
-  </p:clrMapOvr>
-  <p:timing>
-    <p:tnLst>
-      <p:par>
-        <p:cTn id="1" dur="indefinite" restart="never" nodeType="tmRoot"/>
-      </p:par>
-    </p:tnLst>
-  </p:timing>
-</p:sld>
-</file>
-
-<file path=ppt/slides/slide21.xml><?xml version="1.0" encoding="utf-8"?>
-<p:sld xmlns:a="http://schemas.openxmlformats.org/drawingml/2006/main" xmlns:r="http://schemas.openxmlformats.org/officeDocument/2006/relationships" xmlns:p="http://schemas.openxmlformats.org/presentationml/2006/main">
-  <p:cSld>
-    <p:spTree>
-      <p:nvGrpSpPr>
-        <p:cNvPr id="1" name=""/>
-        <p:cNvGrpSpPr/>
-        <p:nvPr/>
-      </p:nvGrpSpPr>
-      <p:grpSpPr>
-        <a:xfrm>
-          <a:off x="0" y="0"/>
-          <a:ext cx="0" cy="0"/>
-          <a:chOff x="0" y="0"/>
-          <a:chExt cx="0" cy="0"/>
-        </a:xfrm>
-      </p:grpSpPr>
-      <p:sp>
-        <p:nvSpPr>
-          <p:cNvPr id="2" name="Title 1"/>
-          <p:cNvSpPr>
-            <a:spLocks noGrp="1"/>
-          </p:cNvSpPr>
-          <p:nvPr>
-            <p:ph type="title"/>
-          </p:nvPr>
-        </p:nvSpPr>
-        <p:spPr/>
-        <p:txBody>
-          <a:bodyPr/>
-          <a:lstStyle/>
-          <a:p>
             <a:r>
               <a:rPr lang="en-US" dirty="0" smtClean="0"/>
               <a:t>Summary</a:t>
@@ -11202,906 +10962,7 @@
 </p:sld>
 </file>
 
-<file path=ppt/slides/slide22.xml><?xml version="1.0" encoding="utf-8"?>
-<p:sld xmlns:a="http://schemas.openxmlformats.org/drawingml/2006/main" xmlns:r="http://schemas.openxmlformats.org/officeDocument/2006/relationships" xmlns:p="http://schemas.openxmlformats.org/presentationml/2006/main">
-  <p:cSld>
-    <p:spTree>
-      <p:nvGrpSpPr>
-        <p:cNvPr id="1" name=""/>
-        <p:cNvGrpSpPr/>
-        <p:nvPr/>
-      </p:nvGrpSpPr>
-      <p:grpSpPr>
-        <a:xfrm>
-          <a:off x="0" y="0"/>
-          <a:ext cx="0" cy="0"/>
-          <a:chOff x="0" y="0"/>
-          <a:chExt cx="0" cy="0"/>
-        </a:xfrm>
-      </p:grpSpPr>
-      <p:sp>
-        <p:nvSpPr>
-          <p:cNvPr id="2" name="Title 1"/>
-          <p:cNvSpPr>
-            <a:spLocks noGrp="1"/>
-          </p:cNvSpPr>
-          <p:nvPr>
-            <p:ph type="title"/>
-          </p:nvPr>
-        </p:nvSpPr>
-        <p:spPr/>
-        <p:txBody>
-          <a:bodyPr/>
-          <a:lstStyle/>
-          <a:p>
-            <a:r>
-              <a:rPr lang="en-US" dirty="0" smtClean="0"/>
-              <a:t>Linear Regression in R</a:t>
-            </a:r>
-            <a:endParaRPr lang="en-US" dirty="0"/>
-          </a:p>
-        </p:txBody>
-      </p:sp>
-      <p:sp>
-        <p:nvSpPr>
-          <p:cNvPr id="3" name="Content Placeholder 2"/>
-          <p:cNvSpPr>
-            <a:spLocks noGrp="1"/>
-          </p:cNvSpPr>
-          <p:nvPr>
-            <p:ph idx="1"/>
-          </p:nvPr>
-        </p:nvSpPr>
-        <p:spPr>
-          <a:xfrm>
-            <a:off x="946404" y="1828801"/>
-            <a:ext cx="7435596" cy="4351337"/>
-          </a:xfrm>
-        </p:spPr>
-        <p:txBody>
-          <a:bodyPr>
-            <a:normAutofit/>
-          </a:bodyPr>
-          <a:lstStyle/>
-          <a:p>
-            <a:pPr marL="0" indent="0" algn="ctr">
-              <a:lnSpc>
-                <a:spcPct val="120000"/>
-              </a:lnSpc>
-              <a:spcBef>
-                <a:spcPts val="0"/>
-              </a:spcBef>
-              <a:buNone/>
-            </a:pPr>
-            <a:r>
-              <a:rPr lang="en-US" sz="2400" b="1" i="1" dirty="0" smtClean="0">
-                <a:cs typeface="Times New Roman" panose="02020603050405020304" pitchFamily="18" charset="0"/>
-              </a:rPr>
-              <a:t>lm(formula, data)</a:t>
-            </a:r>
-          </a:p>
-          <a:p>
-            <a:pPr marL="0" indent="0">
-              <a:lnSpc>
-                <a:spcPct val="120000"/>
-              </a:lnSpc>
-              <a:spcBef>
-                <a:spcPts val="0"/>
-              </a:spcBef>
-              <a:buNone/>
-            </a:pPr>
-            <a:r>
-              <a:rPr lang="en-US" sz="2000" b="1" dirty="0" smtClean="0">
-                <a:cs typeface="Times New Roman" panose="02020603050405020304" pitchFamily="18" charset="0"/>
-              </a:rPr>
-              <a:t>formula </a:t>
-            </a:r>
-            <a:r>
-              <a:rPr lang="en-US" sz="2000" dirty="0" smtClean="0">
-                <a:cs typeface="Times New Roman" panose="02020603050405020304" pitchFamily="18" charset="0"/>
-              </a:rPr>
-              <a:t>    response~predictor1+predictor2+predictorx</a:t>
-            </a:r>
-            <a:endParaRPr lang="en-US" sz="2000" dirty="0">
-              <a:cs typeface="Times New Roman" panose="02020603050405020304" pitchFamily="18" charset="0"/>
-            </a:endParaRPr>
-          </a:p>
-          <a:p>
-            <a:pPr marL="0" indent="0">
-              <a:lnSpc>
-                <a:spcPct val="120000"/>
-              </a:lnSpc>
-              <a:spcBef>
-                <a:spcPts val="0"/>
-              </a:spcBef>
-              <a:buNone/>
-            </a:pPr>
-            <a:r>
-              <a:rPr lang="en-US" sz="2000" b="1" dirty="0" smtClean="0">
-                <a:cs typeface="Times New Roman" panose="02020603050405020304" pitchFamily="18" charset="0"/>
-              </a:rPr>
-              <a:t>data=</a:t>
-            </a:r>
-            <a:r>
-              <a:rPr lang="en-US" sz="2000" dirty="0">
-                <a:cs typeface="Times New Roman" panose="02020603050405020304" pitchFamily="18" charset="0"/>
-              </a:rPr>
-              <a:t>	</a:t>
-            </a:r>
-            <a:r>
-              <a:rPr lang="en-US" sz="2000" dirty="0" smtClean="0">
-                <a:cs typeface="Times New Roman" panose="02020603050405020304" pitchFamily="18" charset="0"/>
-              </a:rPr>
-              <a:t>       specifies </a:t>
-            </a:r>
-            <a:r>
-              <a:rPr lang="en-US" sz="2000" dirty="0">
-                <a:cs typeface="Times New Roman" panose="02020603050405020304" pitchFamily="18" charset="0"/>
-              </a:rPr>
-              <a:t>the </a:t>
-            </a:r>
-            <a:r>
-              <a:rPr lang="en-US" sz="2000" dirty="0" smtClean="0">
-                <a:cs typeface="Times New Roman" panose="02020603050405020304" pitchFamily="18" charset="0"/>
-              </a:rPr>
-              <a:t>dataset</a:t>
-            </a:r>
-            <a:endParaRPr lang="en-US" sz="2000" dirty="0">
-              <a:cs typeface="Times New Roman" panose="02020603050405020304" pitchFamily="18" charset="0"/>
-            </a:endParaRPr>
-          </a:p>
-          <a:p>
-            <a:pPr marL="0" indent="0">
-              <a:lnSpc>
-                <a:spcPct val="120000"/>
-              </a:lnSpc>
-              <a:spcBef>
-                <a:spcPts val="0"/>
-              </a:spcBef>
-              <a:buNone/>
-            </a:pPr>
-            <a:r>
-              <a:rPr lang="en-US" sz="2000" dirty="0">
-                <a:cs typeface="Times New Roman" panose="02020603050405020304" pitchFamily="18" charset="0"/>
-              </a:rPr>
-              <a:t>	</a:t>
-            </a:r>
-          </a:p>
-          <a:p>
-            <a:pPr marL="0" indent="0">
-              <a:lnSpc>
-                <a:spcPct val="120000"/>
-              </a:lnSpc>
-              <a:spcBef>
-                <a:spcPts val="0"/>
-              </a:spcBef>
-              <a:buNone/>
-            </a:pPr>
-            <a:r>
-              <a:rPr lang="en-US" sz="2000" dirty="0">
-                <a:cs typeface="Times New Roman" panose="02020603050405020304" pitchFamily="18" charset="0"/>
-              </a:rPr>
-              <a:t>	</a:t>
-            </a:r>
-          </a:p>
-          <a:p>
-            <a:pPr marL="0" indent="0">
-              <a:lnSpc>
-                <a:spcPct val="120000"/>
-              </a:lnSpc>
-              <a:spcBef>
-                <a:spcPts val="0"/>
-              </a:spcBef>
-              <a:buNone/>
-            </a:pPr>
-            <a:r>
-              <a:rPr lang="en-US" sz="2200" dirty="0">
-                <a:cs typeface="Times New Roman" panose="02020603050405020304" pitchFamily="18" charset="0"/>
-              </a:rPr>
-              <a:t>	</a:t>
-            </a:r>
-          </a:p>
-        </p:txBody>
-      </p:sp>
-      <p:graphicFrame>
-        <p:nvGraphicFramePr>
-          <p:cNvPr id="4" name="Table 3"/>
-          <p:cNvGraphicFramePr>
-            <a:graphicFrameLocks noGrp="1"/>
-          </p:cNvGraphicFramePr>
-          <p:nvPr>
-            <p:extLst>
-              <p:ext uri="{D42A27DB-BD31-4B8C-83A1-F6EECF244321}">
-                <p14:modId xmlns:p14="http://schemas.microsoft.com/office/powerpoint/2010/main" val="1658027818"/>
-              </p:ext>
-            </p:extLst>
-          </p:nvPr>
-        </p:nvGraphicFramePr>
-        <p:xfrm>
-          <a:off x="946404" y="3200400"/>
-          <a:ext cx="7316233" cy="1217107"/>
-        </p:xfrm>
-        <a:graphic>
-          <a:graphicData uri="http://schemas.openxmlformats.org/drawingml/2006/table">
-            <a:tbl>
-              <a:tblPr firstRow="1" bandRow="1">
-                <a:tableStyleId>{5940675A-B579-460E-94D1-54222C63F5DA}</a:tableStyleId>
-              </a:tblPr>
-              <a:tblGrid>
-                <a:gridCol w="1833111"/>
-                <a:gridCol w="5483122"/>
-              </a:tblGrid>
-              <a:tr h="516067">
-                <a:tc>
-                  <a:txBody>
-                    <a:bodyPr/>
-                    <a:lstStyle/>
-                    <a:p>
-                      <a:r>
-                        <a:rPr lang="en-US" sz="1900" b="1" dirty="0" smtClean="0">
-                          <a:solidFill>
-                            <a:schemeClr val="tx1"/>
-                          </a:solidFill>
-                          <a:latin typeface="+mn-lt"/>
-                        </a:rPr>
-                        <a:t>summary ( )</a:t>
-                      </a:r>
-                      <a:endParaRPr lang="en-US" sz="1900" b="1" dirty="0">
-                        <a:solidFill>
-                          <a:schemeClr val="tx1"/>
-                        </a:solidFill>
-                        <a:latin typeface="+mn-lt"/>
-                      </a:endParaRPr>
-                    </a:p>
-                  </a:txBody>
-                  <a:tcPr>
-                    <a:solidFill>
-                      <a:schemeClr val="bg1"/>
-                    </a:solidFill>
-                  </a:tcPr>
-                </a:tc>
-                <a:tc>
-                  <a:txBody>
-                    <a:bodyPr/>
-                    <a:lstStyle/>
-                    <a:p>
-                      <a:r>
-                        <a:rPr lang="en-US" sz="2000" dirty="0" smtClean="0"/>
-                        <a:t>detailed statistical summary</a:t>
-                      </a:r>
-                      <a:endParaRPr lang="en-US" sz="1900" dirty="0">
-                        <a:solidFill>
-                          <a:schemeClr val="tx1"/>
-                        </a:solidFill>
-                        <a:latin typeface="+mn-lt"/>
-                      </a:endParaRPr>
-                    </a:p>
-                  </a:txBody>
-                  <a:tcPr>
-                    <a:solidFill>
-                      <a:schemeClr val="bg1"/>
-                    </a:solidFill>
-                  </a:tcPr>
-                </a:tc>
-              </a:tr>
-              <a:tr h="291690">
-                <a:tc>
-                  <a:txBody>
-                    <a:bodyPr/>
-                    <a:lstStyle/>
-                    <a:p>
-                      <a:r>
-                        <a:rPr lang="en-US" sz="1900" b="1" dirty="0" smtClean="0">
-                          <a:solidFill>
-                            <a:schemeClr val="tx1"/>
-                          </a:solidFill>
-                          <a:latin typeface="+mn-lt"/>
-                        </a:rPr>
-                        <a:t>plot ( )</a:t>
-                      </a:r>
-                      <a:endParaRPr lang="en-US" sz="1900" b="1" dirty="0">
-                        <a:solidFill>
-                          <a:schemeClr val="tx1"/>
-                        </a:solidFill>
-                        <a:latin typeface="+mn-lt"/>
-                      </a:endParaRPr>
-                    </a:p>
-                  </a:txBody>
-                  <a:tcPr>
-                    <a:solidFill>
-                      <a:schemeClr val="bg1"/>
-                    </a:solidFill>
-                  </a:tcPr>
-                </a:tc>
-                <a:tc>
-                  <a:txBody>
-                    <a:bodyPr/>
-                    <a:lstStyle/>
-                    <a:p>
-                      <a:r>
-                        <a:rPr lang="en-US" sz="2000" dirty="0" smtClean="0"/>
-                        <a:t>a series of</a:t>
-                      </a:r>
-                      <a:r>
-                        <a:rPr lang="en-US" sz="2000" baseline="0" dirty="0" smtClean="0"/>
-                        <a:t> </a:t>
-                      </a:r>
-                      <a:r>
-                        <a:rPr lang="en-US" sz="2000" dirty="0" smtClean="0"/>
-                        <a:t>diagnostic plots,</a:t>
-                      </a:r>
-                      <a:r>
-                        <a:rPr lang="en-US" sz="2000" baseline="0" dirty="0" smtClean="0"/>
-                        <a:t> including leverage, residual, and QQ plots</a:t>
-                      </a:r>
-                      <a:endParaRPr lang="en-US" sz="1900" dirty="0">
-                        <a:solidFill>
-                          <a:schemeClr val="tx1"/>
-                        </a:solidFill>
-                        <a:latin typeface="+mn-lt"/>
-                      </a:endParaRPr>
-                    </a:p>
-                  </a:txBody>
-                  <a:tcPr>
-                    <a:solidFill>
-                      <a:schemeClr val="bg1"/>
-                    </a:solidFill>
-                  </a:tcPr>
-                </a:tc>
-              </a:tr>
-            </a:tbl>
-          </a:graphicData>
-        </a:graphic>
-      </p:graphicFrame>
-    </p:spTree>
-    <p:extLst>
-      <p:ext uri="{BB962C8B-B14F-4D97-AF65-F5344CB8AC3E}">
-        <p14:creationId xmlns:p14="http://schemas.microsoft.com/office/powerpoint/2010/main" val="1122672152"/>
-      </p:ext>
-    </p:extLst>
-  </p:cSld>
-  <p:clrMapOvr>
-    <a:masterClrMapping/>
-  </p:clrMapOvr>
-  <p:timing>
-    <p:tnLst>
-      <p:par>
-        <p:cTn id="1" dur="indefinite" restart="never" nodeType="tmRoot">
-          <p:childTnLst>
-            <p:seq concurrent="1" nextAc="seek">
-              <p:cTn id="2" dur="indefinite" nodeType="mainSeq">
-                <p:childTnLst>
-                  <p:par>
-                    <p:cTn id="3" fill="hold">
-                      <p:stCondLst>
-                        <p:cond delay="indefinite"/>
-                      </p:stCondLst>
-                      <p:childTnLst>
-                        <p:par>
-                          <p:cTn id="4" fill="hold">
-                            <p:stCondLst>
-                              <p:cond delay="0"/>
-                            </p:stCondLst>
-                            <p:childTnLst>
-                              <p:par>
-                                <p:cTn id="5" presetID="10" presetClass="entr" presetSubtype="0" fill="hold" nodeType="clickEffect">
-                                  <p:stCondLst>
-                                    <p:cond delay="0"/>
-                                  </p:stCondLst>
-                                  <p:childTnLst>
-                                    <p:set>
-                                      <p:cBhvr>
-                                        <p:cTn id="6" dur="1" fill="hold">
-                                          <p:stCondLst>
-                                            <p:cond delay="0"/>
-                                          </p:stCondLst>
-                                        </p:cTn>
-                                        <p:tgtEl>
-                                          <p:spTgt spid="4"/>
-                                        </p:tgtEl>
-                                        <p:attrNameLst>
-                                          <p:attrName>style.visibility</p:attrName>
-                                        </p:attrNameLst>
-                                      </p:cBhvr>
-                                      <p:to>
-                                        <p:strVal val="visible"/>
-                                      </p:to>
-                                    </p:set>
-                                    <p:animEffect transition="in" filter="fade">
-                                      <p:cBhvr>
-                                        <p:cTn id="7" dur="1000"/>
-                                        <p:tgtEl>
-                                          <p:spTgt spid="4"/>
-                                        </p:tgtEl>
-                                      </p:cBhvr>
-                                    </p:animEffect>
-                                  </p:childTnLst>
-                                </p:cTn>
-                              </p:par>
-                            </p:childTnLst>
-                          </p:cTn>
-                        </p:par>
-                      </p:childTnLst>
-                    </p:cTn>
-                  </p:par>
-                </p:childTnLst>
-              </p:cTn>
-              <p:prevCondLst>
-                <p:cond evt="onPrev" delay="0">
-                  <p:tgtEl>
-                    <p:sldTgt/>
-                  </p:tgtEl>
-                </p:cond>
-              </p:prevCondLst>
-              <p:nextCondLst>
-                <p:cond evt="onNext" delay="0">
-                  <p:tgtEl>
-                    <p:sldTgt/>
-                  </p:tgtEl>
-                </p:cond>
-              </p:nextCondLst>
-            </p:seq>
-          </p:childTnLst>
-        </p:cTn>
-      </p:par>
-    </p:tnLst>
-  </p:timing>
-</p:sld>
-</file>
-
-<file path=ppt/slides/slide23.xml><?xml version="1.0" encoding="utf-8"?>
-<p:sld xmlns:a="http://schemas.openxmlformats.org/drawingml/2006/main" xmlns:r="http://schemas.openxmlformats.org/officeDocument/2006/relationships" xmlns:p="http://schemas.openxmlformats.org/presentationml/2006/main">
-  <p:cSld>
-    <p:spTree>
-      <p:nvGrpSpPr>
-        <p:cNvPr id="1" name=""/>
-        <p:cNvGrpSpPr/>
-        <p:nvPr/>
-      </p:nvGrpSpPr>
-      <p:grpSpPr>
-        <a:xfrm>
-          <a:off x="0" y="0"/>
-          <a:ext cx="0" cy="0"/>
-          <a:chOff x="0" y="0"/>
-          <a:chExt cx="0" cy="0"/>
-        </a:xfrm>
-      </p:grpSpPr>
-      <p:sp>
-        <p:nvSpPr>
-          <p:cNvPr id="2" name="Title 1"/>
-          <p:cNvSpPr>
-            <a:spLocks noGrp="1"/>
-          </p:cNvSpPr>
-          <p:nvPr>
-            <p:ph type="title"/>
-          </p:nvPr>
-        </p:nvSpPr>
-        <p:spPr/>
-        <p:txBody>
-          <a:bodyPr/>
-          <a:lstStyle/>
-          <a:p>
-            <a:r>
-              <a:rPr lang="en-US" dirty="0" smtClean="0"/>
-              <a:t>Linear Regression in R – Diagnostic Tests</a:t>
-            </a:r>
-            <a:endParaRPr lang="en-US" dirty="0"/>
-          </a:p>
-        </p:txBody>
-      </p:sp>
-      <p:sp>
-        <p:nvSpPr>
-          <p:cNvPr id="3" name="Content Placeholder 2"/>
-          <p:cNvSpPr>
-            <a:spLocks noGrp="1"/>
-          </p:cNvSpPr>
-          <p:nvPr>
-            <p:ph idx="1"/>
-          </p:nvPr>
-        </p:nvSpPr>
-        <p:spPr>
-          <a:xfrm>
-            <a:off x="946404" y="1828801"/>
-            <a:ext cx="7435596" cy="4351337"/>
-          </a:xfrm>
-        </p:spPr>
-        <p:txBody>
-          <a:bodyPr>
-            <a:normAutofit/>
-          </a:bodyPr>
-          <a:lstStyle/>
-          <a:p>
-            <a:pPr marL="0" indent="0">
-              <a:lnSpc>
-                <a:spcPct val="120000"/>
-              </a:lnSpc>
-              <a:spcBef>
-                <a:spcPts val="0"/>
-              </a:spcBef>
-              <a:buNone/>
-            </a:pPr>
-            <a:r>
-              <a:rPr lang="en-US" sz="2000" dirty="0">
-                <a:cs typeface="Times New Roman" panose="02020603050405020304" pitchFamily="18" charset="0"/>
-              </a:rPr>
-              <a:t>	</a:t>
-            </a:r>
-          </a:p>
-          <a:p>
-            <a:pPr marL="0" indent="0">
-              <a:lnSpc>
-                <a:spcPct val="120000"/>
-              </a:lnSpc>
-              <a:spcBef>
-                <a:spcPts val="0"/>
-              </a:spcBef>
-              <a:buNone/>
-            </a:pPr>
-            <a:r>
-              <a:rPr lang="en-US" sz="2000" dirty="0">
-                <a:cs typeface="Times New Roman" panose="02020603050405020304" pitchFamily="18" charset="0"/>
-              </a:rPr>
-              <a:t>	</a:t>
-            </a:r>
-          </a:p>
-          <a:p>
-            <a:pPr marL="0" indent="0">
-              <a:lnSpc>
-                <a:spcPct val="120000"/>
-              </a:lnSpc>
-              <a:spcBef>
-                <a:spcPts val="0"/>
-              </a:spcBef>
-              <a:buNone/>
-            </a:pPr>
-            <a:r>
-              <a:rPr lang="en-US" sz="2200" dirty="0">
-                <a:cs typeface="Times New Roman" panose="02020603050405020304" pitchFamily="18" charset="0"/>
-              </a:rPr>
-              <a:t>	</a:t>
-            </a:r>
-          </a:p>
-        </p:txBody>
-      </p:sp>
-      <p:graphicFrame>
-        <p:nvGraphicFramePr>
-          <p:cNvPr id="4" name="Table 3"/>
-          <p:cNvGraphicFramePr>
-            <a:graphicFrameLocks noGrp="1"/>
-          </p:cNvGraphicFramePr>
-          <p:nvPr>
-            <p:extLst>
-              <p:ext uri="{D42A27DB-BD31-4B8C-83A1-F6EECF244321}">
-                <p14:modId xmlns:p14="http://schemas.microsoft.com/office/powerpoint/2010/main" val="99936133"/>
-              </p:ext>
-            </p:extLst>
-          </p:nvPr>
-        </p:nvGraphicFramePr>
-        <p:xfrm>
-          <a:off x="946404" y="1852864"/>
-          <a:ext cx="7316233" cy="1857187"/>
-        </p:xfrm>
-        <a:graphic>
-          <a:graphicData uri="http://schemas.openxmlformats.org/drawingml/2006/table">
-            <a:tbl>
-              <a:tblPr firstRow="1" bandRow="1">
-                <a:tableStyleId>{5940675A-B579-460E-94D1-54222C63F5DA}</a:tableStyleId>
-              </a:tblPr>
-              <a:tblGrid>
-                <a:gridCol w="1833111"/>
-                <a:gridCol w="5483122"/>
-              </a:tblGrid>
-              <a:tr h="516067">
-                <a:tc>
-                  <a:txBody>
-                    <a:bodyPr/>
-                    <a:lstStyle/>
-                    <a:p>
-                      <a:r>
-                        <a:rPr lang="en-US" sz="1900" b="1" dirty="0" err="1" smtClean="0">
-                          <a:solidFill>
-                            <a:schemeClr val="tx1"/>
-                          </a:solidFill>
-                          <a:latin typeface="+mn-lt"/>
-                        </a:rPr>
-                        <a:t>cor</a:t>
-                      </a:r>
-                      <a:r>
-                        <a:rPr lang="en-US" sz="1900" b="1" dirty="0" smtClean="0">
-                          <a:solidFill>
-                            <a:schemeClr val="tx1"/>
-                          </a:solidFill>
-                          <a:latin typeface="+mn-lt"/>
-                        </a:rPr>
-                        <a:t> ( )</a:t>
-                      </a:r>
-                      <a:endParaRPr lang="en-US" sz="1900" b="1" dirty="0">
-                        <a:solidFill>
-                          <a:schemeClr val="tx1"/>
-                        </a:solidFill>
-                        <a:latin typeface="+mn-lt"/>
-                      </a:endParaRPr>
-                    </a:p>
-                  </a:txBody>
-                  <a:tcPr>
-                    <a:solidFill>
-                      <a:schemeClr val="bg1"/>
-                    </a:solidFill>
-                  </a:tcPr>
-                </a:tc>
-                <a:tc>
-                  <a:txBody>
-                    <a:bodyPr/>
-                    <a:lstStyle/>
-                    <a:p>
-                      <a:r>
-                        <a:rPr lang="en-US" sz="1900" dirty="0" smtClean="0">
-                          <a:solidFill>
-                            <a:schemeClr val="tx1"/>
-                          </a:solidFill>
-                          <a:latin typeface="+mn-lt"/>
-                        </a:rPr>
-                        <a:t>correlation matrix</a:t>
-                      </a:r>
-                      <a:endParaRPr lang="en-US" sz="1900" dirty="0">
-                        <a:solidFill>
-                          <a:schemeClr val="tx1"/>
-                        </a:solidFill>
-                        <a:latin typeface="+mn-lt"/>
-                      </a:endParaRPr>
-                    </a:p>
-                  </a:txBody>
-                  <a:tcPr>
-                    <a:solidFill>
-                      <a:schemeClr val="bg1"/>
-                    </a:solidFill>
-                  </a:tcPr>
-                </a:tc>
-              </a:tr>
-              <a:tr h="291690">
-                <a:tc>
-                  <a:txBody>
-                    <a:bodyPr/>
-                    <a:lstStyle/>
-                    <a:p>
-                      <a:r>
-                        <a:rPr lang="en-US" sz="1900" b="1" dirty="0" err="1" smtClean="0">
-                          <a:solidFill>
-                            <a:schemeClr val="tx1"/>
-                          </a:solidFill>
-                          <a:latin typeface="+mn-lt"/>
-                        </a:rPr>
-                        <a:t>hist</a:t>
-                      </a:r>
-                      <a:r>
-                        <a:rPr lang="en-US" sz="1900" b="1" dirty="0" smtClean="0">
-                          <a:solidFill>
-                            <a:schemeClr val="tx1"/>
-                          </a:solidFill>
-                          <a:latin typeface="+mn-lt"/>
-                        </a:rPr>
-                        <a:t> ( )</a:t>
-                      </a:r>
-                      <a:endParaRPr lang="en-US" sz="1900" b="1" dirty="0">
-                        <a:solidFill>
-                          <a:schemeClr val="tx1"/>
-                        </a:solidFill>
-                        <a:latin typeface="+mn-lt"/>
-                      </a:endParaRPr>
-                    </a:p>
-                  </a:txBody>
-                  <a:tcPr>
-                    <a:solidFill>
-                      <a:schemeClr val="bg1"/>
-                    </a:solidFill>
-                  </a:tcPr>
-                </a:tc>
-                <a:tc>
-                  <a:txBody>
-                    <a:bodyPr/>
-                    <a:lstStyle/>
-                    <a:p>
-                      <a:r>
-                        <a:rPr lang="en-US" sz="1900" dirty="0" smtClean="0">
-                          <a:solidFill>
-                            <a:schemeClr val="tx1"/>
-                          </a:solidFill>
-                          <a:latin typeface="+mn-lt"/>
-                        </a:rPr>
-                        <a:t>histogram </a:t>
-                      </a:r>
-                      <a:endParaRPr lang="en-US" sz="1900" dirty="0">
-                        <a:solidFill>
-                          <a:schemeClr val="tx1"/>
-                        </a:solidFill>
-                        <a:latin typeface="+mn-lt"/>
-                      </a:endParaRPr>
-                    </a:p>
-                  </a:txBody>
-                  <a:tcPr>
-                    <a:solidFill>
-                      <a:schemeClr val="bg1"/>
-                    </a:solidFill>
-                  </a:tcPr>
-                </a:tc>
-              </a:tr>
-              <a:tr h="291690">
-                <a:tc>
-                  <a:txBody>
-                    <a:bodyPr/>
-                    <a:lstStyle/>
-                    <a:p>
-                      <a:r>
-                        <a:rPr lang="en-US" sz="1900" b="1" dirty="0" err="1" smtClean="0">
-                          <a:solidFill>
-                            <a:schemeClr val="tx1"/>
-                          </a:solidFill>
-                          <a:latin typeface="+mn-lt"/>
-                        </a:rPr>
-                        <a:t>vif</a:t>
-                      </a:r>
-                      <a:r>
-                        <a:rPr lang="en-US" sz="1900" b="1" dirty="0" smtClean="0">
-                          <a:solidFill>
-                            <a:schemeClr val="tx1"/>
-                          </a:solidFill>
-                          <a:latin typeface="+mn-lt"/>
-                        </a:rPr>
-                        <a:t> ( )</a:t>
-                      </a:r>
-                      <a:endParaRPr lang="en-US" sz="1900" b="1" dirty="0">
-                        <a:solidFill>
-                          <a:schemeClr val="tx1"/>
-                        </a:solidFill>
-                        <a:latin typeface="+mn-lt"/>
-                      </a:endParaRPr>
-                    </a:p>
-                  </a:txBody>
-                  <a:tcPr>
-                    <a:solidFill>
-                      <a:schemeClr val="bg1"/>
-                    </a:solidFill>
-                  </a:tcPr>
-                </a:tc>
-                <a:tc>
-                  <a:txBody>
-                    <a:bodyPr/>
-                    <a:lstStyle/>
-                    <a:p>
-                      <a:r>
-                        <a:rPr lang="en-US" sz="1900" dirty="0" smtClean="0">
-                          <a:solidFill>
-                            <a:schemeClr val="tx1"/>
-                          </a:solidFill>
-                          <a:latin typeface="+mn-lt"/>
-                        </a:rPr>
-                        <a:t>variance-inflation</a:t>
-                      </a:r>
-                      <a:r>
-                        <a:rPr lang="en-US" sz="1900" baseline="0" dirty="0" smtClean="0">
-                          <a:solidFill>
-                            <a:schemeClr val="tx1"/>
-                          </a:solidFill>
-                          <a:latin typeface="+mn-lt"/>
-                        </a:rPr>
-                        <a:t> and generalized variance inflation factors for linear and generalized linear models (in car package)</a:t>
-                      </a:r>
-                      <a:endParaRPr lang="en-US" sz="1900" dirty="0">
-                        <a:solidFill>
-                          <a:schemeClr val="tx1"/>
-                        </a:solidFill>
-                        <a:latin typeface="+mn-lt"/>
-                      </a:endParaRPr>
-                    </a:p>
-                  </a:txBody>
-                  <a:tcPr>
-                    <a:solidFill>
-                      <a:schemeClr val="bg1"/>
-                    </a:solidFill>
-                  </a:tcPr>
-                </a:tc>
-              </a:tr>
-            </a:tbl>
-          </a:graphicData>
-        </a:graphic>
-      </p:graphicFrame>
-    </p:spTree>
-    <p:extLst>
-      <p:ext uri="{BB962C8B-B14F-4D97-AF65-F5344CB8AC3E}">
-        <p14:creationId xmlns:p14="http://schemas.microsoft.com/office/powerpoint/2010/main" val="3056345969"/>
-      </p:ext>
-    </p:extLst>
-  </p:cSld>
-  <p:clrMapOvr>
-    <a:masterClrMapping/>
-  </p:clrMapOvr>
-  <p:timing>
-    <p:tnLst>
-      <p:par>
-        <p:cTn id="1" dur="indefinite" restart="never" nodeType="tmRoot">
-          <p:childTnLst>
-            <p:seq concurrent="1" nextAc="seek">
-              <p:cTn id="2" dur="indefinite" nodeType="mainSeq">
-                <p:childTnLst>
-                  <p:par>
-                    <p:cTn id="3" fill="hold">
-                      <p:stCondLst>
-                        <p:cond delay="indefinite"/>
-                      </p:stCondLst>
-                      <p:childTnLst>
-                        <p:par>
-                          <p:cTn id="4" fill="hold">
-                            <p:stCondLst>
-                              <p:cond delay="0"/>
-                            </p:stCondLst>
-                            <p:childTnLst>
-                              <p:par>
-                                <p:cTn id="5" presetID="10" presetClass="entr" presetSubtype="0" fill="hold" nodeType="clickEffect">
-                                  <p:stCondLst>
-                                    <p:cond delay="0"/>
-                                  </p:stCondLst>
-                                  <p:childTnLst>
-                                    <p:set>
-                                      <p:cBhvr>
-                                        <p:cTn id="6" dur="1" fill="hold">
-                                          <p:stCondLst>
-                                            <p:cond delay="0"/>
-                                          </p:stCondLst>
-                                        </p:cTn>
-                                        <p:tgtEl>
-                                          <p:spTgt spid="4"/>
-                                        </p:tgtEl>
-                                        <p:attrNameLst>
-                                          <p:attrName>style.visibility</p:attrName>
-                                        </p:attrNameLst>
-                                      </p:cBhvr>
-                                      <p:to>
-                                        <p:strVal val="visible"/>
-                                      </p:to>
-                                    </p:set>
-                                    <p:animEffect transition="in" filter="fade">
-                                      <p:cBhvr>
-                                        <p:cTn id="7" dur="1000"/>
-                                        <p:tgtEl>
-                                          <p:spTgt spid="4"/>
-                                        </p:tgtEl>
-                                      </p:cBhvr>
-                                    </p:animEffect>
-                                  </p:childTnLst>
-                                </p:cTn>
-                              </p:par>
-                            </p:childTnLst>
-                          </p:cTn>
-                        </p:par>
-                      </p:childTnLst>
-                    </p:cTn>
-                  </p:par>
-                </p:childTnLst>
-              </p:cTn>
-              <p:prevCondLst>
-                <p:cond evt="onPrev" delay="0">
-                  <p:tgtEl>
-                    <p:sldTgt/>
-                  </p:tgtEl>
-                </p:cond>
-              </p:prevCondLst>
-              <p:nextCondLst>
-                <p:cond evt="onNext" delay="0">
-                  <p:tgtEl>
-                    <p:sldTgt/>
-                  </p:tgtEl>
-                </p:cond>
-              </p:nextCondLst>
-            </p:seq>
-          </p:childTnLst>
-        </p:cTn>
-      </p:par>
-    </p:tnLst>
-  </p:timing>
-</p:sld>
-</file>
-
-<file path=ppt/slides/slide24.xml><?xml version="1.0" encoding="utf-8"?>
+<file path=ppt/slides/slide21.xml><?xml version="1.0" encoding="utf-8"?>
 <p:sld xmlns:a="http://schemas.openxmlformats.org/drawingml/2006/main" xmlns:r="http://schemas.openxmlformats.org/officeDocument/2006/relationships" xmlns:p="http://schemas.openxmlformats.org/presentationml/2006/main">
   <p:cSld>
     <p:spTree>
@@ -12269,7 +11130,7 @@
 </p:sld>
 </file>
 
-<file path=ppt/slides/slide25.xml><?xml version="1.0" encoding="utf-8"?>
+<file path=ppt/slides/slide22.xml><?xml version="1.0" encoding="utf-8"?>
 <p:sld xmlns:a="http://schemas.openxmlformats.org/drawingml/2006/main" xmlns:r="http://schemas.openxmlformats.org/officeDocument/2006/relationships" xmlns:p="http://schemas.openxmlformats.org/presentationml/2006/main">
   <p:cSld>
     <p:spTree>
@@ -13590,7 +12451,454 @@
 </p:sld>
 </file>
 
-<file path=ppt/slides/slide26.xml><?xml version="1.0" encoding="utf-8"?>
+<file path=ppt/slides/slide23.xml><?xml version="1.0" encoding="utf-8"?>
+<p:sld xmlns:a="http://schemas.openxmlformats.org/drawingml/2006/main" xmlns:r="http://schemas.openxmlformats.org/officeDocument/2006/relationships" xmlns:p="http://schemas.openxmlformats.org/presentationml/2006/main">
+  <p:cSld>
+    <p:spTree>
+      <p:nvGrpSpPr>
+        <p:cNvPr id="1" name=""/>
+        <p:cNvGrpSpPr/>
+        <p:nvPr/>
+      </p:nvGrpSpPr>
+      <p:grpSpPr>
+        <a:xfrm>
+          <a:off x="0" y="0"/>
+          <a:ext cx="0" cy="0"/>
+          <a:chOff x="0" y="0"/>
+          <a:chExt cx="0" cy="0"/>
+        </a:xfrm>
+      </p:grpSpPr>
+      <p:sp>
+        <p:nvSpPr>
+          <p:cNvPr id="2" name="Title 1"/>
+          <p:cNvSpPr>
+            <a:spLocks noGrp="1"/>
+          </p:cNvSpPr>
+          <p:nvPr>
+            <p:ph type="title"/>
+          </p:nvPr>
+        </p:nvSpPr>
+        <p:spPr/>
+        <p:txBody>
+          <a:bodyPr/>
+          <a:lstStyle/>
+          <a:p>
+            <a:r>
+              <a:rPr lang="en-US" dirty="0" smtClean="0"/>
+              <a:t>Linear Regression in R</a:t>
+            </a:r>
+            <a:endParaRPr lang="en-US" dirty="0"/>
+          </a:p>
+        </p:txBody>
+      </p:sp>
+      <p:sp>
+        <p:nvSpPr>
+          <p:cNvPr id="3" name="Content Placeholder 2"/>
+          <p:cNvSpPr>
+            <a:spLocks noGrp="1"/>
+          </p:cNvSpPr>
+          <p:nvPr>
+            <p:ph idx="1"/>
+          </p:nvPr>
+        </p:nvSpPr>
+        <p:spPr>
+          <a:xfrm>
+            <a:off x="946404" y="1828801"/>
+            <a:ext cx="7435596" cy="4351337"/>
+          </a:xfrm>
+        </p:spPr>
+        <p:txBody>
+          <a:bodyPr>
+            <a:normAutofit/>
+          </a:bodyPr>
+          <a:lstStyle/>
+          <a:p>
+            <a:pPr marL="0" indent="0" algn="ctr">
+              <a:lnSpc>
+                <a:spcPct val="120000"/>
+              </a:lnSpc>
+              <a:spcBef>
+                <a:spcPts val="0"/>
+              </a:spcBef>
+              <a:buNone/>
+            </a:pPr>
+            <a:r>
+              <a:rPr lang="en-US" sz="2400" b="1" i="1" dirty="0" smtClean="0">
+                <a:cs typeface="Times New Roman" panose="02020603050405020304" pitchFamily="18" charset="0"/>
+              </a:rPr>
+              <a:t>lm(formula, data)</a:t>
+            </a:r>
+          </a:p>
+          <a:p>
+            <a:pPr marL="0" indent="0">
+              <a:lnSpc>
+                <a:spcPct val="120000"/>
+              </a:lnSpc>
+              <a:spcBef>
+                <a:spcPts val="0"/>
+              </a:spcBef>
+              <a:buNone/>
+            </a:pPr>
+            <a:r>
+              <a:rPr lang="en-US" sz="2000" b="1" dirty="0" smtClean="0">
+                <a:cs typeface="Times New Roman" panose="02020603050405020304" pitchFamily="18" charset="0"/>
+              </a:rPr>
+              <a:t>formula </a:t>
+            </a:r>
+            <a:r>
+              <a:rPr lang="en-US" sz="2000" dirty="0" smtClean="0">
+                <a:cs typeface="Times New Roman" panose="02020603050405020304" pitchFamily="18" charset="0"/>
+              </a:rPr>
+              <a:t>    response~predictor1+predictor2+predictorx</a:t>
+            </a:r>
+            <a:endParaRPr lang="en-US" sz="2000" dirty="0">
+              <a:cs typeface="Times New Roman" panose="02020603050405020304" pitchFamily="18" charset="0"/>
+            </a:endParaRPr>
+          </a:p>
+          <a:p>
+            <a:pPr marL="0" indent="0">
+              <a:lnSpc>
+                <a:spcPct val="120000"/>
+              </a:lnSpc>
+              <a:spcBef>
+                <a:spcPts val="0"/>
+              </a:spcBef>
+              <a:buNone/>
+            </a:pPr>
+            <a:r>
+              <a:rPr lang="en-US" sz="2000" b="1" dirty="0" smtClean="0">
+                <a:cs typeface="Times New Roman" panose="02020603050405020304" pitchFamily="18" charset="0"/>
+              </a:rPr>
+              <a:t>data=</a:t>
+            </a:r>
+            <a:r>
+              <a:rPr lang="en-US" sz="2000" dirty="0">
+                <a:cs typeface="Times New Roman" panose="02020603050405020304" pitchFamily="18" charset="0"/>
+              </a:rPr>
+              <a:t>	</a:t>
+            </a:r>
+            <a:r>
+              <a:rPr lang="en-US" sz="2000" dirty="0" smtClean="0">
+                <a:cs typeface="Times New Roman" panose="02020603050405020304" pitchFamily="18" charset="0"/>
+              </a:rPr>
+              <a:t>       specifies </a:t>
+            </a:r>
+            <a:r>
+              <a:rPr lang="en-US" sz="2000" dirty="0">
+                <a:cs typeface="Times New Roman" panose="02020603050405020304" pitchFamily="18" charset="0"/>
+              </a:rPr>
+              <a:t>the </a:t>
+            </a:r>
+            <a:r>
+              <a:rPr lang="en-US" sz="2000" dirty="0" smtClean="0">
+                <a:cs typeface="Times New Roman" panose="02020603050405020304" pitchFamily="18" charset="0"/>
+              </a:rPr>
+              <a:t>dataset</a:t>
+            </a:r>
+            <a:endParaRPr lang="en-US" sz="2000" dirty="0">
+              <a:cs typeface="Times New Roman" panose="02020603050405020304" pitchFamily="18" charset="0"/>
+            </a:endParaRPr>
+          </a:p>
+          <a:p>
+            <a:pPr marL="0" indent="0">
+              <a:lnSpc>
+                <a:spcPct val="120000"/>
+              </a:lnSpc>
+              <a:spcBef>
+                <a:spcPts val="0"/>
+              </a:spcBef>
+              <a:buNone/>
+            </a:pPr>
+            <a:r>
+              <a:rPr lang="en-US" sz="2000" dirty="0">
+                <a:cs typeface="Times New Roman" panose="02020603050405020304" pitchFamily="18" charset="0"/>
+              </a:rPr>
+              <a:t>	</a:t>
+            </a:r>
+          </a:p>
+          <a:p>
+            <a:pPr marL="0" indent="0">
+              <a:lnSpc>
+                <a:spcPct val="120000"/>
+              </a:lnSpc>
+              <a:spcBef>
+                <a:spcPts val="0"/>
+              </a:spcBef>
+              <a:buNone/>
+            </a:pPr>
+            <a:r>
+              <a:rPr lang="en-US" sz="2000" dirty="0">
+                <a:cs typeface="Times New Roman" panose="02020603050405020304" pitchFamily="18" charset="0"/>
+              </a:rPr>
+              <a:t>	</a:t>
+            </a:r>
+          </a:p>
+          <a:p>
+            <a:pPr marL="0" indent="0">
+              <a:lnSpc>
+                <a:spcPct val="120000"/>
+              </a:lnSpc>
+              <a:spcBef>
+                <a:spcPts val="0"/>
+              </a:spcBef>
+              <a:buNone/>
+            </a:pPr>
+            <a:r>
+              <a:rPr lang="en-US" sz="2200" dirty="0">
+                <a:cs typeface="Times New Roman" panose="02020603050405020304" pitchFamily="18" charset="0"/>
+              </a:rPr>
+              <a:t>	</a:t>
+            </a:r>
+          </a:p>
+        </p:txBody>
+      </p:sp>
+      <p:graphicFrame>
+        <p:nvGraphicFramePr>
+          <p:cNvPr id="4" name="Table 3"/>
+          <p:cNvGraphicFramePr>
+            <a:graphicFrameLocks noGrp="1"/>
+          </p:cNvGraphicFramePr>
+          <p:nvPr>
+            <p:extLst>
+              <p:ext uri="{D42A27DB-BD31-4B8C-83A1-F6EECF244321}">
+                <p14:modId xmlns:p14="http://schemas.microsoft.com/office/powerpoint/2010/main" val="1658027818"/>
+              </p:ext>
+            </p:extLst>
+          </p:nvPr>
+        </p:nvGraphicFramePr>
+        <p:xfrm>
+          <a:off x="946404" y="3200400"/>
+          <a:ext cx="7316233" cy="1217107"/>
+        </p:xfrm>
+        <a:graphic>
+          <a:graphicData uri="http://schemas.openxmlformats.org/drawingml/2006/table">
+            <a:tbl>
+              <a:tblPr firstRow="1" bandRow="1">
+                <a:tableStyleId>{5940675A-B579-460E-94D1-54222C63F5DA}</a:tableStyleId>
+              </a:tblPr>
+              <a:tblGrid>
+                <a:gridCol w="1833111"/>
+                <a:gridCol w="5483122"/>
+              </a:tblGrid>
+              <a:tr h="516067">
+                <a:tc>
+                  <a:txBody>
+                    <a:bodyPr/>
+                    <a:lstStyle/>
+                    <a:p>
+                      <a:r>
+                        <a:rPr lang="en-US" sz="1900" b="1" dirty="0" smtClean="0">
+                          <a:solidFill>
+                            <a:schemeClr val="tx1"/>
+                          </a:solidFill>
+                          <a:latin typeface="+mn-lt"/>
+                        </a:rPr>
+                        <a:t>summary ( )</a:t>
+                      </a:r>
+                      <a:endParaRPr lang="en-US" sz="1900" b="1" dirty="0">
+                        <a:solidFill>
+                          <a:schemeClr val="tx1"/>
+                        </a:solidFill>
+                        <a:latin typeface="+mn-lt"/>
+                      </a:endParaRPr>
+                    </a:p>
+                  </a:txBody>
+                  <a:tcPr>
+                    <a:solidFill>
+                      <a:schemeClr val="bg1"/>
+                    </a:solidFill>
+                  </a:tcPr>
+                </a:tc>
+                <a:tc>
+                  <a:txBody>
+                    <a:bodyPr/>
+                    <a:lstStyle/>
+                    <a:p>
+                      <a:r>
+                        <a:rPr lang="en-US" sz="2000" dirty="0" smtClean="0"/>
+                        <a:t>detailed statistical summary</a:t>
+                      </a:r>
+                      <a:endParaRPr lang="en-US" sz="1900" dirty="0">
+                        <a:solidFill>
+                          <a:schemeClr val="tx1"/>
+                        </a:solidFill>
+                        <a:latin typeface="+mn-lt"/>
+                      </a:endParaRPr>
+                    </a:p>
+                  </a:txBody>
+                  <a:tcPr>
+                    <a:solidFill>
+                      <a:schemeClr val="bg1"/>
+                    </a:solidFill>
+                  </a:tcPr>
+                </a:tc>
+              </a:tr>
+              <a:tr h="291690">
+                <a:tc>
+                  <a:txBody>
+                    <a:bodyPr/>
+                    <a:lstStyle/>
+                    <a:p>
+                      <a:r>
+                        <a:rPr lang="en-US" sz="1900" b="1" dirty="0" smtClean="0">
+                          <a:solidFill>
+                            <a:schemeClr val="tx1"/>
+                          </a:solidFill>
+                          <a:latin typeface="+mn-lt"/>
+                        </a:rPr>
+                        <a:t>plot ( )</a:t>
+                      </a:r>
+                      <a:endParaRPr lang="en-US" sz="1900" b="1" dirty="0">
+                        <a:solidFill>
+                          <a:schemeClr val="tx1"/>
+                        </a:solidFill>
+                        <a:latin typeface="+mn-lt"/>
+                      </a:endParaRPr>
+                    </a:p>
+                  </a:txBody>
+                  <a:tcPr>
+                    <a:solidFill>
+                      <a:schemeClr val="bg1"/>
+                    </a:solidFill>
+                  </a:tcPr>
+                </a:tc>
+                <a:tc>
+                  <a:txBody>
+                    <a:bodyPr/>
+                    <a:lstStyle/>
+                    <a:p>
+                      <a:r>
+                        <a:rPr lang="en-US" sz="2000" dirty="0" smtClean="0"/>
+                        <a:t>a series of</a:t>
+                      </a:r>
+                      <a:r>
+                        <a:rPr lang="en-US" sz="2000" baseline="0" dirty="0" smtClean="0"/>
+                        <a:t> </a:t>
+                      </a:r>
+                      <a:r>
+                        <a:rPr lang="en-US" sz="2000" dirty="0" smtClean="0"/>
+                        <a:t>diagnostic plots,</a:t>
+                      </a:r>
+                      <a:r>
+                        <a:rPr lang="en-US" sz="2000" baseline="0" dirty="0" smtClean="0"/>
+                        <a:t> including leverage, residual, and QQ plots</a:t>
+                      </a:r>
+                      <a:endParaRPr lang="en-US" sz="1900" dirty="0">
+                        <a:solidFill>
+                          <a:schemeClr val="tx1"/>
+                        </a:solidFill>
+                        <a:latin typeface="+mn-lt"/>
+                      </a:endParaRPr>
+                    </a:p>
+                  </a:txBody>
+                  <a:tcPr>
+                    <a:solidFill>
+                      <a:schemeClr val="bg1"/>
+                    </a:solidFill>
+                  </a:tcPr>
+                </a:tc>
+              </a:tr>
+            </a:tbl>
+          </a:graphicData>
+        </a:graphic>
+      </p:graphicFrame>
+    </p:spTree>
+    <p:extLst>
+      <p:ext uri="{BB962C8B-B14F-4D97-AF65-F5344CB8AC3E}">
+        <p14:creationId xmlns:p14="http://schemas.microsoft.com/office/powerpoint/2010/main" val="1122672152"/>
+      </p:ext>
+    </p:extLst>
+  </p:cSld>
+  <p:clrMapOvr>
+    <a:masterClrMapping/>
+  </p:clrMapOvr>
+  <p:timing>
+    <p:tnLst>
+      <p:par>
+        <p:cTn id="1" dur="indefinite" restart="never" nodeType="tmRoot">
+          <p:childTnLst>
+            <p:seq concurrent="1" nextAc="seek">
+              <p:cTn id="2" dur="indefinite" nodeType="mainSeq">
+                <p:childTnLst>
+                  <p:par>
+                    <p:cTn id="3" fill="hold">
+                      <p:stCondLst>
+                        <p:cond delay="indefinite"/>
+                      </p:stCondLst>
+                      <p:childTnLst>
+                        <p:par>
+                          <p:cTn id="4" fill="hold">
+                            <p:stCondLst>
+                              <p:cond delay="0"/>
+                            </p:stCondLst>
+                            <p:childTnLst>
+                              <p:par>
+                                <p:cTn id="5" presetID="10" presetClass="entr" presetSubtype="0" fill="hold" nodeType="clickEffect">
+                                  <p:stCondLst>
+                                    <p:cond delay="0"/>
+                                  </p:stCondLst>
+                                  <p:childTnLst>
+                                    <p:set>
+                                      <p:cBhvr>
+                                        <p:cTn id="6" dur="1" fill="hold">
+                                          <p:stCondLst>
+                                            <p:cond delay="0"/>
+                                          </p:stCondLst>
+                                        </p:cTn>
+                                        <p:tgtEl>
+                                          <p:spTgt spid="4"/>
+                                        </p:tgtEl>
+                                        <p:attrNameLst>
+                                          <p:attrName>style.visibility</p:attrName>
+                                        </p:attrNameLst>
+                                      </p:cBhvr>
+                                      <p:to>
+                                        <p:strVal val="visible"/>
+                                      </p:to>
+                                    </p:set>
+                                    <p:animEffect transition="in" filter="fade">
+                                      <p:cBhvr>
+                                        <p:cTn id="7" dur="1000"/>
+                                        <p:tgtEl>
+                                          <p:spTgt spid="4"/>
+                                        </p:tgtEl>
+                                      </p:cBhvr>
+                                    </p:animEffect>
+                                  </p:childTnLst>
+                                </p:cTn>
+                              </p:par>
+                            </p:childTnLst>
+                          </p:cTn>
+                        </p:par>
+                      </p:childTnLst>
+                    </p:cTn>
+                  </p:par>
+                </p:childTnLst>
+              </p:cTn>
+              <p:prevCondLst>
+                <p:cond evt="onPrev" delay="0">
+                  <p:tgtEl>
+                    <p:sldTgt/>
+                  </p:tgtEl>
+                </p:cond>
+              </p:prevCondLst>
+              <p:nextCondLst>
+                <p:cond evt="onNext" delay="0">
+                  <p:tgtEl>
+                    <p:sldTgt/>
+                  </p:tgtEl>
+                </p:cond>
+              </p:nextCondLst>
+            </p:seq>
+          </p:childTnLst>
+        </p:cTn>
+      </p:par>
+    </p:tnLst>
+  </p:timing>
+</p:sld>
+</file>
+
+<file path=ppt/slides/slide24.xml><?xml version="1.0" encoding="utf-8"?>
 <p:sld xmlns:a="http://schemas.openxmlformats.org/drawingml/2006/main" xmlns:r="http://schemas.openxmlformats.org/officeDocument/2006/relationships" xmlns:p="http://schemas.openxmlformats.org/presentationml/2006/main">
   <p:cSld>
     <p:spTree>
@@ -14212,7 +13520,7 @@
 </p:sld>
 </file>
 
-<file path=ppt/slides/slide27.xml><?xml version="1.0" encoding="utf-8"?>
+<file path=ppt/slides/slide25.xml><?xml version="1.0" encoding="utf-8"?>
 <p:sld xmlns:a="http://schemas.openxmlformats.org/drawingml/2006/main" xmlns:r="http://schemas.openxmlformats.org/officeDocument/2006/relationships" xmlns:p="http://schemas.openxmlformats.org/presentationml/2006/main">
   <p:cSld>
     <p:spTree>
@@ -15108,7 +14416,7 @@
 </p:sld>
 </file>
 
-<file path=ppt/slides/slide28.xml><?xml version="1.0" encoding="utf-8"?>
+<file path=ppt/slides/slide26.xml><?xml version="1.0" encoding="utf-8"?>
 <p:sld xmlns:a="http://schemas.openxmlformats.org/drawingml/2006/main" xmlns:r="http://schemas.openxmlformats.org/officeDocument/2006/relationships" xmlns:p="http://schemas.openxmlformats.org/presentationml/2006/main">
   <p:cSld>
     <p:spTree>
@@ -15286,7 +14594,7 @@
 </p:sld>
 </file>
 
-<file path=ppt/slides/slide29.xml><?xml version="1.0" encoding="utf-8"?>
+<file path=ppt/slides/slide27.xml><?xml version="1.0" encoding="utf-8"?>
 <p:sld xmlns:a="http://schemas.openxmlformats.org/drawingml/2006/main" xmlns:r="http://schemas.openxmlformats.org/officeDocument/2006/relationships" xmlns:p="http://schemas.openxmlformats.org/presentationml/2006/main">
   <p:cSld>
     <p:spTree>

</xml_diff>

<commit_message>
minor edits for clarification to linear regression ppt
</commit_message>
<xml_diff>
--- a/presentations/6_linear_regression/Linear_regression.pptx
+++ b/presentations/6_linear_regression/Linear_regression.pptx
@@ -234,7 +234,7 @@
           <a:p>
             <a:fld id="{2793983C-EFA1-41D2-8DCF-4CEF34100D6A}" type="datetimeFigureOut">
               <a:rPr lang="en-US" smtClean="0"/>
-              <a:t>3/6/2016</a:t>
+              <a:t>3/7/2016</a:t>
             </a:fld>
             <a:endParaRPr lang="en-US"/>
           </a:p>
@@ -954,20 +954,63 @@
           <a:lstStyle/>
           <a:p>
             <a:r>
+              <a:rPr lang="en-US" sz="1200" b="1" kern="1200" dirty="0" smtClean="0">
+                <a:solidFill>
+                  <a:schemeClr val="tx1"/>
+                </a:solidFill>
+                <a:effectLst/>
+                <a:latin typeface="+mn-lt"/>
+                <a:ea typeface="+mn-ea"/>
+                <a:cs typeface="+mn-cs"/>
+              </a:rPr>
+              <a:t>Leverage points</a:t>
+            </a:r>
+            <a:r>
               <a:rPr lang="en-US" dirty="0" smtClean="0"/>
-              <a:t>Unlike the other plots, this time patterns are irrelevant. Leverage is a measure of how much each data point influences the regression. Because the regression must pass through the centroid, points that lie far from the centroid have greater leverage, and their leverage increases if there are fewer points nearby. As a result, leverage reflects both the distance from the centroid and the isolation of a point. The plot also shows values of Cook’s distance, which measures how much the regression would change if a point was deleted. Cook’s distance is increased by leverage and by large residuals: a point far from the centroid with a large residual can severely alter the regression. On this plot, you want to see that the red smoothed line stays close to the horizontal gray dashed line and that no points have a large Cook’s distance (</a:t>
-            </a:r>
-            <a:r>
-              <a:rPr lang="en-US" dirty="0" err="1" smtClean="0"/>
-              <a:t>i.e</a:t>
+              <a:t>: A leverage point is defined as an observation that has a value of x that is far away from the mean of x. </a:t>
+            </a:r>
+          </a:p>
+          <a:p>
+            <a:r>
+              <a:rPr lang="en-US" sz="1200" b="1" kern="1200" dirty="0" smtClean="0">
+                <a:solidFill>
+                  <a:schemeClr val="tx1"/>
+                </a:solidFill>
+                <a:effectLst/>
+                <a:latin typeface="+mn-lt"/>
+                <a:ea typeface="+mn-ea"/>
+                <a:cs typeface="+mn-cs"/>
+              </a:rPr>
+              <a:t>Influential observations (Cook’s D)</a:t>
+            </a:r>
+            <a:r>
+              <a:rPr lang="en-US" sz="1200" kern="1200" dirty="0" smtClean="0">
+                <a:solidFill>
+                  <a:schemeClr val="tx1"/>
+                </a:solidFill>
+                <a:effectLst/>
+                <a:latin typeface="+mn-lt"/>
+                <a:ea typeface="+mn-ea"/>
+                <a:cs typeface="+mn-cs"/>
+              </a:rPr>
+              <a:t>:</a:t>
             </a:r>
             <a:r>
               <a:rPr lang="en-US" dirty="0" smtClean="0"/>
-              <a:t>, &gt;0.5). </a:t>
-            </a:r>
+              <a:t> An influential observation is defined as an observation that changes the slope of the line. Thus, influential points have a large influence on the fit of the model. One method to find influential points is to compare the fit of the model with and without each observation – Cook’s D.</a:t>
+            </a:r>
+          </a:p>
+          <a:p>
+            <a:endParaRPr lang="en-US" dirty="0" smtClean="0"/>
+          </a:p>
+          <a:p>
             <a:r>
               <a:rPr lang="en-US" b="1" dirty="0" smtClean="0"/>
-              <a:t>What do you notice about this plot?</a:t>
+              <a:t>What </a:t>
+            </a:r>
+            <a:r>
+              <a:rPr lang="en-US" b="1" dirty="0" smtClean="0"/>
+              <a:t>do you notice about this plot?</a:t>
             </a:r>
             <a:endParaRPr lang="en-US" b="1" dirty="0"/>
           </a:p>
@@ -3035,7 +3078,7 @@
           <a:p>
             <a:fld id="{97CFF939-70E9-4E47-9899-4E3DA2789027}" type="datetimeFigureOut">
               <a:rPr lang="en-US" smtClean="0"/>
-              <a:t>3/6/2016</a:t>
+              <a:t>3/7/2016</a:t>
             </a:fld>
             <a:endParaRPr lang="en-US"/>
           </a:p>
@@ -3227,7 +3270,7 @@
           <a:p>
             <a:fld id="{97CFF939-70E9-4E47-9899-4E3DA2789027}" type="datetimeFigureOut">
               <a:rPr lang="en-US" smtClean="0"/>
-              <a:t>3/6/2016</a:t>
+              <a:t>3/7/2016</a:t>
             </a:fld>
             <a:endParaRPr lang="en-US"/>
           </a:p>
@@ -3407,7 +3450,7 @@
           <a:p>
             <a:fld id="{97CFF939-70E9-4E47-9899-4E3DA2789027}" type="datetimeFigureOut">
               <a:rPr lang="en-US" smtClean="0"/>
-              <a:t>3/6/2016</a:t>
+              <a:t>3/7/2016</a:t>
             </a:fld>
             <a:endParaRPr lang="en-US"/>
           </a:p>
@@ -3577,7 +3620,7 @@
           <a:p>
             <a:fld id="{97CFF939-70E9-4E47-9899-4E3DA2789027}" type="datetimeFigureOut">
               <a:rPr lang="en-US" smtClean="0"/>
-              <a:t>3/6/2016</a:t>
+              <a:t>3/7/2016</a:t>
             </a:fld>
             <a:endParaRPr lang="en-US"/>
           </a:p>
@@ -3831,7 +3874,7 @@
           <a:p>
             <a:fld id="{97CFF939-70E9-4E47-9899-4E3DA2789027}" type="datetimeFigureOut">
               <a:rPr lang="en-US" smtClean="0"/>
-              <a:t>3/6/2016</a:t>
+              <a:t>3/7/2016</a:t>
             </a:fld>
             <a:endParaRPr lang="en-US"/>
           </a:p>
@@ -4157,7 +4200,7 @@
           <a:p>
             <a:fld id="{97CFF939-70E9-4E47-9899-4E3DA2789027}" type="datetimeFigureOut">
               <a:rPr lang="en-US" smtClean="0"/>
-              <a:t>3/6/2016</a:t>
+              <a:t>3/7/2016</a:t>
             </a:fld>
             <a:endParaRPr lang="en-US"/>
           </a:p>
@@ -4577,7 +4620,7 @@
           <a:p>
             <a:fld id="{97CFF939-70E9-4E47-9899-4E3DA2789027}" type="datetimeFigureOut">
               <a:rPr lang="en-US" smtClean="0"/>
-              <a:t>3/6/2016</a:t>
+              <a:t>3/7/2016</a:t>
             </a:fld>
             <a:endParaRPr lang="en-US"/>
           </a:p>
@@ -4695,7 +4738,7 @@
           <a:p>
             <a:fld id="{97CFF939-70E9-4E47-9899-4E3DA2789027}" type="datetimeFigureOut">
               <a:rPr lang="en-US" smtClean="0"/>
-              <a:t>3/6/2016</a:t>
+              <a:t>3/7/2016</a:t>
             </a:fld>
             <a:endParaRPr lang="en-US"/>
           </a:p>
@@ -4790,7 +4833,7 @@
           <a:p>
             <a:fld id="{97CFF939-70E9-4E47-9899-4E3DA2789027}" type="datetimeFigureOut">
               <a:rPr lang="en-US" smtClean="0"/>
-              <a:t>3/6/2016</a:t>
+              <a:t>3/7/2016</a:t>
             </a:fld>
             <a:endParaRPr lang="en-US"/>
           </a:p>
@@ -5077,7 +5120,7 @@
           <a:p>
             <a:fld id="{97CFF939-70E9-4E47-9899-4E3DA2789027}" type="datetimeFigureOut">
               <a:rPr lang="en-US" smtClean="0"/>
-              <a:t>3/6/2016</a:t>
+              <a:t>3/7/2016</a:t>
             </a:fld>
             <a:endParaRPr lang="en-US"/>
           </a:p>
@@ -5399,7 +5442,7 @@
           <a:p>
             <a:fld id="{97CFF939-70E9-4E47-9899-4E3DA2789027}" type="datetimeFigureOut">
               <a:rPr lang="en-US" smtClean="0"/>
-              <a:t>3/6/2016</a:t>
+              <a:t>3/7/2016</a:t>
             </a:fld>
             <a:endParaRPr lang="en-US"/>
           </a:p>
@@ -5653,7 +5696,7 @@
           <a:p>
             <a:fld id="{97CFF939-70E9-4E47-9899-4E3DA2789027}" type="datetimeFigureOut">
               <a:rPr lang="en-US" smtClean="0"/>
-              <a:t>3/6/2016</a:t>
+              <a:t>3/7/2016</a:t>
             </a:fld>
             <a:endParaRPr lang="en-US"/>
           </a:p>
@@ -9249,6 +9292,251 @@
           </a:prstGeom>
         </p:spPr>
       </p:pic>
+      <p:sp>
+        <p:nvSpPr>
+          <p:cNvPr id="7" name="Rectangle 6"/>
+          <p:cNvSpPr/>
+          <p:nvPr/>
+        </p:nvSpPr>
+        <p:spPr>
+          <a:xfrm>
+            <a:off x="685800" y="3581400"/>
+            <a:ext cx="457200" cy="2017059"/>
+          </a:xfrm>
+          <a:prstGeom prst="rect">
+            <a:avLst/>
+          </a:prstGeom>
+          <a:noFill/>
+          <a:ln w="28575">
+            <a:solidFill>
+              <a:srgbClr val="0E13E2"/>
+            </a:solidFill>
+          </a:ln>
+        </p:spPr>
+        <p:style>
+          <a:lnRef idx="2">
+            <a:schemeClr val="accent1">
+              <a:shade val="50000"/>
+            </a:schemeClr>
+          </a:lnRef>
+          <a:fillRef idx="1">
+            <a:schemeClr val="accent1"/>
+          </a:fillRef>
+          <a:effectRef idx="0">
+            <a:schemeClr val="accent1"/>
+          </a:effectRef>
+          <a:fontRef idx="minor">
+            <a:schemeClr val="lt1"/>
+          </a:fontRef>
+        </p:style>
+        <p:txBody>
+          <a:bodyPr rtlCol="0" anchor="ctr"/>
+          <a:lstStyle/>
+          <a:p>
+            <a:pPr algn="ctr"/>
+            <a:endParaRPr lang="en-US"/>
+          </a:p>
+        </p:txBody>
+      </p:sp>
+      <p:sp>
+        <p:nvSpPr>
+          <p:cNvPr id="8" name="Rectangle 7"/>
+          <p:cNvSpPr/>
+          <p:nvPr/>
+        </p:nvSpPr>
+        <p:spPr>
+          <a:xfrm>
+            <a:off x="2133600" y="2057400"/>
+            <a:ext cx="1447800" cy="1371600"/>
+          </a:xfrm>
+          <a:prstGeom prst="rect">
+            <a:avLst/>
+          </a:prstGeom>
+          <a:noFill/>
+          <a:ln w="28575">
+            <a:solidFill>
+              <a:srgbClr val="0E13E2"/>
+            </a:solidFill>
+          </a:ln>
+        </p:spPr>
+        <p:style>
+          <a:lnRef idx="2">
+            <a:schemeClr val="accent1">
+              <a:shade val="50000"/>
+            </a:schemeClr>
+          </a:lnRef>
+          <a:fillRef idx="1">
+            <a:schemeClr val="accent1"/>
+          </a:fillRef>
+          <a:effectRef idx="0">
+            <a:schemeClr val="accent1"/>
+          </a:effectRef>
+          <a:fontRef idx="minor">
+            <a:schemeClr val="lt1"/>
+          </a:fontRef>
+        </p:style>
+        <p:txBody>
+          <a:bodyPr rtlCol="0" anchor="ctr"/>
+          <a:lstStyle/>
+          <a:p>
+            <a:pPr algn="ctr"/>
+            <a:endParaRPr lang="en-US"/>
+          </a:p>
+        </p:txBody>
+      </p:sp>
+      <p:sp>
+        <p:nvSpPr>
+          <p:cNvPr id="9" name="Rectangle 8"/>
+          <p:cNvSpPr/>
+          <p:nvPr/>
+        </p:nvSpPr>
+        <p:spPr>
+          <a:xfrm>
+            <a:off x="5791200" y="4190999"/>
+            <a:ext cx="1905000" cy="1084729"/>
+          </a:xfrm>
+          <a:prstGeom prst="rect">
+            <a:avLst/>
+          </a:prstGeom>
+          <a:noFill/>
+          <a:ln w="28575">
+            <a:solidFill>
+              <a:srgbClr val="0E13E2"/>
+            </a:solidFill>
+          </a:ln>
+        </p:spPr>
+        <p:style>
+          <a:lnRef idx="2">
+            <a:schemeClr val="accent1">
+              <a:shade val="50000"/>
+            </a:schemeClr>
+          </a:lnRef>
+          <a:fillRef idx="1">
+            <a:schemeClr val="accent1"/>
+          </a:fillRef>
+          <a:effectRef idx="0">
+            <a:schemeClr val="accent1"/>
+          </a:effectRef>
+          <a:fontRef idx="minor">
+            <a:schemeClr val="lt1"/>
+          </a:fontRef>
+        </p:style>
+        <p:txBody>
+          <a:bodyPr rtlCol="0" anchor="ctr"/>
+          <a:lstStyle/>
+          <a:p>
+            <a:pPr algn="ctr"/>
+            <a:endParaRPr lang="en-US"/>
+          </a:p>
+        </p:txBody>
+      </p:sp>
+      <p:sp>
+        <p:nvSpPr>
+          <p:cNvPr id="10" name="Rectangle 9"/>
+          <p:cNvSpPr/>
+          <p:nvPr/>
+        </p:nvSpPr>
+        <p:spPr>
+          <a:xfrm>
+            <a:off x="6210300" y="1668910"/>
+            <a:ext cx="1905000" cy="1084729"/>
+          </a:xfrm>
+          <a:prstGeom prst="rect">
+            <a:avLst/>
+          </a:prstGeom>
+          <a:noFill/>
+          <a:ln w="28575">
+            <a:solidFill>
+              <a:srgbClr val="0E13E2"/>
+            </a:solidFill>
+          </a:ln>
+        </p:spPr>
+        <p:style>
+          <a:lnRef idx="2">
+            <a:schemeClr val="accent1">
+              <a:shade val="50000"/>
+            </a:schemeClr>
+          </a:lnRef>
+          <a:fillRef idx="1">
+            <a:schemeClr val="accent1"/>
+          </a:fillRef>
+          <a:effectRef idx="0">
+            <a:schemeClr val="accent1"/>
+          </a:effectRef>
+          <a:fontRef idx="minor">
+            <a:schemeClr val="lt1"/>
+          </a:fontRef>
+        </p:style>
+        <p:txBody>
+          <a:bodyPr rtlCol="0" anchor="ctr"/>
+          <a:lstStyle/>
+          <a:p>
+            <a:pPr algn="ctr"/>
+            <a:endParaRPr lang="en-US"/>
+          </a:p>
+        </p:txBody>
+      </p:sp>
+      <p:sp>
+        <p:nvSpPr>
+          <p:cNvPr id="4" name="TextBox 3"/>
+          <p:cNvSpPr txBox="1"/>
+          <p:nvPr/>
+        </p:nvSpPr>
+        <p:spPr>
+          <a:xfrm>
+            <a:off x="946404" y="2931458"/>
+            <a:ext cx="7034079" cy="1477328"/>
+          </a:xfrm>
+          <a:prstGeom prst="rect">
+            <a:avLst/>
+          </a:prstGeom>
+          <a:solidFill>
+            <a:schemeClr val="tx2">
+              <a:lumMod val="20000"/>
+              <a:lumOff val="80000"/>
+            </a:schemeClr>
+          </a:solidFill>
+        </p:spPr>
+        <p:txBody>
+          <a:bodyPr wrap="square" rtlCol="0">
+            <a:spAutoFit/>
+          </a:bodyPr>
+          <a:lstStyle/>
+          <a:p>
+            <a:r>
+              <a:rPr lang="en-US" dirty="0" smtClean="0"/>
+              <a:t>Rule of thumbs:</a:t>
+            </a:r>
+          </a:p>
+          <a:p>
+            <a:r>
+              <a:rPr lang="en-US" dirty="0" smtClean="0"/>
+              <a:t>Leverage &lt; 0.2 = observation leverage is not a concern</a:t>
+            </a:r>
+          </a:p>
+          <a:p>
+            <a:r>
+              <a:rPr lang="en-US" dirty="0" smtClean="0"/>
+              <a:t>Leverage &gt; 0.5 = observations causes undue leverage to the model</a:t>
+            </a:r>
+          </a:p>
+          <a:p>
+            <a:r>
+              <a:rPr lang="en-US" dirty="0" smtClean="0"/>
+              <a:t>Cook’s </a:t>
+            </a:r>
+            <a:r>
+              <a:rPr lang="en-US" dirty="0"/>
+              <a:t>D &gt;1 = highly influential </a:t>
+            </a:r>
+            <a:r>
+              <a:rPr lang="en-US" dirty="0" smtClean="0"/>
+              <a:t>observation; should be assessed</a:t>
+            </a:r>
+            <a:endParaRPr lang="en-US" dirty="0"/>
+          </a:p>
+        </p:txBody>
+      </p:sp>
     </p:spTree>
     <p:extLst>
       <p:ext uri="{BB962C8B-B14F-4D97-AF65-F5344CB8AC3E}">
@@ -9262,9 +9550,304 @@
   <p:timing>
     <p:tnLst>
       <p:par>
-        <p:cTn id="1" dur="indefinite" restart="never" nodeType="tmRoot"/>
+        <p:cTn id="1" dur="indefinite" restart="never" nodeType="tmRoot">
+          <p:childTnLst>
+            <p:seq concurrent="1" nextAc="seek">
+              <p:cTn id="2" dur="indefinite" nodeType="mainSeq">
+                <p:childTnLst>
+                  <p:par>
+                    <p:cTn id="3" fill="hold">
+                      <p:stCondLst>
+                        <p:cond delay="indefinite"/>
+                      </p:stCondLst>
+                      <p:childTnLst>
+                        <p:par>
+                          <p:cTn id="4" fill="hold">
+                            <p:stCondLst>
+                              <p:cond delay="0"/>
+                            </p:stCondLst>
+                            <p:childTnLst>
+                              <p:par>
+                                <p:cTn id="5" presetID="10" presetClass="entr" presetSubtype="0" fill="hold" grpId="0" nodeType="clickEffect">
+                                  <p:stCondLst>
+                                    <p:cond delay="0"/>
+                                  </p:stCondLst>
+                                  <p:childTnLst>
+                                    <p:set>
+                                      <p:cBhvr>
+                                        <p:cTn id="6" dur="1" fill="hold">
+                                          <p:stCondLst>
+                                            <p:cond delay="0"/>
+                                          </p:stCondLst>
+                                        </p:cTn>
+                                        <p:tgtEl>
+                                          <p:spTgt spid="7"/>
+                                        </p:tgtEl>
+                                        <p:attrNameLst>
+                                          <p:attrName>style.visibility</p:attrName>
+                                        </p:attrNameLst>
+                                      </p:cBhvr>
+                                      <p:to>
+                                        <p:strVal val="visible"/>
+                                      </p:to>
+                                    </p:set>
+                                    <p:animEffect transition="in" filter="fade">
+                                      <p:cBhvr>
+                                        <p:cTn id="7" dur="500"/>
+                                        <p:tgtEl>
+                                          <p:spTgt spid="7"/>
+                                        </p:tgtEl>
+                                      </p:cBhvr>
+                                    </p:animEffect>
+                                  </p:childTnLst>
+                                </p:cTn>
+                              </p:par>
+                            </p:childTnLst>
+                          </p:cTn>
+                        </p:par>
+                      </p:childTnLst>
+                    </p:cTn>
+                  </p:par>
+                  <p:par>
+                    <p:cTn id="8" fill="hold">
+                      <p:stCondLst>
+                        <p:cond delay="indefinite"/>
+                      </p:stCondLst>
+                      <p:childTnLst>
+                        <p:par>
+                          <p:cTn id="9" fill="hold">
+                            <p:stCondLst>
+                              <p:cond delay="0"/>
+                            </p:stCondLst>
+                            <p:childTnLst>
+                              <p:par>
+                                <p:cTn id="10" presetID="10" presetClass="entr" presetSubtype="0" fill="hold" grpId="0" nodeType="clickEffect">
+                                  <p:stCondLst>
+                                    <p:cond delay="0"/>
+                                  </p:stCondLst>
+                                  <p:childTnLst>
+                                    <p:set>
+                                      <p:cBhvr>
+                                        <p:cTn id="11" dur="1" fill="hold">
+                                          <p:stCondLst>
+                                            <p:cond delay="0"/>
+                                          </p:stCondLst>
+                                        </p:cTn>
+                                        <p:tgtEl>
+                                          <p:spTgt spid="8"/>
+                                        </p:tgtEl>
+                                        <p:attrNameLst>
+                                          <p:attrName>style.visibility</p:attrName>
+                                        </p:attrNameLst>
+                                      </p:cBhvr>
+                                      <p:to>
+                                        <p:strVal val="visible"/>
+                                      </p:to>
+                                    </p:set>
+                                    <p:animEffect transition="in" filter="fade">
+                                      <p:cBhvr>
+                                        <p:cTn id="12" dur="500"/>
+                                        <p:tgtEl>
+                                          <p:spTgt spid="8"/>
+                                        </p:tgtEl>
+                                      </p:cBhvr>
+                                    </p:animEffect>
+                                  </p:childTnLst>
+                                </p:cTn>
+                              </p:par>
+                            </p:childTnLst>
+                          </p:cTn>
+                        </p:par>
+                      </p:childTnLst>
+                    </p:cTn>
+                  </p:par>
+                  <p:par>
+                    <p:cTn id="13" fill="hold">
+                      <p:stCondLst>
+                        <p:cond delay="indefinite"/>
+                      </p:stCondLst>
+                      <p:childTnLst>
+                        <p:par>
+                          <p:cTn id="14" fill="hold">
+                            <p:stCondLst>
+                              <p:cond delay="0"/>
+                            </p:stCondLst>
+                            <p:childTnLst>
+                              <p:par>
+                                <p:cTn id="15" presetID="10" presetClass="entr" presetSubtype="0" fill="hold" grpId="0" nodeType="clickEffect">
+                                  <p:stCondLst>
+                                    <p:cond delay="0"/>
+                                  </p:stCondLst>
+                                  <p:childTnLst>
+                                    <p:set>
+                                      <p:cBhvr>
+                                        <p:cTn id="16" dur="1" fill="hold">
+                                          <p:stCondLst>
+                                            <p:cond delay="0"/>
+                                          </p:stCondLst>
+                                        </p:cTn>
+                                        <p:tgtEl>
+                                          <p:spTgt spid="9"/>
+                                        </p:tgtEl>
+                                        <p:attrNameLst>
+                                          <p:attrName>style.visibility</p:attrName>
+                                        </p:attrNameLst>
+                                      </p:cBhvr>
+                                      <p:to>
+                                        <p:strVal val="visible"/>
+                                      </p:to>
+                                    </p:set>
+                                    <p:animEffect transition="in" filter="fade">
+                                      <p:cBhvr>
+                                        <p:cTn id="17" dur="500"/>
+                                        <p:tgtEl>
+                                          <p:spTgt spid="9"/>
+                                        </p:tgtEl>
+                                      </p:cBhvr>
+                                    </p:animEffect>
+                                  </p:childTnLst>
+                                </p:cTn>
+                              </p:par>
+                            </p:childTnLst>
+                          </p:cTn>
+                        </p:par>
+                      </p:childTnLst>
+                    </p:cTn>
+                  </p:par>
+                  <p:par>
+                    <p:cTn id="18" fill="hold">
+                      <p:stCondLst>
+                        <p:cond delay="indefinite"/>
+                      </p:stCondLst>
+                      <p:childTnLst>
+                        <p:par>
+                          <p:cTn id="19" fill="hold">
+                            <p:stCondLst>
+                              <p:cond delay="0"/>
+                            </p:stCondLst>
+                            <p:childTnLst>
+                              <p:par>
+                                <p:cTn id="20" presetID="10" presetClass="entr" presetSubtype="0" fill="hold" grpId="0" nodeType="clickEffect">
+                                  <p:stCondLst>
+                                    <p:cond delay="0"/>
+                                  </p:stCondLst>
+                                  <p:childTnLst>
+                                    <p:set>
+                                      <p:cBhvr>
+                                        <p:cTn id="21" dur="1" fill="hold">
+                                          <p:stCondLst>
+                                            <p:cond delay="0"/>
+                                          </p:stCondLst>
+                                        </p:cTn>
+                                        <p:tgtEl>
+                                          <p:spTgt spid="10"/>
+                                        </p:tgtEl>
+                                        <p:attrNameLst>
+                                          <p:attrName>style.visibility</p:attrName>
+                                        </p:attrNameLst>
+                                      </p:cBhvr>
+                                      <p:to>
+                                        <p:strVal val="visible"/>
+                                      </p:to>
+                                    </p:set>
+                                    <p:animEffect transition="in" filter="fade">
+                                      <p:cBhvr>
+                                        <p:cTn id="22" dur="500"/>
+                                        <p:tgtEl>
+                                          <p:spTgt spid="10"/>
+                                        </p:tgtEl>
+                                      </p:cBhvr>
+                                    </p:animEffect>
+                                  </p:childTnLst>
+                                </p:cTn>
+                              </p:par>
+                            </p:childTnLst>
+                          </p:cTn>
+                        </p:par>
+                      </p:childTnLst>
+                    </p:cTn>
+                  </p:par>
+                  <p:par>
+                    <p:cTn id="23" fill="hold">
+                      <p:stCondLst>
+                        <p:cond delay="indefinite"/>
+                      </p:stCondLst>
+                      <p:childTnLst>
+                        <p:par>
+                          <p:cTn id="24" fill="hold">
+                            <p:stCondLst>
+                              <p:cond delay="0"/>
+                            </p:stCondLst>
+                            <p:childTnLst>
+                              <p:par>
+                                <p:cTn id="25" presetID="10" presetClass="entr" presetSubtype="0" fill="hold" grpId="0" nodeType="clickEffect">
+                                  <p:stCondLst>
+                                    <p:cond delay="0"/>
+                                  </p:stCondLst>
+                                  <p:childTnLst>
+                                    <p:set>
+                                      <p:cBhvr>
+                                        <p:cTn id="26" dur="1" fill="hold">
+                                          <p:stCondLst>
+                                            <p:cond delay="0"/>
+                                          </p:stCondLst>
+                                        </p:cTn>
+                                        <p:tgtEl>
+                                          <p:spTgt spid="4"/>
+                                        </p:tgtEl>
+                                        <p:attrNameLst>
+                                          <p:attrName>style.visibility</p:attrName>
+                                        </p:attrNameLst>
+                                      </p:cBhvr>
+                                      <p:to>
+                                        <p:strVal val="visible"/>
+                                      </p:to>
+                                    </p:set>
+                                    <p:animEffect transition="in" filter="fade">
+                                      <p:cBhvr>
+                                        <p:cTn id="27" dur="500"/>
+                                        <p:tgtEl>
+                                          <p:spTgt spid="4"/>
+                                        </p:tgtEl>
+                                      </p:cBhvr>
+                                    </p:animEffect>
+                                  </p:childTnLst>
+                                </p:cTn>
+                              </p:par>
+                            </p:childTnLst>
+                          </p:cTn>
+                        </p:par>
+                      </p:childTnLst>
+                    </p:cTn>
+                  </p:par>
+                </p:childTnLst>
+              </p:cTn>
+              <p:prevCondLst>
+                <p:cond evt="onPrev" delay="0">
+                  <p:tgtEl>
+                    <p:sldTgt/>
+                  </p:tgtEl>
+                </p:cond>
+              </p:prevCondLst>
+              <p:nextCondLst>
+                <p:cond evt="onNext" delay="0">
+                  <p:tgtEl>
+                    <p:sldTgt/>
+                  </p:tgtEl>
+                </p:cond>
+              </p:nextCondLst>
+            </p:seq>
+          </p:childTnLst>
+        </p:cTn>
       </p:par>
     </p:tnLst>
+    <p:bldLst>
+      <p:bldP spid="7" grpId="0" animBg="1"/>
+      <p:bldP spid="8" grpId="0" animBg="1"/>
+      <p:bldP spid="9" grpId="0" animBg="1"/>
+      <p:bldP spid="10" grpId="0" animBg="1"/>
+      <p:bldP spid="4" grpId="0" animBg="1"/>
+    </p:bldLst>
   </p:timing>
 </p:sld>
 </file>

</xml_diff>

<commit_message>
minor edits for clarification to regression ppt
</commit_message>
<xml_diff>
--- a/presentations/6_linear_regression/Linear_regression.pptx
+++ b/presentations/6_linear_regression/Linear_regression.pptx
@@ -1006,11 +1006,7 @@
           <a:p>
             <a:r>
               <a:rPr lang="en-US" b="1" dirty="0" smtClean="0"/>
-              <a:t>What </a:t>
-            </a:r>
-            <a:r>
-              <a:rPr lang="en-US" b="1" dirty="0" smtClean="0"/>
-              <a:t>do you notice about this plot?</a:t>
+              <a:t>What do you notice about this plot?</a:t>
             </a:r>
             <a:endParaRPr lang="en-US" b="1" dirty="0"/>
           </a:p>
@@ -8371,33 +8367,142 @@
         <p:spPr/>
         <p:txBody>
           <a:bodyPr>
-            <a:normAutofit/>
+            <a:normAutofit lnSpcReduction="10000"/>
           </a:bodyPr>
           <a:lstStyle/>
+          <a:p>
+            <a:r>
+              <a:rPr lang="en-US" sz="2200" u="sng" dirty="0" smtClean="0"/>
+              <a:t>Heteroscedasticity</a:t>
+            </a:r>
+            <a:r>
+              <a:rPr lang="en-US" sz="2200" dirty="0" smtClean="0"/>
+              <a:t> – causes estimates of regression coefficients to be less precise</a:t>
+            </a:r>
+          </a:p>
+          <a:p>
+            <a:r>
+              <a:rPr lang="en-US" sz="2200" u="sng" dirty="0" smtClean="0"/>
+              <a:t>Non-normality</a:t>
+            </a:r>
+            <a:r>
+              <a:rPr lang="en-US" sz="2200" dirty="0" smtClean="0"/>
+              <a:t> </a:t>
+            </a:r>
+            <a:r>
+              <a:rPr lang="en-US" sz="2200" dirty="0"/>
+              <a:t>–</a:t>
+            </a:r>
+            <a:r>
+              <a:rPr lang="en-US" sz="2200" dirty="0" smtClean="0"/>
+              <a:t> compromises </a:t>
+            </a:r>
+            <a:r>
+              <a:rPr lang="en-US" sz="2200" dirty="0"/>
+              <a:t>interpretability of significance tests of the regression </a:t>
+            </a:r>
+            <a:r>
+              <a:rPr lang="en-US" sz="2200" dirty="0" smtClean="0"/>
+              <a:t>coefficients</a:t>
+            </a:r>
+          </a:p>
+          <a:p>
+            <a:r>
+              <a:rPr lang="en-US" sz="2200" u="sng" dirty="0" smtClean="0"/>
+              <a:t>Multicollinearity</a:t>
+            </a:r>
+            <a:r>
+              <a:rPr lang="en-US" sz="2200" dirty="0" smtClean="0"/>
+              <a:t> </a:t>
+            </a:r>
+            <a:r>
+              <a:rPr lang="en-US" sz="2200" dirty="0"/>
+              <a:t>–</a:t>
+            </a:r>
+            <a:r>
+              <a:rPr lang="en-US" sz="2200" dirty="0" smtClean="0"/>
+              <a:t> over-estimates the </a:t>
+            </a:r>
+            <a:r>
+              <a:rPr lang="en-US" sz="2200" dirty="0"/>
+              <a:t>variances of the regression </a:t>
+            </a:r>
+            <a:r>
+              <a:rPr lang="en-US" sz="2200" dirty="0" smtClean="0"/>
+              <a:t>coefficients</a:t>
+            </a:r>
+            <a:endParaRPr lang="en-US" sz="2200" dirty="0"/>
+          </a:p>
+          <a:p>
+            <a:r>
+              <a:rPr lang="en-US" sz="2200" u="sng" dirty="0"/>
+              <a:t>Spatial Autocorrelation</a:t>
+            </a:r>
+            <a:r>
+              <a:rPr lang="en-US" sz="2200" dirty="0"/>
+              <a:t> – results in an underestimation of the standard error of the estimates of the regression coefficients and a bias towards rejecting the </a:t>
+            </a:r>
+            <a:r>
+              <a:rPr lang="en-US" sz="2200" dirty="0" smtClean="0"/>
+              <a:t>H</a:t>
+            </a:r>
+            <a:r>
+              <a:rPr lang="en-US" sz="2200" baseline="-25000" dirty="0" smtClean="0"/>
+              <a:t>o </a:t>
+            </a:r>
+            <a:r>
+              <a:rPr lang="en-US" sz="2200" dirty="0" smtClean="0"/>
+              <a:t>that </a:t>
+            </a:r>
+            <a:r>
+              <a:rPr lang="en-US" sz="2200" dirty="0"/>
+              <a:t>the value of the coefficient is </a:t>
+            </a:r>
+            <a:r>
+              <a:rPr lang="en-US" sz="2200" dirty="0" smtClean="0"/>
+              <a:t>zero</a:t>
+            </a:r>
+            <a:endParaRPr lang="en-US" sz="2200" dirty="0"/>
+          </a:p>
           <a:p>
             <a:pPr marL="0" indent="0">
               <a:buNone/>
             </a:pPr>
-            <a:r>
-              <a:rPr lang="en-US" sz="2600" dirty="0" smtClean="0"/>
-              <a:t>Heteroscedasticity and non-normality in the residuals indicates:</a:t>
-            </a:r>
-            <a:endParaRPr lang="en-US" sz="2600" dirty="0"/>
+            <a:endParaRPr lang="en-US" sz="1600" dirty="0"/>
           </a:p>
           <a:p>
             <a:pPr lvl="1"/>
-            <a:r>
-              <a:rPr lang="en-US" sz="2400" dirty="0" smtClean="0"/>
-              <a:t>One or more important variables were omitted from the model</a:t>
-            </a:r>
-          </a:p>
-          <a:p>
-            <a:pPr lvl="1"/>
-            <a:r>
-              <a:rPr lang="en-US" sz="2400" dirty="0" smtClean="0"/>
-              <a:t>Incorrect functional form used for the model (e.g., linear when the function is actually nonlinear)</a:t>
-            </a:r>
             <a:endParaRPr lang="en-US" sz="2400" dirty="0"/>
+          </a:p>
+        </p:txBody>
+      </p:sp>
+      <p:sp>
+        <p:nvSpPr>
+          <p:cNvPr id="4" name="TextBox 3"/>
+          <p:cNvSpPr txBox="1"/>
+          <p:nvPr/>
+        </p:nvSpPr>
+        <p:spPr>
+          <a:xfrm>
+            <a:off x="-17929" y="6576519"/>
+            <a:ext cx="1949573" cy="276999"/>
+          </a:xfrm>
+          <a:prstGeom prst="rect">
+            <a:avLst/>
+          </a:prstGeom>
+          <a:noFill/>
+        </p:spPr>
+        <p:txBody>
+          <a:bodyPr wrap="none" rtlCol="0">
+            <a:spAutoFit/>
+          </a:bodyPr>
+          <a:lstStyle/>
+          <a:p>
+            <a:r>
+              <a:rPr lang="en-US" sz="1200" dirty="0" smtClean="0"/>
+              <a:t>Griffith and Layne, 2000</a:t>
+            </a:r>
+            <a:endParaRPr lang="en-US" sz="1200" dirty="0"/>
           </a:p>
         </p:txBody>
       </p:sp>

</xml_diff>

<commit_message>
minor edits for clarity to linear regression ppt
</commit_message>
<xml_diff>
--- a/presentations/6_linear_regression/Linear_regression.pptx
+++ b/presentations/6_linear_regression/Linear_regression.pptx
@@ -630,30 +630,418 @@
           <a:bodyPr/>
           <a:lstStyle/>
           <a:p>
+            <a:pPr marL="228600" indent="-228600">
+              <a:buAutoNum type="arabicParenR"/>
+            </a:pPr>
             <a:r>
               <a:rPr lang="en-US" dirty="0" smtClean="0"/>
-              <a:t>This plot is used to detect non-linearity, unequal error variances, and outliers. In</a:t>
+              <a:t>Model</a:t>
             </a:r>
             <a:r>
               <a:rPr lang="en-US" baseline="0" dirty="0" smtClean="0"/>
-              <a:t> a perfect world, the observations would be equally spread around a horizontal line without any distinct patterns.  </a:t>
-            </a:r>
-            <a:r>
-              <a:rPr lang="en-US" b="1" baseline="0" dirty="0" smtClean="0"/>
-              <a:t>Do you see a linear trend? What about their variances? Are there any outliers? </a:t>
-            </a:r>
+              <a:t> formula</a:t>
+            </a:r>
+          </a:p>
+          <a:p>
+            <a:pPr marL="228600" indent="-228600">
+              <a:buAutoNum type="arabicParenR"/>
+            </a:pPr>
             <a:r>
               <a:rPr lang="en-US" baseline="0" dirty="0" smtClean="0"/>
-              <a:t>–click- </a:t>
-            </a:r>
-            <a:r>
-              <a:rPr lang="en-US" b="1" baseline="0" dirty="0" smtClean="0"/>
-              <a:t>what about this model?</a:t>
-            </a:r>
-            <a:endParaRPr lang="en-US" b="1" dirty="0" smtClean="0"/>
-          </a:p>
-          <a:p>
-            <a:endParaRPr lang="en-US" dirty="0" smtClean="0"/>
+              <a:t>Quartiles, or 5 number summary of residuals</a:t>
+            </a:r>
+          </a:p>
+          <a:p>
+            <a:pPr marL="228600" indent="-228600">
+              <a:buAutoNum type="arabicParenR"/>
+            </a:pPr>
+            <a:r>
+              <a:rPr lang="en-US" baseline="0" dirty="0" smtClean="0"/>
+              <a:t>Estimate of the y-intercept (estimated mean of Y when all X’s are zero) and slope of x</a:t>
+            </a:r>
+          </a:p>
+          <a:p>
+            <a:pPr marL="228600" indent="-228600">
+              <a:buAutoNum type="arabicParenR"/>
+            </a:pPr>
+            <a:r>
+              <a:rPr lang="en-US" baseline="0" dirty="0" smtClean="0"/>
+              <a:t>Standard error of the y-intercept and slope</a:t>
+            </a:r>
+          </a:p>
+          <a:p>
+            <a:pPr marL="228600" marR="0" indent="-228600" algn="l" defTabSz="914400" rtl="0" eaLnBrk="1" fontAlgn="auto" latinLnBrk="0" hangingPunct="1">
+              <a:lnSpc>
+                <a:spcPct val="100000"/>
+              </a:lnSpc>
+              <a:spcBef>
+                <a:spcPts val="0"/>
+              </a:spcBef>
+              <a:spcAft>
+                <a:spcPts val="0"/>
+              </a:spcAft>
+              <a:buClrTx/>
+              <a:buSzTx/>
+              <a:buFontTx/>
+              <a:buAutoNum type="arabicParenR"/>
+              <a:tabLst/>
+              <a:defRPr/>
+            </a:pPr>
+            <a:r>
+              <a:rPr lang="en-US" sz="1200" b="0" i="0" u="none" strike="noStrike" kern="1200" baseline="0" dirty="0" smtClean="0">
+                <a:solidFill>
+                  <a:schemeClr val="tx1"/>
+                </a:solidFill>
+                <a:latin typeface="+mn-lt"/>
+                <a:ea typeface="+mn-ea"/>
+                <a:cs typeface="+mn-cs"/>
+              </a:rPr>
+              <a:t>The t-values test the hypothesis that the coefficient is different from 0. You can get the t-values by dividing the coefficient by its standard error. The t-values also show the importance of a variable in the model. </a:t>
+            </a:r>
+          </a:p>
+          <a:p>
+            <a:pPr marL="228600" marR="0" indent="-228600" algn="l" defTabSz="914400" rtl="0" eaLnBrk="1" fontAlgn="auto" latinLnBrk="0" hangingPunct="1">
+              <a:lnSpc>
+                <a:spcPct val="100000"/>
+              </a:lnSpc>
+              <a:spcBef>
+                <a:spcPts val="0"/>
+              </a:spcBef>
+              <a:spcAft>
+                <a:spcPts val="0"/>
+              </a:spcAft>
+              <a:buClrTx/>
+              <a:buSzTx/>
+              <a:buFontTx/>
+              <a:buAutoNum type="arabicParenR"/>
+              <a:tabLst/>
+              <a:defRPr/>
+            </a:pPr>
+            <a:r>
+              <a:rPr lang="en-US" sz="1200" b="0" i="0" u="none" strike="noStrike" kern="1200" baseline="0" dirty="0" smtClean="0">
+                <a:solidFill>
+                  <a:schemeClr val="tx1"/>
+                </a:solidFill>
+                <a:latin typeface="+mn-lt"/>
+                <a:ea typeface="+mn-ea"/>
+                <a:cs typeface="+mn-cs"/>
+              </a:rPr>
+              <a:t>Two-tail p-values test the hypothesis that each coefficient is different from 0. </a:t>
+            </a:r>
+          </a:p>
+          <a:p>
+            <a:pPr marL="228600" marR="0" indent="-228600" algn="l" defTabSz="914400" rtl="0" eaLnBrk="1" fontAlgn="auto" latinLnBrk="0" hangingPunct="1">
+              <a:lnSpc>
+                <a:spcPct val="100000"/>
+              </a:lnSpc>
+              <a:spcBef>
+                <a:spcPts val="0"/>
+              </a:spcBef>
+              <a:spcAft>
+                <a:spcPts val="0"/>
+              </a:spcAft>
+              <a:buClrTx/>
+              <a:buSzTx/>
+              <a:buFontTx/>
+              <a:buAutoNum type="arabicParenR"/>
+              <a:tabLst/>
+              <a:defRPr/>
+            </a:pPr>
+            <a:r>
+              <a:rPr lang="en-US" b="0" u="none" dirty="0" smtClean="0">
+                <a:solidFill>
+                  <a:srgbClr val="0E13E2"/>
+                </a:solidFill>
+              </a:rPr>
+              <a:t>RMSE; Relative</a:t>
+            </a:r>
+            <a:r>
+              <a:rPr lang="en-US" b="0" u="none" baseline="0" dirty="0" smtClean="0">
+                <a:solidFill>
+                  <a:srgbClr val="0E13E2"/>
+                </a:solidFill>
+              </a:rPr>
+              <a:t> model error; </a:t>
+            </a:r>
+            <a:r>
+              <a:rPr lang="en-US" b="0" u="none" dirty="0" smtClean="0">
+                <a:solidFill>
+                  <a:srgbClr val="0E13E2"/>
+                </a:solidFill>
+              </a:rPr>
+              <a:t>degrees</a:t>
+            </a:r>
+            <a:r>
+              <a:rPr lang="en-US" b="0" u="none" baseline="0" dirty="0" smtClean="0">
+                <a:solidFill>
+                  <a:srgbClr val="0E13E2"/>
+                </a:solidFill>
+              </a:rPr>
+              <a:t> of freedom = n-2</a:t>
+            </a:r>
+            <a:endParaRPr lang="en-US" b="0" u="none" dirty="0" smtClean="0">
+              <a:solidFill>
+                <a:srgbClr val="0E13E2"/>
+              </a:solidFill>
+            </a:endParaRPr>
+          </a:p>
+          <a:p>
+            <a:pPr marL="228600" marR="0" indent="-228600" algn="l" defTabSz="914400" rtl="0" eaLnBrk="1" fontAlgn="auto" latinLnBrk="0" hangingPunct="1">
+              <a:lnSpc>
+                <a:spcPct val="100000"/>
+              </a:lnSpc>
+              <a:spcBef>
+                <a:spcPts val="0"/>
+              </a:spcBef>
+              <a:spcAft>
+                <a:spcPts val="0"/>
+              </a:spcAft>
+              <a:buClrTx/>
+              <a:buSzTx/>
+              <a:buFontTx/>
+              <a:buAutoNum type="arabicParenR"/>
+              <a:tabLst/>
+              <a:defRPr/>
+            </a:pPr>
+            <a:r>
+              <a:rPr lang="en-US" sz="1200" b="0" i="0" u="none" strike="noStrike" kern="1200" baseline="0" dirty="0" smtClean="0">
+                <a:solidFill>
+                  <a:schemeClr val="tx1"/>
+                </a:solidFill>
+                <a:latin typeface="+mn-lt"/>
+                <a:ea typeface="+mn-ea"/>
+                <a:cs typeface="+mn-cs"/>
+              </a:rPr>
+              <a:t>R2 shows the amount of variance of Y explained by X. Adjusted R2 shows the same as </a:t>
+            </a:r>
+            <a:r>
+              <a:rPr lang="en-US" sz="1200" b="0" i="1" u="none" strike="noStrike" kern="1200" baseline="0" dirty="0" smtClean="0">
+                <a:solidFill>
+                  <a:schemeClr val="tx1"/>
+                </a:solidFill>
+                <a:latin typeface="+mn-lt"/>
+                <a:ea typeface="+mn-ea"/>
+                <a:cs typeface="+mn-cs"/>
+              </a:rPr>
+              <a:t>R2 </a:t>
+            </a:r>
+            <a:r>
+              <a:rPr lang="en-US" sz="1200" b="0" i="0" u="none" strike="noStrike" kern="1200" baseline="0" dirty="0" smtClean="0">
+                <a:solidFill>
+                  <a:schemeClr val="tx1"/>
+                </a:solidFill>
+                <a:latin typeface="+mn-lt"/>
+                <a:ea typeface="+mn-ea"/>
+                <a:cs typeface="+mn-cs"/>
+              </a:rPr>
+              <a:t>but adjusted by the # of cases and # of variables. When the # of variables is small and the # of cases is very large then </a:t>
+            </a:r>
+            <a:r>
+              <a:rPr lang="en-US" sz="1200" b="0" i="1" u="none" strike="noStrike" kern="1200" baseline="0" dirty="0" err="1" smtClean="0">
+                <a:solidFill>
+                  <a:schemeClr val="tx1"/>
+                </a:solidFill>
+                <a:latin typeface="+mn-lt"/>
+                <a:ea typeface="+mn-ea"/>
+                <a:cs typeface="+mn-cs"/>
+              </a:rPr>
+              <a:t>Adj</a:t>
+            </a:r>
+            <a:r>
+              <a:rPr lang="en-US" sz="1200" b="0" i="1" u="none" strike="noStrike" kern="1200" baseline="0" dirty="0" smtClean="0">
+                <a:solidFill>
+                  <a:schemeClr val="tx1"/>
+                </a:solidFill>
+                <a:latin typeface="+mn-lt"/>
+                <a:ea typeface="+mn-ea"/>
+                <a:cs typeface="+mn-cs"/>
+              </a:rPr>
+              <a:t> R2</a:t>
+            </a:r>
+            <a:r>
+              <a:rPr lang="en-US" sz="1200" b="0" i="0" u="none" strike="noStrike" kern="1200" baseline="0" dirty="0" smtClean="0">
+                <a:solidFill>
+                  <a:schemeClr val="tx1"/>
+                </a:solidFill>
+                <a:latin typeface="+mn-lt"/>
+                <a:ea typeface="+mn-ea"/>
+                <a:cs typeface="+mn-cs"/>
+              </a:rPr>
+              <a:t>is closer to </a:t>
+            </a:r>
+            <a:r>
+              <a:rPr lang="en-US" sz="1200" b="0" i="1" u="none" strike="noStrike" kern="1200" baseline="0" dirty="0" smtClean="0">
+                <a:solidFill>
+                  <a:schemeClr val="tx1"/>
+                </a:solidFill>
+                <a:latin typeface="+mn-lt"/>
+                <a:ea typeface="+mn-ea"/>
+                <a:cs typeface="+mn-cs"/>
+              </a:rPr>
+              <a:t>R2</a:t>
+            </a:r>
+            <a:r>
+              <a:rPr lang="en-US" sz="1200" b="0" i="0" u="none" strike="noStrike" kern="1200" baseline="0" dirty="0" smtClean="0">
+                <a:solidFill>
+                  <a:schemeClr val="tx1"/>
+                </a:solidFill>
+                <a:latin typeface="+mn-lt"/>
+                <a:ea typeface="+mn-ea"/>
+                <a:cs typeface="+mn-cs"/>
+              </a:rPr>
+              <a:t>. This provides a more honest association between X and Y.</a:t>
+            </a:r>
+          </a:p>
+          <a:p>
+            <a:pPr marL="228600" marR="0" indent="-228600" algn="l" defTabSz="914400" rtl="0" eaLnBrk="1" fontAlgn="auto" latinLnBrk="0" hangingPunct="1">
+              <a:lnSpc>
+                <a:spcPct val="100000"/>
+              </a:lnSpc>
+              <a:spcBef>
+                <a:spcPts val="0"/>
+              </a:spcBef>
+              <a:spcAft>
+                <a:spcPts val="0"/>
+              </a:spcAft>
+              <a:buClrTx/>
+              <a:buSzTx/>
+              <a:buFontTx/>
+              <a:buAutoNum type="arabicParenR"/>
+              <a:tabLst/>
+              <a:defRPr/>
+            </a:pPr>
+            <a:r>
+              <a:rPr lang="en-US" b="0" u="none" dirty="0" smtClean="0">
+                <a:solidFill>
+                  <a:srgbClr val="0E13E2"/>
+                </a:solidFill>
+              </a:rPr>
+              <a:t>F-statistic</a:t>
+            </a:r>
+            <a:r>
+              <a:rPr lang="en-US" b="0" u="none" baseline="0" dirty="0" smtClean="0">
+                <a:solidFill>
+                  <a:srgbClr val="0E13E2"/>
+                </a:solidFill>
+              </a:rPr>
+              <a:t> = tests the null hypothesis that all the model coefficients are 0; </a:t>
+            </a:r>
+            <a:r>
+              <a:rPr lang="en-US" sz="1200" b="0" i="0" u="none" strike="noStrike" kern="1200" baseline="0" dirty="0" smtClean="0">
+                <a:solidFill>
+                  <a:schemeClr val="tx1"/>
+                </a:solidFill>
+                <a:latin typeface="+mn-lt"/>
+                <a:ea typeface="+mn-ea"/>
+                <a:cs typeface="+mn-cs"/>
+              </a:rPr>
+              <a:t>p-value of the model--tests whether </a:t>
+            </a:r>
+            <a:r>
+              <a:rPr lang="en-US" sz="1200" b="0" i="1" u="none" strike="noStrike" kern="1200" baseline="0" dirty="0" smtClean="0">
+                <a:solidFill>
+                  <a:schemeClr val="tx1"/>
+                </a:solidFill>
+                <a:latin typeface="+mn-lt"/>
+                <a:ea typeface="+mn-ea"/>
+                <a:cs typeface="+mn-cs"/>
+              </a:rPr>
+              <a:t>R2</a:t>
+            </a:r>
+            <a:r>
+              <a:rPr lang="en-US" sz="1200" b="0" i="0" u="none" strike="noStrike" kern="1200" baseline="0" dirty="0" smtClean="0">
+                <a:solidFill>
+                  <a:schemeClr val="tx1"/>
+                </a:solidFill>
+                <a:latin typeface="+mn-lt"/>
+                <a:ea typeface="+mn-ea"/>
+                <a:cs typeface="+mn-cs"/>
+              </a:rPr>
+              <a:t>is different from 0. </a:t>
+            </a:r>
+            <a:endParaRPr lang="en-US" b="0" u="none" dirty="0" smtClean="0">
+              <a:solidFill>
+                <a:srgbClr val="0E13E2"/>
+              </a:solidFill>
+            </a:endParaRPr>
+          </a:p>
+          <a:p>
+            <a:pPr marL="228600" marR="0" indent="-228600" algn="l" defTabSz="914400" rtl="0" eaLnBrk="1" fontAlgn="auto" latinLnBrk="0" hangingPunct="1">
+              <a:lnSpc>
+                <a:spcPct val="100000"/>
+              </a:lnSpc>
+              <a:spcBef>
+                <a:spcPts val="0"/>
+              </a:spcBef>
+              <a:spcAft>
+                <a:spcPts val="0"/>
+              </a:spcAft>
+              <a:buClrTx/>
+              <a:buSzTx/>
+              <a:buFontTx/>
+              <a:buAutoNum type="arabicParenR"/>
+              <a:tabLst/>
+              <a:defRPr/>
+            </a:pPr>
+            <a:endParaRPr lang="en-US" b="0" u="none" dirty="0" smtClean="0">
+              <a:solidFill>
+                <a:srgbClr val="0E13E2"/>
+              </a:solidFill>
+            </a:endParaRPr>
+          </a:p>
+          <a:p>
+            <a:pPr marL="228600" marR="0" indent="-228600" algn="l" defTabSz="914400" rtl="0" eaLnBrk="1" fontAlgn="auto" latinLnBrk="0" hangingPunct="1">
+              <a:lnSpc>
+                <a:spcPct val="100000"/>
+              </a:lnSpc>
+              <a:spcBef>
+                <a:spcPts val="0"/>
+              </a:spcBef>
+              <a:spcAft>
+                <a:spcPts val="0"/>
+              </a:spcAft>
+              <a:buClrTx/>
+              <a:buSzTx/>
+              <a:buFontTx/>
+              <a:buAutoNum type="arabicParenR"/>
+              <a:tabLst/>
+              <a:defRPr/>
+            </a:pPr>
+            <a:endParaRPr lang="en-US" b="0" u="none" dirty="0" smtClean="0">
+              <a:solidFill>
+                <a:srgbClr val="0E13E2"/>
+              </a:solidFill>
+            </a:endParaRPr>
+          </a:p>
+          <a:p>
+            <a:pPr marL="228600" marR="0" indent="-228600" algn="l" defTabSz="914400" rtl="0" eaLnBrk="1" fontAlgn="auto" latinLnBrk="0" hangingPunct="1">
+              <a:lnSpc>
+                <a:spcPct val="100000"/>
+              </a:lnSpc>
+              <a:spcBef>
+                <a:spcPts val="0"/>
+              </a:spcBef>
+              <a:spcAft>
+                <a:spcPts val="0"/>
+              </a:spcAft>
+              <a:buClrTx/>
+              <a:buSzTx/>
+              <a:buFontTx/>
+              <a:buAutoNum type="arabicParenR"/>
+              <a:tabLst/>
+              <a:defRPr/>
+            </a:pPr>
+            <a:endParaRPr lang="en-US" b="0" u="none" dirty="0" smtClean="0">
+              <a:solidFill>
+                <a:srgbClr val="0E13E2"/>
+              </a:solidFill>
+            </a:endParaRPr>
+          </a:p>
+          <a:p>
+            <a:pPr marL="228600" indent="-228600">
+              <a:buAutoNum type="arabicParenR"/>
+            </a:pPr>
+            <a:endParaRPr lang="en-US" dirty="0"/>
           </a:p>
         </p:txBody>
       </p:sp>
@@ -674,7 +1062,7 @@
           <a:p>
             <a:fld id="{CC5A1FCD-79C7-4337-B79E-A51417706FB1}" type="slidenum">
               <a:rPr lang="en-US" smtClean="0"/>
-              <a:t>14</a:t>
+              <a:t>12</a:t>
             </a:fld>
             <a:endParaRPr lang="en-US"/>
           </a:p>
@@ -683,7 +1071,7 @@
     </p:spTree>
     <p:extLst>
       <p:ext uri="{BB962C8B-B14F-4D97-AF65-F5344CB8AC3E}">
-        <p14:creationId xmlns:p14="http://schemas.microsoft.com/office/powerpoint/2010/main" val="3028999263"/>
+        <p14:creationId xmlns:p14="http://schemas.microsoft.com/office/powerpoint/2010/main" val="4230247132"/>
       </p:ext>
     </p:extLst>
   </p:cSld>
@@ -739,41 +1127,28 @@
           <a:p>
             <a:r>
               <a:rPr lang="en-US" dirty="0" smtClean="0"/>
-              <a:t>Quantile</a:t>
+              <a:t>This plot is used to detect non-linearity, unequal error variances, and outliers. In</a:t>
             </a:r>
             <a:r>
               <a:rPr lang="en-US" baseline="0" dirty="0" smtClean="0"/>
-              <a:t> plot is a probability plot that can be used to compare the shapes of the data vs theoretical distribution, </a:t>
-            </a:r>
-            <a:r>
-              <a:rPr lang="en-US" baseline="0" dirty="0" err="1" smtClean="0"/>
-              <a:t>ie</a:t>
+              <a:t> a perfect world, the observations would be equally spread around a horizontal line without any distinct patterns.  </a:t>
+            </a:r>
+            <a:r>
+              <a:rPr lang="en-US" b="1" baseline="0" dirty="0" smtClean="0"/>
+              <a:t>Do you see a linear trend? What about their variances? Are there any outliers? </a:t>
             </a:r>
             <a:r>
               <a:rPr lang="en-US" baseline="0" dirty="0" smtClean="0"/>
-              <a:t>: location, scale, and skewness . If the quantiles of the theoretical and data distributions agree, observations will plot on the line shown in the figure above. </a:t>
+              <a:t>–click- </a:t>
             </a:r>
             <a:r>
               <a:rPr lang="en-US" b="1" baseline="0" dirty="0" smtClean="0"/>
-              <a:t>What do you notice about the tails of this distribution? </a:t>
-            </a:r>
-            <a:r>
-              <a:rPr lang="en-US" dirty="0" smtClean="0"/>
-              <a:t>The tails </a:t>
-            </a:r>
-            <a:r>
-              <a:rPr lang="en-US" baseline="0" dirty="0" smtClean="0"/>
-              <a:t>are positively skewed and there are a few outliers denoted by the observations labels--</a:t>
-            </a:r>
-            <a:r>
-              <a:rPr lang="en-US" dirty="0" smtClean="0"/>
-              <a:t>same outliers in this</a:t>
-            </a:r>
-            <a:r>
-              <a:rPr lang="en-US" baseline="0" dirty="0" smtClean="0"/>
-              <a:t> plot as the last. </a:t>
-            </a:r>
-            <a:endParaRPr lang="en-US" dirty="0"/>
+              <a:t>what about this model?</a:t>
+            </a:r>
+            <a:endParaRPr lang="en-US" b="1" dirty="0" smtClean="0"/>
+          </a:p>
+          <a:p>
+            <a:endParaRPr lang="en-US" dirty="0" smtClean="0"/>
           </a:p>
         </p:txBody>
       </p:sp>
@@ -794,7 +1169,7 @@
           <a:p>
             <a:fld id="{CC5A1FCD-79C7-4337-B79E-A51417706FB1}" type="slidenum">
               <a:rPr lang="en-US" smtClean="0"/>
-              <a:t>15</a:t>
+              <a:t>14</a:t>
             </a:fld>
             <a:endParaRPr lang="en-US"/>
           </a:p>
@@ -803,7 +1178,7 @@
     </p:spTree>
     <p:extLst>
       <p:ext uri="{BB962C8B-B14F-4D97-AF65-F5344CB8AC3E}">
-        <p14:creationId xmlns:p14="http://schemas.microsoft.com/office/powerpoint/2010/main" val="1425745574"/>
+        <p14:creationId xmlns:p14="http://schemas.microsoft.com/office/powerpoint/2010/main" val="3028999263"/>
       </p:ext>
     </p:extLst>
   </p:cSld>
@@ -859,17 +1234,41 @@
           <a:p>
             <a:r>
               <a:rPr lang="en-US" dirty="0" smtClean="0"/>
-              <a:t>This plot shows if residuals are spread equally along the ranges of predictors. This is how you can check the assumption of equal variance (homoscedasticity). It’s good if you see a horizontal line with equally (randomly) spread points. </a:t>
-            </a:r>
-            <a:r>
-              <a:rPr lang="en-US" b="1" dirty="0" smtClean="0"/>
-              <a:t>What</a:t>
+              <a:t>Quantile</a:t>
+            </a:r>
+            <a:r>
+              <a:rPr lang="en-US" baseline="0" dirty="0" smtClean="0"/>
+              <a:t> plot is a probability plot that can be used to compare the shapes of the data vs theoretical distribution, </a:t>
+            </a:r>
+            <a:r>
+              <a:rPr lang="en-US" baseline="0" dirty="0" err="1" smtClean="0"/>
+              <a:t>ie</a:t>
+            </a:r>
+            <a:r>
+              <a:rPr lang="en-US" baseline="0" dirty="0" smtClean="0"/>
+              <a:t>: location, scale, and skewness . If the quantiles of the theoretical and data distributions agree, observations will plot on the line shown in the figure above. </a:t>
             </a:r>
             <a:r>
               <a:rPr lang="en-US" b="1" baseline="0" dirty="0" smtClean="0"/>
-              <a:t> does this plot tell you?</a:t>
-            </a:r>
-            <a:endParaRPr lang="en-US" b="1" dirty="0"/>
+              <a:t>What do you notice about the tails of this distribution? </a:t>
+            </a:r>
+            <a:r>
+              <a:rPr lang="en-US" dirty="0" smtClean="0"/>
+              <a:t>The tails </a:t>
+            </a:r>
+            <a:r>
+              <a:rPr lang="en-US" baseline="0" dirty="0" smtClean="0"/>
+              <a:t>are positively skewed and there are a few outliers denoted by the observations labels--</a:t>
+            </a:r>
+            <a:r>
+              <a:rPr lang="en-US" dirty="0" smtClean="0"/>
+              <a:t>same outliers in this</a:t>
+            </a:r>
+            <a:r>
+              <a:rPr lang="en-US" baseline="0" dirty="0" smtClean="0"/>
+              <a:t> plot as the last. </a:t>
+            </a:r>
+            <a:endParaRPr lang="en-US" dirty="0"/>
           </a:p>
         </p:txBody>
       </p:sp>
@@ -890,7 +1289,7 @@
           <a:p>
             <a:fld id="{CC5A1FCD-79C7-4337-B79E-A51417706FB1}" type="slidenum">
               <a:rPr lang="en-US" smtClean="0"/>
-              <a:t>16</a:t>
+              <a:t>15</a:t>
             </a:fld>
             <a:endParaRPr lang="en-US"/>
           </a:p>
@@ -899,7 +1298,7 @@
     </p:spTree>
     <p:extLst>
       <p:ext uri="{BB962C8B-B14F-4D97-AF65-F5344CB8AC3E}">
-        <p14:creationId xmlns:p14="http://schemas.microsoft.com/office/powerpoint/2010/main" val="2228989618"/>
+        <p14:creationId xmlns:p14="http://schemas.microsoft.com/office/powerpoint/2010/main" val="1425745574"/>
       </p:ext>
     </p:extLst>
   </p:cSld>
@@ -954,59 +1353,16 @@
           <a:lstStyle/>
           <a:p>
             <a:r>
-              <a:rPr lang="en-US" sz="1200" b="1" kern="1200" dirty="0" smtClean="0">
-                <a:solidFill>
-                  <a:schemeClr val="tx1"/>
-                </a:solidFill>
-                <a:effectLst/>
-                <a:latin typeface="+mn-lt"/>
-                <a:ea typeface="+mn-ea"/>
-                <a:cs typeface="+mn-cs"/>
-              </a:rPr>
-              <a:t>Leverage points</a:t>
-            </a:r>
-            <a:r>
               <a:rPr lang="en-US" dirty="0" smtClean="0"/>
-              <a:t>: A leverage point is defined as an observation that has a value of x that is far away from the mean of x. </a:t>
-            </a:r>
-          </a:p>
-          <a:p>
-            <a:r>
-              <a:rPr lang="en-US" sz="1200" b="1" kern="1200" dirty="0" smtClean="0">
-                <a:solidFill>
-                  <a:schemeClr val="tx1"/>
-                </a:solidFill>
-                <a:effectLst/>
-                <a:latin typeface="+mn-lt"/>
-                <a:ea typeface="+mn-ea"/>
-                <a:cs typeface="+mn-cs"/>
-              </a:rPr>
-              <a:t>Influential observations (Cook’s D)</a:t>
-            </a:r>
-            <a:r>
-              <a:rPr lang="en-US" sz="1200" kern="1200" dirty="0" smtClean="0">
-                <a:solidFill>
-                  <a:schemeClr val="tx1"/>
-                </a:solidFill>
-                <a:effectLst/>
-                <a:latin typeface="+mn-lt"/>
-                <a:ea typeface="+mn-ea"/>
-                <a:cs typeface="+mn-cs"/>
-              </a:rPr>
-              <a:t>:</a:t>
-            </a:r>
-            <a:r>
-              <a:rPr lang="en-US" dirty="0" smtClean="0"/>
-              <a:t> An influential observation is defined as an observation that changes the slope of the line. Thus, influential points have a large influence on the fit of the model. One method to find influential points is to compare the fit of the model with and without each observation – Cook’s D.</a:t>
-            </a:r>
-          </a:p>
-          <a:p>
-            <a:endParaRPr lang="en-US" dirty="0" smtClean="0"/>
-          </a:p>
-          <a:p>
+              <a:t>This plot shows if residuals are spread equally along the ranges of predictors. This is how you can check the assumption of equal variance (homoscedasticity). It’s good if you see a horizontal line with equally (randomly) spread points. </a:t>
+            </a:r>
             <a:r>
               <a:rPr lang="en-US" b="1" dirty="0" smtClean="0"/>
-              <a:t>What do you notice about this plot?</a:t>
+              <a:t>What</a:t>
+            </a:r>
+            <a:r>
+              <a:rPr lang="en-US" b="1" baseline="0" dirty="0" smtClean="0"/>
+              <a:t> does this plot tell you?</a:t>
             </a:r>
             <a:endParaRPr lang="en-US" b="1" dirty="0"/>
           </a:p>
@@ -1029,7 +1385,7 @@
           <a:p>
             <a:fld id="{CC5A1FCD-79C7-4337-B79E-A51417706FB1}" type="slidenum">
               <a:rPr lang="en-US" smtClean="0"/>
-              <a:t>17</a:t>
+              <a:t>16</a:t>
             </a:fld>
             <a:endParaRPr lang="en-US"/>
           </a:p>
@@ -1038,7 +1394,7 @@
     </p:spTree>
     <p:extLst>
       <p:ext uri="{BB962C8B-B14F-4D97-AF65-F5344CB8AC3E}">
-        <p14:creationId xmlns:p14="http://schemas.microsoft.com/office/powerpoint/2010/main" val="1761964469"/>
+        <p14:creationId xmlns:p14="http://schemas.microsoft.com/office/powerpoint/2010/main" val="2228989618"/>
       </p:ext>
     </p:extLst>
   </p:cSld>
@@ -1093,63 +1449,61 @@
           <a:lstStyle/>
           <a:p>
             <a:r>
+              <a:rPr lang="en-US" sz="1200" b="1" kern="1200" dirty="0" smtClean="0">
+                <a:solidFill>
+                  <a:schemeClr val="tx1"/>
+                </a:solidFill>
+                <a:effectLst/>
+                <a:latin typeface="+mn-lt"/>
+                <a:ea typeface="+mn-ea"/>
+                <a:cs typeface="+mn-cs"/>
+              </a:rPr>
+              <a:t>Leverage points</a:t>
+            </a:r>
+            <a:r>
               <a:rPr lang="en-US" dirty="0" smtClean="0"/>
-              <a:t>Scull et al., 2005 in The</a:t>
-            </a:r>
-            <a:r>
-              <a:rPr lang="en-US" baseline="0" dirty="0" smtClean="0"/>
-              <a:t> Professional Geographer. This study compared </a:t>
-            </a:r>
-            <a:r>
-              <a:rPr lang="en-US" baseline="0" dirty="0" err="1" smtClean="0"/>
-              <a:t>nonspatial</a:t>
-            </a:r>
-            <a:r>
-              <a:rPr lang="en-US" baseline="0" dirty="0" smtClean="0"/>
-              <a:t> statistical models with geospatial statistical models to predict A horizon gravel and surface fragments for a portion of the Pinto Basin in Joshua Tree National Park, CA. They concluded that MLR performed the best with a m</a:t>
+              <a:t>: A leverage point is defined as an observation that has a value of x that is far away from the mean of x. </a:t>
+            </a:r>
+          </a:p>
+          <a:p>
+            <a:r>
+              <a:rPr lang="en-US" sz="1200" b="1" kern="1200" dirty="0" smtClean="0">
+                <a:solidFill>
+                  <a:schemeClr val="tx1"/>
+                </a:solidFill>
+                <a:effectLst/>
+                <a:latin typeface="+mn-lt"/>
+                <a:ea typeface="+mn-ea"/>
+                <a:cs typeface="+mn-cs"/>
+              </a:rPr>
+              <a:t>Influential observations (Cook’s D)</a:t>
+            </a:r>
+            <a:r>
+              <a:rPr lang="en-US" sz="1200" kern="1200" dirty="0" smtClean="0">
+                <a:solidFill>
+                  <a:schemeClr val="tx1"/>
+                </a:solidFill>
+                <a:effectLst/>
+                <a:latin typeface="+mn-lt"/>
+                <a:ea typeface="+mn-ea"/>
+                <a:cs typeface="+mn-cs"/>
+              </a:rPr>
+              <a:t>:</a:t>
             </a:r>
             <a:r>
               <a:rPr lang="en-US" dirty="0" smtClean="0"/>
-              <a:t>ean jackknife RMSE of </a:t>
-            </a:r>
-            <a:r>
-              <a:rPr lang="en-US" baseline="0" dirty="0" smtClean="0"/>
-              <a:t>12.7% for A horizon gravel and 20.7% for rock fragments. </a:t>
-            </a:r>
-            <a:r>
-              <a:rPr lang="en-US" b="1" baseline="0" dirty="0" smtClean="0"/>
-              <a:t>Looking at the fitted vs actual values, what do you notice about their MLR model?</a:t>
-            </a:r>
-          </a:p>
-          <a:p>
-            <a:endParaRPr lang="en-US" baseline="0" dirty="0" smtClean="0"/>
-          </a:p>
-          <a:p>
-            <a:r>
-              <a:rPr lang="en-US" baseline="0" dirty="0" smtClean="0"/>
-              <a:t>-PCA of </a:t>
-            </a:r>
-            <a:r>
-              <a:rPr lang="en-US" baseline="0" dirty="0" err="1" smtClean="0"/>
-              <a:t>landsat</a:t>
-            </a:r>
-            <a:r>
-              <a:rPr lang="en-US" baseline="0" dirty="0" smtClean="0"/>
-              <a:t> was used in MLR models</a:t>
-            </a:r>
-          </a:p>
-          <a:p>
-            <a:r>
-              <a:rPr lang="en-US" baseline="0" dirty="0" smtClean="0"/>
-              <a:t>“the high standard deviations for the regression tree and geostatistical models show that they are more sensitive to outliers and data anomalies than other methods”</a:t>
-            </a:r>
-          </a:p>
-          <a:p>
-            <a:r>
-              <a:rPr lang="en-US" baseline="0" dirty="0" smtClean="0"/>
-              <a:t>“the discontinuous data pattern.” </a:t>
-            </a:r>
-            <a:endParaRPr lang="en-US" dirty="0"/>
+              <a:t> An influential observation is defined as an observation that changes the slope of the line. Thus, influential points have a large influence on the fit of the model. One method to find influential points is to compare the fit of the model with and without each observation – Cook’s D.</a:t>
+            </a:r>
+          </a:p>
+          <a:p>
+            <a:endParaRPr lang="en-US" dirty="0" smtClean="0"/>
+          </a:p>
+          <a:p>
+            <a:r>
+              <a:rPr lang="en-US" b="1" dirty="0" smtClean="0"/>
+              <a:t>What do you notice about this plot?</a:t>
+            </a:r>
+            <a:endParaRPr lang="en-US" b="1" dirty="0"/>
           </a:p>
         </p:txBody>
       </p:sp>
@@ -1170,7 +1524,7 @@
           <a:p>
             <a:fld id="{CC5A1FCD-79C7-4337-B79E-A51417706FB1}" type="slidenum">
               <a:rPr lang="en-US" smtClean="0"/>
-              <a:t>19</a:t>
+              <a:t>17</a:t>
             </a:fld>
             <a:endParaRPr lang="en-US"/>
           </a:p>
@@ -1179,7 +1533,7 @@
     </p:spTree>
     <p:extLst>
       <p:ext uri="{BB962C8B-B14F-4D97-AF65-F5344CB8AC3E}">
-        <p14:creationId xmlns:p14="http://schemas.microsoft.com/office/powerpoint/2010/main" val="1991638967"/>
+        <p14:creationId xmlns:p14="http://schemas.microsoft.com/office/powerpoint/2010/main" val="1761964469"/>
       </p:ext>
     </p:extLst>
   </p:cSld>
@@ -1235,19 +1589,60 @@
           <a:p>
             <a:r>
               <a:rPr lang="en-US" dirty="0" smtClean="0"/>
-              <a:t>Regression</a:t>
+              <a:t>Scull et al., 2005 in The</a:t>
             </a:r>
             <a:r>
               <a:rPr lang="en-US" baseline="0" dirty="0" smtClean="0"/>
-              <a:t> can also be used in geospatial models, such as regression kriging, geographically weighted regression, etc. It is common in the soil science field to </a:t>
+              <a:t> Professional Geographer. This study compared </a:t>
             </a:r>
             <a:r>
               <a:rPr lang="en-US" baseline="0" dirty="0" err="1" smtClean="0"/>
-              <a:t>krige</a:t>
+              <a:t>nonspatial</a:t>
             </a:r>
             <a:r>
               <a:rPr lang="en-US" baseline="0" dirty="0" smtClean="0"/>
-              <a:t> the residuals of a model such as OLS and add them to the OLS model to better capture spatial variability in the model. </a:t>
+              <a:t> statistical models with geospatial statistical models to predict A horizon gravel and surface fragments for a portion of the Pinto Basin in Joshua Tree National Park, CA. They concluded that MLR performed the best with a m</a:t>
+            </a:r>
+            <a:r>
+              <a:rPr lang="en-US" dirty="0" smtClean="0"/>
+              <a:t>ean jackknife RMSE of </a:t>
+            </a:r>
+            <a:r>
+              <a:rPr lang="en-US" baseline="0" dirty="0" smtClean="0"/>
+              <a:t>12.7% for A horizon gravel and 20.7% for rock fragments. </a:t>
+            </a:r>
+            <a:r>
+              <a:rPr lang="en-US" b="1" baseline="0" dirty="0" smtClean="0"/>
+              <a:t>Looking at the fitted vs actual values, what do you notice about their MLR model?</a:t>
+            </a:r>
+          </a:p>
+          <a:p>
+            <a:endParaRPr lang="en-US" baseline="0" dirty="0" smtClean="0"/>
+          </a:p>
+          <a:p>
+            <a:r>
+              <a:rPr lang="en-US" baseline="0" dirty="0" smtClean="0"/>
+              <a:t>-PCA of </a:t>
+            </a:r>
+            <a:r>
+              <a:rPr lang="en-US" baseline="0" dirty="0" err="1" smtClean="0"/>
+              <a:t>landsat</a:t>
+            </a:r>
+            <a:r>
+              <a:rPr lang="en-US" baseline="0" dirty="0" smtClean="0"/>
+              <a:t> was used in MLR models</a:t>
+            </a:r>
+          </a:p>
+          <a:p>
+            <a:r>
+              <a:rPr lang="en-US" baseline="0" dirty="0" smtClean="0"/>
+              <a:t>“the high standard deviations for the regression tree and geostatistical models show that they are more sensitive to outliers and data anomalies than other methods”</a:t>
+            </a:r>
+          </a:p>
+          <a:p>
+            <a:r>
+              <a:rPr lang="en-US" baseline="0" dirty="0" smtClean="0"/>
+              <a:t>“the discontinuous data pattern.” </a:t>
             </a:r>
             <a:endParaRPr lang="en-US" dirty="0"/>
           </a:p>
@@ -1270,7 +1665,7 @@
           <a:p>
             <a:fld id="{CC5A1FCD-79C7-4337-B79E-A51417706FB1}" type="slidenum">
               <a:rPr lang="en-US" smtClean="0"/>
-              <a:t>21</a:t>
+              <a:t>19</a:t>
             </a:fld>
             <a:endParaRPr lang="en-US"/>
           </a:p>
@@ -1279,7 +1674,7 @@
     </p:spTree>
     <p:extLst>
       <p:ext uri="{BB962C8B-B14F-4D97-AF65-F5344CB8AC3E}">
-        <p14:creationId xmlns:p14="http://schemas.microsoft.com/office/powerpoint/2010/main" val="1152817016"/>
+        <p14:creationId xmlns:p14="http://schemas.microsoft.com/office/powerpoint/2010/main" val="1991638967"/>
       </p:ext>
     </p:extLst>
   </p:cSld>
@@ -1333,6 +1728,22 @@
           <a:bodyPr/>
           <a:lstStyle/>
           <a:p>
+            <a:r>
+              <a:rPr lang="en-US" dirty="0" smtClean="0"/>
+              <a:t>Regression</a:t>
+            </a:r>
+            <a:r>
+              <a:rPr lang="en-US" baseline="0" dirty="0" smtClean="0"/>
+              <a:t> can also be used in geospatial models, such as regression kriging, geographically weighted regression, etc. It is common in the soil science field to </a:t>
+            </a:r>
+            <a:r>
+              <a:rPr lang="en-US" baseline="0" dirty="0" err="1" smtClean="0"/>
+              <a:t>krige</a:t>
+            </a:r>
+            <a:r>
+              <a:rPr lang="en-US" baseline="0" dirty="0" smtClean="0"/>
+              <a:t> the residuals of a model such as OLS and add them to the OLS model to better capture spatial variability in the model. </a:t>
+            </a:r>
             <a:endParaRPr lang="en-US" dirty="0"/>
           </a:p>
         </p:txBody>
@@ -1354,7 +1765,7 @@
           <a:p>
             <a:fld id="{CC5A1FCD-79C7-4337-B79E-A51417706FB1}" type="slidenum">
               <a:rPr lang="en-US" smtClean="0"/>
-              <a:t>22</a:t>
+              <a:t>21</a:t>
             </a:fld>
             <a:endParaRPr lang="en-US"/>
           </a:p>
@@ -1363,7 +1774,7 @@
     </p:spTree>
     <p:extLst>
       <p:ext uri="{BB962C8B-B14F-4D97-AF65-F5344CB8AC3E}">
-        <p14:creationId xmlns:p14="http://schemas.microsoft.com/office/powerpoint/2010/main" val="2613395863"/>
+        <p14:creationId xmlns:p14="http://schemas.microsoft.com/office/powerpoint/2010/main" val="1152817016"/>
       </p:ext>
     </p:extLst>
   </p:cSld>
@@ -1417,70 +1828,7 @@
           <a:bodyPr/>
           <a:lstStyle/>
           <a:p>
-            <a:pPr marL="0" marR="0" indent="0" algn="l" defTabSz="914400" rtl="0" eaLnBrk="1" fontAlgn="auto" latinLnBrk="0" hangingPunct="1">
-              <a:lnSpc>
-                <a:spcPct val="100000"/>
-              </a:lnSpc>
-              <a:spcBef>
-                <a:spcPts val="0"/>
-              </a:spcBef>
-              <a:spcAft>
-                <a:spcPts val="0"/>
-              </a:spcAft>
-              <a:buClrTx/>
-              <a:buSzTx/>
-              <a:buFontTx/>
-              <a:buNone/>
-              <a:tabLst/>
-              <a:defRPr/>
-            </a:pPr>
-            <a:r>
-              <a:rPr lang="en-US" altLang="en-US" b="0" dirty="0" smtClean="0"/>
-              <a:t>The Sum of Squares Regression (SSR) is the sum of the squared differences between the prediction for each observation and the population mean. (explained</a:t>
-            </a:r>
-            <a:r>
-              <a:rPr lang="en-US" altLang="en-US" b="0" baseline="0" dirty="0" smtClean="0"/>
-              <a:t> variation)</a:t>
-            </a:r>
-            <a:endParaRPr lang="en-US" altLang="en-US" b="0" dirty="0" smtClean="0"/>
-          </a:p>
-          <a:p>
-            <a:endParaRPr lang="en-US" b="0" dirty="0" smtClean="0"/>
-          </a:p>
-          <a:p>
-            <a:pPr eaLnBrk="1" hangingPunct="1">
-              <a:spcBef>
-                <a:spcPct val="50000"/>
-              </a:spcBef>
-            </a:pPr>
-            <a:r>
-              <a:rPr lang="en-US" altLang="en-US" b="0" dirty="0" smtClean="0"/>
-              <a:t>A least squares regression selects the line with the lowest total sum of squared prediction errors or SSE</a:t>
-            </a:r>
-            <a:r>
-              <a:rPr lang="en-US" altLang="en-US" b="0" baseline="0" dirty="0" smtClean="0"/>
-              <a:t> (unexplained variation)</a:t>
-            </a:r>
-          </a:p>
-          <a:p>
-            <a:pPr eaLnBrk="1" hangingPunct="1">
-              <a:spcBef>
-                <a:spcPct val="50000"/>
-              </a:spcBef>
-            </a:pPr>
-            <a:endParaRPr lang="en-US" altLang="en-US" b="0" baseline="0" dirty="0" smtClean="0"/>
-          </a:p>
-          <a:p>
-            <a:pPr eaLnBrk="1" hangingPunct="1">
-              <a:spcBef>
-                <a:spcPct val="50000"/>
-              </a:spcBef>
-            </a:pPr>
-            <a:r>
-              <a:rPr lang="en-US" altLang="en-US" b="0" baseline="0" dirty="0" smtClean="0"/>
-              <a:t>SST (total variation in y)</a:t>
-            </a:r>
-            <a:endParaRPr lang="en-US" altLang="en-US" b="0" dirty="0" smtClean="0"/>
+            <a:endParaRPr lang="en-US" dirty="0"/>
           </a:p>
         </p:txBody>
       </p:sp>
@@ -1501,7 +1849,7 @@
           <a:p>
             <a:fld id="{CC5A1FCD-79C7-4337-B79E-A51417706FB1}" type="slidenum">
               <a:rPr lang="en-US" smtClean="0"/>
-              <a:t>24</a:t>
+              <a:t>22</a:t>
             </a:fld>
             <a:endParaRPr lang="en-US"/>
           </a:p>
@@ -1510,7 +1858,7 @@
     </p:spTree>
     <p:extLst>
       <p:ext uri="{BB962C8B-B14F-4D97-AF65-F5344CB8AC3E}">
-        <p14:creationId xmlns:p14="http://schemas.microsoft.com/office/powerpoint/2010/main" val="975952257"/>
+        <p14:creationId xmlns:p14="http://schemas.microsoft.com/office/powerpoint/2010/main" val="2613395863"/>
       </p:ext>
     </p:extLst>
   </p:cSld>
@@ -1564,7 +1912,70 @@
           <a:bodyPr/>
           <a:lstStyle/>
           <a:p>
-            <a:endParaRPr lang="en-US" b="0" baseline="0" dirty="0" smtClean="0"/>
+            <a:pPr marL="0" marR="0" indent="0" algn="l" defTabSz="914400" rtl="0" eaLnBrk="1" fontAlgn="auto" latinLnBrk="0" hangingPunct="1">
+              <a:lnSpc>
+                <a:spcPct val="100000"/>
+              </a:lnSpc>
+              <a:spcBef>
+                <a:spcPts val="0"/>
+              </a:spcBef>
+              <a:spcAft>
+                <a:spcPts val="0"/>
+              </a:spcAft>
+              <a:buClrTx/>
+              <a:buSzTx/>
+              <a:buFontTx/>
+              <a:buNone/>
+              <a:tabLst/>
+              <a:defRPr/>
+            </a:pPr>
+            <a:r>
+              <a:rPr lang="en-US" altLang="en-US" b="0" dirty="0" smtClean="0"/>
+              <a:t>The Sum of Squares Regression (SSR) is the sum of the squared differences between the prediction for each observation and the population mean. (explained</a:t>
+            </a:r>
+            <a:r>
+              <a:rPr lang="en-US" altLang="en-US" b="0" baseline="0" dirty="0" smtClean="0"/>
+              <a:t> variation)</a:t>
+            </a:r>
+            <a:endParaRPr lang="en-US" altLang="en-US" b="0" dirty="0" smtClean="0"/>
+          </a:p>
+          <a:p>
+            <a:endParaRPr lang="en-US" b="0" dirty="0" smtClean="0"/>
+          </a:p>
+          <a:p>
+            <a:pPr eaLnBrk="1" hangingPunct="1">
+              <a:spcBef>
+                <a:spcPct val="50000"/>
+              </a:spcBef>
+            </a:pPr>
+            <a:r>
+              <a:rPr lang="en-US" altLang="en-US" b="0" dirty="0" smtClean="0"/>
+              <a:t>A least squares regression selects the line with the lowest total sum of squared prediction errors or SSE</a:t>
+            </a:r>
+            <a:r>
+              <a:rPr lang="en-US" altLang="en-US" b="0" baseline="0" dirty="0" smtClean="0"/>
+              <a:t> (unexplained variation)</a:t>
+            </a:r>
+          </a:p>
+          <a:p>
+            <a:pPr eaLnBrk="1" hangingPunct="1">
+              <a:spcBef>
+                <a:spcPct val="50000"/>
+              </a:spcBef>
+            </a:pPr>
+            <a:endParaRPr lang="en-US" altLang="en-US" b="0" baseline="0" dirty="0" smtClean="0"/>
+          </a:p>
+          <a:p>
+            <a:pPr eaLnBrk="1" hangingPunct="1">
+              <a:spcBef>
+                <a:spcPct val="50000"/>
+              </a:spcBef>
+            </a:pPr>
+            <a:r>
+              <a:rPr lang="en-US" altLang="en-US" b="0" baseline="0" dirty="0" smtClean="0"/>
+              <a:t>SST (total variation in y)</a:t>
+            </a:r>
+            <a:endParaRPr lang="en-US" altLang="en-US" b="0" dirty="0" smtClean="0"/>
           </a:p>
         </p:txBody>
       </p:sp>
@@ -1585,7 +1996,7 @@
           <a:p>
             <a:fld id="{CC5A1FCD-79C7-4337-B79E-A51417706FB1}" type="slidenum">
               <a:rPr lang="en-US" smtClean="0"/>
-              <a:t>25</a:t>
+              <a:t>24</a:t>
             </a:fld>
             <a:endParaRPr lang="en-US"/>
           </a:p>
@@ -1594,7 +2005,7 @@
     </p:spTree>
     <p:extLst>
       <p:ext uri="{BB962C8B-B14F-4D97-AF65-F5344CB8AC3E}">
-        <p14:creationId xmlns:p14="http://schemas.microsoft.com/office/powerpoint/2010/main" val="3405494277"/>
+        <p14:creationId xmlns:p14="http://schemas.microsoft.com/office/powerpoint/2010/main" val="975952257"/>
       </p:ext>
     </p:extLst>
   </p:cSld>
@@ -1669,7 +2080,7 @@
           <a:p>
             <a:fld id="{CC5A1FCD-79C7-4337-B79E-A51417706FB1}" type="slidenum">
               <a:rPr lang="en-US" smtClean="0"/>
-              <a:t>26</a:t>
+              <a:t>25</a:t>
             </a:fld>
             <a:endParaRPr lang="en-US"/>
           </a:p>
@@ -1678,7 +2089,7 @@
     </p:spTree>
     <p:extLst>
       <p:ext uri="{BB962C8B-B14F-4D97-AF65-F5344CB8AC3E}">
-        <p14:creationId xmlns:p14="http://schemas.microsoft.com/office/powerpoint/2010/main" val="229642298"/>
+        <p14:creationId xmlns:p14="http://schemas.microsoft.com/office/powerpoint/2010/main" val="3405494277"/>
       </p:ext>
     </p:extLst>
   </p:cSld>
@@ -1763,6 +2174,90 @@
     <p:extLst>
       <p:ext uri="{BB962C8B-B14F-4D97-AF65-F5344CB8AC3E}">
         <p14:creationId xmlns:p14="http://schemas.microsoft.com/office/powerpoint/2010/main" val="3142198636"/>
+      </p:ext>
+    </p:extLst>
+  </p:cSld>
+  <p:clrMapOvr>
+    <a:masterClrMapping/>
+  </p:clrMapOvr>
+</p:notes>
+</file>
+
+<file path=ppt/notesSlides/notesSlide20.xml><?xml version="1.0" encoding="utf-8"?>
+<p:notes xmlns:a="http://schemas.openxmlformats.org/drawingml/2006/main" xmlns:r="http://schemas.openxmlformats.org/officeDocument/2006/relationships" xmlns:p="http://schemas.openxmlformats.org/presentationml/2006/main">
+  <p:cSld>
+    <p:spTree>
+      <p:nvGrpSpPr>
+        <p:cNvPr id="1" name=""/>
+        <p:cNvGrpSpPr/>
+        <p:nvPr/>
+      </p:nvGrpSpPr>
+      <p:grpSpPr>
+        <a:xfrm>
+          <a:off x="0" y="0"/>
+          <a:ext cx="0" cy="0"/>
+          <a:chOff x="0" y="0"/>
+          <a:chExt cx="0" cy="0"/>
+        </a:xfrm>
+      </p:grpSpPr>
+      <p:sp>
+        <p:nvSpPr>
+          <p:cNvPr id="2" name="Slide Image Placeholder 1"/>
+          <p:cNvSpPr>
+            <a:spLocks noGrp="1" noRot="1" noChangeAspect="1"/>
+          </p:cNvSpPr>
+          <p:nvPr>
+            <p:ph type="sldImg"/>
+          </p:nvPr>
+        </p:nvSpPr>
+        <p:spPr/>
+      </p:sp>
+      <p:sp>
+        <p:nvSpPr>
+          <p:cNvPr id="3" name="Notes Placeholder 2"/>
+          <p:cNvSpPr>
+            <a:spLocks noGrp="1"/>
+          </p:cNvSpPr>
+          <p:nvPr>
+            <p:ph type="body" idx="1"/>
+          </p:nvPr>
+        </p:nvSpPr>
+        <p:spPr/>
+        <p:txBody>
+          <a:bodyPr/>
+          <a:lstStyle/>
+          <a:p>
+            <a:endParaRPr lang="en-US" b="0" baseline="0" dirty="0" smtClean="0"/>
+          </a:p>
+        </p:txBody>
+      </p:sp>
+      <p:sp>
+        <p:nvSpPr>
+          <p:cNvPr id="4" name="Slide Number Placeholder 3"/>
+          <p:cNvSpPr>
+            <a:spLocks noGrp="1"/>
+          </p:cNvSpPr>
+          <p:nvPr>
+            <p:ph type="sldNum" sz="quarter" idx="10"/>
+          </p:nvPr>
+        </p:nvSpPr>
+        <p:spPr/>
+        <p:txBody>
+          <a:bodyPr/>
+          <a:lstStyle/>
+          <a:p>
+            <a:fld id="{CC5A1FCD-79C7-4337-B79E-A51417706FB1}" type="slidenum">
+              <a:rPr lang="en-US" smtClean="0"/>
+              <a:t>26</a:t>
+            </a:fld>
+            <a:endParaRPr lang="en-US"/>
+          </a:p>
+        </p:txBody>
+      </p:sp>
+    </p:spTree>
+    <p:extLst>
+      <p:ext uri="{BB962C8B-B14F-4D97-AF65-F5344CB8AC3E}">
+        <p14:creationId xmlns:p14="http://schemas.microsoft.com/office/powerpoint/2010/main" val="229642298"/>
       </p:ext>
     </p:extLst>
   </p:cSld>
@@ -2416,417 +2911,14 @@
           <a:bodyPr/>
           <a:lstStyle/>
           <a:p>
-            <a:pPr marL="228600" indent="-228600">
-              <a:buAutoNum type="arabicParenR"/>
-            </a:pPr>
             <a:r>
               <a:rPr lang="en-US" dirty="0" smtClean="0"/>
-              <a:t>Model</a:t>
+              <a:t>Simply, if you have any of these issues with your model, you should either </a:t>
             </a:r>
             <a:r>
               <a:rPr lang="en-US" baseline="0" dirty="0" smtClean="0"/>
-              <a:t> formula</a:t>
-            </a:r>
-          </a:p>
-          <a:p>
-            <a:pPr marL="228600" indent="-228600">
-              <a:buAutoNum type="arabicParenR"/>
-            </a:pPr>
-            <a:r>
-              <a:rPr lang="en-US" baseline="0" dirty="0" smtClean="0"/>
-              <a:t>Quartiles, or 5 number summary of residuals</a:t>
-            </a:r>
-          </a:p>
-          <a:p>
-            <a:pPr marL="228600" indent="-228600">
-              <a:buAutoNum type="arabicParenR"/>
-            </a:pPr>
-            <a:r>
-              <a:rPr lang="en-US" baseline="0" dirty="0" smtClean="0"/>
-              <a:t>Estimate of the y-intercept (estimated mean of Y when all X’s are zero) and slope of x</a:t>
-            </a:r>
-          </a:p>
-          <a:p>
-            <a:pPr marL="228600" indent="-228600">
-              <a:buAutoNum type="arabicParenR"/>
-            </a:pPr>
-            <a:r>
-              <a:rPr lang="en-US" baseline="0" dirty="0" smtClean="0"/>
-              <a:t>Standard error of the y-intercept and slope</a:t>
-            </a:r>
-          </a:p>
-          <a:p>
-            <a:pPr marL="228600" marR="0" indent="-228600" algn="l" defTabSz="914400" rtl="0" eaLnBrk="1" fontAlgn="auto" latinLnBrk="0" hangingPunct="1">
-              <a:lnSpc>
-                <a:spcPct val="100000"/>
-              </a:lnSpc>
-              <a:spcBef>
-                <a:spcPts val="0"/>
-              </a:spcBef>
-              <a:spcAft>
-                <a:spcPts val="0"/>
-              </a:spcAft>
-              <a:buClrTx/>
-              <a:buSzTx/>
-              <a:buFontTx/>
-              <a:buAutoNum type="arabicParenR"/>
-              <a:tabLst/>
-              <a:defRPr/>
-            </a:pPr>
-            <a:r>
-              <a:rPr lang="en-US" sz="1200" b="0" i="0" u="none" strike="noStrike" kern="1200" baseline="0" dirty="0" smtClean="0">
-                <a:solidFill>
-                  <a:schemeClr val="tx1"/>
-                </a:solidFill>
-                <a:latin typeface="+mn-lt"/>
-                <a:ea typeface="+mn-ea"/>
-                <a:cs typeface="+mn-cs"/>
-              </a:rPr>
-              <a:t>The t-values test the hypothesis that the coefficient is different from 0. You can get the t-values by dividing the coefficient by its standard error. The t-values also show the importance of a variable in the model. </a:t>
-            </a:r>
-          </a:p>
-          <a:p>
-            <a:pPr marL="228600" marR="0" indent="-228600" algn="l" defTabSz="914400" rtl="0" eaLnBrk="1" fontAlgn="auto" latinLnBrk="0" hangingPunct="1">
-              <a:lnSpc>
-                <a:spcPct val="100000"/>
-              </a:lnSpc>
-              <a:spcBef>
-                <a:spcPts val="0"/>
-              </a:spcBef>
-              <a:spcAft>
-                <a:spcPts val="0"/>
-              </a:spcAft>
-              <a:buClrTx/>
-              <a:buSzTx/>
-              <a:buFontTx/>
-              <a:buAutoNum type="arabicParenR"/>
-              <a:tabLst/>
-              <a:defRPr/>
-            </a:pPr>
-            <a:r>
-              <a:rPr lang="en-US" sz="1200" b="0" i="0" u="none" strike="noStrike" kern="1200" baseline="0" dirty="0" smtClean="0">
-                <a:solidFill>
-                  <a:schemeClr val="tx1"/>
-                </a:solidFill>
-                <a:latin typeface="+mn-lt"/>
-                <a:ea typeface="+mn-ea"/>
-                <a:cs typeface="+mn-cs"/>
-              </a:rPr>
-              <a:t>Two-tail p-values test the hypothesis that each coefficient is different from 0. </a:t>
-            </a:r>
-          </a:p>
-          <a:p>
-            <a:pPr marL="228600" marR="0" indent="-228600" algn="l" defTabSz="914400" rtl="0" eaLnBrk="1" fontAlgn="auto" latinLnBrk="0" hangingPunct="1">
-              <a:lnSpc>
-                <a:spcPct val="100000"/>
-              </a:lnSpc>
-              <a:spcBef>
-                <a:spcPts val="0"/>
-              </a:spcBef>
-              <a:spcAft>
-                <a:spcPts val="0"/>
-              </a:spcAft>
-              <a:buClrTx/>
-              <a:buSzTx/>
-              <a:buFontTx/>
-              <a:buAutoNum type="arabicParenR"/>
-              <a:tabLst/>
-              <a:defRPr/>
-            </a:pPr>
-            <a:r>
-              <a:rPr lang="en-US" b="0" u="none" dirty="0" smtClean="0">
-                <a:solidFill>
-                  <a:srgbClr val="0E13E2"/>
-                </a:solidFill>
-              </a:rPr>
-              <a:t>RMSE; Relative</a:t>
-            </a:r>
-            <a:r>
-              <a:rPr lang="en-US" b="0" u="none" baseline="0" dirty="0" smtClean="0">
-                <a:solidFill>
-                  <a:srgbClr val="0E13E2"/>
-                </a:solidFill>
-              </a:rPr>
-              <a:t> model error; </a:t>
-            </a:r>
-            <a:r>
-              <a:rPr lang="en-US" b="0" u="none" dirty="0" smtClean="0">
-                <a:solidFill>
-                  <a:srgbClr val="0E13E2"/>
-                </a:solidFill>
-              </a:rPr>
-              <a:t>degrees</a:t>
-            </a:r>
-            <a:r>
-              <a:rPr lang="en-US" b="0" u="none" baseline="0" dirty="0" smtClean="0">
-                <a:solidFill>
-                  <a:srgbClr val="0E13E2"/>
-                </a:solidFill>
-              </a:rPr>
-              <a:t> of freedom = n-2</a:t>
-            </a:r>
-            <a:endParaRPr lang="en-US" b="0" u="none" dirty="0" smtClean="0">
-              <a:solidFill>
-                <a:srgbClr val="0E13E2"/>
-              </a:solidFill>
-            </a:endParaRPr>
-          </a:p>
-          <a:p>
-            <a:pPr marL="228600" marR="0" indent="-228600" algn="l" defTabSz="914400" rtl="0" eaLnBrk="1" fontAlgn="auto" latinLnBrk="0" hangingPunct="1">
-              <a:lnSpc>
-                <a:spcPct val="100000"/>
-              </a:lnSpc>
-              <a:spcBef>
-                <a:spcPts val="0"/>
-              </a:spcBef>
-              <a:spcAft>
-                <a:spcPts val="0"/>
-              </a:spcAft>
-              <a:buClrTx/>
-              <a:buSzTx/>
-              <a:buFontTx/>
-              <a:buAutoNum type="arabicParenR"/>
-              <a:tabLst/>
-              <a:defRPr/>
-            </a:pPr>
-            <a:r>
-              <a:rPr lang="en-US" sz="1200" b="0" i="0" u="none" strike="noStrike" kern="1200" baseline="0" dirty="0" smtClean="0">
-                <a:solidFill>
-                  <a:schemeClr val="tx1"/>
-                </a:solidFill>
-                <a:latin typeface="+mn-lt"/>
-                <a:ea typeface="+mn-ea"/>
-                <a:cs typeface="+mn-cs"/>
-              </a:rPr>
-              <a:t>R2 shows the amount of variance of Y explained by X. Adjusted R2 shows the same as </a:t>
-            </a:r>
-            <a:r>
-              <a:rPr lang="en-US" sz="1200" b="0" i="1" u="none" strike="noStrike" kern="1200" baseline="0" dirty="0" smtClean="0">
-                <a:solidFill>
-                  <a:schemeClr val="tx1"/>
-                </a:solidFill>
-                <a:latin typeface="+mn-lt"/>
-                <a:ea typeface="+mn-ea"/>
-                <a:cs typeface="+mn-cs"/>
-              </a:rPr>
-              <a:t>R2 </a:t>
-            </a:r>
-            <a:r>
-              <a:rPr lang="en-US" sz="1200" b="0" i="0" u="none" strike="noStrike" kern="1200" baseline="0" dirty="0" smtClean="0">
-                <a:solidFill>
-                  <a:schemeClr val="tx1"/>
-                </a:solidFill>
-                <a:latin typeface="+mn-lt"/>
-                <a:ea typeface="+mn-ea"/>
-                <a:cs typeface="+mn-cs"/>
-              </a:rPr>
-              <a:t>but adjusted by the # of cases and # of variables. When the # of variables is small and the # of cases is very large then </a:t>
-            </a:r>
-            <a:r>
-              <a:rPr lang="en-US" sz="1200" b="0" i="1" u="none" strike="noStrike" kern="1200" baseline="0" dirty="0" err="1" smtClean="0">
-                <a:solidFill>
-                  <a:schemeClr val="tx1"/>
-                </a:solidFill>
-                <a:latin typeface="+mn-lt"/>
-                <a:ea typeface="+mn-ea"/>
-                <a:cs typeface="+mn-cs"/>
-              </a:rPr>
-              <a:t>Adj</a:t>
-            </a:r>
-            <a:r>
-              <a:rPr lang="en-US" sz="1200" b="0" i="1" u="none" strike="noStrike" kern="1200" baseline="0" dirty="0" smtClean="0">
-                <a:solidFill>
-                  <a:schemeClr val="tx1"/>
-                </a:solidFill>
-                <a:latin typeface="+mn-lt"/>
-                <a:ea typeface="+mn-ea"/>
-                <a:cs typeface="+mn-cs"/>
-              </a:rPr>
-              <a:t> R2</a:t>
-            </a:r>
-            <a:r>
-              <a:rPr lang="en-US" sz="1200" b="0" i="0" u="none" strike="noStrike" kern="1200" baseline="0" dirty="0" smtClean="0">
-                <a:solidFill>
-                  <a:schemeClr val="tx1"/>
-                </a:solidFill>
-                <a:latin typeface="+mn-lt"/>
-                <a:ea typeface="+mn-ea"/>
-                <a:cs typeface="+mn-cs"/>
-              </a:rPr>
-              <a:t>is closer to </a:t>
-            </a:r>
-            <a:r>
-              <a:rPr lang="en-US" sz="1200" b="0" i="1" u="none" strike="noStrike" kern="1200" baseline="0" dirty="0" smtClean="0">
-                <a:solidFill>
-                  <a:schemeClr val="tx1"/>
-                </a:solidFill>
-                <a:latin typeface="+mn-lt"/>
-                <a:ea typeface="+mn-ea"/>
-                <a:cs typeface="+mn-cs"/>
-              </a:rPr>
-              <a:t>R2</a:t>
-            </a:r>
-            <a:r>
-              <a:rPr lang="en-US" sz="1200" b="0" i="0" u="none" strike="noStrike" kern="1200" baseline="0" dirty="0" smtClean="0">
-                <a:solidFill>
-                  <a:schemeClr val="tx1"/>
-                </a:solidFill>
-                <a:latin typeface="+mn-lt"/>
-                <a:ea typeface="+mn-ea"/>
-                <a:cs typeface="+mn-cs"/>
-              </a:rPr>
-              <a:t>. This provides a more honest association between X and Y.</a:t>
-            </a:r>
-          </a:p>
-          <a:p>
-            <a:pPr marL="228600" marR="0" indent="-228600" algn="l" defTabSz="914400" rtl="0" eaLnBrk="1" fontAlgn="auto" latinLnBrk="0" hangingPunct="1">
-              <a:lnSpc>
-                <a:spcPct val="100000"/>
-              </a:lnSpc>
-              <a:spcBef>
-                <a:spcPts val="0"/>
-              </a:spcBef>
-              <a:spcAft>
-                <a:spcPts val="0"/>
-              </a:spcAft>
-              <a:buClrTx/>
-              <a:buSzTx/>
-              <a:buFontTx/>
-              <a:buAutoNum type="arabicParenR"/>
-              <a:tabLst/>
-              <a:defRPr/>
-            </a:pPr>
-            <a:r>
-              <a:rPr lang="en-US" b="0" u="none" dirty="0" smtClean="0">
-                <a:solidFill>
-                  <a:srgbClr val="0E13E2"/>
-                </a:solidFill>
-              </a:rPr>
-              <a:t>F-statistic</a:t>
-            </a:r>
-            <a:r>
-              <a:rPr lang="en-US" b="0" u="none" baseline="0" dirty="0" smtClean="0">
-                <a:solidFill>
-                  <a:srgbClr val="0E13E2"/>
-                </a:solidFill>
-              </a:rPr>
-              <a:t> = tests the null hypothesis that all the model coefficients are 0; </a:t>
-            </a:r>
-            <a:r>
-              <a:rPr lang="en-US" sz="1200" b="0" i="0" u="none" strike="noStrike" kern="1200" baseline="0" dirty="0" smtClean="0">
-                <a:solidFill>
-                  <a:schemeClr val="tx1"/>
-                </a:solidFill>
-                <a:latin typeface="+mn-lt"/>
-                <a:ea typeface="+mn-ea"/>
-                <a:cs typeface="+mn-cs"/>
-              </a:rPr>
-              <a:t>p-value of the model--tests whether </a:t>
-            </a:r>
-            <a:r>
-              <a:rPr lang="en-US" sz="1200" b="0" i="1" u="none" strike="noStrike" kern="1200" baseline="0" dirty="0" smtClean="0">
-                <a:solidFill>
-                  <a:schemeClr val="tx1"/>
-                </a:solidFill>
-                <a:latin typeface="+mn-lt"/>
-                <a:ea typeface="+mn-ea"/>
-                <a:cs typeface="+mn-cs"/>
-              </a:rPr>
-              <a:t>R2</a:t>
-            </a:r>
-            <a:r>
-              <a:rPr lang="en-US" sz="1200" b="0" i="0" u="none" strike="noStrike" kern="1200" baseline="0" dirty="0" smtClean="0">
-                <a:solidFill>
-                  <a:schemeClr val="tx1"/>
-                </a:solidFill>
-                <a:latin typeface="+mn-lt"/>
-                <a:ea typeface="+mn-ea"/>
-                <a:cs typeface="+mn-cs"/>
-              </a:rPr>
-              <a:t>is different from 0. </a:t>
-            </a:r>
-            <a:endParaRPr lang="en-US" b="0" u="none" dirty="0" smtClean="0">
-              <a:solidFill>
-                <a:srgbClr val="0E13E2"/>
-              </a:solidFill>
-            </a:endParaRPr>
-          </a:p>
-          <a:p>
-            <a:pPr marL="228600" marR="0" indent="-228600" algn="l" defTabSz="914400" rtl="0" eaLnBrk="1" fontAlgn="auto" latinLnBrk="0" hangingPunct="1">
-              <a:lnSpc>
-                <a:spcPct val="100000"/>
-              </a:lnSpc>
-              <a:spcBef>
-                <a:spcPts val="0"/>
-              </a:spcBef>
-              <a:spcAft>
-                <a:spcPts val="0"/>
-              </a:spcAft>
-              <a:buClrTx/>
-              <a:buSzTx/>
-              <a:buFontTx/>
-              <a:buAutoNum type="arabicParenR"/>
-              <a:tabLst/>
-              <a:defRPr/>
-            </a:pPr>
-            <a:endParaRPr lang="en-US" b="0" u="none" dirty="0" smtClean="0">
-              <a:solidFill>
-                <a:srgbClr val="0E13E2"/>
-              </a:solidFill>
-            </a:endParaRPr>
-          </a:p>
-          <a:p>
-            <a:pPr marL="228600" marR="0" indent="-228600" algn="l" defTabSz="914400" rtl="0" eaLnBrk="1" fontAlgn="auto" latinLnBrk="0" hangingPunct="1">
-              <a:lnSpc>
-                <a:spcPct val="100000"/>
-              </a:lnSpc>
-              <a:spcBef>
-                <a:spcPts val="0"/>
-              </a:spcBef>
-              <a:spcAft>
-                <a:spcPts val="0"/>
-              </a:spcAft>
-              <a:buClrTx/>
-              <a:buSzTx/>
-              <a:buFontTx/>
-              <a:buAutoNum type="arabicParenR"/>
-              <a:tabLst/>
-              <a:defRPr/>
-            </a:pPr>
-            <a:endParaRPr lang="en-US" b="0" u="none" dirty="0" smtClean="0">
-              <a:solidFill>
-                <a:srgbClr val="0E13E2"/>
-              </a:solidFill>
-            </a:endParaRPr>
-          </a:p>
-          <a:p>
-            <a:pPr marL="228600" marR="0" indent="-228600" algn="l" defTabSz="914400" rtl="0" eaLnBrk="1" fontAlgn="auto" latinLnBrk="0" hangingPunct="1">
-              <a:lnSpc>
-                <a:spcPct val="100000"/>
-              </a:lnSpc>
-              <a:spcBef>
-                <a:spcPts val="0"/>
-              </a:spcBef>
-              <a:spcAft>
-                <a:spcPts val="0"/>
-              </a:spcAft>
-              <a:buClrTx/>
-              <a:buSzTx/>
-              <a:buFontTx/>
-              <a:buAutoNum type="arabicParenR"/>
-              <a:tabLst/>
-              <a:defRPr/>
-            </a:pPr>
-            <a:endParaRPr lang="en-US" b="0" u="none" dirty="0" smtClean="0">
-              <a:solidFill>
-                <a:srgbClr val="0E13E2"/>
-              </a:solidFill>
-            </a:endParaRPr>
-          </a:p>
-          <a:p>
-            <a:pPr marL="228600" indent="-228600">
-              <a:buAutoNum type="arabicParenR"/>
-            </a:pPr>
+              <a:t>choose a non-linear model, consider incorporating more predictor variables, or remove observations (if erroneous). </a:t>
+            </a:r>
             <a:endParaRPr lang="en-US" dirty="0"/>
           </a:p>
         </p:txBody>
@@ -2848,7 +2940,7 @@
           <a:p>
             <a:fld id="{CC5A1FCD-79C7-4337-B79E-A51417706FB1}" type="slidenum">
               <a:rPr lang="en-US" smtClean="0"/>
-              <a:t>12</a:t>
+              <a:t>11</a:t>
             </a:fld>
             <a:endParaRPr lang="en-US"/>
           </a:p>
@@ -2857,7 +2949,7 @@
     </p:spTree>
     <p:extLst>
       <p:ext uri="{BB962C8B-B14F-4D97-AF65-F5344CB8AC3E}">
-        <p14:creationId xmlns:p14="http://schemas.microsoft.com/office/powerpoint/2010/main" val="4230247132"/>
+        <p14:creationId xmlns:p14="http://schemas.microsoft.com/office/powerpoint/2010/main" val="476042789"/>
       </p:ext>
     </p:extLst>
   </p:cSld>
@@ -10089,7 +10181,11 @@
           <a:bodyPr/>
           <a:lstStyle/>
           <a:p>
-            <a:endParaRPr lang="en-US"/>
+            <a:r>
+              <a:rPr lang="en-US" dirty="0" smtClean="0"/>
+              <a:t>Pinto Basin, CA</a:t>
+            </a:r>
+            <a:endParaRPr lang="en-US" dirty="0"/>
           </a:p>
         </p:txBody>
       </p:sp>
@@ -10130,7 +10226,7 @@
         </p:blipFill>
         <p:spPr>
           <a:xfrm>
-            <a:off x="379716" y="1905000"/>
+            <a:off x="379716" y="1846730"/>
             <a:ext cx="7579895" cy="3429000"/>
           </a:xfrm>
           <a:prstGeom prst="rect">
@@ -10165,6 +10261,66 @@
               <a:t>Scull et al., 2005</a:t>
             </a:r>
             <a:endParaRPr lang="en-US" sz="1000" dirty="0"/>
+          </a:p>
+        </p:txBody>
+      </p:sp>
+      <p:sp>
+        <p:nvSpPr>
+          <p:cNvPr id="3" name="TextBox 2"/>
+          <p:cNvSpPr txBox="1"/>
+          <p:nvPr/>
+        </p:nvSpPr>
+        <p:spPr>
+          <a:xfrm>
+            <a:off x="908344" y="5050475"/>
+            <a:ext cx="3672800" cy="461665"/>
+          </a:xfrm>
+          <a:prstGeom prst="rect">
+            <a:avLst/>
+          </a:prstGeom>
+          <a:noFill/>
+        </p:spPr>
+        <p:txBody>
+          <a:bodyPr wrap="none" rtlCol="0">
+            <a:spAutoFit/>
+          </a:bodyPr>
+          <a:lstStyle/>
+          <a:p>
+            <a:r>
+              <a:rPr lang="en-US" sz="2400" dirty="0" smtClean="0"/>
+              <a:t>A horizon gravel content</a:t>
+            </a:r>
+            <a:endParaRPr lang="en-US" sz="2400" dirty="0"/>
+          </a:p>
+        </p:txBody>
+      </p:sp>
+      <p:sp>
+        <p:nvSpPr>
+          <p:cNvPr id="9" name="TextBox 8"/>
+          <p:cNvSpPr txBox="1"/>
+          <p:nvPr/>
+        </p:nvSpPr>
+        <p:spPr>
+          <a:xfrm>
+            <a:off x="4768100" y="5050475"/>
+            <a:ext cx="2908168" cy="461665"/>
+          </a:xfrm>
+          <a:prstGeom prst="rect">
+            <a:avLst/>
+          </a:prstGeom>
+          <a:noFill/>
+        </p:spPr>
+        <p:txBody>
+          <a:bodyPr wrap="none" rtlCol="0">
+            <a:spAutoFit/>
+          </a:bodyPr>
+          <a:lstStyle/>
+          <a:p>
+            <a:r>
+              <a:rPr lang="en-US" sz="2400" dirty="0" smtClean="0"/>
+              <a:t>Surface Fragments</a:t>
+            </a:r>
+            <a:endParaRPr lang="en-US" sz="2400" dirty="0"/>
           </a:p>
         </p:txBody>
       </p:sp>

</xml_diff>